<commit_message>
javascript day 4 slide updated
</commit_message>
<xml_diff>
--- a/Class Content/Day 4/JavaScript Lesson 4.pptx
+++ b/Class Content/Day 4/JavaScript Lesson 4.pptx
@@ -5,7 +5,7 @@
     <p:sldMasterId id="2147483659" r:id="rId1"/>
   </p:sldMasterIdLst>
   <p:notesMasterIdLst>
-    <p:notesMasterId r:id="rId13"/>
+    <p:notesMasterId r:id="rId27"/>
   </p:notesMasterIdLst>
   <p:sldIdLst>
     <p:sldId id="256" r:id="rId2"/>
@@ -16,19 +16,40 @@
     <p:sldId id="301" r:id="rId7"/>
     <p:sldId id="302" r:id="rId8"/>
     <p:sldId id="303" r:id="rId9"/>
-    <p:sldId id="304" r:id="rId10"/>
-    <p:sldId id="305" r:id="rId11"/>
-    <p:sldId id="274" r:id="rId12"/>
+    <p:sldId id="306" r:id="rId10"/>
+    <p:sldId id="307" r:id="rId11"/>
+    <p:sldId id="308" r:id="rId12"/>
+    <p:sldId id="309" r:id="rId13"/>
+    <p:sldId id="310" r:id="rId14"/>
+    <p:sldId id="311" r:id="rId15"/>
+    <p:sldId id="304" r:id="rId16"/>
+    <p:sldId id="312" r:id="rId17"/>
+    <p:sldId id="313" r:id="rId18"/>
+    <p:sldId id="314" r:id="rId19"/>
+    <p:sldId id="305" r:id="rId20"/>
+    <p:sldId id="315" r:id="rId21"/>
+    <p:sldId id="317" r:id="rId22"/>
+    <p:sldId id="316" r:id="rId23"/>
+    <p:sldId id="318" r:id="rId24"/>
+    <p:sldId id="319" r:id="rId25"/>
+    <p:sldId id="274" r:id="rId26"/>
   </p:sldIdLst>
   <p:sldSz cx="9144000" cy="5143500" type="screen16x9"/>
   <p:notesSz cx="6858000" cy="9144000"/>
   <p:embeddedFontLst>
     <p:embeddedFont>
+      <p:font typeface="Consolas" panose="020B0609020204030204" pitchFamily="49" charset="0"/>
+      <p:regular r:id="rId28"/>
+      <p:bold r:id="rId29"/>
+      <p:italic r:id="rId30"/>
+      <p:boldItalic r:id="rId31"/>
+    </p:embeddedFont>
+    <p:embeddedFont>
       <p:font typeface="Roboto" panose="020B0604020202020204" charset="0"/>
-      <p:regular r:id="rId14"/>
-      <p:bold r:id="rId15"/>
-      <p:italic r:id="rId16"/>
-      <p:boldItalic r:id="rId17"/>
+      <p:regular r:id="rId32"/>
+      <p:bold r:id="rId33"/>
+      <p:italic r:id="rId34"/>
+      <p:boldItalic r:id="rId35"/>
     </p:embeddedFont>
   </p:embeddedFontLst>
   <p:defaultTextStyle>
@@ -837,6 +858,72 @@
 </file>
 
 <file path=ppt/notesSlides/notesSlide2.xml><?xml version="1.0" encoding="utf-8"?>
+<p:notes xmlns:a="http://schemas.openxmlformats.org/drawingml/2006/main" xmlns:r="http://schemas.openxmlformats.org/officeDocument/2006/relationships" xmlns:p="http://schemas.openxmlformats.org/presentationml/2006/main">
+  <p:cSld>
+    <p:spTree>
+      <p:nvGrpSpPr>
+        <p:cNvPr id="1" name=""/>
+        <p:cNvGrpSpPr/>
+        <p:nvPr/>
+      </p:nvGrpSpPr>
+      <p:grpSpPr>
+        <a:xfrm>
+          <a:off x="0" y="0"/>
+          <a:ext cx="0" cy="0"/>
+          <a:chOff x="0" y="0"/>
+          <a:chExt cx="0" cy="0"/>
+        </a:xfrm>
+      </p:grpSpPr>
+      <p:sp>
+        <p:nvSpPr>
+          <p:cNvPr id="2" name="Slide Image Placeholder 1"/>
+          <p:cNvSpPr>
+            <a:spLocks noGrp="1" noRot="1" noChangeAspect="1"/>
+          </p:cNvSpPr>
+          <p:nvPr>
+            <p:ph type="sldImg"/>
+          </p:nvPr>
+        </p:nvSpPr>
+        <p:spPr>
+          <a:xfrm>
+            <a:off x="381000" y="685800"/>
+            <a:ext cx="6096000" cy="3429000"/>
+          </a:xfrm>
+        </p:spPr>
+      </p:sp>
+      <p:sp>
+        <p:nvSpPr>
+          <p:cNvPr id="3" name="Notes Placeholder 2"/>
+          <p:cNvSpPr>
+            <a:spLocks noGrp="1"/>
+          </p:cNvSpPr>
+          <p:nvPr>
+            <p:ph type="body" idx="1"/>
+          </p:nvPr>
+        </p:nvSpPr>
+        <p:spPr/>
+        <p:txBody>
+          <a:bodyPr/>
+          <a:lstStyle/>
+          <a:p>
+            <a:endParaRPr lang="en-US" dirty="0"/>
+          </a:p>
+        </p:txBody>
+      </p:sp>
+    </p:spTree>
+    <p:extLst>
+      <p:ext uri="{BB962C8B-B14F-4D97-AF65-F5344CB8AC3E}">
+        <p14:creationId xmlns:p14="http://schemas.microsoft.com/office/powerpoint/2010/main" val="1480082144"/>
+      </p:ext>
+    </p:extLst>
+  </p:cSld>
+  <p:clrMapOvr>
+    <a:masterClrMapping/>
+  </p:clrMapOvr>
+</p:notes>
+</file>
+
+<file path=ppt/notesSlides/notesSlide3.xml><?xml version="1.0" encoding="utf-8"?>
 <p:notes xmlns:a="http://schemas.openxmlformats.org/drawingml/2006/main" xmlns:r="http://schemas.openxmlformats.org/officeDocument/2006/relationships" xmlns:p="http://schemas.openxmlformats.org/presentationml/2006/main" showMasterSp="0" showMasterPhAnim="0">
   <p:cSld>
     <p:spTree>
@@ -6414,6 +6501,2671 @@
           <p:cNvPr id="2" name="Title 1">
             <a:extLst>
               <a:ext uri="{FF2B5EF4-FFF2-40B4-BE49-F238E27FC236}">
+                <a16:creationId xmlns:a16="http://schemas.microsoft.com/office/drawing/2014/main" id="{48D568A7-6FE8-439B-8EC7-6CA9B0C65522}"/>
+              </a:ext>
+            </a:extLst>
+          </p:cNvPr>
+          <p:cNvSpPr>
+            <a:spLocks noGrp="1"/>
+          </p:cNvSpPr>
+          <p:nvPr>
+            <p:ph type="title"/>
+          </p:nvPr>
+        </p:nvSpPr>
+        <p:spPr/>
+        <p:txBody>
+          <a:bodyPr/>
+          <a:lstStyle/>
+          <a:p>
+            <a:r>
+              <a:rPr lang="en-US" dirty="0"/>
+              <a:t>do…while Statement</a:t>
+            </a:r>
+          </a:p>
+        </p:txBody>
+      </p:sp>
+      <p:sp>
+        <p:nvSpPr>
+          <p:cNvPr id="5" name="TextBox 4">
+            <a:extLst>
+              <a:ext uri="{FF2B5EF4-FFF2-40B4-BE49-F238E27FC236}">
+                <a16:creationId xmlns:a16="http://schemas.microsoft.com/office/drawing/2014/main" id="{8ACF89A5-F4F0-4F23-9308-8ECC04ACFD9F}"/>
+              </a:ext>
+            </a:extLst>
+          </p:cNvPr>
+          <p:cNvSpPr txBox="1"/>
+          <p:nvPr/>
+        </p:nvSpPr>
+        <p:spPr>
+          <a:xfrm>
+            <a:off x="471900" y="1939434"/>
+            <a:ext cx="5709683" cy="3354765"/>
+          </a:xfrm>
+          <a:prstGeom prst="rect">
+            <a:avLst/>
+          </a:prstGeom>
+          <a:noFill/>
+        </p:spPr>
+        <p:txBody>
+          <a:bodyPr wrap="square" rtlCol="0">
+            <a:spAutoFit/>
+          </a:bodyPr>
+          <a:lstStyle/>
+          <a:p>
+            <a:pPr eaLnBrk="0" fontAlgn="base" hangingPunct="0">
+              <a:spcBef>
+                <a:spcPct val="0"/>
+              </a:spcBef>
+              <a:spcAft>
+                <a:spcPct val="0"/>
+              </a:spcAft>
+              <a:buClrTx/>
+            </a:pPr>
+            <a:r>
+              <a:rPr lang="en-US" altLang="en-US" sz="1800" dirty="0">
+                <a:solidFill>
+                  <a:schemeClr val="tx2"/>
+                </a:solidFill>
+                <a:latin typeface="Roboto" panose="020B0604020202020204" charset="0"/>
+                <a:ea typeface="Roboto" panose="020B0604020202020204" charset="0"/>
+              </a:rPr>
+              <a:t>do{ </a:t>
+            </a:r>
+          </a:p>
+          <a:p>
+            <a:pPr eaLnBrk="0" fontAlgn="base" hangingPunct="0">
+              <a:spcBef>
+                <a:spcPct val="0"/>
+              </a:spcBef>
+              <a:spcAft>
+                <a:spcPct val="0"/>
+              </a:spcAft>
+              <a:buClrTx/>
+            </a:pPr>
+            <a:r>
+              <a:rPr lang="en-US" altLang="en-US" sz="1800" dirty="0">
+                <a:solidFill>
+                  <a:schemeClr val="tx2"/>
+                </a:solidFill>
+                <a:latin typeface="Roboto" panose="020B0604020202020204" charset="0"/>
+                <a:ea typeface="Roboto" panose="020B0604020202020204" charset="0"/>
+              </a:rPr>
+              <a:t>        statement </a:t>
+            </a:r>
+          </a:p>
+          <a:p>
+            <a:pPr eaLnBrk="0" fontAlgn="base" hangingPunct="0">
+              <a:spcBef>
+                <a:spcPct val="0"/>
+              </a:spcBef>
+              <a:spcAft>
+                <a:spcPct val="0"/>
+              </a:spcAft>
+              <a:buClrTx/>
+            </a:pPr>
+            <a:r>
+              <a:rPr lang="en-US" altLang="en-US" sz="1800" dirty="0">
+                <a:solidFill>
+                  <a:schemeClr val="tx2"/>
+                </a:solidFill>
+                <a:latin typeface="Roboto" panose="020B0604020202020204" charset="0"/>
+                <a:ea typeface="Roboto" panose="020B0604020202020204" charset="0"/>
+              </a:rPr>
+              <a:t>}</a:t>
+            </a:r>
+          </a:p>
+          <a:p>
+            <a:pPr eaLnBrk="0" fontAlgn="base" hangingPunct="0">
+              <a:spcBef>
+                <a:spcPct val="0"/>
+              </a:spcBef>
+              <a:spcAft>
+                <a:spcPct val="0"/>
+              </a:spcAft>
+              <a:buClrTx/>
+            </a:pPr>
+            <a:r>
+              <a:rPr lang="en-US" altLang="en-US" sz="1800" dirty="0">
+                <a:solidFill>
+                  <a:schemeClr val="tx2"/>
+                </a:solidFill>
+                <a:latin typeface="Roboto" panose="020B0604020202020204" charset="0"/>
+                <a:ea typeface="Roboto" panose="020B0604020202020204" charset="0"/>
+              </a:rPr>
+              <a:t>while (condition); </a:t>
+            </a:r>
+          </a:p>
+          <a:p>
+            <a:pPr lvl="0" eaLnBrk="0" fontAlgn="base" hangingPunct="0">
+              <a:spcBef>
+                <a:spcPct val="0"/>
+              </a:spcBef>
+              <a:spcAft>
+                <a:spcPct val="0"/>
+              </a:spcAft>
+              <a:buClrTx/>
+            </a:pPr>
+            <a:endParaRPr lang="en-US" altLang="en-US" b="1" dirty="0">
+              <a:solidFill>
+                <a:schemeClr val="tx2"/>
+              </a:solidFill>
+              <a:latin typeface="Roboto" panose="020B0604020202020204" charset="0"/>
+              <a:ea typeface="Roboto" panose="020B0604020202020204" charset="0"/>
+            </a:endParaRPr>
+          </a:p>
+          <a:p>
+            <a:pPr lvl="0" eaLnBrk="0" fontAlgn="base" hangingPunct="0">
+              <a:spcBef>
+                <a:spcPct val="0"/>
+              </a:spcBef>
+              <a:spcAft>
+                <a:spcPct val="0"/>
+              </a:spcAft>
+              <a:buClrTx/>
+            </a:pPr>
+            <a:r>
+              <a:rPr lang="en-US" altLang="en-US" sz="2000" b="1" dirty="0">
+                <a:solidFill>
+                  <a:schemeClr val="tx2"/>
+                </a:solidFill>
+                <a:latin typeface="Roboto" panose="020B0604020202020204" charset="0"/>
+                <a:ea typeface="Roboto" panose="020B0604020202020204" charset="0"/>
+              </a:rPr>
+              <a:t>Example,</a:t>
+            </a:r>
+          </a:p>
+          <a:p>
+            <a:pPr lvl="0" eaLnBrk="0" fontAlgn="base" hangingPunct="0">
+              <a:spcBef>
+                <a:spcPct val="0"/>
+              </a:spcBef>
+              <a:spcAft>
+                <a:spcPct val="0"/>
+              </a:spcAft>
+              <a:buClrTx/>
+            </a:pPr>
+            <a:endParaRPr lang="en-US" altLang="en-US" sz="2000" b="1" dirty="0">
+              <a:solidFill>
+                <a:schemeClr val="tx2"/>
+              </a:solidFill>
+              <a:latin typeface="Roboto" panose="020B0604020202020204" charset="0"/>
+              <a:ea typeface="Roboto" panose="020B0604020202020204" charset="0"/>
+            </a:endParaRPr>
+          </a:p>
+          <a:p>
+            <a:pPr lvl="0" eaLnBrk="0" fontAlgn="base" hangingPunct="0">
+              <a:spcBef>
+                <a:spcPct val="0"/>
+              </a:spcBef>
+              <a:spcAft>
+                <a:spcPct val="0"/>
+              </a:spcAft>
+              <a:buClrTx/>
+            </a:pPr>
+            <a:r>
+              <a:rPr lang="en-US" altLang="en-US" sz="1800" dirty="0">
+                <a:solidFill>
+                  <a:schemeClr val="tx2"/>
+                </a:solidFill>
+                <a:latin typeface="Roboto" panose="020B0604020202020204" charset="0"/>
+                <a:ea typeface="Roboto" panose="020B0604020202020204" charset="0"/>
+              </a:rPr>
+              <a:t>do {</a:t>
+            </a:r>
+          </a:p>
+          <a:p>
+            <a:pPr lvl="0" eaLnBrk="0" fontAlgn="base" hangingPunct="0">
+              <a:spcBef>
+                <a:spcPct val="0"/>
+              </a:spcBef>
+              <a:spcAft>
+                <a:spcPct val="0"/>
+              </a:spcAft>
+              <a:buClrTx/>
+            </a:pPr>
+            <a:r>
+              <a:rPr lang="en-US" altLang="en-US" sz="1800" dirty="0">
+                <a:solidFill>
+                  <a:schemeClr val="tx2"/>
+                </a:solidFill>
+                <a:latin typeface="Roboto" panose="020B0604020202020204" charset="0"/>
+                <a:ea typeface="Roboto" panose="020B0604020202020204" charset="0"/>
+              </a:rPr>
+              <a:t>       </a:t>
+            </a:r>
+            <a:r>
+              <a:rPr lang="en-US" altLang="en-US" sz="1800" dirty="0" err="1">
+                <a:solidFill>
+                  <a:schemeClr val="tx2"/>
+                </a:solidFill>
+                <a:latin typeface="Roboto" panose="020B0604020202020204" charset="0"/>
+                <a:ea typeface="Roboto" panose="020B0604020202020204" charset="0"/>
+              </a:rPr>
+              <a:t>i</a:t>
+            </a:r>
+            <a:r>
+              <a:rPr lang="en-US" altLang="en-US" sz="1800" dirty="0">
+                <a:solidFill>
+                  <a:schemeClr val="tx2"/>
+                </a:solidFill>
+                <a:latin typeface="Roboto" panose="020B0604020202020204" charset="0"/>
+                <a:ea typeface="Roboto" panose="020B0604020202020204" charset="0"/>
+              </a:rPr>
+              <a:t> += 1; </a:t>
+            </a:r>
+            <a:r>
+              <a:rPr lang="en-US" altLang="en-US" sz="1800" dirty="0" err="1">
+                <a:solidFill>
+                  <a:schemeClr val="tx2"/>
+                </a:solidFill>
+                <a:latin typeface="Roboto" panose="020B0604020202020204" charset="0"/>
+                <a:ea typeface="Roboto" panose="020B0604020202020204" charset="0"/>
+              </a:rPr>
+              <a:t>document.write</a:t>
+            </a:r>
+            <a:r>
+              <a:rPr lang="en-US" altLang="en-US" sz="1800" dirty="0">
+                <a:solidFill>
+                  <a:schemeClr val="tx2"/>
+                </a:solidFill>
+                <a:latin typeface="Roboto" panose="020B0604020202020204" charset="0"/>
+                <a:ea typeface="Roboto" panose="020B0604020202020204" charset="0"/>
+              </a:rPr>
+              <a:t>(</a:t>
+            </a:r>
+            <a:r>
+              <a:rPr lang="en-US" altLang="en-US" sz="1800" dirty="0" err="1">
+                <a:solidFill>
+                  <a:schemeClr val="tx2"/>
+                </a:solidFill>
+                <a:latin typeface="Roboto" panose="020B0604020202020204" charset="0"/>
+                <a:ea typeface="Roboto" panose="020B0604020202020204" charset="0"/>
+              </a:rPr>
+              <a:t>i</a:t>
+            </a:r>
+            <a:r>
+              <a:rPr lang="en-US" altLang="en-US" sz="1800" dirty="0">
+                <a:solidFill>
+                  <a:schemeClr val="tx2"/>
+                </a:solidFill>
+                <a:latin typeface="Roboto" panose="020B0604020202020204" charset="0"/>
+                <a:ea typeface="Roboto" panose="020B0604020202020204" charset="0"/>
+              </a:rPr>
+              <a:t>); </a:t>
+            </a:r>
+          </a:p>
+          <a:p>
+            <a:pPr lvl="0" eaLnBrk="0" fontAlgn="base" hangingPunct="0">
+              <a:spcBef>
+                <a:spcPct val="0"/>
+              </a:spcBef>
+              <a:spcAft>
+                <a:spcPct val="0"/>
+              </a:spcAft>
+              <a:buClrTx/>
+            </a:pPr>
+            <a:r>
+              <a:rPr lang="en-US" altLang="en-US" sz="1800" dirty="0">
+                <a:solidFill>
+                  <a:schemeClr val="tx2"/>
+                </a:solidFill>
+                <a:latin typeface="Roboto" panose="020B0604020202020204" charset="0"/>
+                <a:ea typeface="Roboto" panose="020B0604020202020204" charset="0"/>
+              </a:rPr>
+              <a:t>} </a:t>
+            </a:r>
+          </a:p>
+          <a:p>
+            <a:pPr lvl="0" eaLnBrk="0" fontAlgn="base" hangingPunct="0">
+              <a:spcBef>
+                <a:spcPct val="0"/>
+              </a:spcBef>
+              <a:spcAft>
+                <a:spcPct val="0"/>
+              </a:spcAft>
+              <a:buClrTx/>
+            </a:pPr>
+            <a:r>
+              <a:rPr lang="en-US" altLang="en-US" sz="1800" dirty="0">
+                <a:solidFill>
+                  <a:schemeClr val="tx2"/>
+                </a:solidFill>
+                <a:latin typeface="Roboto" panose="020B0604020202020204" charset="0"/>
+                <a:ea typeface="Roboto" panose="020B0604020202020204" charset="0"/>
+              </a:rPr>
+              <a:t>while (</a:t>
+            </a:r>
+            <a:r>
+              <a:rPr lang="en-US" altLang="en-US" sz="1800" dirty="0" err="1">
+                <a:solidFill>
+                  <a:schemeClr val="tx2"/>
+                </a:solidFill>
+                <a:latin typeface="Roboto" panose="020B0604020202020204" charset="0"/>
+                <a:ea typeface="Roboto" panose="020B0604020202020204" charset="0"/>
+              </a:rPr>
+              <a:t>i</a:t>
+            </a:r>
+            <a:r>
+              <a:rPr lang="en-US" altLang="en-US" sz="1800" dirty="0">
+                <a:solidFill>
+                  <a:schemeClr val="tx2"/>
+                </a:solidFill>
+                <a:latin typeface="Roboto" panose="020B0604020202020204" charset="0"/>
+                <a:ea typeface="Roboto" panose="020B0604020202020204" charset="0"/>
+              </a:rPr>
+              <a:t> &lt; 5); </a:t>
+            </a:r>
+          </a:p>
+          <a:p>
+            <a:endParaRPr lang="en-US" dirty="0"/>
+          </a:p>
+        </p:txBody>
+      </p:sp>
+      <p:sp>
+        <p:nvSpPr>
+          <p:cNvPr id="6" name="Rectangle 2">
+            <a:extLst>
+              <a:ext uri="{FF2B5EF4-FFF2-40B4-BE49-F238E27FC236}">
+                <a16:creationId xmlns:a16="http://schemas.microsoft.com/office/drawing/2014/main" id="{515213F5-8BAB-49D4-94E7-C23B9EE5CC8B}"/>
+              </a:ext>
+            </a:extLst>
+          </p:cNvPr>
+          <p:cNvSpPr>
+            <a:spLocks noChangeArrowheads="1"/>
+          </p:cNvSpPr>
+          <p:nvPr/>
+        </p:nvSpPr>
+        <p:spPr bwMode="auto">
+          <a:xfrm>
+            <a:off x="0" y="43934"/>
+            <a:ext cx="184731" cy="369332"/>
+          </a:xfrm>
+          <a:prstGeom prst="rect">
+            <a:avLst/>
+          </a:prstGeom>
+          <a:solidFill>
+            <a:srgbClr val="FFFFFF"/>
+          </a:solidFill>
+          <a:ln>
+            <a:noFill/>
+          </a:ln>
+          <a:effectLst/>
+          <a:extLst>
+            <a:ext uri="{91240B29-F687-4F45-9708-019B960494DF}">
+              <a14:hiddenLine xmlns:a14="http://schemas.microsoft.com/office/drawing/2010/main" w="9525">
+                <a:solidFill>
+                  <a:schemeClr val="tx1"/>
+                </a:solidFill>
+                <a:miter lim="800000"/>
+                <a:headEnd/>
+                <a:tailEnd/>
+              </a14:hiddenLine>
+            </a:ext>
+            <a:ext uri="{AF507438-7753-43E0-B8FC-AC1667EBCBE1}">
+              <a14:hiddenEffects xmlns:a14="http://schemas.microsoft.com/office/drawing/2010/main">
+                <a:effectLst>
+                  <a:outerShdw dist="35921" dir="2700000" algn="ctr" rotWithShape="0">
+                    <a:schemeClr val="bg2"/>
+                  </a:outerShdw>
+                </a:effectLst>
+              </a14:hiddenEffects>
+            </a:ext>
+          </a:extLst>
+        </p:spPr>
+        <p:txBody>
+          <a:bodyPr vert="horz" wrap="none" lIns="91440" tIns="45720" rIns="91440" bIns="45720" numCol="1" anchor="ctr" anchorCtr="0" compatLnSpc="1">
+            <a:prstTxWarp prst="textNoShape">
+              <a:avLst/>
+            </a:prstTxWarp>
+            <a:spAutoFit/>
+          </a:bodyPr>
+          <a:lstStyle/>
+          <a:p>
+            <a:pPr marL="0" marR="0" lvl="0" indent="0" algn="l" defTabSz="914400" rtl="0" eaLnBrk="0" fontAlgn="base" latinLnBrk="0" hangingPunct="0">
+              <a:lnSpc>
+                <a:spcPct val="100000"/>
+              </a:lnSpc>
+              <a:spcBef>
+                <a:spcPct val="0"/>
+              </a:spcBef>
+              <a:spcAft>
+                <a:spcPct val="0"/>
+              </a:spcAft>
+              <a:buClrTx/>
+              <a:buSzTx/>
+              <a:buFontTx/>
+              <a:buNone/>
+              <a:tabLst/>
+            </a:pPr>
+            <a:endParaRPr kumimoji="0" lang="en-US" altLang="en-US" sz="1800" b="0" i="0" u="none" strike="noStrike" cap="none" normalizeH="0" baseline="0" dirty="0">
+              <a:ln>
+                <a:noFill/>
+              </a:ln>
+              <a:solidFill>
+                <a:schemeClr val="tx1"/>
+              </a:solidFill>
+              <a:effectLst/>
+              <a:latin typeface="Arial" panose="020B0604020202020204" pitchFamily="34" charset="0"/>
+            </a:endParaRPr>
+          </a:p>
+        </p:txBody>
+      </p:sp>
+    </p:spTree>
+    <p:extLst>
+      <p:ext uri="{BB962C8B-B14F-4D97-AF65-F5344CB8AC3E}">
+        <p14:creationId xmlns:p14="http://schemas.microsoft.com/office/powerpoint/2010/main" val="1318838838"/>
+      </p:ext>
+    </p:extLst>
+  </p:cSld>
+  <p:clrMapOvr>
+    <a:masterClrMapping/>
+  </p:clrMapOvr>
+</p:sld>
+</file>
+
+<file path=ppt/slides/slide11.xml><?xml version="1.0" encoding="utf-8"?>
+<p:sld xmlns:a="http://schemas.openxmlformats.org/drawingml/2006/main" xmlns:r="http://schemas.openxmlformats.org/officeDocument/2006/relationships" xmlns:p="http://schemas.openxmlformats.org/presentationml/2006/main">
+  <p:cSld>
+    <p:spTree>
+      <p:nvGrpSpPr>
+        <p:cNvPr id="1" name=""/>
+        <p:cNvGrpSpPr/>
+        <p:nvPr/>
+      </p:nvGrpSpPr>
+      <p:grpSpPr>
+        <a:xfrm>
+          <a:off x="0" y="0"/>
+          <a:ext cx="0" cy="0"/>
+          <a:chOff x="0" y="0"/>
+          <a:chExt cx="0" cy="0"/>
+        </a:xfrm>
+      </p:grpSpPr>
+      <p:sp>
+        <p:nvSpPr>
+          <p:cNvPr id="2" name="Title 1">
+            <a:extLst>
+              <a:ext uri="{FF2B5EF4-FFF2-40B4-BE49-F238E27FC236}">
+                <a16:creationId xmlns:a16="http://schemas.microsoft.com/office/drawing/2014/main" id="{93E9E559-14F7-4944-89FA-26F2150BB650}"/>
+              </a:ext>
+            </a:extLst>
+          </p:cNvPr>
+          <p:cNvSpPr>
+            <a:spLocks noGrp="1"/>
+          </p:cNvSpPr>
+          <p:nvPr>
+            <p:ph type="title"/>
+          </p:nvPr>
+        </p:nvSpPr>
+        <p:spPr/>
+        <p:txBody>
+          <a:bodyPr/>
+          <a:lstStyle/>
+          <a:p>
+            <a:r>
+              <a:rPr lang="en-US" dirty="0"/>
+              <a:t>while Statement</a:t>
+            </a:r>
+          </a:p>
+        </p:txBody>
+      </p:sp>
+      <p:sp>
+        <p:nvSpPr>
+          <p:cNvPr id="3" name="Text Placeholder 2">
+            <a:extLst>
+              <a:ext uri="{FF2B5EF4-FFF2-40B4-BE49-F238E27FC236}">
+                <a16:creationId xmlns:a16="http://schemas.microsoft.com/office/drawing/2014/main" id="{0542990A-7E8A-42DA-AF21-2BB2C7424C7E}"/>
+              </a:ext>
+            </a:extLst>
+          </p:cNvPr>
+          <p:cNvSpPr>
+            <a:spLocks noGrp="1"/>
+          </p:cNvSpPr>
+          <p:nvPr>
+            <p:ph type="body" idx="1"/>
+          </p:nvPr>
+        </p:nvSpPr>
+        <p:spPr>
+          <a:xfrm>
+            <a:off x="460950" y="1743740"/>
+            <a:ext cx="8222100" cy="3399759"/>
+          </a:xfrm>
+        </p:spPr>
+        <p:txBody>
+          <a:bodyPr/>
+          <a:lstStyle/>
+          <a:p>
+            <a:pPr marL="114300" indent="0" eaLnBrk="0" fontAlgn="base" hangingPunct="0">
+              <a:spcBef>
+                <a:spcPct val="0"/>
+              </a:spcBef>
+              <a:spcAft>
+                <a:spcPct val="0"/>
+              </a:spcAft>
+              <a:buClrTx/>
+              <a:buNone/>
+            </a:pPr>
+            <a:r>
+              <a:rPr lang="en-US" altLang="en-US" dirty="0">
+                <a:solidFill>
+                  <a:schemeClr val="tx2"/>
+                </a:solidFill>
+                <a:latin typeface="Roboto" panose="020B0604020202020204" charset="0"/>
+                <a:ea typeface="Roboto" panose="020B0604020202020204" charset="0"/>
+              </a:rPr>
+              <a:t>while (condition){</a:t>
+            </a:r>
+          </a:p>
+          <a:p>
+            <a:pPr marL="114300" indent="0" eaLnBrk="0" fontAlgn="base" hangingPunct="0">
+              <a:spcBef>
+                <a:spcPct val="0"/>
+              </a:spcBef>
+              <a:spcAft>
+                <a:spcPct val="0"/>
+              </a:spcAft>
+              <a:buClrTx/>
+              <a:buNone/>
+            </a:pPr>
+            <a:r>
+              <a:rPr lang="en-US" altLang="en-US" dirty="0">
+                <a:solidFill>
+                  <a:schemeClr val="tx2"/>
+                </a:solidFill>
+                <a:latin typeface="Roboto" panose="020B0604020202020204" charset="0"/>
+                <a:ea typeface="Roboto" panose="020B0604020202020204" charset="0"/>
+              </a:rPr>
+              <a:t>       statement</a:t>
+            </a:r>
+          </a:p>
+          <a:p>
+            <a:pPr marL="114300" indent="0" eaLnBrk="0" fontAlgn="base" hangingPunct="0">
+              <a:spcBef>
+                <a:spcPct val="0"/>
+              </a:spcBef>
+              <a:spcAft>
+                <a:spcPct val="0"/>
+              </a:spcAft>
+              <a:buClrTx/>
+              <a:buNone/>
+            </a:pPr>
+            <a:r>
+              <a:rPr lang="en-US" altLang="en-US" dirty="0">
+                <a:solidFill>
+                  <a:schemeClr val="tx2"/>
+                </a:solidFill>
+                <a:latin typeface="Roboto" panose="020B0604020202020204" charset="0"/>
+                <a:ea typeface="Roboto" panose="020B0604020202020204" charset="0"/>
+              </a:rPr>
+              <a:t>}</a:t>
+            </a:r>
+            <a:endParaRPr lang="en-US" altLang="en-US" b="1" dirty="0">
+              <a:solidFill>
+                <a:schemeClr val="tx2"/>
+              </a:solidFill>
+              <a:latin typeface="Roboto" panose="020B0604020202020204" charset="0"/>
+              <a:ea typeface="Roboto" panose="020B0604020202020204" charset="0"/>
+            </a:endParaRPr>
+          </a:p>
+          <a:p>
+            <a:pPr marL="114300" lvl="0" indent="0" eaLnBrk="0" fontAlgn="base" hangingPunct="0">
+              <a:spcBef>
+                <a:spcPct val="0"/>
+              </a:spcBef>
+              <a:spcAft>
+                <a:spcPct val="0"/>
+              </a:spcAft>
+              <a:buClrTx/>
+              <a:buNone/>
+            </a:pPr>
+            <a:r>
+              <a:rPr lang="en-US" altLang="en-US" sz="2000" b="1" dirty="0">
+                <a:solidFill>
+                  <a:schemeClr val="tx2"/>
+                </a:solidFill>
+                <a:latin typeface="Roboto" panose="020B0604020202020204" charset="0"/>
+                <a:ea typeface="Roboto" panose="020B0604020202020204" charset="0"/>
+              </a:rPr>
+              <a:t>Example,</a:t>
+            </a:r>
+          </a:p>
+          <a:p>
+            <a:pPr marL="114300" lvl="0" indent="0" eaLnBrk="0" fontAlgn="base" hangingPunct="0">
+              <a:spcBef>
+                <a:spcPct val="0"/>
+              </a:spcBef>
+              <a:spcAft>
+                <a:spcPct val="0"/>
+              </a:spcAft>
+              <a:buClrTx/>
+              <a:buNone/>
+            </a:pPr>
+            <a:endParaRPr lang="en-US" altLang="en-US" sz="2000" b="1" dirty="0">
+              <a:solidFill>
+                <a:schemeClr val="tx2"/>
+              </a:solidFill>
+              <a:latin typeface="Roboto" panose="020B0604020202020204" charset="0"/>
+              <a:ea typeface="Roboto" panose="020B0604020202020204" charset="0"/>
+            </a:endParaRPr>
+          </a:p>
+          <a:p>
+            <a:pPr marL="114300" lvl="0" indent="0" eaLnBrk="0" fontAlgn="base" hangingPunct="0">
+              <a:spcBef>
+                <a:spcPct val="0"/>
+              </a:spcBef>
+              <a:spcAft>
+                <a:spcPct val="0"/>
+              </a:spcAft>
+              <a:buClrTx/>
+              <a:buNone/>
+            </a:pPr>
+            <a:r>
+              <a:rPr lang="en-US" altLang="en-US" sz="2000" dirty="0">
+                <a:solidFill>
+                  <a:schemeClr val="tx2"/>
+                </a:solidFill>
+                <a:latin typeface="Roboto" panose="020B0604020202020204" charset="0"/>
+                <a:ea typeface="Roboto" panose="020B0604020202020204" charset="0"/>
+              </a:rPr>
+              <a:t>Let I = 1;</a:t>
+            </a:r>
+          </a:p>
+          <a:p>
+            <a:pPr marL="114300" lvl="0" indent="0" eaLnBrk="0" fontAlgn="base" hangingPunct="0">
+              <a:spcBef>
+                <a:spcPct val="0"/>
+              </a:spcBef>
+              <a:spcAft>
+                <a:spcPct val="0"/>
+              </a:spcAft>
+              <a:buClrTx/>
+              <a:buNone/>
+            </a:pPr>
+            <a:r>
+              <a:rPr lang="en-US" altLang="en-US" dirty="0">
+                <a:solidFill>
+                  <a:schemeClr val="tx2"/>
+                </a:solidFill>
+                <a:latin typeface="Roboto" panose="020B0604020202020204" charset="0"/>
+                <a:ea typeface="Roboto" panose="020B0604020202020204" charset="0"/>
+              </a:rPr>
+              <a:t>while (</a:t>
+            </a:r>
+            <a:r>
+              <a:rPr lang="en-US" altLang="en-US" dirty="0" err="1">
+                <a:solidFill>
+                  <a:schemeClr val="tx2"/>
+                </a:solidFill>
+                <a:latin typeface="Roboto" panose="020B0604020202020204" charset="0"/>
+                <a:ea typeface="Roboto" panose="020B0604020202020204" charset="0"/>
+              </a:rPr>
+              <a:t>i</a:t>
+            </a:r>
+            <a:r>
+              <a:rPr lang="en-US" altLang="en-US" dirty="0">
+                <a:solidFill>
+                  <a:schemeClr val="tx2"/>
+                </a:solidFill>
+                <a:latin typeface="Roboto" panose="020B0604020202020204" charset="0"/>
+                <a:ea typeface="Roboto" panose="020B0604020202020204" charset="0"/>
+              </a:rPr>
+              <a:t> &lt; 5){</a:t>
+            </a:r>
+          </a:p>
+          <a:p>
+            <a:pPr marL="114300" lvl="0" indent="0" eaLnBrk="0" fontAlgn="base" hangingPunct="0">
+              <a:spcBef>
+                <a:spcPct val="0"/>
+              </a:spcBef>
+              <a:spcAft>
+                <a:spcPct val="0"/>
+              </a:spcAft>
+              <a:buClrTx/>
+              <a:buNone/>
+            </a:pPr>
+            <a:r>
+              <a:rPr lang="en-US" altLang="en-US" dirty="0">
+                <a:solidFill>
+                  <a:schemeClr val="tx2"/>
+                </a:solidFill>
+                <a:latin typeface="Roboto" panose="020B0604020202020204" charset="0"/>
+                <a:ea typeface="Roboto" panose="020B0604020202020204" charset="0"/>
+              </a:rPr>
+              <a:t>        Consol.log(</a:t>
+            </a:r>
+            <a:r>
+              <a:rPr lang="en-US" altLang="en-US" dirty="0" err="1">
+                <a:solidFill>
+                  <a:schemeClr val="tx2"/>
+                </a:solidFill>
+                <a:latin typeface="Roboto" panose="020B0604020202020204" charset="0"/>
+                <a:ea typeface="Roboto" panose="020B0604020202020204" charset="0"/>
+              </a:rPr>
+              <a:t>i</a:t>
+            </a:r>
+            <a:r>
+              <a:rPr lang="en-US" altLang="en-US" dirty="0">
+                <a:solidFill>
+                  <a:schemeClr val="tx2"/>
+                </a:solidFill>
+                <a:latin typeface="Roboto" panose="020B0604020202020204" charset="0"/>
+                <a:ea typeface="Roboto" panose="020B0604020202020204" charset="0"/>
+              </a:rPr>
+              <a:t>);</a:t>
+            </a:r>
+          </a:p>
+          <a:p>
+            <a:pPr marL="114300" lvl="0" indent="0" eaLnBrk="0" fontAlgn="base" hangingPunct="0">
+              <a:spcBef>
+                <a:spcPct val="0"/>
+              </a:spcBef>
+              <a:spcAft>
+                <a:spcPct val="0"/>
+              </a:spcAft>
+              <a:buClrTx/>
+              <a:buNone/>
+            </a:pPr>
+            <a:r>
+              <a:rPr lang="en-US" altLang="en-US" dirty="0">
+                <a:solidFill>
+                  <a:schemeClr val="tx2"/>
+                </a:solidFill>
+                <a:latin typeface="Roboto" panose="020B0604020202020204" charset="0"/>
+                <a:ea typeface="Roboto" panose="020B0604020202020204" charset="0"/>
+              </a:rPr>
+              <a:t>         </a:t>
+            </a:r>
+            <a:r>
+              <a:rPr lang="en-US" altLang="en-US" dirty="0" err="1">
+                <a:solidFill>
+                  <a:schemeClr val="tx2"/>
+                </a:solidFill>
+                <a:latin typeface="Roboto" panose="020B0604020202020204" charset="0"/>
+                <a:ea typeface="Roboto" panose="020B0604020202020204" charset="0"/>
+              </a:rPr>
+              <a:t>i</a:t>
+            </a:r>
+            <a:r>
+              <a:rPr lang="en-US" altLang="en-US" dirty="0">
+                <a:solidFill>
+                  <a:schemeClr val="tx2"/>
+                </a:solidFill>
+                <a:latin typeface="Roboto" panose="020B0604020202020204" charset="0"/>
+                <a:ea typeface="Roboto" panose="020B0604020202020204" charset="0"/>
+              </a:rPr>
+              <a:t>++;</a:t>
+            </a:r>
+          </a:p>
+          <a:p>
+            <a:pPr marL="114300" lvl="0" indent="0" eaLnBrk="0" fontAlgn="base" hangingPunct="0">
+              <a:spcBef>
+                <a:spcPct val="0"/>
+              </a:spcBef>
+              <a:spcAft>
+                <a:spcPct val="0"/>
+              </a:spcAft>
+              <a:buClrTx/>
+              <a:buNone/>
+            </a:pPr>
+            <a:r>
+              <a:rPr lang="en-US" altLang="en-US" dirty="0">
+                <a:solidFill>
+                  <a:schemeClr val="tx2"/>
+                </a:solidFill>
+                <a:latin typeface="Roboto" panose="020B0604020202020204" charset="0"/>
+                <a:ea typeface="Roboto" panose="020B0604020202020204" charset="0"/>
+              </a:rPr>
+              <a:t>} </a:t>
+            </a:r>
+          </a:p>
+          <a:p>
+            <a:pPr marL="114300" indent="0">
+              <a:buNone/>
+            </a:pPr>
+            <a:endParaRPr lang="en-US" dirty="0"/>
+          </a:p>
+        </p:txBody>
+      </p:sp>
+    </p:spTree>
+    <p:extLst>
+      <p:ext uri="{BB962C8B-B14F-4D97-AF65-F5344CB8AC3E}">
+        <p14:creationId xmlns:p14="http://schemas.microsoft.com/office/powerpoint/2010/main" val="859140621"/>
+      </p:ext>
+    </p:extLst>
+  </p:cSld>
+  <p:clrMapOvr>
+    <a:masterClrMapping/>
+  </p:clrMapOvr>
+</p:sld>
+</file>
+
+<file path=ppt/slides/slide12.xml><?xml version="1.0" encoding="utf-8"?>
+<p:sld xmlns:a="http://schemas.openxmlformats.org/drawingml/2006/main" xmlns:r="http://schemas.openxmlformats.org/officeDocument/2006/relationships" xmlns:p="http://schemas.openxmlformats.org/presentationml/2006/main">
+  <p:cSld>
+    <p:spTree>
+      <p:nvGrpSpPr>
+        <p:cNvPr id="1" name=""/>
+        <p:cNvGrpSpPr/>
+        <p:nvPr/>
+      </p:nvGrpSpPr>
+      <p:grpSpPr>
+        <a:xfrm>
+          <a:off x="0" y="0"/>
+          <a:ext cx="0" cy="0"/>
+          <a:chOff x="0" y="0"/>
+          <a:chExt cx="0" cy="0"/>
+        </a:xfrm>
+      </p:grpSpPr>
+      <p:sp>
+        <p:nvSpPr>
+          <p:cNvPr id="2" name="Title 1">
+            <a:extLst>
+              <a:ext uri="{FF2B5EF4-FFF2-40B4-BE49-F238E27FC236}">
+                <a16:creationId xmlns:a16="http://schemas.microsoft.com/office/drawing/2014/main" id="{B0B184B8-1E24-4FAA-80E6-30D0D52CABBA}"/>
+              </a:ext>
+            </a:extLst>
+          </p:cNvPr>
+          <p:cNvSpPr>
+            <a:spLocks noGrp="1"/>
+          </p:cNvSpPr>
+          <p:nvPr>
+            <p:ph type="title"/>
+          </p:nvPr>
+        </p:nvSpPr>
+        <p:spPr/>
+        <p:txBody>
+          <a:bodyPr/>
+          <a:lstStyle/>
+          <a:p>
+            <a:r>
+              <a:rPr lang="en-US" dirty="0"/>
+              <a:t>label Statement</a:t>
+            </a:r>
+          </a:p>
+        </p:txBody>
+      </p:sp>
+      <p:sp>
+        <p:nvSpPr>
+          <p:cNvPr id="5" name="Text Placeholder 4">
+            <a:extLst>
+              <a:ext uri="{FF2B5EF4-FFF2-40B4-BE49-F238E27FC236}">
+                <a16:creationId xmlns:a16="http://schemas.microsoft.com/office/drawing/2014/main" id="{DDFD8471-3D55-4C21-80E4-E0B47EF73689}"/>
+              </a:ext>
+            </a:extLst>
+          </p:cNvPr>
+          <p:cNvSpPr>
+            <a:spLocks noGrp="1"/>
+          </p:cNvSpPr>
+          <p:nvPr>
+            <p:ph type="body" idx="1"/>
+          </p:nvPr>
+        </p:nvSpPr>
+        <p:spPr>
+          <a:xfrm>
+            <a:off x="471900" y="1780851"/>
+            <a:ext cx="8222100" cy="3224425"/>
+          </a:xfrm>
+        </p:spPr>
+        <p:txBody>
+          <a:bodyPr/>
+          <a:lstStyle/>
+          <a:p>
+            <a:pPr marL="114300" indent="0">
+              <a:buNone/>
+            </a:pPr>
+            <a:r>
+              <a:rPr lang="en-US" altLang="en-US" dirty="0">
+                <a:solidFill>
+                  <a:schemeClr val="tx2"/>
+                </a:solidFill>
+                <a:latin typeface="Roboto" panose="020B0604020202020204" charset="0"/>
+                <a:ea typeface="Roboto" panose="020B0604020202020204" charset="0"/>
+              </a:rPr>
+              <a:t>label :</a:t>
+            </a:r>
+          </a:p>
+          <a:p>
+            <a:pPr marL="114300" indent="0">
+              <a:buNone/>
+            </a:pPr>
+            <a:r>
+              <a:rPr lang="en-US" altLang="en-US" dirty="0">
+                <a:solidFill>
+                  <a:schemeClr val="tx2"/>
+                </a:solidFill>
+                <a:latin typeface="Roboto" panose="020B0604020202020204" charset="0"/>
+                <a:ea typeface="Roboto" panose="020B0604020202020204" charset="0"/>
+              </a:rPr>
+              <a:t>         statement</a:t>
+            </a:r>
+          </a:p>
+          <a:p>
+            <a:pPr marL="114300" indent="0">
+              <a:buNone/>
+            </a:pPr>
+            <a:endParaRPr lang="en-US" b="1" dirty="0">
+              <a:solidFill>
+                <a:schemeClr val="bg2"/>
+              </a:solidFill>
+              <a:latin typeface="Roboto" panose="020B0604020202020204" charset="0"/>
+              <a:ea typeface="Roboto" panose="020B0604020202020204" charset="0"/>
+            </a:endParaRPr>
+          </a:p>
+          <a:p>
+            <a:pPr marL="114300" indent="0">
+              <a:buNone/>
+            </a:pPr>
+            <a:r>
+              <a:rPr lang="en-US" b="1" dirty="0">
+                <a:solidFill>
+                  <a:schemeClr val="bg2"/>
+                </a:solidFill>
+                <a:latin typeface="Roboto" panose="020B0604020202020204" charset="0"/>
+                <a:ea typeface="Roboto" panose="020B0604020202020204" charset="0"/>
+              </a:rPr>
+              <a:t>Example, </a:t>
+            </a:r>
+          </a:p>
+          <a:p>
+            <a:pPr marL="114300" indent="0">
+              <a:buNone/>
+            </a:pPr>
+            <a:endParaRPr lang="en-US" dirty="0">
+              <a:solidFill>
+                <a:schemeClr val="tx2"/>
+              </a:solidFill>
+              <a:latin typeface="Roboto" panose="020B0604020202020204" charset="0"/>
+              <a:ea typeface="Roboto" panose="020B0604020202020204" charset="0"/>
+            </a:endParaRPr>
+          </a:p>
+          <a:p>
+            <a:pPr marL="114300" indent="0">
+              <a:buNone/>
+            </a:pPr>
+            <a:r>
+              <a:rPr lang="en-US" altLang="en-US" dirty="0" err="1">
+                <a:solidFill>
+                  <a:schemeClr val="tx2"/>
+                </a:solidFill>
+                <a:latin typeface="Roboto" panose="020B0604020202020204" charset="0"/>
+                <a:ea typeface="Roboto" panose="020B0604020202020204" charset="0"/>
+              </a:rPr>
+              <a:t>markLoop</a:t>
+            </a:r>
+            <a:r>
+              <a:rPr lang="en-US" altLang="en-US" dirty="0">
+                <a:solidFill>
+                  <a:schemeClr val="tx2"/>
+                </a:solidFill>
+                <a:latin typeface="Roboto" panose="020B0604020202020204" charset="0"/>
+                <a:ea typeface="Roboto" panose="020B0604020202020204" charset="0"/>
+              </a:rPr>
+              <a:t>: </a:t>
+            </a:r>
+          </a:p>
+          <a:p>
+            <a:pPr marL="114300" indent="0">
+              <a:buNone/>
+            </a:pPr>
+            <a:r>
+              <a:rPr lang="en-US" altLang="en-US" dirty="0">
+                <a:solidFill>
+                  <a:schemeClr val="tx2"/>
+                </a:solidFill>
+                <a:latin typeface="Roboto" panose="020B0604020202020204" charset="0"/>
+                <a:ea typeface="Roboto" panose="020B0604020202020204" charset="0"/>
+              </a:rPr>
+              <a:t>while (</a:t>
+            </a:r>
+            <a:r>
+              <a:rPr lang="en-US" altLang="en-US" dirty="0" err="1">
+                <a:solidFill>
+                  <a:schemeClr val="tx2"/>
+                </a:solidFill>
+                <a:latin typeface="Roboto" panose="020B0604020202020204" charset="0"/>
+                <a:ea typeface="Roboto" panose="020B0604020202020204" charset="0"/>
+              </a:rPr>
+              <a:t>theMark</a:t>
+            </a:r>
+            <a:r>
+              <a:rPr lang="en-US" altLang="en-US" dirty="0">
+                <a:solidFill>
+                  <a:schemeClr val="tx2"/>
+                </a:solidFill>
+                <a:latin typeface="Roboto" panose="020B0604020202020204" charset="0"/>
+                <a:ea typeface="Roboto" panose="020B0604020202020204" charset="0"/>
+              </a:rPr>
+              <a:t> == true) </a:t>
+            </a:r>
+          </a:p>
+          <a:p>
+            <a:pPr marL="114300" indent="0">
+              <a:buNone/>
+            </a:pPr>
+            <a:r>
+              <a:rPr lang="en-US" altLang="en-US" dirty="0">
+                <a:solidFill>
+                  <a:schemeClr val="tx2"/>
+                </a:solidFill>
+                <a:latin typeface="Roboto" panose="020B0604020202020204" charset="0"/>
+                <a:ea typeface="Roboto" panose="020B0604020202020204" charset="0"/>
+              </a:rPr>
+              <a:t>{ </a:t>
+            </a:r>
+          </a:p>
+          <a:p>
+            <a:pPr marL="114300" indent="0">
+              <a:buNone/>
+            </a:pPr>
+            <a:r>
+              <a:rPr lang="en-US" altLang="en-US" dirty="0" err="1">
+                <a:solidFill>
+                  <a:schemeClr val="tx2"/>
+                </a:solidFill>
+                <a:latin typeface="Roboto" panose="020B0604020202020204" charset="0"/>
+                <a:ea typeface="Roboto" panose="020B0604020202020204" charset="0"/>
+              </a:rPr>
+              <a:t>doSomething</a:t>
+            </a:r>
+            <a:r>
+              <a:rPr lang="en-US" altLang="en-US" dirty="0">
+                <a:solidFill>
+                  <a:schemeClr val="tx2"/>
+                </a:solidFill>
+                <a:latin typeface="Roboto" panose="020B0604020202020204" charset="0"/>
+                <a:ea typeface="Roboto" panose="020B0604020202020204" charset="0"/>
+              </a:rPr>
+              <a:t>(); </a:t>
+            </a:r>
+          </a:p>
+          <a:p>
+            <a:pPr marL="114300" indent="0">
+              <a:buNone/>
+            </a:pPr>
+            <a:r>
+              <a:rPr lang="en-US" altLang="en-US" dirty="0">
+                <a:solidFill>
+                  <a:schemeClr val="tx2"/>
+                </a:solidFill>
+                <a:latin typeface="Roboto" panose="020B0604020202020204" charset="0"/>
+                <a:ea typeface="Roboto" panose="020B0604020202020204" charset="0"/>
+              </a:rPr>
+              <a:t>} </a:t>
+            </a:r>
+          </a:p>
+          <a:p>
+            <a:pPr marL="114300" indent="0">
+              <a:buNone/>
+            </a:pPr>
+            <a:endParaRPr lang="en-US" dirty="0">
+              <a:solidFill>
+                <a:schemeClr val="tx2"/>
+              </a:solidFill>
+              <a:latin typeface="Roboto" panose="020B0604020202020204" charset="0"/>
+              <a:ea typeface="Roboto" panose="020B0604020202020204" charset="0"/>
+            </a:endParaRPr>
+          </a:p>
+          <a:p>
+            <a:pPr marL="114300" indent="0">
+              <a:buNone/>
+            </a:pPr>
+            <a:endParaRPr lang="en-US" dirty="0">
+              <a:solidFill>
+                <a:schemeClr val="tx2"/>
+              </a:solidFill>
+              <a:latin typeface="Roboto" panose="020B0604020202020204" charset="0"/>
+              <a:ea typeface="Roboto" panose="020B0604020202020204" charset="0"/>
+            </a:endParaRPr>
+          </a:p>
+          <a:p>
+            <a:pPr marL="114300" indent="0">
+              <a:buNone/>
+            </a:pPr>
+            <a:endParaRPr lang="en-US" dirty="0">
+              <a:latin typeface="Roboto" panose="020B0604020202020204" charset="0"/>
+              <a:ea typeface="Roboto" panose="020B0604020202020204" charset="0"/>
+            </a:endParaRPr>
+          </a:p>
+        </p:txBody>
+      </p:sp>
+    </p:spTree>
+    <p:extLst>
+      <p:ext uri="{BB962C8B-B14F-4D97-AF65-F5344CB8AC3E}">
+        <p14:creationId xmlns:p14="http://schemas.microsoft.com/office/powerpoint/2010/main" val="4286491102"/>
+      </p:ext>
+    </p:extLst>
+  </p:cSld>
+  <p:clrMapOvr>
+    <a:masterClrMapping/>
+  </p:clrMapOvr>
+</p:sld>
+</file>
+
+<file path=ppt/slides/slide13.xml><?xml version="1.0" encoding="utf-8"?>
+<p:sld xmlns:a="http://schemas.openxmlformats.org/drawingml/2006/main" xmlns:r="http://schemas.openxmlformats.org/officeDocument/2006/relationships" xmlns:p="http://schemas.openxmlformats.org/presentationml/2006/main">
+  <p:cSld>
+    <p:spTree>
+      <p:nvGrpSpPr>
+        <p:cNvPr id="1" name=""/>
+        <p:cNvGrpSpPr/>
+        <p:nvPr/>
+      </p:nvGrpSpPr>
+      <p:grpSpPr>
+        <a:xfrm>
+          <a:off x="0" y="0"/>
+          <a:ext cx="0" cy="0"/>
+          <a:chOff x="0" y="0"/>
+          <a:chExt cx="0" cy="0"/>
+        </a:xfrm>
+      </p:grpSpPr>
+      <p:sp>
+        <p:nvSpPr>
+          <p:cNvPr id="2" name="Title 1">
+            <a:extLst>
+              <a:ext uri="{FF2B5EF4-FFF2-40B4-BE49-F238E27FC236}">
+                <a16:creationId xmlns:a16="http://schemas.microsoft.com/office/drawing/2014/main" id="{BCB4A8F3-37A5-4157-BE0B-EC70F883C8A5}"/>
+              </a:ext>
+            </a:extLst>
+          </p:cNvPr>
+          <p:cNvSpPr>
+            <a:spLocks noGrp="1"/>
+          </p:cNvSpPr>
+          <p:nvPr>
+            <p:ph type="title"/>
+          </p:nvPr>
+        </p:nvSpPr>
+        <p:spPr/>
+        <p:txBody>
+          <a:bodyPr/>
+          <a:lstStyle/>
+          <a:p>
+            <a:r>
+              <a:rPr lang="en-US" dirty="0"/>
+              <a:t>break Statement</a:t>
+            </a:r>
+          </a:p>
+        </p:txBody>
+      </p:sp>
+      <p:sp>
+        <p:nvSpPr>
+          <p:cNvPr id="5" name="TextBox 4">
+            <a:extLst>
+              <a:ext uri="{FF2B5EF4-FFF2-40B4-BE49-F238E27FC236}">
+                <a16:creationId xmlns:a16="http://schemas.microsoft.com/office/drawing/2014/main" id="{41C6DD3E-4A82-40D6-8FB7-8A45D8C00685}"/>
+              </a:ext>
+            </a:extLst>
+          </p:cNvPr>
+          <p:cNvSpPr txBox="1"/>
+          <p:nvPr/>
+        </p:nvSpPr>
+        <p:spPr>
+          <a:xfrm>
+            <a:off x="471900" y="2339162"/>
+            <a:ext cx="8672100" cy="1692771"/>
+          </a:xfrm>
+          <a:prstGeom prst="rect">
+            <a:avLst/>
+          </a:prstGeom>
+          <a:noFill/>
+        </p:spPr>
+        <p:txBody>
+          <a:bodyPr wrap="square" rtlCol="0">
+            <a:spAutoFit/>
+          </a:bodyPr>
+          <a:lstStyle/>
+          <a:p>
+            <a:r>
+              <a:rPr lang="en-US" altLang="en-US" sz="1800" b="1" dirty="0">
+                <a:solidFill>
+                  <a:schemeClr val="tx2"/>
+                </a:solidFill>
+                <a:latin typeface="Roboto" panose="020B0604020202020204" charset="0"/>
+                <a:ea typeface="Roboto" panose="020B0604020202020204" charset="0"/>
+              </a:rPr>
+              <a:t>for (var </a:t>
+            </a:r>
+            <a:r>
+              <a:rPr lang="en-US" altLang="en-US" sz="1800" b="1" dirty="0" err="1">
+                <a:solidFill>
+                  <a:schemeClr val="tx2"/>
+                </a:solidFill>
+                <a:latin typeface="Roboto" panose="020B0604020202020204" charset="0"/>
+                <a:ea typeface="Roboto" panose="020B0604020202020204" charset="0"/>
+              </a:rPr>
+              <a:t>i</a:t>
+            </a:r>
+            <a:r>
+              <a:rPr lang="en-US" altLang="en-US" sz="1800" b="1" dirty="0">
+                <a:solidFill>
+                  <a:schemeClr val="tx2"/>
+                </a:solidFill>
+                <a:latin typeface="Roboto" panose="020B0604020202020204" charset="0"/>
+                <a:ea typeface="Roboto" panose="020B0604020202020204" charset="0"/>
+              </a:rPr>
+              <a:t> = 0; </a:t>
+            </a:r>
+            <a:r>
+              <a:rPr lang="en-US" altLang="en-US" sz="1800" b="1" dirty="0" err="1">
+                <a:solidFill>
+                  <a:schemeClr val="tx2"/>
+                </a:solidFill>
+                <a:latin typeface="Roboto" panose="020B0604020202020204" charset="0"/>
+                <a:ea typeface="Roboto" panose="020B0604020202020204" charset="0"/>
+              </a:rPr>
+              <a:t>i</a:t>
+            </a:r>
+            <a:r>
+              <a:rPr lang="en-US" altLang="en-US" sz="1800" b="1" dirty="0">
+                <a:solidFill>
+                  <a:schemeClr val="tx2"/>
+                </a:solidFill>
+                <a:latin typeface="Roboto" panose="020B0604020202020204" charset="0"/>
+                <a:ea typeface="Roboto" panose="020B0604020202020204" charset="0"/>
+              </a:rPr>
+              <a:t> &lt; </a:t>
+            </a:r>
+            <a:r>
+              <a:rPr lang="en-US" altLang="en-US" sz="1800" b="1" dirty="0" err="1">
+                <a:solidFill>
+                  <a:schemeClr val="tx2"/>
+                </a:solidFill>
+                <a:latin typeface="Roboto" panose="020B0604020202020204" charset="0"/>
+                <a:ea typeface="Roboto" panose="020B0604020202020204" charset="0"/>
+              </a:rPr>
+              <a:t>a.length</a:t>
+            </a:r>
+            <a:r>
+              <a:rPr lang="en-US" altLang="en-US" sz="1800" b="1" dirty="0">
+                <a:solidFill>
+                  <a:schemeClr val="tx2"/>
+                </a:solidFill>
+                <a:latin typeface="Roboto" panose="020B0604020202020204" charset="0"/>
+                <a:ea typeface="Roboto" panose="020B0604020202020204" charset="0"/>
+              </a:rPr>
+              <a:t>; </a:t>
+            </a:r>
+            <a:r>
+              <a:rPr lang="en-US" altLang="en-US" sz="1800" b="1" dirty="0" err="1">
+                <a:solidFill>
+                  <a:schemeClr val="tx2"/>
+                </a:solidFill>
+                <a:latin typeface="Roboto" panose="020B0604020202020204" charset="0"/>
+                <a:ea typeface="Roboto" panose="020B0604020202020204" charset="0"/>
+              </a:rPr>
+              <a:t>i</a:t>
+            </a:r>
+            <a:r>
+              <a:rPr lang="en-US" altLang="en-US" sz="1800" b="1" dirty="0">
+                <a:solidFill>
+                  <a:schemeClr val="tx2"/>
+                </a:solidFill>
+                <a:latin typeface="Roboto" panose="020B0604020202020204" charset="0"/>
+                <a:ea typeface="Roboto" panose="020B0604020202020204" charset="0"/>
+              </a:rPr>
+              <a:t>++) { </a:t>
+            </a:r>
+          </a:p>
+          <a:p>
+            <a:endParaRPr lang="en-US" altLang="en-US" sz="1800" b="1" dirty="0">
+              <a:solidFill>
+                <a:schemeClr val="tx2"/>
+              </a:solidFill>
+              <a:latin typeface="Roboto" panose="020B0604020202020204" charset="0"/>
+              <a:ea typeface="Roboto" panose="020B0604020202020204" charset="0"/>
+            </a:endParaRPr>
+          </a:p>
+          <a:p>
+            <a:r>
+              <a:rPr lang="en-US" altLang="en-US" sz="1800" b="1" dirty="0">
+                <a:solidFill>
+                  <a:schemeClr val="tx2"/>
+                </a:solidFill>
+                <a:latin typeface="Roboto" panose="020B0604020202020204" charset="0"/>
+                <a:ea typeface="Roboto" panose="020B0604020202020204" charset="0"/>
+              </a:rPr>
+              <a:t>	if (a[</a:t>
+            </a:r>
+            <a:r>
+              <a:rPr lang="en-US" altLang="en-US" sz="1800" b="1" dirty="0" err="1">
+                <a:solidFill>
+                  <a:schemeClr val="tx2"/>
+                </a:solidFill>
+                <a:latin typeface="Roboto" panose="020B0604020202020204" charset="0"/>
+                <a:ea typeface="Roboto" panose="020B0604020202020204" charset="0"/>
+              </a:rPr>
+              <a:t>i</a:t>
+            </a:r>
+            <a:r>
+              <a:rPr lang="en-US" altLang="en-US" sz="1800" b="1" dirty="0">
+                <a:solidFill>
+                  <a:schemeClr val="tx2"/>
+                </a:solidFill>
+                <a:latin typeface="Roboto" panose="020B0604020202020204" charset="0"/>
+                <a:ea typeface="Roboto" panose="020B0604020202020204" charset="0"/>
+              </a:rPr>
+              <a:t>] == </a:t>
+            </a:r>
+            <a:r>
+              <a:rPr lang="en-US" altLang="en-US" sz="1800" b="1" dirty="0" err="1">
+                <a:solidFill>
+                  <a:schemeClr val="tx2"/>
+                </a:solidFill>
+                <a:latin typeface="Roboto" panose="020B0604020202020204" charset="0"/>
+                <a:ea typeface="Roboto" panose="020B0604020202020204" charset="0"/>
+              </a:rPr>
+              <a:t>theValue</a:t>
+            </a:r>
+            <a:r>
+              <a:rPr lang="en-US" altLang="en-US" sz="1800" b="1" dirty="0">
+                <a:solidFill>
+                  <a:schemeClr val="tx2"/>
+                </a:solidFill>
+                <a:latin typeface="Roboto" panose="020B0604020202020204" charset="0"/>
+                <a:ea typeface="Roboto" panose="020B0604020202020204" charset="0"/>
+              </a:rPr>
+              <a:t>) break;</a:t>
+            </a:r>
+          </a:p>
+          <a:p>
+            <a:endParaRPr lang="en-US" altLang="en-US" sz="1800" b="1" dirty="0">
+              <a:solidFill>
+                <a:schemeClr val="tx2"/>
+              </a:solidFill>
+              <a:latin typeface="Roboto" panose="020B0604020202020204" charset="0"/>
+              <a:ea typeface="Roboto" panose="020B0604020202020204" charset="0"/>
+            </a:endParaRPr>
+          </a:p>
+          <a:p>
+            <a:r>
+              <a:rPr lang="en-US" altLang="en-US" sz="1800" b="1" dirty="0">
+                <a:solidFill>
+                  <a:schemeClr val="tx2"/>
+                </a:solidFill>
+                <a:latin typeface="Roboto" panose="020B0604020202020204" charset="0"/>
+                <a:ea typeface="Roboto" panose="020B0604020202020204" charset="0"/>
+              </a:rPr>
+              <a:t> }</a:t>
+            </a:r>
+            <a:r>
+              <a:rPr lang="en-US" altLang="en-US" sz="1800" dirty="0">
+                <a:solidFill>
+                  <a:schemeClr val="tx2"/>
+                </a:solidFill>
+                <a:latin typeface="Roboto" panose="020B0604020202020204" charset="0"/>
+                <a:ea typeface="Roboto" panose="020B0604020202020204" charset="0"/>
+              </a:rPr>
+              <a:t> </a:t>
+            </a:r>
+          </a:p>
+          <a:p>
+            <a:endParaRPr lang="en-US" dirty="0"/>
+          </a:p>
+        </p:txBody>
+      </p:sp>
+    </p:spTree>
+    <p:extLst>
+      <p:ext uri="{BB962C8B-B14F-4D97-AF65-F5344CB8AC3E}">
+        <p14:creationId xmlns:p14="http://schemas.microsoft.com/office/powerpoint/2010/main" val="3360048694"/>
+      </p:ext>
+    </p:extLst>
+  </p:cSld>
+  <p:clrMapOvr>
+    <a:masterClrMapping/>
+  </p:clrMapOvr>
+</p:sld>
+</file>
+
+<file path=ppt/slides/slide14.xml><?xml version="1.0" encoding="utf-8"?>
+<p:sld xmlns:a="http://schemas.openxmlformats.org/drawingml/2006/main" xmlns:r="http://schemas.openxmlformats.org/officeDocument/2006/relationships" xmlns:p="http://schemas.openxmlformats.org/presentationml/2006/main">
+  <p:cSld>
+    <p:spTree>
+      <p:nvGrpSpPr>
+        <p:cNvPr id="1" name=""/>
+        <p:cNvGrpSpPr/>
+        <p:nvPr/>
+      </p:nvGrpSpPr>
+      <p:grpSpPr>
+        <a:xfrm>
+          <a:off x="0" y="0"/>
+          <a:ext cx="0" cy="0"/>
+          <a:chOff x="0" y="0"/>
+          <a:chExt cx="0" cy="0"/>
+        </a:xfrm>
+      </p:grpSpPr>
+      <p:sp>
+        <p:nvSpPr>
+          <p:cNvPr id="2" name="Title 1">
+            <a:extLst>
+              <a:ext uri="{FF2B5EF4-FFF2-40B4-BE49-F238E27FC236}">
+                <a16:creationId xmlns:a16="http://schemas.microsoft.com/office/drawing/2014/main" id="{B50E37FA-53D9-49F4-8F92-D6265CDA3EDD}"/>
+              </a:ext>
+            </a:extLst>
+          </p:cNvPr>
+          <p:cNvSpPr>
+            <a:spLocks noGrp="1"/>
+          </p:cNvSpPr>
+          <p:nvPr>
+            <p:ph type="title"/>
+          </p:nvPr>
+        </p:nvSpPr>
+        <p:spPr/>
+        <p:txBody>
+          <a:bodyPr/>
+          <a:lstStyle/>
+          <a:p>
+            <a:r>
+              <a:rPr lang="en-US" dirty="0"/>
+              <a:t>continue Statement</a:t>
+            </a:r>
+          </a:p>
+        </p:txBody>
+      </p:sp>
+      <p:sp>
+        <p:nvSpPr>
+          <p:cNvPr id="5" name="TextBox 4">
+            <a:extLst>
+              <a:ext uri="{FF2B5EF4-FFF2-40B4-BE49-F238E27FC236}">
+                <a16:creationId xmlns:a16="http://schemas.microsoft.com/office/drawing/2014/main" id="{582A3DA8-996D-4EBD-BF29-D7AE11E5AFE6}"/>
+              </a:ext>
+            </a:extLst>
+          </p:cNvPr>
+          <p:cNvSpPr txBox="1"/>
+          <p:nvPr/>
+        </p:nvSpPr>
+        <p:spPr>
+          <a:xfrm>
+            <a:off x="471900" y="2094615"/>
+            <a:ext cx="8406285" cy="2523768"/>
+          </a:xfrm>
+          <a:prstGeom prst="rect">
+            <a:avLst/>
+          </a:prstGeom>
+          <a:noFill/>
+        </p:spPr>
+        <p:txBody>
+          <a:bodyPr wrap="square" rtlCol="0">
+            <a:spAutoFit/>
+          </a:bodyPr>
+          <a:lstStyle/>
+          <a:p>
+            <a:r>
+              <a:rPr lang="en-US" altLang="en-US" sz="1800" b="1" dirty="0" err="1">
+                <a:solidFill>
+                  <a:schemeClr val="tx2"/>
+                </a:solidFill>
+                <a:latin typeface="Roboto" panose="020B0604020202020204" charset="0"/>
+                <a:ea typeface="Roboto" panose="020B0604020202020204" charset="0"/>
+              </a:rPr>
+              <a:t>i</a:t>
+            </a:r>
+            <a:r>
+              <a:rPr lang="en-US" altLang="en-US" sz="1800" b="1" dirty="0">
+                <a:solidFill>
+                  <a:schemeClr val="tx2"/>
+                </a:solidFill>
+                <a:latin typeface="Roboto" panose="020B0604020202020204" charset="0"/>
+                <a:ea typeface="Roboto" panose="020B0604020202020204" charset="0"/>
+              </a:rPr>
+              <a:t> = 0; </a:t>
+            </a:r>
+          </a:p>
+          <a:p>
+            <a:r>
+              <a:rPr lang="en-US" altLang="en-US" sz="1800" b="1" dirty="0">
+                <a:solidFill>
+                  <a:schemeClr val="tx2"/>
+                </a:solidFill>
+                <a:latin typeface="Roboto" panose="020B0604020202020204" charset="0"/>
+                <a:ea typeface="Roboto" panose="020B0604020202020204" charset="0"/>
+              </a:rPr>
+              <a:t>n = 0; </a:t>
+            </a:r>
+          </a:p>
+          <a:p>
+            <a:endParaRPr lang="en-US" altLang="en-US" sz="1800" b="1" dirty="0">
+              <a:solidFill>
+                <a:schemeClr val="tx2"/>
+              </a:solidFill>
+              <a:latin typeface="Roboto" panose="020B0604020202020204" charset="0"/>
+              <a:ea typeface="Roboto" panose="020B0604020202020204" charset="0"/>
+            </a:endParaRPr>
+          </a:p>
+          <a:p>
+            <a:r>
+              <a:rPr lang="en-US" altLang="en-US" sz="1800" b="1" dirty="0">
+                <a:solidFill>
+                  <a:schemeClr val="tx2"/>
+                </a:solidFill>
+                <a:latin typeface="Roboto" panose="020B0604020202020204" charset="0"/>
+                <a:ea typeface="Roboto" panose="020B0604020202020204" charset="0"/>
+              </a:rPr>
+              <a:t>while (</a:t>
+            </a:r>
+            <a:r>
+              <a:rPr lang="en-US" altLang="en-US" sz="1800" b="1" dirty="0" err="1">
+                <a:solidFill>
+                  <a:schemeClr val="tx2"/>
+                </a:solidFill>
+                <a:latin typeface="Roboto" panose="020B0604020202020204" charset="0"/>
+                <a:ea typeface="Roboto" panose="020B0604020202020204" charset="0"/>
+              </a:rPr>
+              <a:t>i</a:t>
+            </a:r>
+            <a:r>
+              <a:rPr lang="en-US" altLang="en-US" sz="1800" b="1" dirty="0">
+                <a:solidFill>
+                  <a:schemeClr val="tx2"/>
+                </a:solidFill>
+                <a:latin typeface="Roboto" panose="020B0604020202020204" charset="0"/>
+                <a:ea typeface="Roboto" panose="020B0604020202020204" charset="0"/>
+              </a:rPr>
+              <a:t> &lt; 5) {</a:t>
+            </a:r>
+          </a:p>
+          <a:p>
+            <a:r>
+              <a:rPr lang="en-US" altLang="en-US" sz="1800" b="1" dirty="0">
+                <a:solidFill>
+                  <a:schemeClr val="tx2"/>
+                </a:solidFill>
+                <a:latin typeface="Roboto" panose="020B0604020202020204" charset="0"/>
+                <a:ea typeface="Roboto" panose="020B0604020202020204" charset="0"/>
+              </a:rPr>
+              <a:t>    </a:t>
+            </a:r>
+            <a:r>
+              <a:rPr lang="en-US" altLang="en-US" sz="1800" b="1" dirty="0" err="1">
+                <a:solidFill>
+                  <a:schemeClr val="tx2"/>
+                </a:solidFill>
+                <a:latin typeface="Roboto" panose="020B0604020202020204" charset="0"/>
+                <a:ea typeface="Roboto" panose="020B0604020202020204" charset="0"/>
+              </a:rPr>
+              <a:t>i</a:t>
+            </a:r>
+            <a:r>
+              <a:rPr lang="en-US" altLang="en-US" sz="1800" b="1" dirty="0">
+                <a:solidFill>
+                  <a:schemeClr val="tx2"/>
+                </a:solidFill>
+                <a:latin typeface="Roboto" panose="020B0604020202020204" charset="0"/>
+                <a:ea typeface="Roboto" panose="020B0604020202020204" charset="0"/>
+              </a:rPr>
+              <a:t>++;</a:t>
+            </a:r>
+          </a:p>
+          <a:p>
+            <a:r>
+              <a:rPr lang="en-US" altLang="en-US" sz="1800" b="1" dirty="0">
+                <a:solidFill>
+                  <a:schemeClr val="tx2"/>
+                </a:solidFill>
+                <a:latin typeface="Roboto" panose="020B0604020202020204" charset="0"/>
+                <a:ea typeface="Roboto" panose="020B0604020202020204" charset="0"/>
+              </a:rPr>
+              <a:t>    if (</a:t>
+            </a:r>
+            <a:r>
+              <a:rPr lang="en-US" altLang="en-US" sz="1800" b="1" dirty="0" err="1">
+                <a:solidFill>
+                  <a:schemeClr val="tx2"/>
+                </a:solidFill>
+                <a:latin typeface="Roboto" panose="020B0604020202020204" charset="0"/>
+                <a:ea typeface="Roboto" panose="020B0604020202020204" charset="0"/>
+              </a:rPr>
+              <a:t>i</a:t>
+            </a:r>
+            <a:r>
+              <a:rPr lang="en-US" altLang="en-US" sz="1800" b="1" dirty="0">
+                <a:solidFill>
+                  <a:schemeClr val="tx2"/>
+                </a:solidFill>
+                <a:latin typeface="Roboto" panose="020B0604020202020204" charset="0"/>
+                <a:ea typeface="Roboto" panose="020B0604020202020204" charset="0"/>
+              </a:rPr>
+              <a:t> == 3) </a:t>
+            </a:r>
+          </a:p>
+          <a:p>
+            <a:r>
+              <a:rPr lang="en-US" altLang="en-US" sz="1800" b="1" dirty="0">
+                <a:solidFill>
+                  <a:schemeClr val="tx2"/>
+                </a:solidFill>
+                <a:latin typeface="Roboto" panose="020B0604020202020204" charset="0"/>
+                <a:ea typeface="Roboto" panose="020B0604020202020204" charset="0"/>
+              </a:rPr>
+              <a:t>           continue; n += </a:t>
+            </a:r>
+            <a:r>
+              <a:rPr lang="en-US" altLang="en-US" sz="1800" b="1" dirty="0" err="1">
+                <a:solidFill>
+                  <a:schemeClr val="tx2"/>
+                </a:solidFill>
+                <a:latin typeface="Roboto" panose="020B0604020202020204" charset="0"/>
+                <a:ea typeface="Roboto" panose="020B0604020202020204" charset="0"/>
+              </a:rPr>
+              <a:t>i</a:t>
+            </a:r>
+            <a:r>
+              <a:rPr lang="en-US" altLang="en-US" sz="1800" b="1" dirty="0">
+                <a:solidFill>
+                  <a:schemeClr val="tx2"/>
+                </a:solidFill>
+                <a:latin typeface="Roboto" panose="020B0604020202020204" charset="0"/>
+                <a:ea typeface="Roboto" panose="020B0604020202020204" charset="0"/>
+              </a:rPr>
+              <a:t>; </a:t>
+            </a:r>
+          </a:p>
+          <a:p>
+            <a:r>
+              <a:rPr lang="en-US" altLang="en-US" sz="1800" b="1" dirty="0">
+                <a:solidFill>
+                  <a:schemeClr val="tx2"/>
+                </a:solidFill>
+                <a:latin typeface="Roboto" panose="020B0604020202020204" charset="0"/>
+                <a:ea typeface="Roboto" panose="020B0604020202020204" charset="0"/>
+              </a:rPr>
+              <a:t>}</a:t>
+            </a:r>
+            <a:r>
+              <a:rPr lang="en-US" altLang="en-US" sz="1800" dirty="0">
+                <a:solidFill>
+                  <a:schemeClr val="tx2"/>
+                </a:solidFill>
+                <a:latin typeface="Roboto" panose="020B0604020202020204" charset="0"/>
+                <a:ea typeface="Roboto" panose="020B0604020202020204" charset="0"/>
+              </a:rPr>
+              <a:t> </a:t>
+            </a:r>
+          </a:p>
+          <a:p>
+            <a:endParaRPr lang="en-US" dirty="0"/>
+          </a:p>
+        </p:txBody>
+      </p:sp>
+    </p:spTree>
+    <p:extLst>
+      <p:ext uri="{BB962C8B-B14F-4D97-AF65-F5344CB8AC3E}">
+        <p14:creationId xmlns:p14="http://schemas.microsoft.com/office/powerpoint/2010/main" val="1172095248"/>
+      </p:ext>
+    </p:extLst>
+  </p:cSld>
+  <p:clrMapOvr>
+    <a:masterClrMapping/>
+  </p:clrMapOvr>
+</p:sld>
+</file>
+
+<file path=ppt/slides/slide15.xml><?xml version="1.0" encoding="utf-8"?>
+<p:sld xmlns:a="http://schemas.openxmlformats.org/drawingml/2006/main" xmlns:r="http://schemas.openxmlformats.org/officeDocument/2006/relationships" xmlns:p="http://schemas.openxmlformats.org/presentationml/2006/main">
+  <p:cSld>
+    <p:spTree>
+      <p:nvGrpSpPr>
+        <p:cNvPr id="1" name=""/>
+        <p:cNvGrpSpPr/>
+        <p:nvPr/>
+      </p:nvGrpSpPr>
+      <p:grpSpPr>
+        <a:xfrm>
+          <a:off x="0" y="0"/>
+          <a:ext cx="0" cy="0"/>
+          <a:chOff x="0" y="0"/>
+          <a:chExt cx="0" cy="0"/>
+        </a:xfrm>
+      </p:grpSpPr>
+      <p:sp>
+        <p:nvSpPr>
+          <p:cNvPr id="2" name="Title 1">
+            <a:extLst>
+              <a:ext uri="{FF2B5EF4-FFF2-40B4-BE49-F238E27FC236}">
+                <a16:creationId xmlns:a16="http://schemas.microsoft.com/office/drawing/2014/main" id="{E0008E5A-74FF-4CC9-940F-699FF20EF1D9}"/>
+              </a:ext>
+            </a:extLst>
+          </p:cNvPr>
+          <p:cNvSpPr>
+            <a:spLocks noGrp="1"/>
+          </p:cNvSpPr>
+          <p:nvPr>
+            <p:ph type="title"/>
+          </p:nvPr>
+        </p:nvSpPr>
+        <p:spPr/>
+        <p:txBody>
+          <a:bodyPr/>
+          <a:lstStyle/>
+          <a:p>
+            <a:r>
+              <a:rPr lang="en-US" b="1" dirty="0"/>
+              <a:t>Object Manipulation Statements</a:t>
+            </a:r>
+            <a:endParaRPr lang="en-US" dirty="0"/>
+          </a:p>
+        </p:txBody>
+      </p:sp>
+      <p:sp>
+        <p:nvSpPr>
+          <p:cNvPr id="3" name="Text Placeholder 2">
+            <a:extLst>
+              <a:ext uri="{FF2B5EF4-FFF2-40B4-BE49-F238E27FC236}">
+                <a16:creationId xmlns:a16="http://schemas.microsoft.com/office/drawing/2014/main" id="{B8CBF1D8-DD90-4681-B980-E30564F28628}"/>
+              </a:ext>
+            </a:extLst>
+          </p:cNvPr>
+          <p:cNvSpPr>
+            <a:spLocks noGrp="1"/>
+          </p:cNvSpPr>
+          <p:nvPr>
+            <p:ph type="body" idx="1"/>
+          </p:nvPr>
+        </p:nvSpPr>
+        <p:spPr>
+          <a:xfrm>
+            <a:off x="460950" y="1855280"/>
+            <a:ext cx="8222100" cy="2710200"/>
+          </a:xfrm>
+        </p:spPr>
+        <p:txBody>
+          <a:bodyPr/>
+          <a:lstStyle/>
+          <a:p>
+            <a:pPr marL="114300" indent="0">
+              <a:buNone/>
+            </a:pPr>
+            <a:r>
+              <a:rPr lang="en-US" altLang="en-US" dirty="0">
+                <a:solidFill>
+                  <a:schemeClr val="bg1">
+                    <a:lumMod val="50000"/>
+                  </a:schemeClr>
+                </a:solidFill>
+                <a:latin typeface="Roboto" panose="020B0604020202020204" charset="0"/>
+                <a:ea typeface="Roboto" panose="020B0604020202020204" charset="0"/>
+              </a:rPr>
+              <a:t>JavaScript uses the for...in, for each...in, and with statements to manipulate objects.</a:t>
+            </a:r>
+          </a:p>
+          <a:p>
+            <a:pPr marL="114300" indent="0">
+              <a:buNone/>
+            </a:pPr>
+            <a:endParaRPr lang="en-US" altLang="en-US" dirty="0">
+              <a:solidFill>
+                <a:schemeClr val="bg1">
+                  <a:lumMod val="50000"/>
+                </a:schemeClr>
+              </a:solidFill>
+              <a:latin typeface="Roboto" panose="020B0604020202020204" charset="0"/>
+              <a:ea typeface="Roboto" panose="020B0604020202020204" charset="0"/>
+            </a:endParaRPr>
+          </a:p>
+          <a:p>
+            <a:pPr marL="114300" indent="0">
+              <a:buNone/>
+            </a:pPr>
+            <a:endParaRPr lang="en-US" dirty="0"/>
+          </a:p>
+        </p:txBody>
+      </p:sp>
+    </p:spTree>
+    <p:extLst>
+      <p:ext uri="{BB962C8B-B14F-4D97-AF65-F5344CB8AC3E}">
+        <p14:creationId xmlns:p14="http://schemas.microsoft.com/office/powerpoint/2010/main" val="1162783113"/>
+      </p:ext>
+    </p:extLst>
+  </p:cSld>
+  <p:clrMapOvr>
+    <a:masterClrMapping/>
+  </p:clrMapOvr>
+</p:sld>
+</file>
+
+<file path=ppt/slides/slide16.xml><?xml version="1.0" encoding="utf-8"?>
+<p:sld xmlns:a="http://schemas.openxmlformats.org/drawingml/2006/main" xmlns:r="http://schemas.openxmlformats.org/officeDocument/2006/relationships" xmlns:p="http://schemas.openxmlformats.org/presentationml/2006/main">
+  <p:cSld>
+    <p:spTree>
+      <p:nvGrpSpPr>
+        <p:cNvPr id="1" name=""/>
+        <p:cNvGrpSpPr/>
+        <p:nvPr/>
+      </p:nvGrpSpPr>
+      <p:grpSpPr>
+        <a:xfrm>
+          <a:off x="0" y="0"/>
+          <a:ext cx="0" cy="0"/>
+          <a:chOff x="0" y="0"/>
+          <a:chExt cx="0" cy="0"/>
+        </a:xfrm>
+      </p:grpSpPr>
+      <p:sp>
+        <p:nvSpPr>
+          <p:cNvPr id="2" name="Title 1">
+            <a:extLst>
+              <a:ext uri="{FF2B5EF4-FFF2-40B4-BE49-F238E27FC236}">
+                <a16:creationId xmlns:a16="http://schemas.microsoft.com/office/drawing/2014/main" id="{37F9A10E-E3D8-4CC7-A41B-0E9D11E1A357}"/>
+              </a:ext>
+            </a:extLst>
+          </p:cNvPr>
+          <p:cNvSpPr>
+            <a:spLocks noGrp="1"/>
+          </p:cNvSpPr>
+          <p:nvPr>
+            <p:ph type="title"/>
+          </p:nvPr>
+        </p:nvSpPr>
+        <p:spPr/>
+        <p:txBody>
+          <a:bodyPr/>
+          <a:lstStyle/>
+          <a:p>
+            <a:r>
+              <a:rPr lang="en-US" dirty="0"/>
+              <a:t>for…in Statement</a:t>
+            </a:r>
+          </a:p>
+        </p:txBody>
+      </p:sp>
+      <p:sp>
+        <p:nvSpPr>
+          <p:cNvPr id="5" name="TextBox 4">
+            <a:extLst>
+              <a:ext uri="{FF2B5EF4-FFF2-40B4-BE49-F238E27FC236}">
+                <a16:creationId xmlns:a16="http://schemas.microsoft.com/office/drawing/2014/main" id="{52BCBD55-01B3-4546-BF61-BE36F2B8D7BB}"/>
+              </a:ext>
+            </a:extLst>
+          </p:cNvPr>
+          <p:cNvSpPr txBox="1"/>
+          <p:nvPr/>
+        </p:nvSpPr>
+        <p:spPr>
+          <a:xfrm>
+            <a:off x="471900" y="1830351"/>
+            <a:ext cx="8406286" cy="4185761"/>
+          </a:xfrm>
+          <a:prstGeom prst="rect">
+            <a:avLst/>
+          </a:prstGeom>
+          <a:noFill/>
+        </p:spPr>
+        <p:txBody>
+          <a:bodyPr wrap="square" rtlCol="0">
+            <a:spAutoFit/>
+          </a:bodyPr>
+          <a:lstStyle/>
+          <a:p>
+            <a:r>
+              <a:rPr lang="en-US" altLang="en-US" sz="1800" dirty="0">
+                <a:solidFill>
+                  <a:schemeClr val="tx2"/>
+                </a:solidFill>
+                <a:latin typeface="Roboto" panose="020B0604020202020204" charset="0"/>
+                <a:ea typeface="Roboto" panose="020B0604020202020204" charset="0"/>
+              </a:rPr>
+              <a:t>for (variable in object) { </a:t>
+            </a:r>
+          </a:p>
+          <a:p>
+            <a:r>
+              <a:rPr lang="en-US" altLang="en-US" sz="1800" dirty="0">
+                <a:solidFill>
+                  <a:schemeClr val="tx2"/>
+                </a:solidFill>
+                <a:latin typeface="Roboto" panose="020B0604020202020204" charset="0"/>
+                <a:ea typeface="Roboto" panose="020B0604020202020204" charset="0"/>
+              </a:rPr>
+              <a:t>        statements </a:t>
+            </a:r>
+          </a:p>
+          <a:p>
+            <a:r>
+              <a:rPr lang="en-US" altLang="en-US" sz="1800" dirty="0">
+                <a:solidFill>
+                  <a:schemeClr val="tx2"/>
+                </a:solidFill>
+                <a:latin typeface="Roboto" panose="020B0604020202020204" charset="0"/>
+                <a:ea typeface="Roboto" panose="020B0604020202020204" charset="0"/>
+              </a:rPr>
+              <a:t>} </a:t>
+            </a:r>
+          </a:p>
+          <a:p>
+            <a:r>
+              <a:rPr lang="en-US" altLang="en-US" sz="1600" b="1" dirty="0">
+                <a:solidFill>
+                  <a:schemeClr val="bg2"/>
+                </a:solidFill>
+                <a:latin typeface="Roboto" panose="020B0604020202020204" charset="0"/>
+                <a:ea typeface="Roboto" panose="020B0604020202020204" charset="0"/>
+              </a:rPr>
+              <a:t>Example,</a:t>
+            </a:r>
+          </a:p>
+          <a:p>
+            <a:r>
+              <a:rPr lang="en-US" altLang="en-US" sz="1600" dirty="0">
+                <a:solidFill>
+                  <a:schemeClr val="tx2"/>
+                </a:solidFill>
+                <a:latin typeface="Roboto" panose="020B0604020202020204" charset="0"/>
+                <a:ea typeface="Roboto" panose="020B0604020202020204" charset="0"/>
+              </a:rPr>
+              <a:t>function </a:t>
+            </a:r>
+            <a:r>
+              <a:rPr lang="en-US" altLang="en-US" sz="1600" dirty="0" err="1">
+                <a:solidFill>
+                  <a:schemeClr val="tx2"/>
+                </a:solidFill>
+                <a:latin typeface="Roboto" panose="020B0604020202020204" charset="0"/>
+                <a:ea typeface="Roboto" panose="020B0604020202020204" charset="0"/>
+              </a:rPr>
+              <a:t>dump_props</a:t>
+            </a:r>
+            <a:r>
+              <a:rPr lang="en-US" altLang="en-US" sz="1600" dirty="0">
+                <a:solidFill>
+                  <a:schemeClr val="tx2"/>
+                </a:solidFill>
+                <a:latin typeface="Roboto" panose="020B0604020202020204" charset="0"/>
+                <a:ea typeface="Roboto" panose="020B0604020202020204" charset="0"/>
+              </a:rPr>
+              <a:t>(obj, </a:t>
+            </a:r>
+            <a:r>
+              <a:rPr lang="en-US" altLang="en-US" sz="1600" dirty="0" err="1">
+                <a:solidFill>
+                  <a:schemeClr val="tx2"/>
+                </a:solidFill>
+                <a:latin typeface="Roboto" panose="020B0604020202020204" charset="0"/>
+                <a:ea typeface="Roboto" panose="020B0604020202020204" charset="0"/>
+              </a:rPr>
+              <a:t>obj_name</a:t>
+            </a:r>
+            <a:r>
+              <a:rPr lang="en-US" altLang="en-US" sz="1600" dirty="0">
+                <a:solidFill>
+                  <a:schemeClr val="tx2"/>
+                </a:solidFill>
+                <a:latin typeface="Roboto" panose="020B0604020202020204" charset="0"/>
+                <a:ea typeface="Roboto" panose="020B0604020202020204" charset="0"/>
+              </a:rPr>
+              <a:t>) {</a:t>
+            </a:r>
+          </a:p>
+          <a:p>
+            <a:r>
+              <a:rPr lang="en-US" altLang="en-US" sz="1600" dirty="0">
+                <a:solidFill>
+                  <a:schemeClr val="tx2"/>
+                </a:solidFill>
+                <a:latin typeface="Roboto" panose="020B0604020202020204" charset="0"/>
+                <a:ea typeface="Roboto" panose="020B0604020202020204" charset="0"/>
+              </a:rPr>
+              <a:t>        var result = ""; </a:t>
+            </a:r>
+          </a:p>
+          <a:p>
+            <a:r>
+              <a:rPr lang="en-US" altLang="en-US" sz="1600" dirty="0">
+                <a:solidFill>
+                  <a:schemeClr val="tx2"/>
+                </a:solidFill>
+                <a:latin typeface="Roboto" panose="020B0604020202020204" charset="0"/>
+                <a:ea typeface="Roboto" panose="020B0604020202020204" charset="0"/>
+              </a:rPr>
+              <a:t>        for (var </a:t>
+            </a:r>
+            <a:r>
+              <a:rPr lang="en-US" altLang="en-US" sz="1600" dirty="0" err="1">
+                <a:solidFill>
+                  <a:schemeClr val="tx2"/>
+                </a:solidFill>
+                <a:latin typeface="Roboto" panose="020B0604020202020204" charset="0"/>
+                <a:ea typeface="Roboto" panose="020B0604020202020204" charset="0"/>
+              </a:rPr>
+              <a:t>i</a:t>
+            </a:r>
+            <a:r>
+              <a:rPr lang="en-US" altLang="en-US" sz="1600" dirty="0">
+                <a:solidFill>
+                  <a:schemeClr val="tx2"/>
+                </a:solidFill>
+                <a:latin typeface="Roboto" panose="020B0604020202020204" charset="0"/>
+                <a:ea typeface="Roboto" panose="020B0604020202020204" charset="0"/>
+              </a:rPr>
+              <a:t> in obj) { </a:t>
+            </a:r>
+          </a:p>
+          <a:p>
+            <a:r>
+              <a:rPr lang="en-US" altLang="en-US" sz="1600" dirty="0">
+                <a:solidFill>
+                  <a:schemeClr val="tx2"/>
+                </a:solidFill>
+                <a:latin typeface="Roboto" panose="020B0604020202020204" charset="0"/>
+                <a:ea typeface="Roboto" panose="020B0604020202020204" charset="0"/>
+              </a:rPr>
+              <a:t>                result += </a:t>
+            </a:r>
+            <a:r>
+              <a:rPr lang="en-US" altLang="en-US" sz="1600" dirty="0" err="1">
+                <a:solidFill>
+                  <a:schemeClr val="tx2"/>
+                </a:solidFill>
+                <a:latin typeface="Roboto" panose="020B0604020202020204" charset="0"/>
+                <a:ea typeface="Roboto" panose="020B0604020202020204" charset="0"/>
+              </a:rPr>
+              <a:t>obj_name</a:t>
+            </a:r>
+            <a:r>
+              <a:rPr lang="en-US" altLang="en-US" sz="1600" dirty="0">
+                <a:solidFill>
+                  <a:schemeClr val="tx2"/>
+                </a:solidFill>
+                <a:latin typeface="Roboto" panose="020B0604020202020204" charset="0"/>
+                <a:ea typeface="Roboto" panose="020B0604020202020204" charset="0"/>
+              </a:rPr>
+              <a:t> + "." + </a:t>
+            </a:r>
+            <a:r>
+              <a:rPr lang="en-US" altLang="en-US" sz="1600" dirty="0" err="1">
+                <a:solidFill>
+                  <a:schemeClr val="tx2"/>
+                </a:solidFill>
+                <a:latin typeface="Roboto" panose="020B0604020202020204" charset="0"/>
+                <a:ea typeface="Roboto" panose="020B0604020202020204" charset="0"/>
+              </a:rPr>
+              <a:t>i</a:t>
+            </a:r>
+            <a:r>
+              <a:rPr lang="en-US" altLang="en-US" sz="1600" dirty="0">
+                <a:solidFill>
+                  <a:schemeClr val="tx2"/>
+                </a:solidFill>
+                <a:latin typeface="Roboto" panose="020B0604020202020204" charset="0"/>
+                <a:ea typeface="Roboto" panose="020B0604020202020204" charset="0"/>
+              </a:rPr>
+              <a:t> + " = " + obj[</a:t>
+            </a:r>
+            <a:r>
+              <a:rPr lang="en-US" altLang="en-US" sz="1600" dirty="0" err="1">
+                <a:solidFill>
+                  <a:schemeClr val="tx2"/>
+                </a:solidFill>
+                <a:latin typeface="Roboto" panose="020B0604020202020204" charset="0"/>
+                <a:ea typeface="Roboto" panose="020B0604020202020204" charset="0"/>
+              </a:rPr>
+              <a:t>i</a:t>
+            </a:r>
+            <a:r>
+              <a:rPr lang="en-US" altLang="en-US" sz="1600" dirty="0">
+                <a:solidFill>
+                  <a:schemeClr val="tx2"/>
+                </a:solidFill>
+                <a:latin typeface="Roboto" panose="020B0604020202020204" charset="0"/>
+                <a:ea typeface="Roboto" panose="020B0604020202020204" charset="0"/>
+              </a:rPr>
+              <a:t>] + "&lt;</a:t>
+            </a:r>
+            <a:r>
+              <a:rPr lang="en-US" altLang="en-US" sz="1600" dirty="0" err="1">
+                <a:solidFill>
+                  <a:schemeClr val="tx2"/>
+                </a:solidFill>
+                <a:latin typeface="Roboto" panose="020B0604020202020204" charset="0"/>
+                <a:ea typeface="Roboto" panose="020B0604020202020204" charset="0"/>
+              </a:rPr>
+              <a:t>br</a:t>
+            </a:r>
+            <a:r>
+              <a:rPr lang="en-US" altLang="en-US" sz="1600" dirty="0">
+                <a:solidFill>
+                  <a:schemeClr val="tx2"/>
+                </a:solidFill>
+                <a:latin typeface="Roboto" panose="020B0604020202020204" charset="0"/>
+                <a:ea typeface="Roboto" panose="020B0604020202020204" charset="0"/>
+              </a:rPr>
+              <a:t>&gt;";</a:t>
+            </a:r>
+          </a:p>
+          <a:p>
+            <a:r>
+              <a:rPr lang="en-US" altLang="en-US" sz="1600" dirty="0">
+                <a:solidFill>
+                  <a:schemeClr val="tx2"/>
+                </a:solidFill>
+                <a:latin typeface="Roboto" panose="020B0604020202020204" charset="0"/>
+                <a:ea typeface="Roboto" panose="020B0604020202020204" charset="0"/>
+              </a:rPr>
+              <a:t>        } </a:t>
+            </a:r>
+          </a:p>
+          <a:p>
+            <a:r>
+              <a:rPr lang="en-US" altLang="en-US" sz="1600" dirty="0">
+                <a:solidFill>
+                  <a:schemeClr val="tx2"/>
+                </a:solidFill>
+                <a:latin typeface="Roboto" panose="020B0604020202020204" charset="0"/>
+                <a:ea typeface="Roboto" panose="020B0604020202020204" charset="0"/>
+              </a:rPr>
+              <a:t>        result += "&lt;</a:t>
+            </a:r>
+            <a:r>
+              <a:rPr lang="en-US" altLang="en-US" sz="1600" dirty="0" err="1">
+                <a:solidFill>
+                  <a:schemeClr val="tx2"/>
+                </a:solidFill>
+                <a:latin typeface="Roboto" panose="020B0604020202020204" charset="0"/>
+                <a:ea typeface="Roboto" panose="020B0604020202020204" charset="0"/>
+              </a:rPr>
+              <a:t>hr</a:t>
+            </a:r>
+            <a:r>
+              <a:rPr lang="en-US" altLang="en-US" sz="1600" dirty="0">
+                <a:solidFill>
+                  <a:schemeClr val="tx2"/>
+                </a:solidFill>
+                <a:latin typeface="Roboto" panose="020B0604020202020204" charset="0"/>
+                <a:ea typeface="Roboto" panose="020B0604020202020204" charset="0"/>
+              </a:rPr>
+              <a:t>&gt;"; </a:t>
+            </a:r>
+          </a:p>
+          <a:p>
+            <a:r>
+              <a:rPr lang="en-US" altLang="en-US" sz="1600" dirty="0">
+                <a:solidFill>
+                  <a:schemeClr val="tx2"/>
+                </a:solidFill>
+                <a:latin typeface="Roboto" panose="020B0604020202020204" charset="0"/>
+                <a:ea typeface="Roboto" panose="020B0604020202020204" charset="0"/>
+              </a:rPr>
+              <a:t>        return result; </a:t>
+            </a:r>
+          </a:p>
+          <a:p>
+            <a:r>
+              <a:rPr lang="en-US" altLang="en-US" sz="1600" dirty="0">
+                <a:solidFill>
+                  <a:schemeClr val="tx2"/>
+                </a:solidFill>
+                <a:latin typeface="Roboto" panose="020B0604020202020204" charset="0"/>
+                <a:ea typeface="Roboto" panose="020B0604020202020204" charset="0"/>
+              </a:rPr>
+              <a:t>} </a:t>
+            </a:r>
+          </a:p>
+          <a:p>
+            <a:endParaRPr lang="en-US" altLang="en-US" sz="1800" dirty="0">
+              <a:solidFill>
+                <a:schemeClr val="tx2"/>
+              </a:solidFill>
+              <a:latin typeface="Roboto" panose="020B0604020202020204" charset="0"/>
+              <a:ea typeface="Roboto" panose="020B0604020202020204" charset="0"/>
+            </a:endParaRPr>
+          </a:p>
+          <a:p>
+            <a:endParaRPr lang="en-US" altLang="en-US" sz="1800" dirty="0">
+              <a:solidFill>
+                <a:schemeClr val="tx2"/>
+              </a:solidFill>
+              <a:latin typeface="Roboto" panose="020B0604020202020204" charset="0"/>
+              <a:ea typeface="Roboto" panose="020B0604020202020204" charset="0"/>
+            </a:endParaRPr>
+          </a:p>
+          <a:p>
+            <a:endParaRPr lang="en-US" altLang="en-US" sz="1800" dirty="0">
+              <a:solidFill>
+                <a:schemeClr val="tx2"/>
+              </a:solidFill>
+              <a:latin typeface="Roboto" panose="020B0604020202020204" charset="0"/>
+              <a:ea typeface="Roboto" panose="020B0604020202020204" charset="0"/>
+            </a:endParaRPr>
+          </a:p>
+          <a:p>
+            <a:endParaRPr lang="en-US" dirty="0"/>
+          </a:p>
+        </p:txBody>
+      </p:sp>
+    </p:spTree>
+    <p:extLst>
+      <p:ext uri="{BB962C8B-B14F-4D97-AF65-F5344CB8AC3E}">
+        <p14:creationId xmlns:p14="http://schemas.microsoft.com/office/powerpoint/2010/main" val="3903925706"/>
+      </p:ext>
+    </p:extLst>
+  </p:cSld>
+  <p:clrMapOvr>
+    <a:masterClrMapping/>
+  </p:clrMapOvr>
+</p:sld>
+</file>
+
+<file path=ppt/slides/slide17.xml><?xml version="1.0" encoding="utf-8"?>
+<p:sld xmlns:a="http://schemas.openxmlformats.org/drawingml/2006/main" xmlns:r="http://schemas.openxmlformats.org/officeDocument/2006/relationships" xmlns:p="http://schemas.openxmlformats.org/presentationml/2006/main">
+  <p:cSld>
+    <p:spTree>
+      <p:nvGrpSpPr>
+        <p:cNvPr id="1" name=""/>
+        <p:cNvGrpSpPr/>
+        <p:nvPr/>
+      </p:nvGrpSpPr>
+      <p:grpSpPr>
+        <a:xfrm>
+          <a:off x="0" y="0"/>
+          <a:ext cx="0" cy="0"/>
+          <a:chOff x="0" y="0"/>
+          <a:chExt cx="0" cy="0"/>
+        </a:xfrm>
+      </p:grpSpPr>
+      <p:sp>
+        <p:nvSpPr>
+          <p:cNvPr id="2" name="Title 1">
+            <a:extLst>
+              <a:ext uri="{FF2B5EF4-FFF2-40B4-BE49-F238E27FC236}">
+                <a16:creationId xmlns:a16="http://schemas.microsoft.com/office/drawing/2014/main" id="{F78FF827-39C5-4603-B016-F70D466DC2F2}"/>
+              </a:ext>
+            </a:extLst>
+          </p:cNvPr>
+          <p:cNvSpPr>
+            <a:spLocks noGrp="1"/>
+          </p:cNvSpPr>
+          <p:nvPr>
+            <p:ph type="title"/>
+          </p:nvPr>
+        </p:nvSpPr>
+        <p:spPr/>
+        <p:txBody>
+          <a:bodyPr/>
+          <a:lstStyle/>
+          <a:p>
+            <a:r>
+              <a:rPr lang="en-US" dirty="0"/>
+              <a:t>for each…in Statement</a:t>
+            </a:r>
+          </a:p>
+        </p:txBody>
+      </p:sp>
+      <p:sp>
+        <p:nvSpPr>
+          <p:cNvPr id="5" name="TextBox 4">
+            <a:extLst>
+              <a:ext uri="{FF2B5EF4-FFF2-40B4-BE49-F238E27FC236}">
+                <a16:creationId xmlns:a16="http://schemas.microsoft.com/office/drawing/2014/main" id="{70E2F0E8-FE73-4E92-BE82-7B892DA6158C}"/>
+              </a:ext>
+            </a:extLst>
+          </p:cNvPr>
+          <p:cNvSpPr txBox="1"/>
+          <p:nvPr/>
+        </p:nvSpPr>
+        <p:spPr>
+          <a:xfrm>
+            <a:off x="471900" y="1847850"/>
+            <a:ext cx="8453025" cy="3077766"/>
+          </a:xfrm>
+          <a:prstGeom prst="rect">
+            <a:avLst/>
+          </a:prstGeom>
+          <a:noFill/>
+        </p:spPr>
+        <p:txBody>
+          <a:bodyPr wrap="square" rtlCol="0">
+            <a:spAutoFit/>
+          </a:bodyPr>
+          <a:lstStyle/>
+          <a:p>
+            <a:r>
+              <a:rPr lang="en-US" altLang="en-US" sz="1800" dirty="0">
+                <a:solidFill>
+                  <a:schemeClr val="tx2"/>
+                </a:solidFill>
+                <a:latin typeface="Roboto" panose="020B0604020202020204" charset="0"/>
+                <a:ea typeface="Roboto" panose="020B0604020202020204" charset="0"/>
+              </a:rPr>
+              <a:t>var sum = 0;</a:t>
+            </a:r>
+          </a:p>
+          <a:p>
+            <a:r>
+              <a:rPr lang="en-US" altLang="en-US" sz="1800" dirty="0">
+                <a:solidFill>
+                  <a:schemeClr val="tx2"/>
+                </a:solidFill>
+                <a:latin typeface="Roboto" panose="020B0604020202020204" charset="0"/>
+                <a:ea typeface="Roboto" panose="020B0604020202020204" charset="0"/>
+              </a:rPr>
+              <a:t>var obj = {</a:t>
+            </a:r>
+          </a:p>
+          <a:p>
+            <a:r>
+              <a:rPr lang="en-US" altLang="en-US" sz="1800" dirty="0">
+                <a:solidFill>
+                  <a:schemeClr val="tx2"/>
+                </a:solidFill>
+                <a:latin typeface="Roboto" panose="020B0604020202020204" charset="0"/>
+                <a:ea typeface="Roboto" panose="020B0604020202020204" charset="0"/>
+              </a:rPr>
+              <a:t>	prop1: 5, </a:t>
+            </a:r>
+          </a:p>
+          <a:p>
+            <a:r>
+              <a:rPr lang="en-US" altLang="en-US" sz="1800" dirty="0">
+                <a:solidFill>
+                  <a:schemeClr val="tx2"/>
+                </a:solidFill>
+                <a:latin typeface="Roboto" panose="020B0604020202020204" charset="0"/>
+                <a:ea typeface="Roboto" panose="020B0604020202020204" charset="0"/>
+              </a:rPr>
+              <a:t>	prop2: 13, </a:t>
+            </a:r>
+          </a:p>
+          <a:p>
+            <a:r>
+              <a:rPr lang="en-US" altLang="en-US" sz="1800" dirty="0">
+                <a:solidFill>
+                  <a:schemeClr val="tx2"/>
+                </a:solidFill>
+                <a:latin typeface="Roboto" panose="020B0604020202020204" charset="0"/>
+                <a:ea typeface="Roboto" panose="020B0604020202020204" charset="0"/>
+              </a:rPr>
+              <a:t>	prop3: 8</a:t>
+            </a:r>
+          </a:p>
+          <a:p>
+            <a:r>
+              <a:rPr lang="en-US" altLang="en-US" sz="1800" dirty="0">
+                <a:solidFill>
+                  <a:schemeClr val="tx2"/>
+                </a:solidFill>
+                <a:latin typeface="Roboto" panose="020B0604020202020204" charset="0"/>
+                <a:ea typeface="Roboto" panose="020B0604020202020204" charset="0"/>
+              </a:rPr>
+              <a:t>};</a:t>
+            </a:r>
+          </a:p>
+          <a:p>
+            <a:r>
+              <a:rPr lang="en-US" altLang="en-US" sz="1800" dirty="0">
+                <a:solidFill>
+                  <a:schemeClr val="tx2"/>
+                </a:solidFill>
+                <a:latin typeface="Roboto" panose="020B0604020202020204" charset="0"/>
+                <a:ea typeface="Roboto" panose="020B0604020202020204" charset="0"/>
+              </a:rPr>
+              <a:t> for each (var item in obj) {</a:t>
+            </a:r>
+          </a:p>
+          <a:p>
+            <a:r>
+              <a:rPr lang="en-US" altLang="en-US" sz="1800" dirty="0">
+                <a:solidFill>
+                  <a:schemeClr val="tx2"/>
+                </a:solidFill>
+                <a:latin typeface="Roboto" panose="020B0604020202020204" charset="0"/>
+                <a:ea typeface="Roboto" panose="020B0604020202020204" charset="0"/>
+              </a:rPr>
+              <a:t> 	sum += item;</a:t>
+            </a:r>
+          </a:p>
+          <a:p>
+            <a:r>
+              <a:rPr lang="en-US" altLang="en-US" sz="1800" dirty="0">
+                <a:solidFill>
+                  <a:schemeClr val="tx2"/>
+                </a:solidFill>
+                <a:latin typeface="Roboto" panose="020B0604020202020204" charset="0"/>
+                <a:ea typeface="Roboto" panose="020B0604020202020204" charset="0"/>
+              </a:rPr>
+              <a:t> } </a:t>
+            </a:r>
+          </a:p>
+          <a:p>
+            <a:r>
+              <a:rPr lang="en-US" altLang="en-US" sz="1800" dirty="0">
+                <a:solidFill>
+                  <a:schemeClr val="tx2"/>
+                </a:solidFill>
+                <a:latin typeface="Roboto" panose="020B0604020202020204" charset="0"/>
+                <a:ea typeface="Roboto" panose="020B0604020202020204" charset="0"/>
+              </a:rPr>
+              <a:t>print(sum); </a:t>
+            </a:r>
+            <a:r>
+              <a:rPr lang="en-US" altLang="en-US" sz="1800" dirty="0">
+                <a:solidFill>
+                  <a:schemeClr val="tx1"/>
+                </a:solidFill>
+                <a:latin typeface="Roboto" panose="020B0604020202020204" charset="0"/>
+                <a:ea typeface="Roboto" panose="020B0604020202020204" charset="0"/>
+              </a:rPr>
+              <a:t>// prints "26", which is 5+13+8 </a:t>
+            </a:r>
+          </a:p>
+          <a:p>
+            <a:endParaRPr lang="en-US" dirty="0"/>
+          </a:p>
+        </p:txBody>
+      </p:sp>
+    </p:spTree>
+    <p:extLst>
+      <p:ext uri="{BB962C8B-B14F-4D97-AF65-F5344CB8AC3E}">
+        <p14:creationId xmlns:p14="http://schemas.microsoft.com/office/powerpoint/2010/main" val="2321243745"/>
+      </p:ext>
+    </p:extLst>
+  </p:cSld>
+  <p:clrMapOvr>
+    <a:masterClrMapping/>
+  </p:clrMapOvr>
+</p:sld>
+</file>
+
+<file path=ppt/slides/slide18.xml><?xml version="1.0" encoding="utf-8"?>
+<p:sld xmlns:a="http://schemas.openxmlformats.org/drawingml/2006/main" xmlns:r="http://schemas.openxmlformats.org/officeDocument/2006/relationships" xmlns:p="http://schemas.openxmlformats.org/presentationml/2006/main">
+  <p:cSld>
+    <p:spTree>
+      <p:nvGrpSpPr>
+        <p:cNvPr id="1" name=""/>
+        <p:cNvGrpSpPr/>
+        <p:nvPr/>
+      </p:nvGrpSpPr>
+      <p:grpSpPr>
+        <a:xfrm>
+          <a:off x="0" y="0"/>
+          <a:ext cx="0" cy="0"/>
+          <a:chOff x="0" y="0"/>
+          <a:chExt cx="0" cy="0"/>
+        </a:xfrm>
+      </p:grpSpPr>
+      <p:sp>
+        <p:nvSpPr>
+          <p:cNvPr id="2" name="Title 1">
+            <a:extLst>
+              <a:ext uri="{FF2B5EF4-FFF2-40B4-BE49-F238E27FC236}">
+                <a16:creationId xmlns:a16="http://schemas.microsoft.com/office/drawing/2014/main" id="{D25ADD56-61B9-48D9-B547-7605D8646627}"/>
+              </a:ext>
+            </a:extLst>
+          </p:cNvPr>
+          <p:cNvSpPr>
+            <a:spLocks noGrp="1"/>
+          </p:cNvSpPr>
+          <p:nvPr>
+            <p:ph type="title"/>
+          </p:nvPr>
+        </p:nvSpPr>
+        <p:spPr/>
+        <p:txBody>
+          <a:bodyPr/>
+          <a:lstStyle/>
+          <a:p>
+            <a:r>
+              <a:rPr lang="en-US" dirty="0"/>
+              <a:t>Comments</a:t>
+            </a:r>
+          </a:p>
+        </p:txBody>
+      </p:sp>
+      <p:sp>
+        <p:nvSpPr>
+          <p:cNvPr id="5" name="TextBox 4">
+            <a:extLst>
+              <a:ext uri="{FF2B5EF4-FFF2-40B4-BE49-F238E27FC236}">
+                <a16:creationId xmlns:a16="http://schemas.microsoft.com/office/drawing/2014/main" id="{8CC5991E-722A-4A20-96FA-E6AE3099B551}"/>
+              </a:ext>
+            </a:extLst>
+          </p:cNvPr>
+          <p:cNvSpPr txBox="1"/>
+          <p:nvPr/>
+        </p:nvSpPr>
+        <p:spPr>
+          <a:xfrm>
+            <a:off x="471900" y="2124075"/>
+            <a:ext cx="8310150" cy="1754326"/>
+          </a:xfrm>
+          <a:prstGeom prst="rect">
+            <a:avLst/>
+          </a:prstGeom>
+          <a:noFill/>
+        </p:spPr>
+        <p:txBody>
+          <a:bodyPr wrap="square" rtlCol="0">
+            <a:spAutoFit/>
+          </a:bodyPr>
+          <a:lstStyle/>
+          <a:p>
+            <a:pPr lvl="0" eaLnBrk="0" fontAlgn="base" hangingPunct="0">
+              <a:spcBef>
+                <a:spcPct val="0"/>
+              </a:spcBef>
+              <a:spcAft>
+                <a:spcPct val="0"/>
+              </a:spcAft>
+              <a:buClrTx/>
+            </a:pPr>
+            <a:endParaRPr lang="en-US" altLang="en-US" sz="1800" dirty="0">
+              <a:solidFill>
+                <a:schemeClr val="tx2"/>
+              </a:solidFill>
+              <a:latin typeface="Roboto" panose="020B0604020202020204" charset="0"/>
+              <a:ea typeface="Roboto" panose="020B0604020202020204" charset="0"/>
+            </a:endParaRPr>
+          </a:p>
+          <a:p>
+            <a:pPr lvl="0" eaLnBrk="0" fontAlgn="base" hangingPunct="0">
+              <a:spcBef>
+                <a:spcPct val="0"/>
+              </a:spcBef>
+              <a:spcAft>
+                <a:spcPct val="0"/>
+              </a:spcAft>
+              <a:buClrTx/>
+            </a:pPr>
+            <a:r>
+              <a:rPr lang="en-US" altLang="en-US" sz="1800" dirty="0">
+                <a:solidFill>
+                  <a:schemeClr val="tx2"/>
+                </a:solidFill>
+                <a:latin typeface="Roboto" panose="020B0604020202020204" charset="0"/>
+                <a:ea typeface="Roboto" panose="020B0604020202020204" charset="0"/>
+              </a:rPr>
+              <a:t>// This is a single-line comment. </a:t>
+            </a:r>
+          </a:p>
+          <a:p>
+            <a:pPr lvl="0" eaLnBrk="0" fontAlgn="base" hangingPunct="0">
+              <a:spcBef>
+                <a:spcPct val="0"/>
+              </a:spcBef>
+              <a:spcAft>
+                <a:spcPct val="0"/>
+              </a:spcAft>
+              <a:buClrTx/>
+            </a:pPr>
+            <a:endParaRPr lang="en-US" altLang="en-US" sz="1800" dirty="0">
+              <a:solidFill>
+                <a:schemeClr val="tx2"/>
+              </a:solidFill>
+              <a:latin typeface="Roboto" panose="020B0604020202020204" charset="0"/>
+              <a:ea typeface="Roboto" panose="020B0604020202020204" charset="0"/>
+            </a:endParaRPr>
+          </a:p>
+          <a:p>
+            <a:pPr lvl="0" eaLnBrk="0" fontAlgn="base" hangingPunct="0">
+              <a:spcBef>
+                <a:spcPct val="0"/>
+              </a:spcBef>
+              <a:spcAft>
+                <a:spcPct val="0"/>
+              </a:spcAft>
+              <a:buClrTx/>
+            </a:pPr>
+            <a:endParaRPr lang="en-US" altLang="en-US" sz="1800" dirty="0">
+              <a:solidFill>
+                <a:schemeClr val="tx2"/>
+              </a:solidFill>
+              <a:latin typeface="Roboto" panose="020B0604020202020204" charset="0"/>
+              <a:ea typeface="Roboto" panose="020B0604020202020204" charset="0"/>
+            </a:endParaRPr>
+          </a:p>
+          <a:p>
+            <a:pPr lvl="0" eaLnBrk="0" fontAlgn="base" hangingPunct="0">
+              <a:spcBef>
+                <a:spcPct val="0"/>
+              </a:spcBef>
+              <a:spcAft>
+                <a:spcPct val="0"/>
+              </a:spcAft>
+              <a:buClrTx/>
+            </a:pPr>
+            <a:r>
+              <a:rPr lang="en-US" altLang="en-US" sz="1800" dirty="0">
+                <a:solidFill>
+                  <a:schemeClr val="tx2"/>
+                </a:solidFill>
+                <a:latin typeface="Roboto" panose="020B0604020202020204" charset="0"/>
+                <a:ea typeface="Roboto" panose="020B0604020202020204" charset="0"/>
+              </a:rPr>
+              <a:t>/*  This is a multiple-line comment. It can be of any length, and you can put whatever you want here.  */ </a:t>
+            </a:r>
+          </a:p>
+        </p:txBody>
+      </p:sp>
+    </p:spTree>
+    <p:extLst>
+      <p:ext uri="{BB962C8B-B14F-4D97-AF65-F5344CB8AC3E}">
+        <p14:creationId xmlns:p14="http://schemas.microsoft.com/office/powerpoint/2010/main" val="1855201412"/>
+      </p:ext>
+    </p:extLst>
+  </p:cSld>
+  <p:clrMapOvr>
+    <a:masterClrMapping/>
+  </p:clrMapOvr>
+</p:sld>
+</file>
+
+<file path=ppt/slides/slide19.xml><?xml version="1.0" encoding="utf-8"?>
+<p:sld xmlns:a="http://schemas.openxmlformats.org/drawingml/2006/main" xmlns:r="http://schemas.openxmlformats.org/officeDocument/2006/relationships" xmlns:p="http://schemas.openxmlformats.org/presentationml/2006/main">
+  <p:cSld>
+    <p:spTree>
+      <p:nvGrpSpPr>
+        <p:cNvPr id="1" name=""/>
+        <p:cNvGrpSpPr/>
+        <p:nvPr/>
+      </p:nvGrpSpPr>
+      <p:grpSpPr>
+        <a:xfrm>
+          <a:off x="0" y="0"/>
+          <a:ext cx="0" cy="0"/>
+          <a:chOff x="0" y="0"/>
+          <a:chExt cx="0" cy="0"/>
+        </a:xfrm>
+      </p:grpSpPr>
+      <p:sp>
+        <p:nvSpPr>
+          <p:cNvPr id="2" name="Title 1">
+            <a:extLst>
+              <a:ext uri="{FF2B5EF4-FFF2-40B4-BE49-F238E27FC236}">
                 <a16:creationId xmlns:a16="http://schemas.microsoft.com/office/drawing/2014/main" id="{FE986348-2E6B-4B83-90C9-7B2144299D98}"/>
               </a:ext>
             </a:extLst>
@@ -6495,173 +9247,6 @@
         <p14:creationId xmlns:p14="http://schemas.microsoft.com/office/powerpoint/2010/main" val="1579018120"/>
       </p:ext>
     </p:extLst>
-  </p:cSld>
-  <p:clrMapOvr>
-    <a:masterClrMapping/>
-  </p:clrMapOvr>
-</p:sld>
-</file>
-
-<file path=ppt/slides/slide11.xml><?xml version="1.0" encoding="utf-8"?>
-<p:sld xmlns:a="http://schemas.openxmlformats.org/drawingml/2006/main" xmlns:r="http://schemas.openxmlformats.org/officeDocument/2006/relationships" xmlns:p="http://schemas.openxmlformats.org/presentationml/2006/main">
-  <p:cSld>
-    <p:spTree>
-      <p:nvGrpSpPr>
-        <p:cNvPr id="1" name="Shape 174"/>
-        <p:cNvGrpSpPr/>
-        <p:nvPr/>
-      </p:nvGrpSpPr>
-      <p:grpSpPr>
-        <a:xfrm>
-          <a:off x="0" y="0"/>
-          <a:ext cx="0" cy="0"/>
-          <a:chOff x="0" y="0"/>
-          <a:chExt cx="0" cy="0"/>
-        </a:xfrm>
-      </p:grpSpPr>
-      <p:sp>
-        <p:nvSpPr>
-          <p:cNvPr id="175" name="Google Shape;175;p31"/>
-          <p:cNvSpPr txBox="1">
-            <a:spLocks noGrp="1"/>
-          </p:cNvSpPr>
-          <p:nvPr>
-            <p:ph type="title"/>
-          </p:nvPr>
-        </p:nvSpPr>
-        <p:spPr>
-          <a:xfrm>
-            <a:off x="471900" y="738725"/>
-            <a:ext cx="8222100" cy="767700"/>
-          </a:xfrm>
-          <a:prstGeom prst="rect">
-            <a:avLst/>
-          </a:prstGeom>
-        </p:spPr>
-        <p:txBody>
-          <a:bodyPr spcFirstLastPara="1" wrap="square" lIns="91425" tIns="91425" rIns="91425" bIns="91425" anchor="b" anchorCtr="0">
-            <a:noAutofit/>
-          </a:bodyPr>
-          <a:lstStyle/>
-          <a:p>
-            <a:pPr marL="0" lvl="0" indent="0" algn="l" rtl="0">
-              <a:spcBef>
-                <a:spcPts val="0"/>
-              </a:spcBef>
-              <a:spcAft>
-                <a:spcPts val="0"/>
-              </a:spcAft>
-              <a:buNone/>
-            </a:pPr>
-            <a:r>
-              <a:rPr lang="en-US" dirty="0"/>
-              <a:t>Thank you today</a:t>
-            </a:r>
-            <a:endParaRPr dirty="0"/>
-          </a:p>
-        </p:txBody>
-      </p:sp>
-      <p:sp>
-        <p:nvSpPr>
-          <p:cNvPr id="176" name="Google Shape;176;p31"/>
-          <p:cNvSpPr txBox="1">
-            <a:spLocks noGrp="1"/>
-          </p:cNvSpPr>
-          <p:nvPr>
-            <p:ph type="body" idx="1"/>
-          </p:nvPr>
-        </p:nvSpPr>
-        <p:spPr>
-          <a:xfrm>
-            <a:off x="471900" y="1919075"/>
-            <a:ext cx="8222100" cy="2710200"/>
-          </a:xfrm>
-          <a:prstGeom prst="rect">
-            <a:avLst/>
-          </a:prstGeom>
-        </p:spPr>
-        <p:txBody>
-          <a:bodyPr spcFirstLastPara="1" wrap="square" lIns="91425" tIns="91425" rIns="91425" bIns="91425" anchor="t" anchorCtr="0">
-            <a:noAutofit/>
-          </a:bodyPr>
-          <a:lstStyle/>
-          <a:p>
-            <a:pPr marL="0" lvl="0" indent="0" algn="l" rtl="0">
-              <a:spcBef>
-                <a:spcPts val="0"/>
-              </a:spcBef>
-              <a:spcAft>
-                <a:spcPts val="0"/>
-              </a:spcAft>
-              <a:buNone/>
-            </a:pPr>
-            <a:endParaRPr dirty="0"/>
-          </a:p>
-          <a:p>
-            <a:pPr marL="0" lvl="0" indent="0" algn="l" rtl="0">
-              <a:spcBef>
-                <a:spcPts val="1600"/>
-              </a:spcBef>
-              <a:spcAft>
-                <a:spcPts val="0"/>
-              </a:spcAft>
-              <a:buNone/>
-            </a:pPr>
-            <a:r>
-              <a:rPr lang="en" dirty="0"/>
-              <a:t> </a:t>
-            </a:r>
-            <a:endParaRPr dirty="0"/>
-          </a:p>
-          <a:p>
-            <a:pPr marL="0" lvl="0" indent="0" algn="l" rtl="0">
-              <a:spcBef>
-                <a:spcPts val="1600"/>
-              </a:spcBef>
-              <a:spcAft>
-                <a:spcPts val="1600"/>
-              </a:spcAft>
-              <a:buNone/>
-            </a:pPr>
-            <a:r>
-              <a:rPr lang="en" dirty="0"/>
-              <a:t> </a:t>
-            </a:r>
-            <a:endParaRPr dirty="0"/>
-          </a:p>
-        </p:txBody>
-      </p:sp>
-      <p:pic>
-        <p:nvPicPr>
-          <p:cNvPr id="3" name="Picture 2">
-            <a:extLst>
-              <a:ext uri="{FF2B5EF4-FFF2-40B4-BE49-F238E27FC236}">
-                <a16:creationId xmlns:a16="http://schemas.microsoft.com/office/drawing/2014/main" id="{D5740987-B884-4A8E-B052-CECE13E45610}"/>
-              </a:ext>
-            </a:extLst>
-          </p:cNvPr>
-          <p:cNvPicPr>
-            <a:picLocks noChangeAspect="1"/>
-          </p:cNvPicPr>
-          <p:nvPr/>
-        </p:nvPicPr>
-        <p:blipFill>
-          <a:blip r:embed="rId3"/>
-          <a:stretch>
-            <a:fillRect/>
-          </a:stretch>
-        </p:blipFill>
-        <p:spPr>
-          <a:xfrm>
-            <a:off x="3143250" y="2303027"/>
-            <a:ext cx="2857500" cy="2152650"/>
-          </a:xfrm>
-          <a:prstGeom prst="rect">
-            <a:avLst/>
-          </a:prstGeom>
-        </p:spPr>
-      </p:pic>
-    </p:spTree>
   </p:cSld>
   <p:clrMapOvr>
     <a:masterClrMapping/>
@@ -6794,6 +9379,1529 @@
         <p14:creationId xmlns:p14="http://schemas.microsoft.com/office/powerpoint/2010/main" val="2355437649"/>
       </p:ext>
     </p:extLst>
+  </p:cSld>
+  <p:clrMapOvr>
+    <a:masterClrMapping/>
+  </p:clrMapOvr>
+</p:sld>
+</file>
+
+<file path=ppt/slides/slide20.xml><?xml version="1.0" encoding="utf-8"?>
+<p:sld xmlns:a="http://schemas.openxmlformats.org/drawingml/2006/main" xmlns:r="http://schemas.openxmlformats.org/officeDocument/2006/relationships" xmlns:p="http://schemas.openxmlformats.org/presentationml/2006/main">
+  <p:cSld>
+    <p:spTree>
+      <p:nvGrpSpPr>
+        <p:cNvPr id="1" name=""/>
+        <p:cNvGrpSpPr/>
+        <p:nvPr/>
+      </p:nvGrpSpPr>
+      <p:grpSpPr>
+        <a:xfrm>
+          <a:off x="0" y="0"/>
+          <a:ext cx="0" cy="0"/>
+          <a:chOff x="0" y="0"/>
+          <a:chExt cx="0" cy="0"/>
+        </a:xfrm>
+      </p:grpSpPr>
+      <p:sp>
+        <p:nvSpPr>
+          <p:cNvPr id="2" name="Title 1">
+            <a:extLst>
+              <a:ext uri="{FF2B5EF4-FFF2-40B4-BE49-F238E27FC236}">
+                <a16:creationId xmlns:a16="http://schemas.microsoft.com/office/drawing/2014/main" id="{16755565-5BBF-4B87-923E-8B3C43CB026F}"/>
+              </a:ext>
+            </a:extLst>
+          </p:cNvPr>
+          <p:cNvSpPr>
+            <a:spLocks noGrp="1"/>
+          </p:cNvSpPr>
+          <p:nvPr>
+            <p:ph type="title"/>
+          </p:nvPr>
+        </p:nvSpPr>
+        <p:spPr/>
+        <p:txBody>
+          <a:bodyPr/>
+          <a:lstStyle/>
+          <a:p>
+            <a:r>
+              <a:rPr lang="en-US" dirty="0"/>
+              <a:t>throw Statement</a:t>
+            </a:r>
+          </a:p>
+        </p:txBody>
+      </p:sp>
+      <p:sp>
+        <p:nvSpPr>
+          <p:cNvPr id="5" name="TextBox 4">
+            <a:extLst>
+              <a:ext uri="{FF2B5EF4-FFF2-40B4-BE49-F238E27FC236}">
+                <a16:creationId xmlns:a16="http://schemas.microsoft.com/office/drawing/2014/main" id="{2248BEE7-D0C5-4356-B58B-8A5C38A48EF7}"/>
+              </a:ext>
+            </a:extLst>
+          </p:cNvPr>
+          <p:cNvSpPr txBox="1"/>
+          <p:nvPr/>
+        </p:nvSpPr>
+        <p:spPr>
+          <a:xfrm>
+            <a:off x="471900" y="2047875"/>
+            <a:ext cx="8405400" cy="2523768"/>
+          </a:xfrm>
+          <a:prstGeom prst="rect">
+            <a:avLst/>
+          </a:prstGeom>
+          <a:noFill/>
+        </p:spPr>
+        <p:txBody>
+          <a:bodyPr wrap="square" rtlCol="0">
+            <a:spAutoFit/>
+          </a:bodyPr>
+          <a:lstStyle/>
+          <a:p>
+            <a:r>
+              <a:rPr lang="en-US" altLang="en-US" sz="1800" dirty="0">
+                <a:solidFill>
+                  <a:schemeClr val="tx2"/>
+                </a:solidFill>
+                <a:latin typeface="Roboto" panose="020B0604020202020204" charset="0"/>
+                <a:ea typeface="Roboto" panose="020B0604020202020204" charset="0"/>
+              </a:rPr>
+              <a:t>throw "Error2"; </a:t>
+            </a:r>
+          </a:p>
+          <a:p>
+            <a:r>
+              <a:rPr lang="en-US" altLang="en-US" sz="1800" dirty="0">
+                <a:solidFill>
+                  <a:schemeClr val="tx2"/>
+                </a:solidFill>
+                <a:latin typeface="Roboto" panose="020B0604020202020204" charset="0"/>
+                <a:ea typeface="Roboto" panose="020B0604020202020204" charset="0"/>
+              </a:rPr>
+              <a:t>throw 42; </a:t>
+            </a:r>
+          </a:p>
+          <a:p>
+            <a:r>
+              <a:rPr lang="en-US" altLang="en-US" sz="1800" dirty="0">
+                <a:solidFill>
+                  <a:schemeClr val="tx2"/>
+                </a:solidFill>
+                <a:latin typeface="Roboto" panose="020B0604020202020204" charset="0"/>
+                <a:ea typeface="Roboto" panose="020B0604020202020204" charset="0"/>
+              </a:rPr>
+              <a:t>throw true; </a:t>
+            </a:r>
+          </a:p>
+          <a:p>
+            <a:r>
+              <a:rPr lang="en-US" altLang="en-US" sz="1800" dirty="0">
+                <a:solidFill>
+                  <a:schemeClr val="tx2"/>
+                </a:solidFill>
+                <a:latin typeface="Roboto" panose="020B0604020202020204" charset="0"/>
+                <a:ea typeface="Roboto" panose="020B0604020202020204" charset="0"/>
+              </a:rPr>
+              <a:t>throw {</a:t>
+            </a:r>
+          </a:p>
+          <a:p>
+            <a:r>
+              <a:rPr lang="en-US" altLang="en-US" sz="1800" dirty="0">
+                <a:solidFill>
+                  <a:schemeClr val="tx2"/>
+                </a:solidFill>
+                <a:latin typeface="Roboto" panose="020B0604020202020204" charset="0"/>
+                <a:ea typeface="Roboto" panose="020B0604020202020204" charset="0"/>
+              </a:rPr>
+              <a:t>	</a:t>
+            </a:r>
+            <a:r>
+              <a:rPr lang="en-US" altLang="en-US" sz="1800" dirty="0" err="1">
+                <a:solidFill>
+                  <a:schemeClr val="tx2"/>
+                </a:solidFill>
+                <a:latin typeface="Roboto" panose="020B0604020202020204" charset="0"/>
+                <a:ea typeface="Roboto" panose="020B0604020202020204" charset="0"/>
+              </a:rPr>
+              <a:t>toString</a:t>
+            </a:r>
+            <a:r>
+              <a:rPr lang="en-US" altLang="en-US" sz="1800" dirty="0">
+                <a:solidFill>
+                  <a:schemeClr val="tx2"/>
+                </a:solidFill>
+                <a:latin typeface="Roboto" panose="020B0604020202020204" charset="0"/>
+                <a:ea typeface="Roboto" panose="020B0604020202020204" charset="0"/>
+              </a:rPr>
+              <a:t>: function() { </a:t>
+            </a:r>
+          </a:p>
+          <a:p>
+            <a:r>
+              <a:rPr lang="en-US" altLang="en-US" sz="1800" dirty="0">
+                <a:solidFill>
+                  <a:schemeClr val="tx2"/>
+                </a:solidFill>
+                <a:latin typeface="Roboto" panose="020B0604020202020204" charset="0"/>
+                <a:ea typeface="Roboto" panose="020B0604020202020204" charset="0"/>
+              </a:rPr>
+              <a:t>	return "I'm an object!"; </a:t>
+            </a:r>
+          </a:p>
+          <a:p>
+            <a:r>
+              <a:rPr lang="en-US" altLang="en-US" sz="1800" dirty="0">
+                <a:solidFill>
+                  <a:schemeClr val="tx2"/>
+                </a:solidFill>
+                <a:latin typeface="Roboto" panose="020B0604020202020204" charset="0"/>
+                <a:ea typeface="Roboto" panose="020B0604020202020204" charset="0"/>
+              </a:rPr>
+              <a:t>  	} </a:t>
+            </a:r>
+          </a:p>
+          <a:p>
+            <a:r>
+              <a:rPr lang="en-US" altLang="en-US" sz="1800" dirty="0">
+                <a:solidFill>
+                  <a:schemeClr val="tx2"/>
+                </a:solidFill>
+                <a:latin typeface="Roboto" panose="020B0604020202020204" charset="0"/>
+                <a:ea typeface="Roboto" panose="020B0604020202020204" charset="0"/>
+              </a:rPr>
+              <a:t>}; </a:t>
+            </a:r>
+          </a:p>
+          <a:p>
+            <a:endParaRPr lang="en-US" dirty="0"/>
+          </a:p>
+        </p:txBody>
+      </p:sp>
+    </p:spTree>
+    <p:extLst>
+      <p:ext uri="{BB962C8B-B14F-4D97-AF65-F5344CB8AC3E}">
+        <p14:creationId xmlns:p14="http://schemas.microsoft.com/office/powerpoint/2010/main" val="742259342"/>
+      </p:ext>
+    </p:extLst>
+  </p:cSld>
+  <p:clrMapOvr>
+    <a:masterClrMapping/>
+  </p:clrMapOvr>
+</p:sld>
+</file>
+
+<file path=ppt/slides/slide21.xml><?xml version="1.0" encoding="utf-8"?>
+<p:sld xmlns:a="http://schemas.openxmlformats.org/drawingml/2006/main" xmlns:r="http://schemas.openxmlformats.org/officeDocument/2006/relationships" xmlns:p="http://schemas.openxmlformats.org/presentationml/2006/main">
+  <p:cSld>
+    <p:spTree>
+      <p:nvGrpSpPr>
+        <p:cNvPr id="1" name=""/>
+        <p:cNvGrpSpPr/>
+        <p:nvPr/>
+      </p:nvGrpSpPr>
+      <p:grpSpPr>
+        <a:xfrm>
+          <a:off x="0" y="0"/>
+          <a:ext cx="0" cy="0"/>
+          <a:chOff x="0" y="0"/>
+          <a:chExt cx="0" cy="0"/>
+        </a:xfrm>
+      </p:grpSpPr>
+      <p:sp>
+        <p:nvSpPr>
+          <p:cNvPr id="2" name="Title 1">
+            <a:extLst>
+              <a:ext uri="{FF2B5EF4-FFF2-40B4-BE49-F238E27FC236}">
+                <a16:creationId xmlns:a16="http://schemas.microsoft.com/office/drawing/2014/main" id="{3B74BAE1-C9A8-4099-B317-602B2C2B5C73}"/>
+              </a:ext>
+            </a:extLst>
+          </p:cNvPr>
+          <p:cNvSpPr>
+            <a:spLocks noGrp="1"/>
+          </p:cNvSpPr>
+          <p:nvPr>
+            <p:ph type="title"/>
+          </p:nvPr>
+        </p:nvSpPr>
+        <p:spPr/>
+        <p:txBody>
+          <a:bodyPr/>
+          <a:lstStyle/>
+          <a:p>
+            <a:r>
+              <a:rPr lang="en-US" b="1" dirty="0"/>
+              <a:t>The catch Block</a:t>
+            </a:r>
+            <a:endParaRPr lang="en-US" dirty="0"/>
+          </a:p>
+        </p:txBody>
+      </p:sp>
+      <p:sp>
+        <p:nvSpPr>
+          <p:cNvPr id="5" name="TextBox 4">
+            <a:extLst>
+              <a:ext uri="{FF2B5EF4-FFF2-40B4-BE49-F238E27FC236}">
+                <a16:creationId xmlns:a16="http://schemas.microsoft.com/office/drawing/2014/main" id="{A717585C-8DD3-4C67-B214-D6F9720131C6}"/>
+              </a:ext>
+            </a:extLst>
+          </p:cNvPr>
+          <p:cNvSpPr txBox="1"/>
+          <p:nvPr/>
+        </p:nvSpPr>
+        <p:spPr>
+          <a:xfrm>
+            <a:off x="471900" y="2110085"/>
+            <a:ext cx="7972425" cy="923330"/>
+          </a:xfrm>
+          <a:prstGeom prst="rect">
+            <a:avLst/>
+          </a:prstGeom>
+          <a:noFill/>
+        </p:spPr>
+        <p:txBody>
+          <a:bodyPr wrap="square" rtlCol="0">
+            <a:spAutoFit/>
+          </a:bodyPr>
+          <a:lstStyle/>
+          <a:p>
+            <a:pPr lvl="0" eaLnBrk="0" fontAlgn="base" hangingPunct="0">
+              <a:spcBef>
+                <a:spcPct val="0"/>
+              </a:spcBef>
+              <a:spcAft>
+                <a:spcPct val="0"/>
+              </a:spcAft>
+              <a:buClrTx/>
+            </a:pPr>
+            <a:r>
+              <a:rPr lang="en-US" altLang="en-US" sz="1800" dirty="0">
+                <a:solidFill>
+                  <a:schemeClr val="tx2"/>
+                </a:solidFill>
+                <a:latin typeface="Roboto" panose="020B0604020202020204" charset="0"/>
+                <a:ea typeface="Roboto" panose="020B0604020202020204" charset="0"/>
+              </a:rPr>
+              <a:t>catch (</a:t>
+            </a:r>
+            <a:r>
+              <a:rPr lang="en-US" altLang="en-US" sz="1800" dirty="0" err="1">
+                <a:solidFill>
+                  <a:schemeClr val="tx2"/>
+                </a:solidFill>
+                <a:latin typeface="Roboto" panose="020B0604020202020204" charset="0"/>
+                <a:ea typeface="Roboto" panose="020B0604020202020204" charset="0"/>
+              </a:rPr>
+              <a:t>catchID</a:t>
+            </a:r>
+            <a:r>
+              <a:rPr lang="en-US" altLang="en-US" sz="1800" dirty="0">
+                <a:solidFill>
+                  <a:schemeClr val="tx2"/>
+                </a:solidFill>
+                <a:latin typeface="Roboto" panose="020B0604020202020204" charset="0"/>
+                <a:ea typeface="Roboto" panose="020B0604020202020204" charset="0"/>
+              </a:rPr>
+              <a:t>) {</a:t>
+            </a:r>
+          </a:p>
+          <a:p>
+            <a:pPr lvl="0" eaLnBrk="0" fontAlgn="base" hangingPunct="0">
+              <a:spcBef>
+                <a:spcPct val="0"/>
+              </a:spcBef>
+              <a:spcAft>
+                <a:spcPct val="0"/>
+              </a:spcAft>
+              <a:buClrTx/>
+            </a:pPr>
+            <a:r>
+              <a:rPr lang="en-US" altLang="en-US" sz="1800" dirty="0">
+                <a:solidFill>
+                  <a:schemeClr val="tx2"/>
+                </a:solidFill>
+                <a:latin typeface="Roboto" panose="020B0604020202020204" charset="0"/>
+                <a:ea typeface="Roboto" panose="020B0604020202020204" charset="0"/>
+              </a:rPr>
+              <a:t> 	statements</a:t>
+            </a:r>
+          </a:p>
+          <a:p>
+            <a:pPr lvl="0" eaLnBrk="0" fontAlgn="base" hangingPunct="0">
+              <a:spcBef>
+                <a:spcPct val="0"/>
+              </a:spcBef>
+              <a:spcAft>
+                <a:spcPct val="0"/>
+              </a:spcAft>
+              <a:buClrTx/>
+            </a:pPr>
+            <a:r>
+              <a:rPr lang="en-US" altLang="en-US" sz="1800" dirty="0">
+                <a:solidFill>
+                  <a:schemeClr val="tx2"/>
+                </a:solidFill>
+                <a:latin typeface="Roboto" panose="020B0604020202020204" charset="0"/>
+                <a:ea typeface="Roboto" panose="020B0604020202020204" charset="0"/>
+              </a:rPr>
+              <a:t> } </a:t>
+            </a:r>
+          </a:p>
+        </p:txBody>
+      </p:sp>
+    </p:spTree>
+    <p:extLst>
+      <p:ext uri="{BB962C8B-B14F-4D97-AF65-F5344CB8AC3E}">
+        <p14:creationId xmlns:p14="http://schemas.microsoft.com/office/powerpoint/2010/main" val="4292196806"/>
+      </p:ext>
+    </p:extLst>
+  </p:cSld>
+  <p:clrMapOvr>
+    <a:masterClrMapping/>
+  </p:clrMapOvr>
+</p:sld>
+</file>
+
+<file path=ppt/slides/slide22.xml><?xml version="1.0" encoding="utf-8"?>
+<p:sld xmlns:a="http://schemas.openxmlformats.org/drawingml/2006/main" xmlns:r="http://schemas.openxmlformats.org/officeDocument/2006/relationships" xmlns:p="http://schemas.openxmlformats.org/presentationml/2006/main">
+  <p:cSld>
+    <p:spTree>
+      <p:nvGrpSpPr>
+        <p:cNvPr id="1" name=""/>
+        <p:cNvGrpSpPr/>
+        <p:nvPr/>
+      </p:nvGrpSpPr>
+      <p:grpSpPr>
+        <a:xfrm>
+          <a:off x="0" y="0"/>
+          <a:ext cx="0" cy="0"/>
+          <a:chOff x="0" y="0"/>
+          <a:chExt cx="0" cy="0"/>
+        </a:xfrm>
+      </p:grpSpPr>
+      <p:sp>
+        <p:nvSpPr>
+          <p:cNvPr id="2" name="Title 1">
+            <a:extLst>
+              <a:ext uri="{FF2B5EF4-FFF2-40B4-BE49-F238E27FC236}">
+                <a16:creationId xmlns:a16="http://schemas.microsoft.com/office/drawing/2014/main" id="{193118AF-546A-449D-8FE9-0378366E27CE}"/>
+              </a:ext>
+            </a:extLst>
+          </p:cNvPr>
+          <p:cNvSpPr>
+            <a:spLocks noGrp="1"/>
+          </p:cNvSpPr>
+          <p:nvPr>
+            <p:ph type="title"/>
+          </p:nvPr>
+        </p:nvSpPr>
+        <p:spPr/>
+        <p:txBody>
+          <a:bodyPr/>
+          <a:lstStyle/>
+          <a:p>
+            <a:r>
+              <a:rPr lang="en-US" dirty="0"/>
+              <a:t>try…catch Statement</a:t>
+            </a:r>
+          </a:p>
+        </p:txBody>
+      </p:sp>
+      <p:sp>
+        <p:nvSpPr>
+          <p:cNvPr id="5" name="TextBox 4">
+            <a:extLst>
+              <a:ext uri="{FF2B5EF4-FFF2-40B4-BE49-F238E27FC236}">
+                <a16:creationId xmlns:a16="http://schemas.microsoft.com/office/drawing/2014/main" id="{E318CF15-6B2C-4091-A8A2-9A73392FB8F5}"/>
+              </a:ext>
+            </a:extLst>
+          </p:cNvPr>
+          <p:cNvSpPr txBox="1"/>
+          <p:nvPr/>
+        </p:nvSpPr>
+        <p:spPr>
+          <a:xfrm>
+            <a:off x="471900" y="2190750"/>
+            <a:ext cx="8072025" cy="1969770"/>
+          </a:xfrm>
+          <a:prstGeom prst="rect">
+            <a:avLst/>
+          </a:prstGeom>
+          <a:noFill/>
+        </p:spPr>
+        <p:txBody>
+          <a:bodyPr wrap="square" rtlCol="0">
+            <a:spAutoFit/>
+          </a:bodyPr>
+          <a:lstStyle/>
+          <a:p>
+            <a:r>
+              <a:rPr lang="en-US" altLang="en-US" sz="1800" dirty="0">
+                <a:solidFill>
+                  <a:schemeClr val="tx2"/>
+                </a:solidFill>
+                <a:latin typeface="Roboto" panose="020B0604020202020204" charset="0"/>
+                <a:ea typeface="Roboto" panose="020B0604020202020204" charset="0"/>
+              </a:rPr>
+              <a:t>try { </a:t>
+            </a:r>
+          </a:p>
+          <a:p>
+            <a:r>
+              <a:rPr lang="en-US" altLang="en-US" sz="1800" dirty="0">
+                <a:solidFill>
+                  <a:schemeClr val="tx2"/>
+                </a:solidFill>
+                <a:latin typeface="Roboto" panose="020B0604020202020204" charset="0"/>
+                <a:ea typeface="Roboto" panose="020B0604020202020204" charset="0"/>
+              </a:rPr>
+              <a:t>	</a:t>
+            </a:r>
+            <a:r>
+              <a:rPr lang="en-US" altLang="en-US" sz="1800" dirty="0" err="1">
+                <a:solidFill>
+                  <a:schemeClr val="tx2"/>
+                </a:solidFill>
+                <a:latin typeface="Roboto" panose="020B0604020202020204" charset="0"/>
+                <a:ea typeface="Roboto" panose="020B0604020202020204" charset="0"/>
+              </a:rPr>
+              <a:t>monthName</a:t>
+            </a:r>
+            <a:r>
+              <a:rPr lang="en-US" altLang="en-US" sz="1800" dirty="0">
+                <a:solidFill>
+                  <a:schemeClr val="tx2"/>
+                </a:solidFill>
+                <a:latin typeface="Roboto" panose="020B0604020202020204" charset="0"/>
+                <a:ea typeface="Roboto" panose="020B0604020202020204" charset="0"/>
+              </a:rPr>
+              <a:t>=</a:t>
+            </a:r>
+            <a:r>
+              <a:rPr lang="en-US" altLang="en-US" sz="1800" dirty="0" err="1">
+                <a:solidFill>
+                  <a:schemeClr val="tx2"/>
+                </a:solidFill>
+                <a:latin typeface="Roboto" panose="020B0604020202020204" charset="0"/>
+                <a:ea typeface="Roboto" panose="020B0604020202020204" charset="0"/>
+              </a:rPr>
+              <a:t>getMonthName</a:t>
+            </a:r>
+            <a:r>
+              <a:rPr lang="en-US" altLang="en-US" sz="1800" dirty="0">
+                <a:solidFill>
+                  <a:schemeClr val="tx2"/>
+                </a:solidFill>
+                <a:latin typeface="Roboto" panose="020B0604020202020204" charset="0"/>
+                <a:ea typeface="Roboto" panose="020B0604020202020204" charset="0"/>
+              </a:rPr>
+              <a:t>(</a:t>
+            </a:r>
+            <a:r>
+              <a:rPr lang="en-US" altLang="en-US" sz="1800" dirty="0" err="1">
+                <a:solidFill>
+                  <a:schemeClr val="tx2"/>
+                </a:solidFill>
+                <a:latin typeface="Roboto" panose="020B0604020202020204" charset="0"/>
+                <a:ea typeface="Roboto" panose="020B0604020202020204" charset="0"/>
+              </a:rPr>
+              <a:t>myMonth</a:t>
+            </a:r>
+            <a:r>
+              <a:rPr lang="en-US" altLang="en-US" sz="1800" dirty="0">
+                <a:solidFill>
+                  <a:schemeClr val="tx2"/>
+                </a:solidFill>
+                <a:latin typeface="Roboto" panose="020B0604020202020204" charset="0"/>
+                <a:ea typeface="Roboto" panose="020B0604020202020204" charset="0"/>
+              </a:rPr>
+              <a:t>)</a:t>
+            </a:r>
+          </a:p>
+          <a:p>
+            <a:r>
+              <a:rPr lang="en-US" altLang="en-US" sz="1800" dirty="0">
+                <a:solidFill>
+                  <a:schemeClr val="tx2"/>
+                </a:solidFill>
+                <a:latin typeface="Roboto" panose="020B0604020202020204" charset="0"/>
+                <a:ea typeface="Roboto" panose="020B0604020202020204" charset="0"/>
+              </a:rPr>
+              <a:t> } catch (e) {</a:t>
+            </a:r>
+          </a:p>
+          <a:p>
+            <a:r>
+              <a:rPr lang="en-US" altLang="en-US" sz="1800" dirty="0">
+                <a:solidFill>
+                  <a:schemeClr val="tx2"/>
+                </a:solidFill>
+                <a:latin typeface="Roboto" panose="020B0604020202020204" charset="0"/>
+                <a:ea typeface="Roboto" panose="020B0604020202020204" charset="0"/>
+              </a:rPr>
+              <a:t> 	</a:t>
+            </a:r>
+            <a:r>
+              <a:rPr lang="en-US" altLang="en-US" sz="1800" dirty="0" err="1">
+                <a:solidFill>
+                  <a:schemeClr val="tx2"/>
+                </a:solidFill>
+                <a:latin typeface="Roboto" panose="020B0604020202020204" charset="0"/>
+                <a:ea typeface="Roboto" panose="020B0604020202020204" charset="0"/>
+              </a:rPr>
+              <a:t>monthName</a:t>
+            </a:r>
+            <a:r>
+              <a:rPr lang="en-US" altLang="en-US" sz="1800" dirty="0">
+                <a:solidFill>
+                  <a:schemeClr val="tx2"/>
+                </a:solidFill>
+                <a:latin typeface="Roboto" panose="020B0604020202020204" charset="0"/>
+                <a:ea typeface="Roboto" panose="020B0604020202020204" charset="0"/>
+              </a:rPr>
+              <a:t>="unknown" </a:t>
+            </a:r>
+            <a:r>
+              <a:rPr lang="en-US" altLang="en-US" sz="1800" dirty="0" err="1">
+                <a:solidFill>
+                  <a:schemeClr val="tx2"/>
+                </a:solidFill>
+                <a:latin typeface="Roboto" panose="020B0604020202020204" charset="0"/>
+                <a:ea typeface="Roboto" panose="020B0604020202020204" charset="0"/>
+              </a:rPr>
+              <a:t>logMyErrors</a:t>
+            </a:r>
+            <a:r>
+              <a:rPr lang="en-US" altLang="en-US" sz="1800" dirty="0">
+                <a:solidFill>
+                  <a:schemeClr val="tx2"/>
+                </a:solidFill>
+                <a:latin typeface="Roboto" panose="020B0604020202020204" charset="0"/>
+                <a:ea typeface="Roboto" panose="020B0604020202020204" charset="0"/>
+              </a:rPr>
+              <a:t>(e) </a:t>
+            </a:r>
+            <a:r>
+              <a:rPr lang="en-US" altLang="en-US" sz="1800" dirty="0">
+                <a:solidFill>
+                  <a:schemeClr val="tx1"/>
+                </a:solidFill>
+                <a:latin typeface="Roboto" panose="020B0604020202020204" charset="0"/>
+                <a:ea typeface="Roboto" panose="020B0604020202020204" charset="0"/>
+              </a:rPr>
+              <a:t>// pass exception object to </a:t>
+            </a:r>
+            <a:r>
+              <a:rPr lang="en-US" altLang="en-US" sz="1800" dirty="0">
+                <a:solidFill>
+                  <a:schemeClr val="tx2"/>
+                </a:solidFill>
+                <a:latin typeface="Roboto" panose="020B0604020202020204" charset="0"/>
+                <a:ea typeface="Roboto" panose="020B0604020202020204" charset="0"/>
+              </a:rPr>
+              <a:t>	error handler </a:t>
+            </a:r>
+          </a:p>
+          <a:p>
+            <a:r>
+              <a:rPr lang="en-US" altLang="en-US" sz="1800" dirty="0">
+                <a:solidFill>
+                  <a:schemeClr val="tx2"/>
+                </a:solidFill>
+                <a:latin typeface="Roboto" panose="020B0604020202020204" charset="0"/>
+                <a:ea typeface="Roboto" panose="020B0604020202020204" charset="0"/>
+              </a:rPr>
+              <a:t>} </a:t>
+            </a:r>
+          </a:p>
+          <a:p>
+            <a:endParaRPr lang="en-US" dirty="0"/>
+          </a:p>
+        </p:txBody>
+      </p:sp>
+    </p:spTree>
+    <p:extLst>
+      <p:ext uri="{BB962C8B-B14F-4D97-AF65-F5344CB8AC3E}">
+        <p14:creationId xmlns:p14="http://schemas.microsoft.com/office/powerpoint/2010/main" val="3771808042"/>
+      </p:ext>
+    </p:extLst>
+  </p:cSld>
+  <p:clrMapOvr>
+    <a:masterClrMapping/>
+  </p:clrMapOvr>
+</p:sld>
+</file>
+
+<file path=ppt/slides/slide23.xml><?xml version="1.0" encoding="utf-8"?>
+<p:sld xmlns:a="http://schemas.openxmlformats.org/drawingml/2006/main" xmlns:r="http://schemas.openxmlformats.org/officeDocument/2006/relationships" xmlns:p="http://schemas.openxmlformats.org/presentationml/2006/main">
+  <p:cSld>
+    <p:spTree>
+      <p:nvGrpSpPr>
+        <p:cNvPr id="1" name=""/>
+        <p:cNvGrpSpPr/>
+        <p:nvPr/>
+      </p:nvGrpSpPr>
+      <p:grpSpPr>
+        <a:xfrm>
+          <a:off x="0" y="0"/>
+          <a:ext cx="0" cy="0"/>
+          <a:chOff x="0" y="0"/>
+          <a:chExt cx="0" cy="0"/>
+        </a:xfrm>
+      </p:grpSpPr>
+      <p:sp>
+        <p:nvSpPr>
+          <p:cNvPr id="2" name="Title 1">
+            <a:extLst>
+              <a:ext uri="{FF2B5EF4-FFF2-40B4-BE49-F238E27FC236}">
+                <a16:creationId xmlns:a16="http://schemas.microsoft.com/office/drawing/2014/main" id="{47B88B71-3593-447F-B9FD-F450A94543FA}"/>
+              </a:ext>
+            </a:extLst>
+          </p:cNvPr>
+          <p:cNvSpPr>
+            <a:spLocks noGrp="1"/>
+          </p:cNvSpPr>
+          <p:nvPr>
+            <p:ph type="title"/>
+          </p:nvPr>
+        </p:nvSpPr>
+        <p:spPr/>
+        <p:txBody>
+          <a:bodyPr/>
+          <a:lstStyle/>
+          <a:p>
+            <a:r>
+              <a:rPr lang="en-US" b="1" dirty="0"/>
+              <a:t>The finally Block</a:t>
+            </a:r>
+            <a:endParaRPr lang="en-US" dirty="0"/>
+          </a:p>
+        </p:txBody>
+      </p:sp>
+      <p:sp>
+        <p:nvSpPr>
+          <p:cNvPr id="5" name="TextBox 4">
+            <a:extLst>
+              <a:ext uri="{FF2B5EF4-FFF2-40B4-BE49-F238E27FC236}">
+                <a16:creationId xmlns:a16="http://schemas.microsoft.com/office/drawing/2014/main" id="{83FEF944-2D41-4FBB-9CE8-C9D913B62970}"/>
+              </a:ext>
+            </a:extLst>
+          </p:cNvPr>
+          <p:cNvSpPr txBox="1"/>
+          <p:nvPr/>
+        </p:nvSpPr>
+        <p:spPr>
+          <a:xfrm>
+            <a:off x="361950" y="2000250"/>
+            <a:ext cx="8448675" cy="2585323"/>
+          </a:xfrm>
+          <a:prstGeom prst="rect">
+            <a:avLst/>
+          </a:prstGeom>
+          <a:noFill/>
+        </p:spPr>
+        <p:txBody>
+          <a:bodyPr wrap="square" rtlCol="0">
+            <a:spAutoFit/>
+          </a:bodyPr>
+          <a:lstStyle/>
+          <a:p>
+            <a:pPr lvl="0" eaLnBrk="0" fontAlgn="base" hangingPunct="0">
+              <a:spcBef>
+                <a:spcPct val="0"/>
+              </a:spcBef>
+              <a:spcAft>
+                <a:spcPct val="0"/>
+              </a:spcAft>
+              <a:buClrTx/>
+            </a:pPr>
+            <a:r>
+              <a:rPr lang="en-US" altLang="en-US" sz="1800" dirty="0" err="1">
+                <a:solidFill>
+                  <a:schemeClr val="tx2"/>
+                </a:solidFill>
+                <a:latin typeface="Roboto" panose="020B0604020202020204" charset="0"/>
+                <a:ea typeface="Roboto" panose="020B0604020202020204" charset="0"/>
+              </a:rPr>
+              <a:t>openMyFile</a:t>
+            </a:r>
+            <a:r>
+              <a:rPr lang="en-US" altLang="en-US" sz="1800" dirty="0">
+                <a:solidFill>
+                  <a:schemeClr val="tx2"/>
+                </a:solidFill>
+                <a:latin typeface="Roboto" panose="020B0604020202020204" charset="0"/>
+                <a:ea typeface="Roboto" panose="020B0604020202020204" charset="0"/>
+              </a:rPr>
+              <a:t>();</a:t>
+            </a:r>
+          </a:p>
+          <a:p>
+            <a:pPr lvl="0" eaLnBrk="0" fontAlgn="base" hangingPunct="0">
+              <a:spcBef>
+                <a:spcPct val="0"/>
+              </a:spcBef>
+              <a:spcAft>
+                <a:spcPct val="0"/>
+              </a:spcAft>
+              <a:buClrTx/>
+            </a:pPr>
+            <a:endParaRPr lang="en-US" altLang="en-US" sz="1800" dirty="0">
+              <a:solidFill>
+                <a:schemeClr val="tx2"/>
+              </a:solidFill>
+              <a:latin typeface="Roboto" panose="020B0604020202020204" charset="0"/>
+              <a:ea typeface="Roboto" panose="020B0604020202020204" charset="0"/>
+            </a:endParaRPr>
+          </a:p>
+          <a:p>
+            <a:pPr lvl="0" eaLnBrk="0" fontAlgn="base" hangingPunct="0">
+              <a:spcBef>
+                <a:spcPct val="0"/>
+              </a:spcBef>
+              <a:spcAft>
+                <a:spcPct val="0"/>
+              </a:spcAft>
+              <a:buClrTx/>
+            </a:pPr>
+            <a:r>
+              <a:rPr lang="en-US" altLang="en-US" sz="1800" dirty="0">
+                <a:solidFill>
+                  <a:schemeClr val="tx2"/>
+                </a:solidFill>
+                <a:latin typeface="Roboto" panose="020B0604020202020204" charset="0"/>
+                <a:ea typeface="Roboto" panose="020B0604020202020204" charset="0"/>
+              </a:rPr>
+              <a:t>try { </a:t>
+            </a:r>
+          </a:p>
+          <a:p>
+            <a:pPr lvl="0" eaLnBrk="0" fontAlgn="base" hangingPunct="0">
+              <a:spcBef>
+                <a:spcPct val="0"/>
+              </a:spcBef>
+              <a:spcAft>
+                <a:spcPct val="0"/>
+              </a:spcAft>
+              <a:buClrTx/>
+            </a:pPr>
+            <a:r>
+              <a:rPr lang="en-US" altLang="en-US" sz="1800" dirty="0">
+                <a:solidFill>
+                  <a:schemeClr val="tx2"/>
+                </a:solidFill>
+                <a:latin typeface="Roboto" panose="020B0604020202020204" charset="0"/>
+                <a:ea typeface="Roboto" panose="020B0604020202020204" charset="0"/>
+              </a:rPr>
+              <a:t>	</a:t>
+            </a:r>
+            <a:r>
+              <a:rPr lang="en-US" altLang="en-US" sz="1800" dirty="0" err="1">
+                <a:solidFill>
+                  <a:schemeClr val="tx2"/>
+                </a:solidFill>
+                <a:latin typeface="Roboto" panose="020B0604020202020204" charset="0"/>
+                <a:ea typeface="Roboto" panose="020B0604020202020204" charset="0"/>
+              </a:rPr>
+              <a:t>writeMyFile</a:t>
+            </a:r>
+            <a:r>
+              <a:rPr lang="en-US" altLang="en-US" sz="1800" dirty="0">
+                <a:solidFill>
+                  <a:schemeClr val="tx2"/>
+                </a:solidFill>
+                <a:latin typeface="Roboto" panose="020B0604020202020204" charset="0"/>
+                <a:ea typeface="Roboto" panose="020B0604020202020204" charset="0"/>
+              </a:rPr>
+              <a:t>(</a:t>
+            </a:r>
+            <a:r>
+              <a:rPr lang="en-US" altLang="en-US" sz="1800" dirty="0" err="1">
+                <a:solidFill>
+                  <a:schemeClr val="tx2"/>
+                </a:solidFill>
+                <a:latin typeface="Roboto" panose="020B0604020202020204" charset="0"/>
+                <a:ea typeface="Roboto" panose="020B0604020202020204" charset="0"/>
+              </a:rPr>
+              <a:t>theData</a:t>
+            </a:r>
+            <a:r>
+              <a:rPr lang="en-US" altLang="en-US" sz="1800" dirty="0">
+                <a:solidFill>
+                  <a:schemeClr val="tx2"/>
+                </a:solidFill>
+                <a:latin typeface="Roboto" panose="020B0604020202020204" charset="0"/>
+                <a:ea typeface="Roboto" panose="020B0604020202020204" charset="0"/>
+              </a:rPr>
+              <a:t>); </a:t>
+            </a:r>
+            <a:r>
+              <a:rPr lang="en-US" altLang="en-US" sz="1800" dirty="0">
+                <a:solidFill>
+                  <a:schemeClr val="tx1"/>
+                </a:solidFill>
+                <a:latin typeface="Roboto" panose="020B0604020202020204" charset="0"/>
+                <a:ea typeface="Roboto" panose="020B0604020202020204" charset="0"/>
+              </a:rPr>
+              <a:t>//This may throw a error </a:t>
+            </a:r>
+          </a:p>
+          <a:p>
+            <a:pPr lvl="0" eaLnBrk="0" fontAlgn="base" hangingPunct="0">
+              <a:spcBef>
+                <a:spcPct val="0"/>
+              </a:spcBef>
+              <a:spcAft>
+                <a:spcPct val="0"/>
+              </a:spcAft>
+              <a:buClrTx/>
+            </a:pPr>
+            <a:r>
+              <a:rPr lang="en-US" altLang="en-US" sz="1800" dirty="0">
+                <a:solidFill>
+                  <a:schemeClr val="tx2"/>
+                </a:solidFill>
+                <a:latin typeface="Roboto" panose="020B0604020202020204" charset="0"/>
+                <a:ea typeface="Roboto" panose="020B0604020202020204" charset="0"/>
+              </a:rPr>
+              <a:t>}catch(e){ </a:t>
+            </a:r>
+          </a:p>
+          <a:p>
+            <a:pPr lvl="0" eaLnBrk="0" fontAlgn="base" hangingPunct="0">
+              <a:spcBef>
+                <a:spcPct val="0"/>
+              </a:spcBef>
+              <a:spcAft>
+                <a:spcPct val="0"/>
+              </a:spcAft>
+              <a:buClrTx/>
+            </a:pPr>
+            <a:r>
+              <a:rPr lang="en-US" altLang="en-US" sz="1800" dirty="0">
+                <a:solidFill>
+                  <a:schemeClr val="tx2"/>
+                </a:solidFill>
+                <a:latin typeface="Roboto" panose="020B0604020202020204" charset="0"/>
+                <a:ea typeface="Roboto" panose="020B0604020202020204" charset="0"/>
+              </a:rPr>
+              <a:t>	</a:t>
+            </a:r>
+            <a:r>
+              <a:rPr lang="en-US" altLang="en-US" sz="1800" dirty="0" err="1">
+                <a:solidFill>
+                  <a:schemeClr val="tx2"/>
+                </a:solidFill>
+                <a:latin typeface="Roboto" panose="020B0604020202020204" charset="0"/>
+                <a:ea typeface="Roboto" panose="020B0604020202020204" charset="0"/>
+              </a:rPr>
+              <a:t>handleError</a:t>
+            </a:r>
+            <a:r>
+              <a:rPr lang="en-US" altLang="en-US" sz="1800" dirty="0">
+                <a:solidFill>
+                  <a:schemeClr val="tx2"/>
+                </a:solidFill>
+                <a:latin typeface="Roboto" panose="020B0604020202020204" charset="0"/>
+                <a:ea typeface="Roboto" panose="020B0604020202020204" charset="0"/>
+              </a:rPr>
+              <a:t>(e); </a:t>
+            </a:r>
+            <a:r>
+              <a:rPr lang="en-US" altLang="en-US" sz="1800" dirty="0">
+                <a:solidFill>
+                  <a:schemeClr val="tx1"/>
+                </a:solidFill>
+                <a:latin typeface="Roboto" panose="020B0604020202020204" charset="0"/>
+                <a:ea typeface="Roboto" panose="020B0604020202020204" charset="0"/>
+              </a:rPr>
+              <a:t>// If we got a error we handle it</a:t>
+            </a:r>
+          </a:p>
+          <a:p>
+            <a:pPr lvl="0" eaLnBrk="0" fontAlgn="base" hangingPunct="0">
+              <a:spcBef>
+                <a:spcPct val="0"/>
+              </a:spcBef>
+              <a:spcAft>
+                <a:spcPct val="0"/>
+              </a:spcAft>
+              <a:buClrTx/>
+            </a:pPr>
+            <a:r>
+              <a:rPr lang="en-US" altLang="en-US" sz="1800" dirty="0">
+                <a:solidFill>
+                  <a:schemeClr val="tx2"/>
+                </a:solidFill>
+                <a:latin typeface="Roboto" panose="020B0604020202020204" charset="0"/>
+                <a:ea typeface="Roboto" panose="020B0604020202020204" charset="0"/>
+              </a:rPr>
+              <a:t> }finally { </a:t>
+            </a:r>
+          </a:p>
+          <a:p>
+            <a:pPr lvl="0" eaLnBrk="0" fontAlgn="base" hangingPunct="0">
+              <a:spcBef>
+                <a:spcPct val="0"/>
+              </a:spcBef>
+              <a:spcAft>
+                <a:spcPct val="0"/>
+              </a:spcAft>
+              <a:buClrTx/>
+            </a:pPr>
+            <a:r>
+              <a:rPr lang="en-US" altLang="en-US" sz="1800" dirty="0">
+                <a:solidFill>
+                  <a:schemeClr val="tx2"/>
+                </a:solidFill>
+                <a:latin typeface="Roboto" panose="020B0604020202020204" charset="0"/>
+                <a:ea typeface="Roboto" panose="020B0604020202020204" charset="0"/>
+              </a:rPr>
+              <a:t>	</a:t>
+            </a:r>
+            <a:r>
+              <a:rPr lang="en-US" altLang="en-US" sz="1800" dirty="0" err="1">
+                <a:solidFill>
+                  <a:schemeClr val="tx2"/>
+                </a:solidFill>
+                <a:latin typeface="Roboto" panose="020B0604020202020204" charset="0"/>
+                <a:ea typeface="Roboto" panose="020B0604020202020204" charset="0"/>
+              </a:rPr>
+              <a:t>closeMyFile</a:t>
+            </a:r>
+            <a:r>
+              <a:rPr lang="en-US" altLang="en-US" sz="1800" dirty="0">
+                <a:solidFill>
+                  <a:schemeClr val="tx2"/>
+                </a:solidFill>
+                <a:latin typeface="Roboto" panose="020B0604020202020204" charset="0"/>
+                <a:ea typeface="Roboto" panose="020B0604020202020204" charset="0"/>
+              </a:rPr>
+              <a:t>(); </a:t>
+            </a:r>
+            <a:r>
+              <a:rPr lang="en-US" altLang="en-US" sz="1800" dirty="0">
+                <a:solidFill>
+                  <a:schemeClr val="tx1"/>
+                </a:solidFill>
+                <a:latin typeface="Roboto" panose="020B0604020202020204" charset="0"/>
+                <a:ea typeface="Roboto" panose="020B0604020202020204" charset="0"/>
+              </a:rPr>
+              <a:t>// always close the resource </a:t>
+            </a:r>
+          </a:p>
+          <a:p>
+            <a:pPr lvl="0" eaLnBrk="0" fontAlgn="base" hangingPunct="0">
+              <a:spcBef>
+                <a:spcPct val="0"/>
+              </a:spcBef>
+              <a:spcAft>
+                <a:spcPct val="0"/>
+              </a:spcAft>
+              <a:buClrTx/>
+            </a:pPr>
+            <a:r>
+              <a:rPr lang="en-US" altLang="en-US" sz="1800" dirty="0">
+                <a:solidFill>
+                  <a:schemeClr val="tx2"/>
+                </a:solidFill>
+                <a:latin typeface="Roboto" panose="020B0604020202020204" charset="0"/>
+                <a:ea typeface="Roboto" panose="020B0604020202020204" charset="0"/>
+              </a:rPr>
+              <a:t>} </a:t>
+            </a:r>
+          </a:p>
+        </p:txBody>
+      </p:sp>
+    </p:spTree>
+    <p:extLst>
+      <p:ext uri="{BB962C8B-B14F-4D97-AF65-F5344CB8AC3E}">
+        <p14:creationId xmlns:p14="http://schemas.microsoft.com/office/powerpoint/2010/main" val="3775756269"/>
+      </p:ext>
+    </p:extLst>
+  </p:cSld>
+  <p:clrMapOvr>
+    <a:masterClrMapping/>
+  </p:clrMapOvr>
+</p:sld>
+</file>
+
+<file path=ppt/slides/slide24.xml><?xml version="1.0" encoding="utf-8"?>
+<p:sld xmlns:a="http://schemas.openxmlformats.org/drawingml/2006/main" xmlns:r="http://schemas.openxmlformats.org/officeDocument/2006/relationships" xmlns:p="http://schemas.openxmlformats.org/presentationml/2006/main">
+  <p:cSld>
+    <p:spTree>
+      <p:nvGrpSpPr>
+        <p:cNvPr id="1" name=""/>
+        <p:cNvGrpSpPr/>
+        <p:nvPr/>
+      </p:nvGrpSpPr>
+      <p:grpSpPr>
+        <a:xfrm>
+          <a:off x="0" y="0"/>
+          <a:ext cx="0" cy="0"/>
+          <a:chOff x="0" y="0"/>
+          <a:chExt cx="0" cy="0"/>
+        </a:xfrm>
+      </p:grpSpPr>
+      <p:sp>
+        <p:nvSpPr>
+          <p:cNvPr id="2" name="Title 1">
+            <a:extLst>
+              <a:ext uri="{FF2B5EF4-FFF2-40B4-BE49-F238E27FC236}">
+                <a16:creationId xmlns:a16="http://schemas.microsoft.com/office/drawing/2014/main" id="{D50E6864-A4C0-4422-B5EF-B7815B90B607}"/>
+              </a:ext>
+            </a:extLst>
+          </p:cNvPr>
+          <p:cNvSpPr>
+            <a:spLocks noGrp="1"/>
+          </p:cNvSpPr>
+          <p:nvPr>
+            <p:ph type="title"/>
+          </p:nvPr>
+        </p:nvSpPr>
+        <p:spPr/>
+        <p:txBody>
+          <a:bodyPr/>
+          <a:lstStyle/>
+          <a:p>
+            <a:r>
+              <a:rPr lang="en-US" b="1" dirty="0"/>
+              <a:t>Nesting try…catch Statements</a:t>
+            </a:r>
+            <a:endParaRPr lang="en-US" dirty="0"/>
+          </a:p>
+        </p:txBody>
+      </p:sp>
+      <p:sp>
+        <p:nvSpPr>
+          <p:cNvPr id="5" name="TextBox 4">
+            <a:extLst>
+              <a:ext uri="{FF2B5EF4-FFF2-40B4-BE49-F238E27FC236}">
+                <a16:creationId xmlns:a16="http://schemas.microsoft.com/office/drawing/2014/main" id="{CEB2B4A8-C800-43B3-9AA0-9993758A2623}"/>
+              </a:ext>
+            </a:extLst>
+          </p:cNvPr>
+          <p:cNvSpPr txBox="1"/>
+          <p:nvPr/>
+        </p:nvSpPr>
+        <p:spPr>
+          <a:xfrm>
+            <a:off x="471899" y="1781175"/>
+            <a:ext cx="8559225" cy="3447098"/>
+          </a:xfrm>
+          <a:prstGeom prst="rect">
+            <a:avLst/>
+          </a:prstGeom>
+          <a:noFill/>
+        </p:spPr>
+        <p:txBody>
+          <a:bodyPr wrap="square" rtlCol="0">
+            <a:spAutoFit/>
+          </a:bodyPr>
+          <a:lstStyle/>
+          <a:p>
+            <a:r>
+              <a:rPr lang="en-US" altLang="en-US" sz="1700" dirty="0">
+                <a:solidFill>
+                  <a:schemeClr val="tx2"/>
+                </a:solidFill>
+                <a:latin typeface="Roboto" panose="020B0604020202020204" charset="0"/>
+                <a:ea typeface="Roboto" panose="020B0604020202020204" charset="0"/>
+              </a:rPr>
+              <a:t>function </a:t>
+            </a:r>
+            <a:r>
+              <a:rPr lang="en-US" altLang="en-US" sz="1700" dirty="0" err="1">
+                <a:solidFill>
+                  <a:schemeClr val="tx2"/>
+                </a:solidFill>
+                <a:latin typeface="Roboto" panose="020B0604020202020204" charset="0"/>
+                <a:ea typeface="Roboto" panose="020B0604020202020204" charset="0"/>
+              </a:rPr>
+              <a:t>doSomethingErrorProne</a:t>
+            </a:r>
+            <a:r>
+              <a:rPr lang="en-US" altLang="en-US" sz="1700" dirty="0">
+                <a:solidFill>
+                  <a:schemeClr val="tx2"/>
+                </a:solidFill>
+                <a:latin typeface="Roboto" panose="020B0604020202020204" charset="0"/>
+                <a:ea typeface="Roboto" panose="020B0604020202020204" charset="0"/>
+              </a:rPr>
+              <a:t> () {</a:t>
+            </a:r>
+          </a:p>
+          <a:p>
+            <a:r>
+              <a:rPr lang="en-US" altLang="en-US" sz="1700" dirty="0">
+                <a:solidFill>
+                  <a:schemeClr val="tx2"/>
+                </a:solidFill>
+                <a:latin typeface="Roboto" panose="020B0604020202020204" charset="0"/>
+                <a:ea typeface="Roboto" panose="020B0604020202020204" charset="0"/>
+              </a:rPr>
+              <a:t> 	if (</a:t>
+            </a:r>
+            <a:r>
+              <a:rPr lang="en-US" altLang="en-US" sz="1700" dirty="0" err="1">
+                <a:solidFill>
+                  <a:schemeClr val="tx2"/>
+                </a:solidFill>
+                <a:latin typeface="Roboto" panose="020B0604020202020204" charset="0"/>
+                <a:ea typeface="Roboto" panose="020B0604020202020204" charset="0"/>
+              </a:rPr>
+              <a:t>ourCodeMakesAMistake</a:t>
+            </a:r>
+            <a:r>
+              <a:rPr lang="en-US" altLang="en-US" sz="1700" dirty="0">
+                <a:solidFill>
+                  <a:schemeClr val="tx2"/>
+                </a:solidFill>
+                <a:latin typeface="Roboto" panose="020B0604020202020204" charset="0"/>
+                <a:ea typeface="Roboto" panose="020B0604020202020204" charset="0"/>
+              </a:rPr>
+              <a:t>()) {</a:t>
+            </a:r>
+          </a:p>
+          <a:p>
+            <a:r>
+              <a:rPr lang="en-US" altLang="en-US" sz="1700" dirty="0">
+                <a:solidFill>
+                  <a:schemeClr val="tx2"/>
+                </a:solidFill>
+                <a:latin typeface="Roboto" panose="020B0604020202020204" charset="0"/>
+                <a:ea typeface="Roboto" panose="020B0604020202020204" charset="0"/>
+              </a:rPr>
+              <a:t> 		throw (new Error('The message')); </a:t>
+            </a:r>
+          </a:p>
+          <a:p>
+            <a:r>
+              <a:rPr lang="en-US" altLang="en-US" sz="1700" dirty="0">
+                <a:solidFill>
+                  <a:schemeClr val="tx2"/>
+                </a:solidFill>
+                <a:latin typeface="Roboto" panose="020B0604020202020204" charset="0"/>
+                <a:ea typeface="Roboto" panose="020B0604020202020204" charset="0"/>
+              </a:rPr>
+              <a:t>	} else { </a:t>
+            </a:r>
+          </a:p>
+          <a:p>
+            <a:r>
+              <a:rPr lang="en-US" altLang="en-US" sz="1700" dirty="0">
+                <a:solidFill>
+                  <a:schemeClr val="tx2"/>
+                </a:solidFill>
+                <a:latin typeface="Roboto" panose="020B0604020202020204" charset="0"/>
+                <a:ea typeface="Roboto" panose="020B0604020202020204" charset="0"/>
+              </a:rPr>
+              <a:t>		</a:t>
+            </a:r>
+            <a:r>
+              <a:rPr lang="en-US" altLang="en-US" sz="1700" dirty="0" err="1">
+                <a:solidFill>
+                  <a:schemeClr val="tx2"/>
+                </a:solidFill>
+                <a:latin typeface="Roboto" panose="020B0604020202020204" charset="0"/>
+                <a:ea typeface="Roboto" panose="020B0604020202020204" charset="0"/>
+              </a:rPr>
+              <a:t>doSomethingToGetAJavascriptError</a:t>
+            </a:r>
+            <a:r>
+              <a:rPr lang="en-US" altLang="en-US" sz="1700" dirty="0">
+                <a:solidFill>
+                  <a:schemeClr val="tx2"/>
+                </a:solidFill>
+                <a:latin typeface="Roboto" panose="020B0604020202020204" charset="0"/>
+                <a:ea typeface="Roboto" panose="020B0604020202020204" charset="0"/>
+              </a:rPr>
+              <a:t>(); </a:t>
+            </a:r>
+          </a:p>
+          <a:p>
+            <a:r>
+              <a:rPr lang="en-US" altLang="en-US" sz="1700" dirty="0">
+                <a:solidFill>
+                  <a:schemeClr val="tx2"/>
+                </a:solidFill>
+                <a:latin typeface="Roboto" panose="020B0604020202020204" charset="0"/>
+                <a:ea typeface="Roboto" panose="020B0604020202020204" charset="0"/>
+              </a:rPr>
+              <a:t>	}</a:t>
+            </a:r>
+          </a:p>
+          <a:p>
+            <a:r>
+              <a:rPr lang="en-US" altLang="en-US" sz="1700" dirty="0">
+                <a:solidFill>
+                  <a:schemeClr val="tx2"/>
+                </a:solidFill>
+                <a:latin typeface="Roboto" panose="020B0604020202020204" charset="0"/>
+                <a:ea typeface="Roboto" panose="020B0604020202020204" charset="0"/>
+              </a:rPr>
+              <a:t> } .... </a:t>
+            </a:r>
+          </a:p>
+          <a:p>
+            <a:r>
+              <a:rPr lang="en-US" altLang="en-US" sz="1700" dirty="0">
+                <a:solidFill>
+                  <a:schemeClr val="tx2"/>
+                </a:solidFill>
+                <a:latin typeface="Roboto" panose="020B0604020202020204" charset="0"/>
+                <a:ea typeface="Roboto" panose="020B0604020202020204" charset="0"/>
+              </a:rPr>
+              <a:t>try { </a:t>
+            </a:r>
+          </a:p>
+          <a:p>
+            <a:r>
+              <a:rPr lang="en-US" altLang="en-US" sz="1700" dirty="0">
+                <a:solidFill>
+                  <a:schemeClr val="tx2"/>
+                </a:solidFill>
+                <a:latin typeface="Roboto" panose="020B0604020202020204" charset="0"/>
+                <a:ea typeface="Roboto" panose="020B0604020202020204" charset="0"/>
+              </a:rPr>
+              <a:t>	</a:t>
+            </a:r>
+            <a:r>
+              <a:rPr lang="en-US" altLang="en-US" sz="1700" dirty="0" err="1">
+                <a:solidFill>
+                  <a:schemeClr val="tx2"/>
+                </a:solidFill>
+                <a:latin typeface="Roboto" panose="020B0604020202020204" charset="0"/>
+                <a:ea typeface="Roboto" panose="020B0604020202020204" charset="0"/>
+              </a:rPr>
+              <a:t>doSomethingErrorProne</a:t>
+            </a:r>
+            <a:r>
+              <a:rPr lang="en-US" altLang="en-US" sz="1700" dirty="0">
+                <a:solidFill>
+                  <a:schemeClr val="tx2"/>
+                </a:solidFill>
+                <a:latin typeface="Roboto" panose="020B0604020202020204" charset="0"/>
+                <a:ea typeface="Roboto" panose="020B0604020202020204" charset="0"/>
+              </a:rPr>
+              <a:t>();</a:t>
+            </a:r>
+          </a:p>
+          <a:p>
+            <a:r>
+              <a:rPr lang="en-US" altLang="en-US" sz="1700" dirty="0">
+                <a:solidFill>
+                  <a:schemeClr val="tx2"/>
+                </a:solidFill>
+                <a:latin typeface="Roboto" panose="020B0604020202020204" charset="0"/>
+                <a:ea typeface="Roboto" panose="020B0604020202020204" charset="0"/>
+              </a:rPr>
+              <a:t> } catch (e) { </a:t>
+            </a:r>
+          </a:p>
+          <a:p>
+            <a:r>
+              <a:rPr lang="en-US" altLang="en-US" sz="1700" dirty="0">
+                <a:solidFill>
+                  <a:schemeClr val="tx2"/>
+                </a:solidFill>
+                <a:latin typeface="Roboto" panose="020B0604020202020204" charset="0"/>
+                <a:ea typeface="Roboto" panose="020B0604020202020204" charset="0"/>
+              </a:rPr>
+              <a:t>	alert(e.name);   </a:t>
+            </a:r>
+          </a:p>
+          <a:p>
+            <a:r>
+              <a:rPr lang="en-US" altLang="en-US" sz="1700" dirty="0">
+                <a:solidFill>
+                  <a:schemeClr val="tx2"/>
+                </a:solidFill>
+                <a:latin typeface="Roboto" panose="020B0604020202020204" charset="0"/>
+                <a:ea typeface="Roboto" panose="020B0604020202020204" charset="0"/>
+              </a:rPr>
+              <a:t> } </a:t>
+            </a:r>
+          </a:p>
+          <a:p>
+            <a:endParaRPr lang="en-US" dirty="0"/>
+          </a:p>
+        </p:txBody>
+      </p:sp>
+    </p:spTree>
+    <p:extLst>
+      <p:ext uri="{BB962C8B-B14F-4D97-AF65-F5344CB8AC3E}">
+        <p14:creationId xmlns:p14="http://schemas.microsoft.com/office/powerpoint/2010/main" val="3552791388"/>
+      </p:ext>
+    </p:extLst>
+  </p:cSld>
+  <p:clrMapOvr>
+    <a:masterClrMapping/>
+  </p:clrMapOvr>
+</p:sld>
+</file>
+
+<file path=ppt/slides/slide25.xml><?xml version="1.0" encoding="utf-8"?>
+<p:sld xmlns:a="http://schemas.openxmlformats.org/drawingml/2006/main" xmlns:r="http://schemas.openxmlformats.org/officeDocument/2006/relationships" xmlns:p="http://schemas.openxmlformats.org/presentationml/2006/main">
+  <p:cSld>
+    <p:spTree>
+      <p:nvGrpSpPr>
+        <p:cNvPr id="1" name="Shape 174"/>
+        <p:cNvGrpSpPr/>
+        <p:nvPr/>
+      </p:nvGrpSpPr>
+      <p:grpSpPr>
+        <a:xfrm>
+          <a:off x="0" y="0"/>
+          <a:ext cx="0" cy="0"/>
+          <a:chOff x="0" y="0"/>
+          <a:chExt cx="0" cy="0"/>
+        </a:xfrm>
+      </p:grpSpPr>
+      <p:sp>
+        <p:nvSpPr>
+          <p:cNvPr id="175" name="Google Shape;175;p31"/>
+          <p:cNvSpPr txBox="1">
+            <a:spLocks noGrp="1"/>
+          </p:cNvSpPr>
+          <p:nvPr>
+            <p:ph type="title"/>
+          </p:nvPr>
+        </p:nvSpPr>
+        <p:spPr>
+          <a:xfrm>
+            <a:off x="471900" y="738725"/>
+            <a:ext cx="8222100" cy="767700"/>
+          </a:xfrm>
+          <a:prstGeom prst="rect">
+            <a:avLst/>
+          </a:prstGeom>
+        </p:spPr>
+        <p:txBody>
+          <a:bodyPr spcFirstLastPara="1" wrap="square" lIns="91425" tIns="91425" rIns="91425" bIns="91425" anchor="b" anchorCtr="0">
+            <a:noAutofit/>
+          </a:bodyPr>
+          <a:lstStyle/>
+          <a:p>
+            <a:pPr marL="0" lvl="0" indent="0" algn="l" rtl="0">
+              <a:spcBef>
+                <a:spcPts val="0"/>
+              </a:spcBef>
+              <a:spcAft>
+                <a:spcPts val="0"/>
+              </a:spcAft>
+              <a:buNone/>
+            </a:pPr>
+            <a:r>
+              <a:rPr lang="en-US" dirty="0"/>
+              <a:t>Thank you today</a:t>
+            </a:r>
+            <a:endParaRPr dirty="0"/>
+          </a:p>
+        </p:txBody>
+      </p:sp>
+      <p:sp>
+        <p:nvSpPr>
+          <p:cNvPr id="176" name="Google Shape;176;p31"/>
+          <p:cNvSpPr txBox="1">
+            <a:spLocks noGrp="1"/>
+          </p:cNvSpPr>
+          <p:nvPr>
+            <p:ph type="body" idx="1"/>
+          </p:nvPr>
+        </p:nvSpPr>
+        <p:spPr>
+          <a:xfrm>
+            <a:off x="471900" y="1919075"/>
+            <a:ext cx="8222100" cy="2710200"/>
+          </a:xfrm>
+          <a:prstGeom prst="rect">
+            <a:avLst/>
+          </a:prstGeom>
+        </p:spPr>
+        <p:txBody>
+          <a:bodyPr spcFirstLastPara="1" wrap="square" lIns="91425" tIns="91425" rIns="91425" bIns="91425" anchor="t" anchorCtr="0">
+            <a:noAutofit/>
+          </a:bodyPr>
+          <a:lstStyle/>
+          <a:p>
+            <a:pPr marL="0" lvl="0" indent="0" algn="l" rtl="0">
+              <a:spcBef>
+                <a:spcPts val="0"/>
+              </a:spcBef>
+              <a:spcAft>
+                <a:spcPts val="0"/>
+              </a:spcAft>
+              <a:buNone/>
+            </a:pPr>
+            <a:endParaRPr dirty="0"/>
+          </a:p>
+          <a:p>
+            <a:pPr marL="0" lvl="0" indent="0" algn="l" rtl="0">
+              <a:spcBef>
+                <a:spcPts val="1600"/>
+              </a:spcBef>
+              <a:spcAft>
+                <a:spcPts val="0"/>
+              </a:spcAft>
+              <a:buNone/>
+            </a:pPr>
+            <a:r>
+              <a:rPr lang="en" dirty="0"/>
+              <a:t> </a:t>
+            </a:r>
+            <a:endParaRPr dirty="0"/>
+          </a:p>
+          <a:p>
+            <a:pPr marL="0" lvl="0" indent="0" algn="l" rtl="0">
+              <a:spcBef>
+                <a:spcPts val="1600"/>
+              </a:spcBef>
+              <a:spcAft>
+                <a:spcPts val="1600"/>
+              </a:spcAft>
+              <a:buNone/>
+            </a:pPr>
+            <a:r>
+              <a:rPr lang="en" dirty="0"/>
+              <a:t> </a:t>
+            </a:r>
+            <a:endParaRPr dirty="0"/>
+          </a:p>
+        </p:txBody>
+      </p:sp>
+      <p:pic>
+        <p:nvPicPr>
+          <p:cNvPr id="3" name="Picture 2">
+            <a:extLst>
+              <a:ext uri="{FF2B5EF4-FFF2-40B4-BE49-F238E27FC236}">
+                <a16:creationId xmlns:a16="http://schemas.microsoft.com/office/drawing/2014/main" id="{D5740987-B884-4A8E-B052-CECE13E45610}"/>
+              </a:ext>
+            </a:extLst>
+          </p:cNvPr>
+          <p:cNvPicPr>
+            <a:picLocks noChangeAspect="1"/>
+          </p:cNvPicPr>
+          <p:nvPr/>
+        </p:nvPicPr>
+        <p:blipFill>
+          <a:blip r:embed="rId3"/>
+          <a:stretch>
+            <a:fillRect/>
+          </a:stretch>
+        </p:blipFill>
+        <p:spPr>
+          <a:xfrm>
+            <a:off x="3143250" y="2303027"/>
+            <a:ext cx="2857500" cy="2152650"/>
+          </a:xfrm>
+          <a:prstGeom prst="rect">
+            <a:avLst/>
+          </a:prstGeom>
+        </p:spPr>
+      </p:pic>
+    </p:spTree>
   </p:cSld>
   <p:clrMapOvr>
     <a:masterClrMapping/>
@@ -8124,7 +12232,7 @@
           <p:cNvPr id="2" name="Title 1">
             <a:extLst>
               <a:ext uri="{FF2B5EF4-FFF2-40B4-BE49-F238E27FC236}">
-                <a16:creationId xmlns:a16="http://schemas.microsoft.com/office/drawing/2014/main" id="{E0008E5A-74FF-4CC9-940F-699FF20EF1D9}"/>
+                <a16:creationId xmlns:a16="http://schemas.microsoft.com/office/drawing/2014/main" id="{ACE00107-B6A1-499D-90A8-6F408272F132}"/>
               </a:ext>
             </a:extLst>
           </p:cNvPr>
@@ -8141,19 +12249,18 @@
           <a:lstStyle/>
           <a:p>
             <a:r>
-              <a:rPr lang="en-US" b="1" dirty="0"/>
-              <a:t>Object Manipulation Statements</a:t>
-            </a:r>
-            <a:endParaRPr lang="en-US" dirty="0"/>
+              <a:rPr lang="en-US" dirty="0"/>
+              <a:t>For Statement</a:t>
+            </a:r>
           </a:p>
         </p:txBody>
       </p:sp>
       <p:sp>
         <p:nvSpPr>
-          <p:cNvPr id="3" name="Text Placeholder 2">
+          <p:cNvPr id="7" name="Text Placeholder 6">
             <a:extLst>
               <a:ext uri="{FF2B5EF4-FFF2-40B4-BE49-F238E27FC236}">
-                <a16:creationId xmlns:a16="http://schemas.microsoft.com/office/drawing/2014/main" id="{B8CBF1D8-DD90-4681-B980-E30564F28628}"/>
+                <a16:creationId xmlns:a16="http://schemas.microsoft.com/office/drawing/2014/main" id="{E33E2FF1-8787-4DCA-8F7A-14446DC62786}"/>
               </a:ext>
             </a:extLst>
           </p:cNvPr>
@@ -8166,42 +12273,405 @@
         </p:nvSpPr>
         <p:spPr>
           <a:xfrm>
-            <a:off x="460950" y="1855280"/>
-            <a:ext cx="8222100" cy="2710200"/>
+            <a:off x="471900" y="1919074"/>
+            <a:ext cx="8222100" cy="3224425"/>
           </a:xfrm>
         </p:spPr>
         <p:txBody>
           <a:bodyPr/>
           <a:lstStyle/>
           <a:p>
-            <a:pPr marL="114300" indent="0">
+            <a:pPr marL="0" lvl="0" indent="0" eaLnBrk="0" fontAlgn="base" hangingPunct="0">
+              <a:lnSpc>
+                <a:spcPct val="100000"/>
+              </a:lnSpc>
+              <a:spcBef>
+                <a:spcPct val="0"/>
+              </a:spcBef>
+              <a:spcAft>
+                <a:spcPct val="0"/>
+              </a:spcAft>
+              <a:buClrTx/>
+              <a:buSzTx/>
               <a:buNone/>
             </a:pPr>
             <a:r>
               <a:rPr lang="en-US" altLang="en-US" dirty="0">
                 <a:solidFill>
-                  <a:schemeClr val="bg1">
-                    <a:lumMod val="50000"/>
-                  </a:schemeClr>
-                </a:solidFill>
-                <a:latin typeface="Roboto" panose="020B0604020202020204" charset="0"/>
-                <a:ea typeface="Roboto" panose="020B0604020202020204" charset="0"/>
-              </a:rPr>
-              <a:t>JavaScript uses the for...in, for each...in, and with statements to manipulate objects.</a:t>
-            </a:r>
-          </a:p>
-          <a:p>
-            <a:pPr marL="114300" indent="0">
+                  <a:schemeClr val="tx2"/>
+                </a:solidFill>
+                <a:latin typeface="Roboto" panose="020B0604020202020204" charset="0"/>
+                <a:ea typeface="Roboto" panose="020B0604020202020204" charset="0"/>
+              </a:rPr>
+              <a:t>for ([</a:t>
+            </a:r>
+            <a:r>
+              <a:rPr lang="en-US" altLang="en-US" dirty="0" err="1">
+                <a:solidFill>
+                  <a:schemeClr val="tx2"/>
+                </a:solidFill>
+                <a:latin typeface="Roboto" panose="020B0604020202020204" charset="0"/>
+                <a:ea typeface="Roboto" panose="020B0604020202020204" charset="0"/>
+              </a:rPr>
+              <a:t>initialExpression</a:t>
+            </a:r>
+            <a:r>
+              <a:rPr lang="en-US" altLang="en-US" dirty="0">
+                <a:solidFill>
+                  <a:schemeClr val="tx2"/>
+                </a:solidFill>
+                <a:latin typeface="Roboto" panose="020B0604020202020204" charset="0"/>
+                <a:ea typeface="Roboto" panose="020B0604020202020204" charset="0"/>
+              </a:rPr>
+              <a:t>]; [condition]; [</a:t>
+            </a:r>
+            <a:r>
+              <a:rPr lang="en-US" altLang="en-US" dirty="0" err="1">
+                <a:solidFill>
+                  <a:schemeClr val="tx2"/>
+                </a:solidFill>
+                <a:latin typeface="Roboto" panose="020B0604020202020204" charset="0"/>
+                <a:ea typeface="Roboto" panose="020B0604020202020204" charset="0"/>
+              </a:rPr>
+              <a:t>incrementExpression</a:t>
+            </a:r>
+            <a:r>
+              <a:rPr lang="en-US" altLang="en-US" dirty="0">
+                <a:solidFill>
+                  <a:schemeClr val="tx2"/>
+                </a:solidFill>
+                <a:latin typeface="Roboto" panose="020B0604020202020204" charset="0"/>
+                <a:ea typeface="Roboto" panose="020B0604020202020204" charset="0"/>
+              </a:rPr>
+              <a:t>]){</a:t>
+            </a:r>
+          </a:p>
+          <a:p>
+            <a:pPr marL="0" lvl="0" indent="0" eaLnBrk="0" fontAlgn="base" hangingPunct="0">
+              <a:lnSpc>
+                <a:spcPct val="100000"/>
+              </a:lnSpc>
+              <a:spcBef>
+                <a:spcPct val="0"/>
+              </a:spcBef>
+              <a:spcAft>
+                <a:spcPct val="0"/>
+              </a:spcAft>
+              <a:buClrTx/>
+              <a:buSzTx/>
+              <a:buNone/>
+            </a:pPr>
+            <a:r>
+              <a:rPr lang="en-US" altLang="en-US" dirty="0">
+                <a:solidFill>
+                  <a:schemeClr val="tx2"/>
+                </a:solidFill>
+                <a:latin typeface="Roboto" panose="020B0604020202020204" charset="0"/>
+                <a:ea typeface="Roboto" panose="020B0604020202020204" charset="0"/>
+              </a:rPr>
+              <a:t> 	statement </a:t>
+            </a:r>
+          </a:p>
+          <a:p>
+            <a:pPr marL="0" lvl="0" indent="0" eaLnBrk="0" fontAlgn="base" hangingPunct="0">
+              <a:lnSpc>
+                <a:spcPct val="100000"/>
+              </a:lnSpc>
+              <a:spcBef>
+                <a:spcPct val="0"/>
+              </a:spcBef>
+              <a:spcAft>
+                <a:spcPct val="0"/>
+              </a:spcAft>
+              <a:buClrTx/>
+              <a:buSzTx/>
+              <a:buNone/>
+            </a:pPr>
+            <a:r>
+              <a:rPr lang="en-US" altLang="en-US" dirty="0">
+                <a:solidFill>
+                  <a:schemeClr val="tx2"/>
+                </a:solidFill>
+                <a:latin typeface="Roboto" panose="020B0604020202020204" charset="0"/>
+                <a:ea typeface="Roboto" panose="020B0604020202020204" charset="0"/>
+              </a:rPr>
+              <a:t>}</a:t>
+            </a:r>
+          </a:p>
+          <a:p>
+            <a:pPr marL="0" lvl="0" indent="0" eaLnBrk="0" fontAlgn="base" hangingPunct="0">
+              <a:lnSpc>
+                <a:spcPct val="100000"/>
+              </a:lnSpc>
+              <a:spcBef>
+                <a:spcPct val="0"/>
+              </a:spcBef>
+              <a:spcAft>
+                <a:spcPct val="0"/>
+              </a:spcAft>
+              <a:buClrTx/>
+              <a:buSzTx/>
               <a:buNone/>
             </a:pPr>
             <a:endParaRPr lang="en-US" altLang="en-US" dirty="0">
               <a:solidFill>
-                <a:schemeClr val="bg1">
-                  <a:lumMod val="50000"/>
-                </a:schemeClr>
+                <a:schemeClr val="tx2"/>
               </a:solidFill>
               <a:latin typeface="Roboto" panose="020B0604020202020204" charset="0"/>
               <a:ea typeface="Roboto" panose="020B0604020202020204" charset="0"/>
+            </a:endParaRPr>
+          </a:p>
+          <a:p>
+            <a:pPr marL="0" lvl="0" indent="0" eaLnBrk="0" fontAlgn="base" hangingPunct="0">
+              <a:lnSpc>
+                <a:spcPct val="100000"/>
+              </a:lnSpc>
+              <a:spcBef>
+                <a:spcPct val="0"/>
+              </a:spcBef>
+              <a:spcAft>
+                <a:spcPct val="0"/>
+              </a:spcAft>
+              <a:buClrTx/>
+              <a:buSzTx/>
+              <a:buNone/>
+            </a:pPr>
+            <a:r>
+              <a:rPr lang="en-US" altLang="en-US" b="1" dirty="0">
+                <a:solidFill>
+                  <a:schemeClr val="bg2"/>
+                </a:solidFill>
+                <a:latin typeface="Roboto" panose="020B0604020202020204" charset="0"/>
+                <a:ea typeface="Roboto" panose="020B0604020202020204" charset="0"/>
+              </a:rPr>
+              <a:t>Example,</a:t>
+            </a:r>
+          </a:p>
+          <a:p>
+            <a:pPr marL="0" lvl="0" indent="0" eaLnBrk="0" fontAlgn="base" hangingPunct="0">
+              <a:lnSpc>
+                <a:spcPct val="100000"/>
+              </a:lnSpc>
+              <a:spcBef>
+                <a:spcPct val="0"/>
+              </a:spcBef>
+              <a:spcAft>
+                <a:spcPct val="0"/>
+              </a:spcAft>
+              <a:buClrTx/>
+              <a:buSzTx/>
+              <a:buNone/>
+            </a:pPr>
+            <a:endParaRPr lang="en-US" altLang="en-US" dirty="0">
+              <a:solidFill>
+                <a:schemeClr val="tx2"/>
+              </a:solidFill>
+              <a:latin typeface="Roboto" panose="020B0604020202020204" charset="0"/>
+              <a:ea typeface="Roboto" panose="020B0604020202020204" charset="0"/>
+            </a:endParaRPr>
+          </a:p>
+          <a:p>
+            <a:pPr marL="0" indent="0" eaLnBrk="0" fontAlgn="base" hangingPunct="0">
+              <a:lnSpc>
+                <a:spcPct val="100000"/>
+              </a:lnSpc>
+              <a:spcBef>
+                <a:spcPct val="0"/>
+              </a:spcBef>
+              <a:spcAft>
+                <a:spcPct val="0"/>
+              </a:spcAft>
+              <a:buClrTx/>
+              <a:buSzTx/>
+              <a:buNone/>
+            </a:pPr>
+            <a:r>
+              <a:rPr lang="en-US" altLang="en-US" dirty="0">
+                <a:solidFill>
+                  <a:schemeClr val="tx2"/>
+                </a:solidFill>
+                <a:latin typeface="Consolas" panose="020B0609020204030204" pitchFamily="49" charset="0"/>
+              </a:rPr>
+              <a:t>for (var </a:t>
+            </a:r>
+            <a:r>
+              <a:rPr lang="en-US" altLang="en-US" dirty="0" err="1">
+                <a:solidFill>
+                  <a:schemeClr val="tx2"/>
+                </a:solidFill>
+                <a:latin typeface="Consolas" panose="020B0609020204030204" pitchFamily="49" charset="0"/>
+              </a:rPr>
+              <a:t>i</a:t>
+            </a:r>
+            <a:r>
+              <a:rPr lang="en-US" altLang="en-US" dirty="0">
+                <a:solidFill>
+                  <a:schemeClr val="tx2"/>
+                </a:solidFill>
+                <a:latin typeface="Consolas" panose="020B0609020204030204" pitchFamily="49" charset="0"/>
+              </a:rPr>
+              <a:t> = 0; </a:t>
+            </a:r>
+            <a:r>
+              <a:rPr lang="en-US" altLang="en-US" dirty="0" err="1">
+                <a:solidFill>
+                  <a:schemeClr val="tx2"/>
+                </a:solidFill>
+                <a:latin typeface="Consolas" panose="020B0609020204030204" pitchFamily="49" charset="0"/>
+              </a:rPr>
+              <a:t>i</a:t>
+            </a:r>
+            <a:r>
+              <a:rPr lang="en-US" altLang="en-US" dirty="0">
+                <a:solidFill>
+                  <a:schemeClr val="tx2"/>
+                </a:solidFill>
+                <a:latin typeface="Consolas" panose="020B0609020204030204" pitchFamily="49" charset="0"/>
+              </a:rPr>
+              <a:t> &lt; </a:t>
+            </a:r>
+            <a:r>
+              <a:rPr lang="en-US" altLang="en-US" dirty="0" err="1">
+                <a:solidFill>
+                  <a:schemeClr val="tx2"/>
+                </a:solidFill>
+                <a:latin typeface="Consolas" panose="020B0609020204030204" pitchFamily="49" charset="0"/>
+              </a:rPr>
+              <a:t>selectObject.options.length</a:t>
+            </a:r>
+            <a:r>
+              <a:rPr lang="en-US" altLang="en-US" dirty="0">
+                <a:solidFill>
+                  <a:schemeClr val="tx2"/>
+                </a:solidFill>
+                <a:latin typeface="Consolas" panose="020B0609020204030204" pitchFamily="49" charset="0"/>
+              </a:rPr>
+              <a:t>; </a:t>
+            </a:r>
+            <a:r>
+              <a:rPr lang="en-US" altLang="en-US" dirty="0" err="1">
+                <a:solidFill>
+                  <a:schemeClr val="tx2"/>
+                </a:solidFill>
+                <a:latin typeface="Consolas" panose="020B0609020204030204" pitchFamily="49" charset="0"/>
+              </a:rPr>
+              <a:t>i</a:t>
+            </a:r>
+            <a:r>
+              <a:rPr lang="en-US" altLang="en-US" dirty="0">
+                <a:solidFill>
+                  <a:schemeClr val="tx2"/>
+                </a:solidFill>
+                <a:latin typeface="Consolas" panose="020B0609020204030204" pitchFamily="49" charset="0"/>
+              </a:rPr>
+              <a:t>++)</a:t>
+            </a:r>
+          </a:p>
+          <a:p>
+            <a:pPr marL="0" indent="0" eaLnBrk="0" fontAlgn="base" hangingPunct="0">
+              <a:lnSpc>
+                <a:spcPct val="100000"/>
+              </a:lnSpc>
+              <a:spcBef>
+                <a:spcPct val="0"/>
+              </a:spcBef>
+              <a:spcAft>
+                <a:spcPct val="0"/>
+              </a:spcAft>
+              <a:buClrTx/>
+              <a:buSzTx/>
+              <a:buNone/>
+            </a:pPr>
+            <a:r>
+              <a:rPr lang="en-US" altLang="en-US" dirty="0">
+                <a:solidFill>
+                  <a:schemeClr val="tx2"/>
+                </a:solidFill>
+                <a:latin typeface="Consolas" panose="020B0609020204030204" pitchFamily="49" charset="0"/>
+              </a:rPr>
+              <a:t> {</a:t>
+            </a:r>
+          </a:p>
+          <a:p>
+            <a:pPr marL="0" indent="0" eaLnBrk="0" fontAlgn="base" hangingPunct="0">
+              <a:lnSpc>
+                <a:spcPct val="100000"/>
+              </a:lnSpc>
+              <a:spcBef>
+                <a:spcPct val="0"/>
+              </a:spcBef>
+              <a:spcAft>
+                <a:spcPct val="0"/>
+              </a:spcAft>
+              <a:buClrTx/>
+              <a:buSzTx/>
+              <a:buNone/>
+            </a:pPr>
+            <a:r>
+              <a:rPr lang="en-US" altLang="en-US" dirty="0">
+                <a:solidFill>
+                  <a:schemeClr val="tx2"/>
+                </a:solidFill>
+                <a:latin typeface="Consolas" panose="020B0609020204030204" pitchFamily="49" charset="0"/>
+              </a:rPr>
+              <a:t> 	consol.log(</a:t>
+            </a:r>
+            <a:r>
+              <a:rPr lang="en-US" altLang="en-US" dirty="0" err="1">
+                <a:solidFill>
+                  <a:schemeClr val="tx2"/>
+                </a:solidFill>
+                <a:latin typeface="Consolas" panose="020B0609020204030204" pitchFamily="49" charset="0"/>
+              </a:rPr>
+              <a:t>i</a:t>
+            </a:r>
+            <a:r>
+              <a:rPr lang="en-US" altLang="en-US" dirty="0">
+                <a:solidFill>
+                  <a:schemeClr val="tx2"/>
+                </a:solidFill>
+                <a:latin typeface="Consolas" panose="020B0609020204030204" pitchFamily="49" charset="0"/>
+              </a:rPr>
+              <a:t>);</a:t>
+            </a:r>
+          </a:p>
+          <a:p>
+            <a:pPr marL="0" indent="0" eaLnBrk="0" fontAlgn="base" hangingPunct="0">
+              <a:lnSpc>
+                <a:spcPct val="100000"/>
+              </a:lnSpc>
+              <a:spcBef>
+                <a:spcPct val="0"/>
+              </a:spcBef>
+              <a:spcAft>
+                <a:spcPct val="0"/>
+              </a:spcAft>
+              <a:buClrTx/>
+              <a:buSzTx/>
+              <a:buNone/>
+            </a:pPr>
+            <a:r>
+              <a:rPr lang="en-US" altLang="en-US" dirty="0">
+                <a:solidFill>
+                  <a:schemeClr val="tx2"/>
+                </a:solidFill>
+                <a:latin typeface="Consolas" panose="020B0609020204030204" pitchFamily="49" charset="0"/>
+              </a:rPr>
+              <a:t> }</a:t>
+            </a:r>
+            <a:r>
+              <a:rPr lang="en-US" altLang="en-US" sz="1400" dirty="0">
+                <a:solidFill>
+                  <a:schemeClr val="tx2"/>
+                </a:solidFill>
+              </a:rPr>
+              <a:t> </a:t>
+            </a:r>
+            <a:endParaRPr lang="en-US" altLang="en-US" sz="4000" dirty="0">
+              <a:solidFill>
+                <a:schemeClr val="tx2"/>
+              </a:solidFill>
+              <a:latin typeface="Arial" panose="020B0604020202020204" pitchFamily="34" charset="0"/>
             </a:endParaRPr>
           </a:p>
           <a:p>
@@ -8215,7 +12685,7 @@
     </p:spTree>
     <p:extLst>
       <p:ext uri="{BB962C8B-B14F-4D97-AF65-F5344CB8AC3E}">
-        <p14:creationId xmlns:p14="http://schemas.microsoft.com/office/powerpoint/2010/main" val="1162783113"/>
+        <p14:creationId xmlns:p14="http://schemas.microsoft.com/office/powerpoint/2010/main" val="1995994981"/>
       </p:ext>
     </p:extLst>
   </p:cSld>

</xml_diff>

<commit_message>
update the lesson 4
</commit_message>
<xml_diff>
--- a/Class Content/Day 4/JavaScript Lesson 4.pptx
+++ b/Class Content/Day 4/JavaScript Lesson 4.pptx
@@ -5,7 +5,7 @@
     <p:sldMasterId id="2147483659" r:id="rId1"/>
   </p:sldMasterIdLst>
   <p:notesMasterIdLst>
-    <p:notesMasterId r:id="rId13"/>
+    <p:notesMasterId r:id="rId27"/>
   </p:notesMasterIdLst>
   <p:sldIdLst>
     <p:sldId id="256" r:id="rId2"/>
@@ -16,19 +16,40 @@
     <p:sldId id="301" r:id="rId7"/>
     <p:sldId id="302" r:id="rId8"/>
     <p:sldId id="303" r:id="rId9"/>
-    <p:sldId id="304" r:id="rId10"/>
-    <p:sldId id="305" r:id="rId11"/>
-    <p:sldId id="274" r:id="rId12"/>
+    <p:sldId id="306" r:id="rId10"/>
+    <p:sldId id="307" r:id="rId11"/>
+    <p:sldId id="308" r:id="rId12"/>
+    <p:sldId id="309" r:id="rId13"/>
+    <p:sldId id="310" r:id="rId14"/>
+    <p:sldId id="311" r:id="rId15"/>
+    <p:sldId id="304" r:id="rId16"/>
+    <p:sldId id="312" r:id="rId17"/>
+    <p:sldId id="313" r:id="rId18"/>
+    <p:sldId id="314" r:id="rId19"/>
+    <p:sldId id="305" r:id="rId20"/>
+    <p:sldId id="315" r:id="rId21"/>
+    <p:sldId id="317" r:id="rId22"/>
+    <p:sldId id="316" r:id="rId23"/>
+    <p:sldId id="318" r:id="rId24"/>
+    <p:sldId id="319" r:id="rId25"/>
+    <p:sldId id="274" r:id="rId26"/>
   </p:sldIdLst>
   <p:sldSz cx="9144000" cy="5143500" type="screen16x9"/>
   <p:notesSz cx="6858000" cy="9144000"/>
   <p:embeddedFontLst>
     <p:embeddedFont>
+      <p:font typeface="Consolas" panose="020B0609020204030204" pitchFamily="49" charset="0"/>
+      <p:regular r:id="rId28"/>
+      <p:bold r:id="rId29"/>
+      <p:italic r:id="rId30"/>
+      <p:boldItalic r:id="rId31"/>
+    </p:embeddedFont>
+    <p:embeddedFont>
       <p:font typeface="Roboto" panose="020B0604020202020204" charset="0"/>
-      <p:regular r:id="rId14"/>
-      <p:bold r:id="rId15"/>
-      <p:italic r:id="rId16"/>
-      <p:boldItalic r:id="rId17"/>
+      <p:regular r:id="rId32"/>
+      <p:bold r:id="rId33"/>
+      <p:italic r:id="rId34"/>
+      <p:boldItalic r:id="rId35"/>
     </p:embeddedFont>
   </p:embeddedFontLst>
   <p:defaultTextStyle>
@@ -837,6 +858,72 @@
 </file>
 
 <file path=ppt/notesSlides/notesSlide2.xml><?xml version="1.0" encoding="utf-8"?>
+<p:notes xmlns:a="http://schemas.openxmlformats.org/drawingml/2006/main" xmlns:r="http://schemas.openxmlformats.org/officeDocument/2006/relationships" xmlns:p="http://schemas.openxmlformats.org/presentationml/2006/main">
+  <p:cSld>
+    <p:spTree>
+      <p:nvGrpSpPr>
+        <p:cNvPr id="1" name=""/>
+        <p:cNvGrpSpPr/>
+        <p:nvPr/>
+      </p:nvGrpSpPr>
+      <p:grpSpPr>
+        <a:xfrm>
+          <a:off x="0" y="0"/>
+          <a:ext cx="0" cy="0"/>
+          <a:chOff x="0" y="0"/>
+          <a:chExt cx="0" cy="0"/>
+        </a:xfrm>
+      </p:grpSpPr>
+      <p:sp>
+        <p:nvSpPr>
+          <p:cNvPr id="2" name="Slide Image Placeholder 1"/>
+          <p:cNvSpPr>
+            <a:spLocks noGrp="1" noRot="1" noChangeAspect="1"/>
+          </p:cNvSpPr>
+          <p:nvPr>
+            <p:ph type="sldImg"/>
+          </p:nvPr>
+        </p:nvSpPr>
+        <p:spPr>
+          <a:xfrm>
+            <a:off x="381000" y="685800"/>
+            <a:ext cx="6096000" cy="3429000"/>
+          </a:xfrm>
+        </p:spPr>
+      </p:sp>
+      <p:sp>
+        <p:nvSpPr>
+          <p:cNvPr id="3" name="Notes Placeholder 2"/>
+          <p:cNvSpPr>
+            <a:spLocks noGrp="1"/>
+          </p:cNvSpPr>
+          <p:nvPr>
+            <p:ph type="body" idx="1"/>
+          </p:nvPr>
+        </p:nvSpPr>
+        <p:spPr/>
+        <p:txBody>
+          <a:bodyPr/>
+          <a:lstStyle/>
+          <a:p>
+            <a:endParaRPr lang="en-US" dirty="0"/>
+          </a:p>
+        </p:txBody>
+      </p:sp>
+    </p:spTree>
+    <p:extLst>
+      <p:ext uri="{BB962C8B-B14F-4D97-AF65-F5344CB8AC3E}">
+        <p14:creationId xmlns:p14="http://schemas.microsoft.com/office/powerpoint/2010/main" val="1480082144"/>
+      </p:ext>
+    </p:extLst>
+  </p:cSld>
+  <p:clrMapOvr>
+    <a:masterClrMapping/>
+  </p:clrMapOvr>
+</p:notes>
+</file>
+
+<file path=ppt/notesSlides/notesSlide3.xml><?xml version="1.0" encoding="utf-8"?>
 <p:notes xmlns:a="http://schemas.openxmlformats.org/drawingml/2006/main" xmlns:r="http://schemas.openxmlformats.org/officeDocument/2006/relationships" xmlns:p="http://schemas.openxmlformats.org/presentationml/2006/main" showMasterSp="0" showMasterPhAnim="0">
   <p:cSld>
     <p:spTree>
@@ -6414,6 +6501,2671 @@
           <p:cNvPr id="2" name="Title 1">
             <a:extLst>
               <a:ext uri="{FF2B5EF4-FFF2-40B4-BE49-F238E27FC236}">
+                <a16:creationId xmlns:a16="http://schemas.microsoft.com/office/drawing/2014/main" id="{48D568A7-6FE8-439B-8EC7-6CA9B0C65522}"/>
+              </a:ext>
+            </a:extLst>
+          </p:cNvPr>
+          <p:cNvSpPr>
+            <a:spLocks noGrp="1"/>
+          </p:cNvSpPr>
+          <p:nvPr>
+            <p:ph type="title"/>
+          </p:nvPr>
+        </p:nvSpPr>
+        <p:spPr/>
+        <p:txBody>
+          <a:bodyPr/>
+          <a:lstStyle/>
+          <a:p>
+            <a:r>
+              <a:rPr lang="en-US" dirty="0"/>
+              <a:t>do…while Statement</a:t>
+            </a:r>
+          </a:p>
+        </p:txBody>
+      </p:sp>
+      <p:sp>
+        <p:nvSpPr>
+          <p:cNvPr id="5" name="TextBox 4">
+            <a:extLst>
+              <a:ext uri="{FF2B5EF4-FFF2-40B4-BE49-F238E27FC236}">
+                <a16:creationId xmlns:a16="http://schemas.microsoft.com/office/drawing/2014/main" id="{8ACF89A5-F4F0-4F23-9308-8ECC04ACFD9F}"/>
+              </a:ext>
+            </a:extLst>
+          </p:cNvPr>
+          <p:cNvSpPr txBox="1"/>
+          <p:nvPr/>
+        </p:nvSpPr>
+        <p:spPr>
+          <a:xfrm>
+            <a:off x="471900" y="1939434"/>
+            <a:ext cx="5709683" cy="3354765"/>
+          </a:xfrm>
+          <a:prstGeom prst="rect">
+            <a:avLst/>
+          </a:prstGeom>
+          <a:noFill/>
+        </p:spPr>
+        <p:txBody>
+          <a:bodyPr wrap="square" rtlCol="0">
+            <a:spAutoFit/>
+          </a:bodyPr>
+          <a:lstStyle/>
+          <a:p>
+            <a:pPr eaLnBrk="0" fontAlgn="base" hangingPunct="0">
+              <a:spcBef>
+                <a:spcPct val="0"/>
+              </a:spcBef>
+              <a:spcAft>
+                <a:spcPct val="0"/>
+              </a:spcAft>
+              <a:buClrTx/>
+            </a:pPr>
+            <a:r>
+              <a:rPr lang="en-US" altLang="en-US" sz="1800" dirty="0">
+                <a:solidFill>
+                  <a:schemeClr val="tx2"/>
+                </a:solidFill>
+                <a:latin typeface="Roboto" panose="020B0604020202020204" charset="0"/>
+                <a:ea typeface="Roboto" panose="020B0604020202020204" charset="0"/>
+              </a:rPr>
+              <a:t>do{ </a:t>
+            </a:r>
+          </a:p>
+          <a:p>
+            <a:pPr eaLnBrk="0" fontAlgn="base" hangingPunct="0">
+              <a:spcBef>
+                <a:spcPct val="0"/>
+              </a:spcBef>
+              <a:spcAft>
+                <a:spcPct val="0"/>
+              </a:spcAft>
+              <a:buClrTx/>
+            </a:pPr>
+            <a:r>
+              <a:rPr lang="en-US" altLang="en-US" sz="1800" dirty="0">
+                <a:solidFill>
+                  <a:schemeClr val="tx2"/>
+                </a:solidFill>
+                <a:latin typeface="Roboto" panose="020B0604020202020204" charset="0"/>
+                <a:ea typeface="Roboto" panose="020B0604020202020204" charset="0"/>
+              </a:rPr>
+              <a:t>        statement </a:t>
+            </a:r>
+          </a:p>
+          <a:p>
+            <a:pPr eaLnBrk="0" fontAlgn="base" hangingPunct="0">
+              <a:spcBef>
+                <a:spcPct val="0"/>
+              </a:spcBef>
+              <a:spcAft>
+                <a:spcPct val="0"/>
+              </a:spcAft>
+              <a:buClrTx/>
+            </a:pPr>
+            <a:r>
+              <a:rPr lang="en-US" altLang="en-US" sz="1800" dirty="0">
+                <a:solidFill>
+                  <a:schemeClr val="tx2"/>
+                </a:solidFill>
+                <a:latin typeface="Roboto" panose="020B0604020202020204" charset="0"/>
+                <a:ea typeface="Roboto" panose="020B0604020202020204" charset="0"/>
+              </a:rPr>
+              <a:t>}</a:t>
+            </a:r>
+          </a:p>
+          <a:p>
+            <a:pPr eaLnBrk="0" fontAlgn="base" hangingPunct="0">
+              <a:spcBef>
+                <a:spcPct val="0"/>
+              </a:spcBef>
+              <a:spcAft>
+                <a:spcPct val="0"/>
+              </a:spcAft>
+              <a:buClrTx/>
+            </a:pPr>
+            <a:r>
+              <a:rPr lang="en-US" altLang="en-US" sz="1800" dirty="0">
+                <a:solidFill>
+                  <a:schemeClr val="tx2"/>
+                </a:solidFill>
+                <a:latin typeface="Roboto" panose="020B0604020202020204" charset="0"/>
+                <a:ea typeface="Roboto" panose="020B0604020202020204" charset="0"/>
+              </a:rPr>
+              <a:t>while (condition); </a:t>
+            </a:r>
+          </a:p>
+          <a:p>
+            <a:pPr lvl="0" eaLnBrk="0" fontAlgn="base" hangingPunct="0">
+              <a:spcBef>
+                <a:spcPct val="0"/>
+              </a:spcBef>
+              <a:spcAft>
+                <a:spcPct val="0"/>
+              </a:spcAft>
+              <a:buClrTx/>
+            </a:pPr>
+            <a:endParaRPr lang="en-US" altLang="en-US" b="1" dirty="0">
+              <a:solidFill>
+                <a:schemeClr val="tx2"/>
+              </a:solidFill>
+              <a:latin typeface="Roboto" panose="020B0604020202020204" charset="0"/>
+              <a:ea typeface="Roboto" panose="020B0604020202020204" charset="0"/>
+            </a:endParaRPr>
+          </a:p>
+          <a:p>
+            <a:pPr lvl="0" eaLnBrk="0" fontAlgn="base" hangingPunct="0">
+              <a:spcBef>
+                <a:spcPct val="0"/>
+              </a:spcBef>
+              <a:spcAft>
+                <a:spcPct val="0"/>
+              </a:spcAft>
+              <a:buClrTx/>
+            </a:pPr>
+            <a:r>
+              <a:rPr lang="en-US" altLang="en-US" sz="2000" b="1" dirty="0">
+                <a:solidFill>
+                  <a:schemeClr val="tx2"/>
+                </a:solidFill>
+                <a:latin typeface="Roboto" panose="020B0604020202020204" charset="0"/>
+                <a:ea typeface="Roboto" panose="020B0604020202020204" charset="0"/>
+              </a:rPr>
+              <a:t>Example,</a:t>
+            </a:r>
+          </a:p>
+          <a:p>
+            <a:pPr lvl="0" eaLnBrk="0" fontAlgn="base" hangingPunct="0">
+              <a:spcBef>
+                <a:spcPct val="0"/>
+              </a:spcBef>
+              <a:spcAft>
+                <a:spcPct val="0"/>
+              </a:spcAft>
+              <a:buClrTx/>
+            </a:pPr>
+            <a:endParaRPr lang="en-US" altLang="en-US" sz="2000" b="1" dirty="0">
+              <a:solidFill>
+                <a:schemeClr val="tx2"/>
+              </a:solidFill>
+              <a:latin typeface="Roboto" panose="020B0604020202020204" charset="0"/>
+              <a:ea typeface="Roboto" panose="020B0604020202020204" charset="0"/>
+            </a:endParaRPr>
+          </a:p>
+          <a:p>
+            <a:pPr lvl="0" eaLnBrk="0" fontAlgn="base" hangingPunct="0">
+              <a:spcBef>
+                <a:spcPct val="0"/>
+              </a:spcBef>
+              <a:spcAft>
+                <a:spcPct val="0"/>
+              </a:spcAft>
+              <a:buClrTx/>
+            </a:pPr>
+            <a:r>
+              <a:rPr lang="en-US" altLang="en-US" sz="1800" dirty="0">
+                <a:solidFill>
+                  <a:schemeClr val="tx2"/>
+                </a:solidFill>
+                <a:latin typeface="Roboto" panose="020B0604020202020204" charset="0"/>
+                <a:ea typeface="Roboto" panose="020B0604020202020204" charset="0"/>
+              </a:rPr>
+              <a:t>do {</a:t>
+            </a:r>
+          </a:p>
+          <a:p>
+            <a:pPr lvl="0" eaLnBrk="0" fontAlgn="base" hangingPunct="0">
+              <a:spcBef>
+                <a:spcPct val="0"/>
+              </a:spcBef>
+              <a:spcAft>
+                <a:spcPct val="0"/>
+              </a:spcAft>
+              <a:buClrTx/>
+            </a:pPr>
+            <a:r>
+              <a:rPr lang="en-US" altLang="en-US" sz="1800" dirty="0">
+                <a:solidFill>
+                  <a:schemeClr val="tx2"/>
+                </a:solidFill>
+                <a:latin typeface="Roboto" panose="020B0604020202020204" charset="0"/>
+                <a:ea typeface="Roboto" panose="020B0604020202020204" charset="0"/>
+              </a:rPr>
+              <a:t>       </a:t>
+            </a:r>
+            <a:r>
+              <a:rPr lang="en-US" altLang="en-US" sz="1800" dirty="0" err="1">
+                <a:solidFill>
+                  <a:schemeClr val="tx2"/>
+                </a:solidFill>
+                <a:latin typeface="Roboto" panose="020B0604020202020204" charset="0"/>
+                <a:ea typeface="Roboto" panose="020B0604020202020204" charset="0"/>
+              </a:rPr>
+              <a:t>i</a:t>
+            </a:r>
+            <a:r>
+              <a:rPr lang="en-US" altLang="en-US" sz="1800" dirty="0">
+                <a:solidFill>
+                  <a:schemeClr val="tx2"/>
+                </a:solidFill>
+                <a:latin typeface="Roboto" panose="020B0604020202020204" charset="0"/>
+                <a:ea typeface="Roboto" panose="020B0604020202020204" charset="0"/>
+              </a:rPr>
+              <a:t> += 1; </a:t>
+            </a:r>
+            <a:r>
+              <a:rPr lang="en-US" altLang="en-US" sz="1800" dirty="0" err="1">
+                <a:solidFill>
+                  <a:schemeClr val="tx2"/>
+                </a:solidFill>
+                <a:latin typeface="Roboto" panose="020B0604020202020204" charset="0"/>
+                <a:ea typeface="Roboto" panose="020B0604020202020204" charset="0"/>
+              </a:rPr>
+              <a:t>document.write</a:t>
+            </a:r>
+            <a:r>
+              <a:rPr lang="en-US" altLang="en-US" sz="1800" dirty="0">
+                <a:solidFill>
+                  <a:schemeClr val="tx2"/>
+                </a:solidFill>
+                <a:latin typeface="Roboto" panose="020B0604020202020204" charset="0"/>
+                <a:ea typeface="Roboto" panose="020B0604020202020204" charset="0"/>
+              </a:rPr>
+              <a:t>(</a:t>
+            </a:r>
+            <a:r>
+              <a:rPr lang="en-US" altLang="en-US" sz="1800" dirty="0" err="1">
+                <a:solidFill>
+                  <a:schemeClr val="tx2"/>
+                </a:solidFill>
+                <a:latin typeface="Roboto" panose="020B0604020202020204" charset="0"/>
+                <a:ea typeface="Roboto" panose="020B0604020202020204" charset="0"/>
+              </a:rPr>
+              <a:t>i</a:t>
+            </a:r>
+            <a:r>
+              <a:rPr lang="en-US" altLang="en-US" sz="1800" dirty="0">
+                <a:solidFill>
+                  <a:schemeClr val="tx2"/>
+                </a:solidFill>
+                <a:latin typeface="Roboto" panose="020B0604020202020204" charset="0"/>
+                <a:ea typeface="Roboto" panose="020B0604020202020204" charset="0"/>
+              </a:rPr>
+              <a:t>); </a:t>
+            </a:r>
+          </a:p>
+          <a:p>
+            <a:pPr lvl="0" eaLnBrk="0" fontAlgn="base" hangingPunct="0">
+              <a:spcBef>
+                <a:spcPct val="0"/>
+              </a:spcBef>
+              <a:spcAft>
+                <a:spcPct val="0"/>
+              </a:spcAft>
+              <a:buClrTx/>
+            </a:pPr>
+            <a:r>
+              <a:rPr lang="en-US" altLang="en-US" sz="1800" dirty="0">
+                <a:solidFill>
+                  <a:schemeClr val="tx2"/>
+                </a:solidFill>
+                <a:latin typeface="Roboto" panose="020B0604020202020204" charset="0"/>
+                <a:ea typeface="Roboto" panose="020B0604020202020204" charset="0"/>
+              </a:rPr>
+              <a:t>} </a:t>
+            </a:r>
+          </a:p>
+          <a:p>
+            <a:pPr lvl="0" eaLnBrk="0" fontAlgn="base" hangingPunct="0">
+              <a:spcBef>
+                <a:spcPct val="0"/>
+              </a:spcBef>
+              <a:spcAft>
+                <a:spcPct val="0"/>
+              </a:spcAft>
+              <a:buClrTx/>
+            </a:pPr>
+            <a:r>
+              <a:rPr lang="en-US" altLang="en-US" sz="1800" dirty="0">
+                <a:solidFill>
+                  <a:schemeClr val="tx2"/>
+                </a:solidFill>
+                <a:latin typeface="Roboto" panose="020B0604020202020204" charset="0"/>
+                <a:ea typeface="Roboto" panose="020B0604020202020204" charset="0"/>
+              </a:rPr>
+              <a:t>while (</a:t>
+            </a:r>
+            <a:r>
+              <a:rPr lang="en-US" altLang="en-US" sz="1800" dirty="0" err="1">
+                <a:solidFill>
+                  <a:schemeClr val="tx2"/>
+                </a:solidFill>
+                <a:latin typeface="Roboto" panose="020B0604020202020204" charset="0"/>
+                <a:ea typeface="Roboto" panose="020B0604020202020204" charset="0"/>
+              </a:rPr>
+              <a:t>i</a:t>
+            </a:r>
+            <a:r>
+              <a:rPr lang="en-US" altLang="en-US" sz="1800" dirty="0">
+                <a:solidFill>
+                  <a:schemeClr val="tx2"/>
+                </a:solidFill>
+                <a:latin typeface="Roboto" panose="020B0604020202020204" charset="0"/>
+                <a:ea typeface="Roboto" panose="020B0604020202020204" charset="0"/>
+              </a:rPr>
+              <a:t> &lt; 5); </a:t>
+            </a:r>
+          </a:p>
+          <a:p>
+            <a:endParaRPr lang="en-US" dirty="0"/>
+          </a:p>
+        </p:txBody>
+      </p:sp>
+      <p:sp>
+        <p:nvSpPr>
+          <p:cNvPr id="6" name="Rectangle 2">
+            <a:extLst>
+              <a:ext uri="{FF2B5EF4-FFF2-40B4-BE49-F238E27FC236}">
+                <a16:creationId xmlns:a16="http://schemas.microsoft.com/office/drawing/2014/main" id="{515213F5-8BAB-49D4-94E7-C23B9EE5CC8B}"/>
+              </a:ext>
+            </a:extLst>
+          </p:cNvPr>
+          <p:cNvSpPr>
+            <a:spLocks noChangeArrowheads="1"/>
+          </p:cNvSpPr>
+          <p:nvPr/>
+        </p:nvSpPr>
+        <p:spPr bwMode="auto">
+          <a:xfrm>
+            <a:off x="0" y="43934"/>
+            <a:ext cx="184731" cy="369332"/>
+          </a:xfrm>
+          <a:prstGeom prst="rect">
+            <a:avLst/>
+          </a:prstGeom>
+          <a:solidFill>
+            <a:srgbClr val="FFFFFF"/>
+          </a:solidFill>
+          <a:ln>
+            <a:noFill/>
+          </a:ln>
+          <a:effectLst/>
+          <a:extLst>
+            <a:ext uri="{91240B29-F687-4F45-9708-019B960494DF}">
+              <a14:hiddenLine xmlns:a14="http://schemas.microsoft.com/office/drawing/2010/main" w="9525">
+                <a:solidFill>
+                  <a:schemeClr val="tx1"/>
+                </a:solidFill>
+                <a:miter lim="800000"/>
+                <a:headEnd/>
+                <a:tailEnd/>
+              </a14:hiddenLine>
+            </a:ext>
+            <a:ext uri="{AF507438-7753-43E0-B8FC-AC1667EBCBE1}">
+              <a14:hiddenEffects xmlns:a14="http://schemas.microsoft.com/office/drawing/2010/main">
+                <a:effectLst>
+                  <a:outerShdw dist="35921" dir="2700000" algn="ctr" rotWithShape="0">
+                    <a:schemeClr val="bg2"/>
+                  </a:outerShdw>
+                </a:effectLst>
+              </a14:hiddenEffects>
+            </a:ext>
+          </a:extLst>
+        </p:spPr>
+        <p:txBody>
+          <a:bodyPr vert="horz" wrap="none" lIns="91440" tIns="45720" rIns="91440" bIns="45720" numCol="1" anchor="ctr" anchorCtr="0" compatLnSpc="1">
+            <a:prstTxWarp prst="textNoShape">
+              <a:avLst/>
+            </a:prstTxWarp>
+            <a:spAutoFit/>
+          </a:bodyPr>
+          <a:lstStyle/>
+          <a:p>
+            <a:pPr marL="0" marR="0" lvl="0" indent="0" algn="l" defTabSz="914400" rtl="0" eaLnBrk="0" fontAlgn="base" latinLnBrk="0" hangingPunct="0">
+              <a:lnSpc>
+                <a:spcPct val="100000"/>
+              </a:lnSpc>
+              <a:spcBef>
+                <a:spcPct val="0"/>
+              </a:spcBef>
+              <a:spcAft>
+                <a:spcPct val="0"/>
+              </a:spcAft>
+              <a:buClrTx/>
+              <a:buSzTx/>
+              <a:buFontTx/>
+              <a:buNone/>
+              <a:tabLst/>
+            </a:pPr>
+            <a:endParaRPr kumimoji="0" lang="en-US" altLang="en-US" sz="1800" b="0" i="0" u="none" strike="noStrike" cap="none" normalizeH="0" baseline="0" dirty="0">
+              <a:ln>
+                <a:noFill/>
+              </a:ln>
+              <a:solidFill>
+                <a:schemeClr val="tx1"/>
+              </a:solidFill>
+              <a:effectLst/>
+              <a:latin typeface="Arial" panose="020B0604020202020204" pitchFamily="34" charset="0"/>
+            </a:endParaRPr>
+          </a:p>
+        </p:txBody>
+      </p:sp>
+    </p:spTree>
+    <p:extLst>
+      <p:ext uri="{BB962C8B-B14F-4D97-AF65-F5344CB8AC3E}">
+        <p14:creationId xmlns:p14="http://schemas.microsoft.com/office/powerpoint/2010/main" val="1318838838"/>
+      </p:ext>
+    </p:extLst>
+  </p:cSld>
+  <p:clrMapOvr>
+    <a:masterClrMapping/>
+  </p:clrMapOvr>
+</p:sld>
+</file>
+
+<file path=ppt/slides/slide11.xml><?xml version="1.0" encoding="utf-8"?>
+<p:sld xmlns:a="http://schemas.openxmlformats.org/drawingml/2006/main" xmlns:r="http://schemas.openxmlformats.org/officeDocument/2006/relationships" xmlns:p="http://schemas.openxmlformats.org/presentationml/2006/main">
+  <p:cSld>
+    <p:spTree>
+      <p:nvGrpSpPr>
+        <p:cNvPr id="1" name=""/>
+        <p:cNvGrpSpPr/>
+        <p:nvPr/>
+      </p:nvGrpSpPr>
+      <p:grpSpPr>
+        <a:xfrm>
+          <a:off x="0" y="0"/>
+          <a:ext cx="0" cy="0"/>
+          <a:chOff x="0" y="0"/>
+          <a:chExt cx="0" cy="0"/>
+        </a:xfrm>
+      </p:grpSpPr>
+      <p:sp>
+        <p:nvSpPr>
+          <p:cNvPr id="2" name="Title 1">
+            <a:extLst>
+              <a:ext uri="{FF2B5EF4-FFF2-40B4-BE49-F238E27FC236}">
+                <a16:creationId xmlns:a16="http://schemas.microsoft.com/office/drawing/2014/main" id="{93E9E559-14F7-4944-89FA-26F2150BB650}"/>
+              </a:ext>
+            </a:extLst>
+          </p:cNvPr>
+          <p:cNvSpPr>
+            <a:spLocks noGrp="1"/>
+          </p:cNvSpPr>
+          <p:nvPr>
+            <p:ph type="title"/>
+          </p:nvPr>
+        </p:nvSpPr>
+        <p:spPr/>
+        <p:txBody>
+          <a:bodyPr/>
+          <a:lstStyle/>
+          <a:p>
+            <a:r>
+              <a:rPr lang="en-US" dirty="0"/>
+              <a:t>while Statement</a:t>
+            </a:r>
+          </a:p>
+        </p:txBody>
+      </p:sp>
+      <p:sp>
+        <p:nvSpPr>
+          <p:cNvPr id="3" name="Text Placeholder 2">
+            <a:extLst>
+              <a:ext uri="{FF2B5EF4-FFF2-40B4-BE49-F238E27FC236}">
+                <a16:creationId xmlns:a16="http://schemas.microsoft.com/office/drawing/2014/main" id="{0542990A-7E8A-42DA-AF21-2BB2C7424C7E}"/>
+              </a:ext>
+            </a:extLst>
+          </p:cNvPr>
+          <p:cNvSpPr>
+            <a:spLocks noGrp="1"/>
+          </p:cNvSpPr>
+          <p:nvPr>
+            <p:ph type="body" idx="1"/>
+          </p:nvPr>
+        </p:nvSpPr>
+        <p:spPr>
+          <a:xfrm>
+            <a:off x="460950" y="1743740"/>
+            <a:ext cx="8222100" cy="3399759"/>
+          </a:xfrm>
+        </p:spPr>
+        <p:txBody>
+          <a:bodyPr/>
+          <a:lstStyle/>
+          <a:p>
+            <a:pPr marL="114300" indent="0" eaLnBrk="0" fontAlgn="base" hangingPunct="0">
+              <a:spcBef>
+                <a:spcPct val="0"/>
+              </a:spcBef>
+              <a:spcAft>
+                <a:spcPct val="0"/>
+              </a:spcAft>
+              <a:buClrTx/>
+              <a:buNone/>
+            </a:pPr>
+            <a:r>
+              <a:rPr lang="en-US" altLang="en-US" dirty="0">
+                <a:solidFill>
+                  <a:schemeClr val="tx2"/>
+                </a:solidFill>
+                <a:latin typeface="Roboto" panose="020B0604020202020204" charset="0"/>
+                <a:ea typeface="Roboto" panose="020B0604020202020204" charset="0"/>
+              </a:rPr>
+              <a:t>while (condition){</a:t>
+            </a:r>
+          </a:p>
+          <a:p>
+            <a:pPr marL="114300" indent="0" eaLnBrk="0" fontAlgn="base" hangingPunct="0">
+              <a:spcBef>
+                <a:spcPct val="0"/>
+              </a:spcBef>
+              <a:spcAft>
+                <a:spcPct val="0"/>
+              </a:spcAft>
+              <a:buClrTx/>
+              <a:buNone/>
+            </a:pPr>
+            <a:r>
+              <a:rPr lang="en-US" altLang="en-US" dirty="0">
+                <a:solidFill>
+                  <a:schemeClr val="tx2"/>
+                </a:solidFill>
+                <a:latin typeface="Roboto" panose="020B0604020202020204" charset="0"/>
+                <a:ea typeface="Roboto" panose="020B0604020202020204" charset="0"/>
+              </a:rPr>
+              <a:t>       statement</a:t>
+            </a:r>
+          </a:p>
+          <a:p>
+            <a:pPr marL="114300" indent="0" eaLnBrk="0" fontAlgn="base" hangingPunct="0">
+              <a:spcBef>
+                <a:spcPct val="0"/>
+              </a:spcBef>
+              <a:spcAft>
+                <a:spcPct val="0"/>
+              </a:spcAft>
+              <a:buClrTx/>
+              <a:buNone/>
+            </a:pPr>
+            <a:r>
+              <a:rPr lang="en-US" altLang="en-US" dirty="0">
+                <a:solidFill>
+                  <a:schemeClr val="tx2"/>
+                </a:solidFill>
+                <a:latin typeface="Roboto" panose="020B0604020202020204" charset="0"/>
+                <a:ea typeface="Roboto" panose="020B0604020202020204" charset="0"/>
+              </a:rPr>
+              <a:t>}</a:t>
+            </a:r>
+            <a:endParaRPr lang="en-US" altLang="en-US" b="1" dirty="0">
+              <a:solidFill>
+                <a:schemeClr val="tx2"/>
+              </a:solidFill>
+              <a:latin typeface="Roboto" panose="020B0604020202020204" charset="0"/>
+              <a:ea typeface="Roboto" panose="020B0604020202020204" charset="0"/>
+            </a:endParaRPr>
+          </a:p>
+          <a:p>
+            <a:pPr marL="114300" lvl="0" indent="0" eaLnBrk="0" fontAlgn="base" hangingPunct="0">
+              <a:spcBef>
+                <a:spcPct val="0"/>
+              </a:spcBef>
+              <a:spcAft>
+                <a:spcPct val="0"/>
+              </a:spcAft>
+              <a:buClrTx/>
+              <a:buNone/>
+            </a:pPr>
+            <a:r>
+              <a:rPr lang="en-US" altLang="en-US" sz="2000" b="1" dirty="0">
+                <a:solidFill>
+                  <a:schemeClr val="tx2"/>
+                </a:solidFill>
+                <a:latin typeface="Roboto" panose="020B0604020202020204" charset="0"/>
+                <a:ea typeface="Roboto" panose="020B0604020202020204" charset="0"/>
+              </a:rPr>
+              <a:t>Example,</a:t>
+            </a:r>
+          </a:p>
+          <a:p>
+            <a:pPr marL="114300" lvl="0" indent="0" eaLnBrk="0" fontAlgn="base" hangingPunct="0">
+              <a:spcBef>
+                <a:spcPct val="0"/>
+              </a:spcBef>
+              <a:spcAft>
+                <a:spcPct val="0"/>
+              </a:spcAft>
+              <a:buClrTx/>
+              <a:buNone/>
+            </a:pPr>
+            <a:endParaRPr lang="en-US" altLang="en-US" sz="2000" b="1" dirty="0">
+              <a:solidFill>
+                <a:schemeClr val="tx2"/>
+              </a:solidFill>
+              <a:latin typeface="Roboto" panose="020B0604020202020204" charset="0"/>
+              <a:ea typeface="Roboto" panose="020B0604020202020204" charset="0"/>
+            </a:endParaRPr>
+          </a:p>
+          <a:p>
+            <a:pPr marL="114300" lvl="0" indent="0" eaLnBrk="0" fontAlgn="base" hangingPunct="0">
+              <a:spcBef>
+                <a:spcPct val="0"/>
+              </a:spcBef>
+              <a:spcAft>
+                <a:spcPct val="0"/>
+              </a:spcAft>
+              <a:buClrTx/>
+              <a:buNone/>
+            </a:pPr>
+            <a:r>
+              <a:rPr lang="en-US" altLang="en-US" sz="2000" dirty="0">
+                <a:solidFill>
+                  <a:schemeClr val="tx2"/>
+                </a:solidFill>
+                <a:latin typeface="Roboto" panose="020B0604020202020204" charset="0"/>
+                <a:ea typeface="Roboto" panose="020B0604020202020204" charset="0"/>
+              </a:rPr>
+              <a:t>Let I = 1;</a:t>
+            </a:r>
+          </a:p>
+          <a:p>
+            <a:pPr marL="114300" lvl="0" indent="0" eaLnBrk="0" fontAlgn="base" hangingPunct="0">
+              <a:spcBef>
+                <a:spcPct val="0"/>
+              </a:spcBef>
+              <a:spcAft>
+                <a:spcPct val="0"/>
+              </a:spcAft>
+              <a:buClrTx/>
+              <a:buNone/>
+            </a:pPr>
+            <a:r>
+              <a:rPr lang="en-US" altLang="en-US" dirty="0">
+                <a:solidFill>
+                  <a:schemeClr val="tx2"/>
+                </a:solidFill>
+                <a:latin typeface="Roboto" panose="020B0604020202020204" charset="0"/>
+                <a:ea typeface="Roboto" panose="020B0604020202020204" charset="0"/>
+              </a:rPr>
+              <a:t>while (</a:t>
+            </a:r>
+            <a:r>
+              <a:rPr lang="en-US" altLang="en-US" dirty="0" err="1">
+                <a:solidFill>
+                  <a:schemeClr val="tx2"/>
+                </a:solidFill>
+                <a:latin typeface="Roboto" panose="020B0604020202020204" charset="0"/>
+                <a:ea typeface="Roboto" panose="020B0604020202020204" charset="0"/>
+              </a:rPr>
+              <a:t>i</a:t>
+            </a:r>
+            <a:r>
+              <a:rPr lang="en-US" altLang="en-US" dirty="0">
+                <a:solidFill>
+                  <a:schemeClr val="tx2"/>
+                </a:solidFill>
+                <a:latin typeface="Roboto" panose="020B0604020202020204" charset="0"/>
+                <a:ea typeface="Roboto" panose="020B0604020202020204" charset="0"/>
+              </a:rPr>
+              <a:t> &lt; 5){</a:t>
+            </a:r>
+          </a:p>
+          <a:p>
+            <a:pPr marL="114300" lvl="0" indent="0" eaLnBrk="0" fontAlgn="base" hangingPunct="0">
+              <a:spcBef>
+                <a:spcPct val="0"/>
+              </a:spcBef>
+              <a:spcAft>
+                <a:spcPct val="0"/>
+              </a:spcAft>
+              <a:buClrTx/>
+              <a:buNone/>
+            </a:pPr>
+            <a:r>
+              <a:rPr lang="en-US" altLang="en-US" dirty="0">
+                <a:solidFill>
+                  <a:schemeClr val="tx2"/>
+                </a:solidFill>
+                <a:latin typeface="Roboto" panose="020B0604020202020204" charset="0"/>
+                <a:ea typeface="Roboto" panose="020B0604020202020204" charset="0"/>
+              </a:rPr>
+              <a:t>        Consol.log(</a:t>
+            </a:r>
+            <a:r>
+              <a:rPr lang="en-US" altLang="en-US" dirty="0" err="1">
+                <a:solidFill>
+                  <a:schemeClr val="tx2"/>
+                </a:solidFill>
+                <a:latin typeface="Roboto" panose="020B0604020202020204" charset="0"/>
+                <a:ea typeface="Roboto" panose="020B0604020202020204" charset="0"/>
+              </a:rPr>
+              <a:t>i</a:t>
+            </a:r>
+            <a:r>
+              <a:rPr lang="en-US" altLang="en-US" dirty="0">
+                <a:solidFill>
+                  <a:schemeClr val="tx2"/>
+                </a:solidFill>
+                <a:latin typeface="Roboto" panose="020B0604020202020204" charset="0"/>
+                <a:ea typeface="Roboto" panose="020B0604020202020204" charset="0"/>
+              </a:rPr>
+              <a:t>);</a:t>
+            </a:r>
+          </a:p>
+          <a:p>
+            <a:pPr marL="114300" lvl="0" indent="0" eaLnBrk="0" fontAlgn="base" hangingPunct="0">
+              <a:spcBef>
+                <a:spcPct val="0"/>
+              </a:spcBef>
+              <a:spcAft>
+                <a:spcPct val="0"/>
+              </a:spcAft>
+              <a:buClrTx/>
+              <a:buNone/>
+            </a:pPr>
+            <a:r>
+              <a:rPr lang="en-US" altLang="en-US" dirty="0">
+                <a:solidFill>
+                  <a:schemeClr val="tx2"/>
+                </a:solidFill>
+                <a:latin typeface="Roboto" panose="020B0604020202020204" charset="0"/>
+                <a:ea typeface="Roboto" panose="020B0604020202020204" charset="0"/>
+              </a:rPr>
+              <a:t>         </a:t>
+            </a:r>
+            <a:r>
+              <a:rPr lang="en-US" altLang="en-US" dirty="0" err="1">
+                <a:solidFill>
+                  <a:schemeClr val="tx2"/>
+                </a:solidFill>
+                <a:latin typeface="Roboto" panose="020B0604020202020204" charset="0"/>
+                <a:ea typeface="Roboto" panose="020B0604020202020204" charset="0"/>
+              </a:rPr>
+              <a:t>i</a:t>
+            </a:r>
+            <a:r>
+              <a:rPr lang="en-US" altLang="en-US" dirty="0">
+                <a:solidFill>
+                  <a:schemeClr val="tx2"/>
+                </a:solidFill>
+                <a:latin typeface="Roboto" panose="020B0604020202020204" charset="0"/>
+                <a:ea typeface="Roboto" panose="020B0604020202020204" charset="0"/>
+              </a:rPr>
+              <a:t>++;</a:t>
+            </a:r>
+          </a:p>
+          <a:p>
+            <a:pPr marL="114300" lvl="0" indent="0" eaLnBrk="0" fontAlgn="base" hangingPunct="0">
+              <a:spcBef>
+                <a:spcPct val="0"/>
+              </a:spcBef>
+              <a:spcAft>
+                <a:spcPct val="0"/>
+              </a:spcAft>
+              <a:buClrTx/>
+              <a:buNone/>
+            </a:pPr>
+            <a:r>
+              <a:rPr lang="en-US" altLang="en-US" dirty="0">
+                <a:solidFill>
+                  <a:schemeClr val="tx2"/>
+                </a:solidFill>
+                <a:latin typeface="Roboto" panose="020B0604020202020204" charset="0"/>
+                <a:ea typeface="Roboto" panose="020B0604020202020204" charset="0"/>
+              </a:rPr>
+              <a:t>} </a:t>
+            </a:r>
+          </a:p>
+          <a:p>
+            <a:pPr marL="114300" indent="0">
+              <a:buNone/>
+            </a:pPr>
+            <a:endParaRPr lang="en-US" dirty="0"/>
+          </a:p>
+        </p:txBody>
+      </p:sp>
+    </p:spTree>
+    <p:extLst>
+      <p:ext uri="{BB962C8B-B14F-4D97-AF65-F5344CB8AC3E}">
+        <p14:creationId xmlns:p14="http://schemas.microsoft.com/office/powerpoint/2010/main" val="859140621"/>
+      </p:ext>
+    </p:extLst>
+  </p:cSld>
+  <p:clrMapOvr>
+    <a:masterClrMapping/>
+  </p:clrMapOvr>
+</p:sld>
+</file>
+
+<file path=ppt/slides/slide12.xml><?xml version="1.0" encoding="utf-8"?>
+<p:sld xmlns:a="http://schemas.openxmlformats.org/drawingml/2006/main" xmlns:r="http://schemas.openxmlformats.org/officeDocument/2006/relationships" xmlns:p="http://schemas.openxmlformats.org/presentationml/2006/main">
+  <p:cSld>
+    <p:spTree>
+      <p:nvGrpSpPr>
+        <p:cNvPr id="1" name=""/>
+        <p:cNvGrpSpPr/>
+        <p:nvPr/>
+      </p:nvGrpSpPr>
+      <p:grpSpPr>
+        <a:xfrm>
+          <a:off x="0" y="0"/>
+          <a:ext cx="0" cy="0"/>
+          <a:chOff x="0" y="0"/>
+          <a:chExt cx="0" cy="0"/>
+        </a:xfrm>
+      </p:grpSpPr>
+      <p:sp>
+        <p:nvSpPr>
+          <p:cNvPr id="2" name="Title 1">
+            <a:extLst>
+              <a:ext uri="{FF2B5EF4-FFF2-40B4-BE49-F238E27FC236}">
+                <a16:creationId xmlns:a16="http://schemas.microsoft.com/office/drawing/2014/main" id="{B0B184B8-1E24-4FAA-80E6-30D0D52CABBA}"/>
+              </a:ext>
+            </a:extLst>
+          </p:cNvPr>
+          <p:cNvSpPr>
+            <a:spLocks noGrp="1"/>
+          </p:cNvSpPr>
+          <p:nvPr>
+            <p:ph type="title"/>
+          </p:nvPr>
+        </p:nvSpPr>
+        <p:spPr/>
+        <p:txBody>
+          <a:bodyPr/>
+          <a:lstStyle/>
+          <a:p>
+            <a:r>
+              <a:rPr lang="en-US" dirty="0"/>
+              <a:t>label Statement</a:t>
+            </a:r>
+          </a:p>
+        </p:txBody>
+      </p:sp>
+      <p:sp>
+        <p:nvSpPr>
+          <p:cNvPr id="5" name="Text Placeholder 4">
+            <a:extLst>
+              <a:ext uri="{FF2B5EF4-FFF2-40B4-BE49-F238E27FC236}">
+                <a16:creationId xmlns:a16="http://schemas.microsoft.com/office/drawing/2014/main" id="{DDFD8471-3D55-4C21-80E4-E0B47EF73689}"/>
+              </a:ext>
+            </a:extLst>
+          </p:cNvPr>
+          <p:cNvSpPr>
+            <a:spLocks noGrp="1"/>
+          </p:cNvSpPr>
+          <p:nvPr>
+            <p:ph type="body" idx="1"/>
+          </p:nvPr>
+        </p:nvSpPr>
+        <p:spPr>
+          <a:xfrm>
+            <a:off x="471900" y="1780851"/>
+            <a:ext cx="8222100" cy="3224425"/>
+          </a:xfrm>
+        </p:spPr>
+        <p:txBody>
+          <a:bodyPr/>
+          <a:lstStyle/>
+          <a:p>
+            <a:pPr marL="114300" indent="0">
+              <a:buNone/>
+            </a:pPr>
+            <a:r>
+              <a:rPr lang="en-US" altLang="en-US" dirty="0">
+                <a:solidFill>
+                  <a:schemeClr val="tx2"/>
+                </a:solidFill>
+                <a:latin typeface="Roboto" panose="020B0604020202020204" charset="0"/>
+                <a:ea typeface="Roboto" panose="020B0604020202020204" charset="0"/>
+              </a:rPr>
+              <a:t>label :</a:t>
+            </a:r>
+          </a:p>
+          <a:p>
+            <a:pPr marL="114300" indent="0">
+              <a:buNone/>
+            </a:pPr>
+            <a:r>
+              <a:rPr lang="en-US" altLang="en-US" dirty="0">
+                <a:solidFill>
+                  <a:schemeClr val="tx2"/>
+                </a:solidFill>
+                <a:latin typeface="Roboto" panose="020B0604020202020204" charset="0"/>
+                <a:ea typeface="Roboto" panose="020B0604020202020204" charset="0"/>
+              </a:rPr>
+              <a:t>         statement</a:t>
+            </a:r>
+          </a:p>
+          <a:p>
+            <a:pPr marL="114300" indent="0">
+              <a:buNone/>
+            </a:pPr>
+            <a:endParaRPr lang="en-US" b="1" dirty="0">
+              <a:solidFill>
+                <a:schemeClr val="bg2"/>
+              </a:solidFill>
+              <a:latin typeface="Roboto" panose="020B0604020202020204" charset="0"/>
+              <a:ea typeface="Roboto" panose="020B0604020202020204" charset="0"/>
+            </a:endParaRPr>
+          </a:p>
+          <a:p>
+            <a:pPr marL="114300" indent="0">
+              <a:buNone/>
+            </a:pPr>
+            <a:r>
+              <a:rPr lang="en-US" b="1" dirty="0">
+                <a:solidFill>
+                  <a:schemeClr val="bg2"/>
+                </a:solidFill>
+                <a:latin typeface="Roboto" panose="020B0604020202020204" charset="0"/>
+                <a:ea typeface="Roboto" panose="020B0604020202020204" charset="0"/>
+              </a:rPr>
+              <a:t>Example, </a:t>
+            </a:r>
+          </a:p>
+          <a:p>
+            <a:pPr marL="114300" indent="0">
+              <a:buNone/>
+            </a:pPr>
+            <a:endParaRPr lang="en-US" dirty="0">
+              <a:solidFill>
+                <a:schemeClr val="tx2"/>
+              </a:solidFill>
+              <a:latin typeface="Roboto" panose="020B0604020202020204" charset="0"/>
+              <a:ea typeface="Roboto" panose="020B0604020202020204" charset="0"/>
+            </a:endParaRPr>
+          </a:p>
+          <a:p>
+            <a:pPr marL="114300" indent="0">
+              <a:buNone/>
+            </a:pPr>
+            <a:r>
+              <a:rPr lang="en-US" altLang="en-US" dirty="0" err="1">
+                <a:solidFill>
+                  <a:schemeClr val="tx2"/>
+                </a:solidFill>
+                <a:latin typeface="Roboto" panose="020B0604020202020204" charset="0"/>
+                <a:ea typeface="Roboto" panose="020B0604020202020204" charset="0"/>
+              </a:rPr>
+              <a:t>markLoop</a:t>
+            </a:r>
+            <a:r>
+              <a:rPr lang="en-US" altLang="en-US" dirty="0">
+                <a:solidFill>
+                  <a:schemeClr val="tx2"/>
+                </a:solidFill>
+                <a:latin typeface="Roboto" panose="020B0604020202020204" charset="0"/>
+                <a:ea typeface="Roboto" panose="020B0604020202020204" charset="0"/>
+              </a:rPr>
+              <a:t>: </a:t>
+            </a:r>
+          </a:p>
+          <a:p>
+            <a:pPr marL="114300" indent="0">
+              <a:buNone/>
+            </a:pPr>
+            <a:r>
+              <a:rPr lang="en-US" altLang="en-US" dirty="0">
+                <a:solidFill>
+                  <a:schemeClr val="tx2"/>
+                </a:solidFill>
+                <a:latin typeface="Roboto" panose="020B0604020202020204" charset="0"/>
+                <a:ea typeface="Roboto" panose="020B0604020202020204" charset="0"/>
+              </a:rPr>
+              <a:t>while (</a:t>
+            </a:r>
+            <a:r>
+              <a:rPr lang="en-US" altLang="en-US" dirty="0" err="1">
+                <a:solidFill>
+                  <a:schemeClr val="tx2"/>
+                </a:solidFill>
+                <a:latin typeface="Roboto" panose="020B0604020202020204" charset="0"/>
+                <a:ea typeface="Roboto" panose="020B0604020202020204" charset="0"/>
+              </a:rPr>
+              <a:t>theMark</a:t>
+            </a:r>
+            <a:r>
+              <a:rPr lang="en-US" altLang="en-US" dirty="0">
+                <a:solidFill>
+                  <a:schemeClr val="tx2"/>
+                </a:solidFill>
+                <a:latin typeface="Roboto" panose="020B0604020202020204" charset="0"/>
+                <a:ea typeface="Roboto" panose="020B0604020202020204" charset="0"/>
+              </a:rPr>
+              <a:t> == true) </a:t>
+            </a:r>
+          </a:p>
+          <a:p>
+            <a:pPr marL="114300" indent="0">
+              <a:buNone/>
+            </a:pPr>
+            <a:r>
+              <a:rPr lang="en-US" altLang="en-US" dirty="0">
+                <a:solidFill>
+                  <a:schemeClr val="tx2"/>
+                </a:solidFill>
+                <a:latin typeface="Roboto" panose="020B0604020202020204" charset="0"/>
+                <a:ea typeface="Roboto" panose="020B0604020202020204" charset="0"/>
+              </a:rPr>
+              <a:t>{ </a:t>
+            </a:r>
+          </a:p>
+          <a:p>
+            <a:pPr marL="114300" indent="0">
+              <a:buNone/>
+            </a:pPr>
+            <a:r>
+              <a:rPr lang="en-US" altLang="en-US" dirty="0" err="1">
+                <a:solidFill>
+                  <a:schemeClr val="tx2"/>
+                </a:solidFill>
+                <a:latin typeface="Roboto" panose="020B0604020202020204" charset="0"/>
+                <a:ea typeface="Roboto" panose="020B0604020202020204" charset="0"/>
+              </a:rPr>
+              <a:t>doSomething</a:t>
+            </a:r>
+            <a:r>
+              <a:rPr lang="en-US" altLang="en-US" dirty="0">
+                <a:solidFill>
+                  <a:schemeClr val="tx2"/>
+                </a:solidFill>
+                <a:latin typeface="Roboto" panose="020B0604020202020204" charset="0"/>
+                <a:ea typeface="Roboto" panose="020B0604020202020204" charset="0"/>
+              </a:rPr>
+              <a:t>(); </a:t>
+            </a:r>
+          </a:p>
+          <a:p>
+            <a:pPr marL="114300" indent="0">
+              <a:buNone/>
+            </a:pPr>
+            <a:r>
+              <a:rPr lang="en-US" altLang="en-US" dirty="0">
+                <a:solidFill>
+                  <a:schemeClr val="tx2"/>
+                </a:solidFill>
+                <a:latin typeface="Roboto" panose="020B0604020202020204" charset="0"/>
+                <a:ea typeface="Roboto" panose="020B0604020202020204" charset="0"/>
+              </a:rPr>
+              <a:t>} </a:t>
+            </a:r>
+          </a:p>
+          <a:p>
+            <a:pPr marL="114300" indent="0">
+              <a:buNone/>
+            </a:pPr>
+            <a:endParaRPr lang="en-US" dirty="0">
+              <a:solidFill>
+                <a:schemeClr val="tx2"/>
+              </a:solidFill>
+              <a:latin typeface="Roboto" panose="020B0604020202020204" charset="0"/>
+              <a:ea typeface="Roboto" panose="020B0604020202020204" charset="0"/>
+            </a:endParaRPr>
+          </a:p>
+          <a:p>
+            <a:pPr marL="114300" indent="0">
+              <a:buNone/>
+            </a:pPr>
+            <a:endParaRPr lang="en-US" dirty="0">
+              <a:solidFill>
+                <a:schemeClr val="tx2"/>
+              </a:solidFill>
+              <a:latin typeface="Roboto" panose="020B0604020202020204" charset="0"/>
+              <a:ea typeface="Roboto" panose="020B0604020202020204" charset="0"/>
+            </a:endParaRPr>
+          </a:p>
+          <a:p>
+            <a:pPr marL="114300" indent="0">
+              <a:buNone/>
+            </a:pPr>
+            <a:endParaRPr lang="en-US" dirty="0">
+              <a:latin typeface="Roboto" panose="020B0604020202020204" charset="0"/>
+              <a:ea typeface="Roboto" panose="020B0604020202020204" charset="0"/>
+            </a:endParaRPr>
+          </a:p>
+        </p:txBody>
+      </p:sp>
+    </p:spTree>
+    <p:extLst>
+      <p:ext uri="{BB962C8B-B14F-4D97-AF65-F5344CB8AC3E}">
+        <p14:creationId xmlns:p14="http://schemas.microsoft.com/office/powerpoint/2010/main" val="4286491102"/>
+      </p:ext>
+    </p:extLst>
+  </p:cSld>
+  <p:clrMapOvr>
+    <a:masterClrMapping/>
+  </p:clrMapOvr>
+</p:sld>
+</file>
+
+<file path=ppt/slides/slide13.xml><?xml version="1.0" encoding="utf-8"?>
+<p:sld xmlns:a="http://schemas.openxmlformats.org/drawingml/2006/main" xmlns:r="http://schemas.openxmlformats.org/officeDocument/2006/relationships" xmlns:p="http://schemas.openxmlformats.org/presentationml/2006/main">
+  <p:cSld>
+    <p:spTree>
+      <p:nvGrpSpPr>
+        <p:cNvPr id="1" name=""/>
+        <p:cNvGrpSpPr/>
+        <p:nvPr/>
+      </p:nvGrpSpPr>
+      <p:grpSpPr>
+        <a:xfrm>
+          <a:off x="0" y="0"/>
+          <a:ext cx="0" cy="0"/>
+          <a:chOff x="0" y="0"/>
+          <a:chExt cx="0" cy="0"/>
+        </a:xfrm>
+      </p:grpSpPr>
+      <p:sp>
+        <p:nvSpPr>
+          <p:cNvPr id="2" name="Title 1">
+            <a:extLst>
+              <a:ext uri="{FF2B5EF4-FFF2-40B4-BE49-F238E27FC236}">
+                <a16:creationId xmlns:a16="http://schemas.microsoft.com/office/drawing/2014/main" id="{BCB4A8F3-37A5-4157-BE0B-EC70F883C8A5}"/>
+              </a:ext>
+            </a:extLst>
+          </p:cNvPr>
+          <p:cNvSpPr>
+            <a:spLocks noGrp="1"/>
+          </p:cNvSpPr>
+          <p:nvPr>
+            <p:ph type="title"/>
+          </p:nvPr>
+        </p:nvSpPr>
+        <p:spPr/>
+        <p:txBody>
+          <a:bodyPr/>
+          <a:lstStyle/>
+          <a:p>
+            <a:r>
+              <a:rPr lang="en-US" dirty="0"/>
+              <a:t>break Statement</a:t>
+            </a:r>
+          </a:p>
+        </p:txBody>
+      </p:sp>
+      <p:sp>
+        <p:nvSpPr>
+          <p:cNvPr id="5" name="TextBox 4">
+            <a:extLst>
+              <a:ext uri="{FF2B5EF4-FFF2-40B4-BE49-F238E27FC236}">
+                <a16:creationId xmlns:a16="http://schemas.microsoft.com/office/drawing/2014/main" id="{41C6DD3E-4A82-40D6-8FB7-8A45D8C00685}"/>
+              </a:ext>
+            </a:extLst>
+          </p:cNvPr>
+          <p:cNvSpPr txBox="1"/>
+          <p:nvPr/>
+        </p:nvSpPr>
+        <p:spPr>
+          <a:xfrm>
+            <a:off x="471900" y="2339162"/>
+            <a:ext cx="8672100" cy="1692771"/>
+          </a:xfrm>
+          <a:prstGeom prst="rect">
+            <a:avLst/>
+          </a:prstGeom>
+          <a:noFill/>
+        </p:spPr>
+        <p:txBody>
+          <a:bodyPr wrap="square" rtlCol="0">
+            <a:spAutoFit/>
+          </a:bodyPr>
+          <a:lstStyle/>
+          <a:p>
+            <a:r>
+              <a:rPr lang="en-US" altLang="en-US" sz="1800" b="1" dirty="0">
+                <a:solidFill>
+                  <a:schemeClr val="tx2"/>
+                </a:solidFill>
+                <a:latin typeface="Roboto" panose="020B0604020202020204" charset="0"/>
+                <a:ea typeface="Roboto" panose="020B0604020202020204" charset="0"/>
+              </a:rPr>
+              <a:t>for (var </a:t>
+            </a:r>
+            <a:r>
+              <a:rPr lang="en-US" altLang="en-US" sz="1800" b="1" dirty="0" err="1">
+                <a:solidFill>
+                  <a:schemeClr val="tx2"/>
+                </a:solidFill>
+                <a:latin typeface="Roboto" panose="020B0604020202020204" charset="0"/>
+                <a:ea typeface="Roboto" panose="020B0604020202020204" charset="0"/>
+              </a:rPr>
+              <a:t>i</a:t>
+            </a:r>
+            <a:r>
+              <a:rPr lang="en-US" altLang="en-US" sz="1800" b="1" dirty="0">
+                <a:solidFill>
+                  <a:schemeClr val="tx2"/>
+                </a:solidFill>
+                <a:latin typeface="Roboto" panose="020B0604020202020204" charset="0"/>
+                <a:ea typeface="Roboto" panose="020B0604020202020204" charset="0"/>
+              </a:rPr>
+              <a:t> = 0; </a:t>
+            </a:r>
+            <a:r>
+              <a:rPr lang="en-US" altLang="en-US" sz="1800" b="1" dirty="0" err="1">
+                <a:solidFill>
+                  <a:schemeClr val="tx2"/>
+                </a:solidFill>
+                <a:latin typeface="Roboto" panose="020B0604020202020204" charset="0"/>
+                <a:ea typeface="Roboto" panose="020B0604020202020204" charset="0"/>
+              </a:rPr>
+              <a:t>i</a:t>
+            </a:r>
+            <a:r>
+              <a:rPr lang="en-US" altLang="en-US" sz="1800" b="1" dirty="0">
+                <a:solidFill>
+                  <a:schemeClr val="tx2"/>
+                </a:solidFill>
+                <a:latin typeface="Roboto" panose="020B0604020202020204" charset="0"/>
+                <a:ea typeface="Roboto" panose="020B0604020202020204" charset="0"/>
+              </a:rPr>
+              <a:t> &lt; </a:t>
+            </a:r>
+            <a:r>
+              <a:rPr lang="en-US" altLang="en-US" sz="1800" b="1" dirty="0" err="1">
+                <a:solidFill>
+                  <a:schemeClr val="tx2"/>
+                </a:solidFill>
+                <a:latin typeface="Roboto" panose="020B0604020202020204" charset="0"/>
+                <a:ea typeface="Roboto" panose="020B0604020202020204" charset="0"/>
+              </a:rPr>
+              <a:t>a.length</a:t>
+            </a:r>
+            <a:r>
+              <a:rPr lang="en-US" altLang="en-US" sz="1800" b="1" dirty="0">
+                <a:solidFill>
+                  <a:schemeClr val="tx2"/>
+                </a:solidFill>
+                <a:latin typeface="Roboto" panose="020B0604020202020204" charset="0"/>
+                <a:ea typeface="Roboto" panose="020B0604020202020204" charset="0"/>
+              </a:rPr>
+              <a:t>; </a:t>
+            </a:r>
+            <a:r>
+              <a:rPr lang="en-US" altLang="en-US" sz="1800" b="1" dirty="0" err="1">
+                <a:solidFill>
+                  <a:schemeClr val="tx2"/>
+                </a:solidFill>
+                <a:latin typeface="Roboto" panose="020B0604020202020204" charset="0"/>
+                <a:ea typeface="Roboto" panose="020B0604020202020204" charset="0"/>
+              </a:rPr>
+              <a:t>i</a:t>
+            </a:r>
+            <a:r>
+              <a:rPr lang="en-US" altLang="en-US" sz="1800" b="1" dirty="0">
+                <a:solidFill>
+                  <a:schemeClr val="tx2"/>
+                </a:solidFill>
+                <a:latin typeface="Roboto" panose="020B0604020202020204" charset="0"/>
+                <a:ea typeface="Roboto" panose="020B0604020202020204" charset="0"/>
+              </a:rPr>
+              <a:t>++) { </a:t>
+            </a:r>
+          </a:p>
+          <a:p>
+            <a:endParaRPr lang="en-US" altLang="en-US" sz="1800" b="1" dirty="0">
+              <a:solidFill>
+                <a:schemeClr val="tx2"/>
+              </a:solidFill>
+              <a:latin typeface="Roboto" panose="020B0604020202020204" charset="0"/>
+              <a:ea typeface="Roboto" panose="020B0604020202020204" charset="0"/>
+            </a:endParaRPr>
+          </a:p>
+          <a:p>
+            <a:r>
+              <a:rPr lang="en-US" altLang="en-US" sz="1800" b="1" dirty="0">
+                <a:solidFill>
+                  <a:schemeClr val="tx2"/>
+                </a:solidFill>
+                <a:latin typeface="Roboto" panose="020B0604020202020204" charset="0"/>
+                <a:ea typeface="Roboto" panose="020B0604020202020204" charset="0"/>
+              </a:rPr>
+              <a:t>	if (a[</a:t>
+            </a:r>
+            <a:r>
+              <a:rPr lang="en-US" altLang="en-US" sz="1800" b="1" dirty="0" err="1">
+                <a:solidFill>
+                  <a:schemeClr val="tx2"/>
+                </a:solidFill>
+                <a:latin typeface="Roboto" panose="020B0604020202020204" charset="0"/>
+                <a:ea typeface="Roboto" panose="020B0604020202020204" charset="0"/>
+              </a:rPr>
+              <a:t>i</a:t>
+            </a:r>
+            <a:r>
+              <a:rPr lang="en-US" altLang="en-US" sz="1800" b="1" dirty="0">
+                <a:solidFill>
+                  <a:schemeClr val="tx2"/>
+                </a:solidFill>
+                <a:latin typeface="Roboto" panose="020B0604020202020204" charset="0"/>
+                <a:ea typeface="Roboto" panose="020B0604020202020204" charset="0"/>
+              </a:rPr>
+              <a:t>] == </a:t>
+            </a:r>
+            <a:r>
+              <a:rPr lang="en-US" altLang="en-US" sz="1800" b="1" dirty="0" err="1">
+                <a:solidFill>
+                  <a:schemeClr val="tx2"/>
+                </a:solidFill>
+                <a:latin typeface="Roboto" panose="020B0604020202020204" charset="0"/>
+                <a:ea typeface="Roboto" panose="020B0604020202020204" charset="0"/>
+              </a:rPr>
+              <a:t>theValue</a:t>
+            </a:r>
+            <a:r>
+              <a:rPr lang="en-US" altLang="en-US" sz="1800" b="1" dirty="0">
+                <a:solidFill>
+                  <a:schemeClr val="tx2"/>
+                </a:solidFill>
+                <a:latin typeface="Roboto" panose="020B0604020202020204" charset="0"/>
+                <a:ea typeface="Roboto" panose="020B0604020202020204" charset="0"/>
+              </a:rPr>
+              <a:t>) break;</a:t>
+            </a:r>
+          </a:p>
+          <a:p>
+            <a:endParaRPr lang="en-US" altLang="en-US" sz="1800" b="1" dirty="0">
+              <a:solidFill>
+                <a:schemeClr val="tx2"/>
+              </a:solidFill>
+              <a:latin typeface="Roboto" panose="020B0604020202020204" charset="0"/>
+              <a:ea typeface="Roboto" panose="020B0604020202020204" charset="0"/>
+            </a:endParaRPr>
+          </a:p>
+          <a:p>
+            <a:r>
+              <a:rPr lang="en-US" altLang="en-US" sz="1800" b="1" dirty="0">
+                <a:solidFill>
+                  <a:schemeClr val="tx2"/>
+                </a:solidFill>
+                <a:latin typeface="Roboto" panose="020B0604020202020204" charset="0"/>
+                <a:ea typeface="Roboto" panose="020B0604020202020204" charset="0"/>
+              </a:rPr>
+              <a:t> }</a:t>
+            </a:r>
+            <a:r>
+              <a:rPr lang="en-US" altLang="en-US" sz="1800" dirty="0">
+                <a:solidFill>
+                  <a:schemeClr val="tx2"/>
+                </a:solidFill>
+                <a:latin typeface="Roboto" panose="020B0604020202020204" charset="0"/>
+                <a:ea typeface="Roboto" panose="020B0604020202020204" charset="0"/>
+              </a:rPr>
+              <a:t> </a:t>
+            </a:r>
+          </a:p>
+          <a:p>
+            <a:endParaRPr lang="en-US" dirty="0"/>
+          </a:p>
+        </p:txBody>
+      </p:sp>
+    </p:spTree>
+    <p:extLst>
+      <p:ext uri="{BB962C8B-B14F-4D97-AF65-F5344CB8AC3E}">
+        <p14:creationId xmlns:p14="http://schemas.microsoft.com/office/powerpoint/2010/main" val="3360048694"/>
+      </p:ext>
+    </p:extLst>
+  </p:cSld>
+  <p:clrMapOvr>
+    <a:masterClrMapping/>
+  </p:clrMapOvr>
+</p:sld>
+</file>
+
+<file path=ppt/slides/slide14.xml><?xml version="1.0" encoding="utf-8"?>
+<p:sld xmlns:a="http://schemas.openxmlformats.org/drawingml/2006/main" xmlns:r="http://schemas.openxmlformats.org/officeDocument/2006/relationships" xmlns:p="http://schemas.openxmlformats.org/presentationml/2006/main">
+  <p:cSld>
+    <p:spTree>
+      <p:nvGrpSpPr>
+        <p:cNvPr id="1" name=""/>
+        <p:cNvGrpSpPr/>
+        <p:nvPr/>
+      </p:nvGrpSpPr>
+      <p:grpSpPr>
+        <a:xfrm>
+          <a:off x="0" y="0"/>
+          <a:ext cx="0" cy="0"/>
+          <a:chOff x="0" y="0"/>
+          <a:chExt cx="0" cy="0"/>
+        </a:xfrm>
+      </p:grpSpPr>
+      <p:sp>
+        <p:nvSpPr>
+          <p:cNvPr id="2" name="Title 1">
+            <a:extLst>
+              <a:ext uri="{FF2B5EF4-FFF2-40B4-BE49-F238E27FC236}">
+                <a16:creationId xmlns:a16="http://schemas.microsoft.com/office/drawing/2014/main" id="{B50E37FA-53D9-49F4-8F92-D6265CDA3EDD}"/>
+              </a:ext>
+            </a:extLst>
+          </p:cNvPr>
+          <p:cNvSpPr>
+            <a:spLocks noGrp="1"/>
+          </p:cNvSpPr>
+          <p:nvPr>
+            <p:ph type="title"/>
+          </p:nvPr>
+        </p:nvSpPr>
+        <p:spPr/>
+        <p:txBody>
+          <a:bodyPr/>
+          <a:lstStyle/>
+          <a:p>
+            <a:r>
+              <a:rPr lang="en-US" dirty="0"/>
+              <a:t>continue Statement</a:t>
+            </a:r>
+          </a:p>
+        </p:txBody>
+      </p:sp>
+      <p:sp>
+        <p:nvSpPr>
+          <p:cNvPr id="5" name="TextBox 4">
+            <a:extLst>
+              <a:ext uri="{FF2B5EF4-FFF2-40B4-BE49-F238E27FC236}">
+                <a16:creationId xmlns:a16="http://schemas.microsoft.com/office/drawing/2014/main" id="{582A3DA8-996D-4EBD-BF29-D7AE11E5AFE6}"/>
+              </a:ext>
+            </a:extLst>
+          </p:cNvPr>
+          <p:cNvSpPr txBox="1"/>
+          <p:nvPr/>
+        </p:nvSpPr>
+        <p:spPr>
+          <a:xfrm>
+            <a:off x="471900" y="2094615"/>
+            <a:ext cx="8406285" cy="2523768"/>
+          </a:xfrm>
+          <a:prstGeom prst="rect">
+            <a:avLst/>
+          </a:prstGeom>
+          <a:noFill/>
+        </p:spPr>
+        <p:txBody>
+          <a:bodyPr wrap="square" rtlCol="0">
+            <a:spAutoFit/>
+          </a:bodyPr>
+          <a:lstStyle/>
+          <a:p>
+            <a:r>
+              <a:rPr lang="en-US" altLang="en-US" sz="1800" b="1" dirty="0" err="1">
+                <a:solidFill>
+                  <a:schemeClr val="tx2"/>
+                </a:solidFill>
+                <a:latin typeface="Roboto" panose="020B0604020202020204" charset="0"/>
+                <a:ea typeface="Roboto" panose="020B0604020202020204" charset="0"/>
+              </a:rPr>
+              <a:t>i</a:t>
+            </a:r>
+            <a:r>
+              <a:rPr lang="en-US" altLang="en-US" sz="1800" b="1" dirty="0">
+                <a:solidFill>
+                  <a:schemeClr val="tx2"/>
+                </a:solidFill>
+                <a:latin typeface="Roboto" panose="020B0604020202020204" charset="0"/>
+                <a:ea typeface="Roboto" panose="020B0604020202020204" charset="0"/>
+              </a:rPr>
+              <a:t> = 0; </a:t>
+            </a:r>
+          </a:p>
+          <a:p>
+            <a:r>
+              <a:rPr lang="en-US" altLang="en-US" sz="1800" b="1" dirty="0">
+                <a:solidFill>
+                  <a:schemeClr val="tx2"/>
+                </a:solidFill>
+                <a:latin typeface="Roboto" panose="020B0604020202020204" charset="0"/>
+                <a:ea typeface="Roboto" panose="020B0604020202020204" charset="0"/>
+              </a:rPr>
+              <a:t>n = 0; </a:t>
+            </a:r>
+          </a:p>
+          <a:p>
+            <a:endParaRPr lang="en-US" altLang="en-US" sz="1800" b="1" dirty="0">
+              <a:solidFill>
+                <a:schemeClr val="tx2"/>
+              </a:solidFill>
+              <a:latin typeface="Roboto" panose="020B0604020202020204" charset="0"/>
+              <a:ea typeface="Roboto" panose="020B0604020202020204" charset="0"/>
+            </a:endParaRPr>
+          </a:p>
+          <a:p>
+            <a:r>
+              <a:rPr lang="en-US" altLang="en-US" sz="1800" b="1" dirty="0">
+                <a:solidFill>
+                  <a:schemeClr val="tx2"/>
+                </a:solidFill>
+                <a:latin typeface="Roboto" panose="020B0604020202020204" charset="0"/>
+                <a:ea typeface="Roboto" panose="020B0604020202020204" charset="0"/>
+              </a:rPr>
+              <a:t>while (</a:t>
+            </a:r>
+            <a:r>
+              <a:rPr lang="en-US" altLang="en-US" sz="1800" b="1" dirty="0" err="1">
+                <a:solidFill>
+                  <a:schemeClr val="tx2"/>
+                </a:solidFill>
+                <a:latin typeface="Roboto" panose="020B0604020202020204" charset="0"/>
+                <a:ea typeface="Roboto" panose="020B0604020202020204" charset="0"/>
+              </a:rPr>
+              <a:t>i</a:t>
+            </a:r>
+            <a:r>
+              <a:rPr lang="en-US" altLang="en-US" sz="1800" b="1" dirty="0">
+                <a:solidFill>
+                  <a:schemeClr val="tx2"/>
+                </a:solidFill>
+                <a:latin typeface="Roboto" panose="020B0604020202020204" charset="0"/>
+                <a:ea typeface="Roboto" panose="020B0604020202020204" charset="0"/>
+              </a:rPr>
+              <a:t> &lt; 5) {</a:t>
+            </a:r>
+          </a:p>
+          <a:p>
+            <a:r>
+              <a:rPr lang="en-US" altLang="en-US" sz="1800" b="1" dirty="0">
+                <a:solidFill>
+                  <a:schemeClr val="tx2"/>
+                </a:solidFill>
+                <a:latin typeface="Roboto" panose="020B0604020202020204" charset="0"/>
+                <a:ea typeface="Roboto" panose="020B0604020202020204" charset="0"/>
+              </a:rPr>
+              <a:t>    </a:t>
+            </a:r>
+            <a:r>
+              <a:rPr lang="en-US" altLang="en-US" sz="1800" b="1" dirty="0" err="1">
+                <a:solidFill>
+                  <a:schemeClr val="tx2"/>
+                </a:solidFill>
+                <a:latin typeface="Roboto" panose="020B0604020202020204" charset="0"/>
+                <a:ea typeface="Roboto" panose="020B0604020202020204" charset="0"/>
+              </a:rPr>
+              <a:t>i</a:t>
+            </a:r>
+            <a:r>
+              <a:rPr lang="en-US" altLang="en-US" sz="1800" b="1" dirty="0">
+                <a:solidFill>
+                  <a:schemeClr val="tx2"/>
+                </a:solidFill>
+                <a:latin typeface="Roboto" panose="020B0604020202020204" charset="0"/>
+                <a:ea typeface="Roboto" panose="020B0604020202020204" charset="0"/>
+              </a:rPr>
+              <a:t>++;</a:t>
+            </a:r>
+          </a:p>
+          <a:p>
+            <a:r>
+              <a:rPr lang="en-US" altLang="en-US" sz="1800" b="1" dirty="0">
+                <a:solidFill>
+                  <a:schemeClr val="tx2"/>
+                </a:solidFill>
+                <a:latin typeface="Roboto" panose="020B0604020202020204" charset="0"/>
+                <a:ea typeface="Roboto" panose="020B0604020202020204" charset="0"/>
+              </a:rPr>
+              <a:t>    if (</a:t>
+            </a:r>
+            <a:r>
+              <a:rPr lang="en-US" altLang="en-US" sz="1800" b="1" dirty="0" err="1">
+                <a:solidFill>
+                  <a:schemeClr val="tx2"/>
+                </a:solidFill>
+                <a:latin typeface="Roboto" panose="020B0604020202020204" charset="0"/>
+                <a:ea typeface="Roboto" panose="020B0604020202020204" charset="0"/>
+              </a:rPr>
+              <a:t>i</a:t>
+            </a:r>
+            <a:r>
+              <a:rPr lang="en-US" altLang="en-US" sz="1800" b="1" dirty="0">
+                <a:solidFill>
+                  <a:schemeClr val="tx2"/>
+                </a:solidFill>
+                <a:latin typeface="Roboto" panose="020B0604020202020204" charset="0"/>
+                <a:ea typeface="Roboto" panose="020B0604020202020204" charset="0"/>
+              </a:rPr>
+              <a:t> == 3) </a:t>
+            </a:r>
+          </a:p>
+          <a:p>
+            <a:r>
+              <a:rPr lang="en-US" altLang="en-US" sz="1800" b="1" dirty="0">
+                <a:solidFill>
+                  <a:schemeClr val="tx2"/>
+                </a:solidFill>
+                <a:latin typeface="Roboto" panose="020B0604020202020204" charset="0"/>
+                <a:ea typeface="Roboto" panose="020B0604020202020204" charset="0"/>
+              </a:rPr>
+              <a:t>           continue; n += </a:t>
+            </a:r>
+            <a:r>
+              <a:rPr lang="en-US" altLang="en-US" sz="1800" b="1" dirty="0" err="1">
+                <a:solidFill>
+                  <a:schemeClr val="tx2"/>
+                </a:solidFill>
+                <a:latin typeface="Roboto" panose="020B0604020202020204" charset="0"/>
+                <a:ea typeface="Roboto" panose="020B0604020202020204" charset="0"/>
+              </a:rPr>
+              <a:t>i</a:t>
+            </a:r>
+            <a:r>
+              <a:rPr lang="en-US" altLang="en-US" sz="1800" b="1" dirty="0">
+                <a:solidFill>
+                  <a:schemeClr val="tx2"/>
+                </a:solidFill>
+                <a:latin typeface="Roboto" panose="020B0604020202020204" charset="0"/>
+                <a:ea typeface="Roboto" panose="020B0604020202020204" charset="0"/>
+              </a:rPr>
+              <a:t>; </a:t>
+            </a:r>
+          </a:p>
+          <a:p>
+            <a:r>
+              <a:rPr lang="en-US" altLang="en-US" sz="1800" b="1" dirty="0">
+                <a:solidFill>
+                  <a:schemeClr val="tx2"/>
+                </a:solidFill>
+                <a:latin typeface="Roboto" panose="020B0604020202020204" charset="0"/>
+                <a:ea typeface="Roboto" panose="020B0604020202020204" charset="0"/>
+              </a:rPr>
+              <a:t>}</a:t>
+            </a:r>
+            <a:r>
+              <a:rPr lang="en-US" altLang="en-US" sz="1800" dirty="0">
+                <a:solidFill>
+                  <a:schemeClr val="tx2"/>
+                </a:solidFill>
+                <a:latin typeface="Roboto" panose="020B0604020202020204" charset="0"/>
+                <a:ea typeface="Roboto" panose="020B0604020202020204" charset="0"/>
+              </a:rPr>
+              <a:t> </a:t>
+            </a:r>
+          </a:p>
+          <a:p>
+            <a:endParaRPr lang="en-US" dirty="0"/>
+          </a:p>
+        </p:txBody>
+      </p:sp>
+    </p:spTree>
+    <p:extLst>
+      <p:ext uri="{BB962C8B-B14F-4D97-AF65-F5344CB8AC3E}">
+        <p14:creationId xmlns:p14="http://schemas.microsoft.com/office/powerpoint/2010/main" val="1172095248"/>
+      </p:ext>
+    </p:extLst>
+  </p:cSld>
+  <p:clrMapOvr>
+    <a:masterClrMapping/>
+  </p:clrMapOvr>
+</p:sld>
+</file>
+
+<file path=ppt/slides/slide15.xml><?xml version="1.0" encoding="utf-8"?>
+<p:sld xmlns:a="http://schemas.openxmlformats.org/drawingml/2006/main" xmlns:r="http://schemas.openxmlformats.org/officeDocument/2006/relationships" xmlns:p="http://schemas.openxmlformats.org/presentationml/2006/main">
+  <p:cSld>
+    <p:spTree>
+      <p:nvGrpSpPr>
+        <p:cNvPr id="1" name=""/>
+        <p:cNvGrpSpPr/>
+        <p:nvPr/>
+      </p:nvGrpSpPr>
+      <p:grpSpPr>
+        <a:xfrm>
+          <a:off x="0" y="0"/>
+          <a:ext cx="0" cy="0"/>
+          <a:chOff x="0" y="0"/>
+          <a:chExt cx="0" cy="0"/>
+        </a:xfrm>
+      </p:grpSpPr>
+      <p:sp>
+        <p:nvSpPr>
+          <p:cNvPr id="2" name="Title 1">
+            <a:extLst>
+              <a:ext uri="{FF2B5EF4-FFF2-40B4-BE49-F238E27FC236}">
+                <a16:creationId xmlns:a16="http://schemas.microsoft.com/office/drawing/2014/main" id="{E0008E5A-74FF-4CC9-940F-699FF20EF1D9}"/>
+              </a:ext>
+            </a:extLst>
+          </p:cNvPr>
+          <p:cNvSpPr>
+            <a:spLocks noGrp="1"/>
+          </p:cNvSpPr>
+          <p:nvPr>
+            <p:ph type="title"/>
+          </p:nvPr>
+        </p:nvSpPr>
+        <p:spPr/>
+        <p:txBody>
+          <a:bodyPr/>
+          <a:lstStyle/>
+          <a:p>
+            <a:r>
+              <a:rPr lang="en-US" b="1" dirty="0"/>
+              <a:t>Object Manipulation Statements</a:t>
+            </a:r>
+            <a:endParaRPr lang="en-US" dirty="0"/>
+          </a:p>
+        </p:txBody>
+      </p:sp>
+      <p:sp>
+        <p:nvSpPr>
+          <p:cNvPr id="3" name="Text Placeholder 2">
+            <a:extLst>
+              <a:ext uri="{FF2B5EF4-FFF2-40B4-BE49-F238E27FC236}">
+                <a16:creationId xmlns:a16="http://schemas.microsoft.com/office/drawing/2014/main" id="{B8CBF1D8-DD90-4681-B980-E30564F28628}"/>
+              </a:ext>
+            </a:extLst>
+          </p:cNvPr>
+          <p:cNvSpPr>
+            <a:spLocks noGrp="1"/>
+          </p:cNvSpPr>
+          <p:nvPr>
+            <p:ph type="body" idx="1"/>
+          </p:nvPr>
+        </p:nvSpPr>
+        <p:spPr>
+          <a:xfrm>
+            <a:off x="460950" y="1855280"/>
+            <a:ext cx="8222100" cy="2710200"/>
+          </a:xfrm>
+        </p:spPr>
+        <p:txBody>
+          <a:bodyPr/>
+          <a:lstStyle/>
+          <a:p>
+            <a:pPr marL="114300" indent="0">
+              <a:buNone/>
+            </a:pPr>
+            <a:r>
+              <a:rPr lang="en-US" altLang="en-US" dirty="0">
+                <a:solidFill>
+                  <a:schemeClr val="bg1">
+                    <a:lumMod val="50000"/>
+                  </a:schemeClr>
+                </a:solidFill>
+                <a:latin typeface="Roboto" panose="020B0604020202020204" charset="0"/>
+                <a:ea typeface="Roboto" panose="020B0604020202020204" charset="0"/>
+              </a:rPr>
+              <a:t>JavaScript uses the for...in, for each...in, and with statements to manipulate objects.</a:t>
+            </a:r>
+          </a:p>
+          <a:p>
+            <a:pPr marL="114300" indent="0">
+              <a:buNone/>
+            </a:pPr>
+            <a:endParaRPr lang="en-US" altLang="en-US" dirty="0">
+              <a:solidFill>
+                <a:schemeClr val="bg1">
+                  <a:lumMod val="50000"/>
+                </a:schemeClr>
+              </a:solidFill>
+              <a:latin typeface="Roboto" panose="020B0604020202020204" charset="0"/>
+              <a:ea typeface="Roboto" panose="020B0604020202020204" charset="0"/>
+            </a:endParaRPr>
+          </a:p>
+          <a:p>
+            <a:pPr marL="114300" indent="0">
+              <a:buNone/>
+            </a:pPr>
+            <a:endParaRPr lang="en-US" dirty="0"/>
+          </a:p>
+        </p:txBody>
+      </p:sp>
+    </p:spTree>
+    <p:extLst>
+      <p:ext uri="{BB962C8B-B14F-4D97-AF65-F5344CB8AC3E}">
+        <p14:creationId xmlns:p14="http://schemas.microsoft.com/office/powerpoint/2010/main" val="1162783113"/>
+      </p:ext>
+    </p:extLst>
+  </p:cSld>
+  <p:clrMapOvr>
+    <a:masterClrMapping/>
+  </p:clrMapOvr>
+</p:sld>
+</file>
+
+<file path=ppt/slides/slide16.xml><?xml version="1.0" encoding="utf-8"?>
+<p:sld xmlns:a="http://schemas.openxmlformats.org/drawingml/2006/main" xmlns:r="http://schemas.openxmlformats.org/officeDocument/2006/relationships" xmlns:p="http://schemas.openxmlformats.org/presentationml/2006/main">
+  <p:cSld>
+    <p:spTree>
+      <p:nvGrpSpPr>
+        <p:cNvPr id="1" name=""/>
+        <p:cNvGrpSpPr/>
+        <p:nvPr/>
+      </p:nvGrpSpPr>
+      <p:grpSpPr>
+        <a:xfrm>
+          <a:off x="0" y="0"/>
+          <a:ext cx="0" cy="0"/>
+          <a:chOff x="0" y="0"/>
+          <a:chExt cx="0" cy="0"/>
+        </a:xfrm>
+      </p:grpSpPr>
+      <p:sp>
+        <p:nvSpPr>
+          <p:cNvPr id="2" name="Title 1">
+            <a:extLst>
+              <a:ext uri="{FF2B5EF4-FFF2-40B4-BE49-F238E27FC236}">
+                <a16:creationId xmlns:a16="http://schemas.microsoft.com/office/drawing/2014/main" id="{37F9A10E-E3D8-4CC7-A41B-0E9D11E1A357}"/>
+              </a:ext>
+            </a:extLst>
+          </p:cNvPr>
+          <p:cNvSpPr>
+            <a:spLocks noGrp="1"/>
+          </p:cNvSpPr>
+          <p:nvPr>
+            <p:ph type="title"/>
+          </p:nvPr>
+        </p:nvSpPr>
+        <p:spPr/>
+        <p:txBody>
+          <a:bodyPr/>
+          <a:lstStyle/>
+          <a:p>
+            <a:r>
+              <a:rPr lang="en-US" dirty="0"/>
+              <a:t>for…in Statement</a:t>
+            </a:r>
+          </a:p>
+        </p:txBody>
+      </p:sp>
+      <p:sp>
+        <p:nvSpPr>
+          <p:cNvPr id="5" name="TextBox 4">
+            <a:extLst>
+              <a:ext uri="{FF2B5EF4-FFF2-40B4-BE49-F238E27FC236}">
+                <a16:creationId xmlns:a16="http://schemas.microsoft.com/office/drawing/2014/main" id="{52BCBD55-01B3-4546-BF61-BE36F2B8D7BB}"/>
+              </a:ext>
+            </a:extLst>
+          </p:cNvPr>
+          <p:cNvSpPr txBox="1"/>
+          <p:nvPr/>
+        </p:nvSpPr>
+        <p:spPr>
+          <a:xfrm>
+            <a:off x="471900" y="1830351"/>
+            <a:ext cx="8406286" cy="4185761"/>
+          </a:xfrm>
+          <a:prstGeom prst="rect">
+            <a:avLst/>
+          </a:prstGeom>
+          <a:noFill/>
+        </p:spPr>
+        <p:txBody>
+          <a:bodyPr wrap="square" rtlCol="0">
+            <a:spAutoFit/>
+          </a:bodyPr>
+          <a:lstStyle/>
+          <a:p>
+            <a:r>
+              <a:rPr lang="en-US" altLang="en-US" sz="1800" dirty="0">
+                <a:solidFill>
+                  <a:schemeClr val="tx2"/>
+                </a:solidFill>
+                <a:latin typeface="Roboto" panose="020B0604020202020204" charset="0"/>
+                <a:ea typeface="Roboto" panose="020B0604020202020204" charset="0"/>
+              </a:rPr>
+              <a:t>for (variable in object) { </a:t>
+            </a:r>
+          </a:p>
+          <a:p>
+            <a:r>
+              <a:rPr lang="en-US" altLang="en-US" sz="1800" dirty="0">
+                <a:solidFill>
+                  <a:schemeClr val="tx2"/>
+                </a:solidFill>
+                <a:latin typeface="Roboto" panose="020B0604020202020204" charset="0"/>
+                <a:ea typeface="Roboto" panose="020B0604020202020204" charset="0"/>
+              </a:rPr>
+              <a:t>        statements </a:t>
+            </a:r>
+          </a:p>
+          <a:p>
+            <a:r>
+              <a:rPr lang="en-US" altLang="en-US" sz="1800" dirty="0">
+                <a:solidFill>
+                  <a:schemeClr val="tx2"/>
+                </a:solidFill>
+                <a:latin typeface="Roboto" panose="020B0604020202020204" charset="0"/>
+                <a:ea typeface="Roboto" panose="020B0604020202020204" charset="0"/>
+              </a:rPr>
+              <a:t>} </a:t>
+            </a:r>
+          </a:p>
+          <a:p>
+            <a:r>
+              <a:rPr lang="en-US" altLang="en-US" sz="1600" b="1" dirty="0">
+                <a:solidFill>
+                  <a:schemeClr val="bg2"/>
+                </a:solidFill>
+                <a:latin typeface="Roboto" panose="020B0604020202020204" charset="0"/>
+                <a:ea typeface="Roboto" panose="020B0604020202020204" charset="0"/>
+              </a:rPr>
+              <a:t>Example,</a:t>
+            </a:r>
+          </a:p>
+          <a:p>
+            <a:r>
+              <a:rPr lang="en-US" altLang="en-US" sz="1600" dirty="0">
+                <a:solidFill>
+                  <a:schemeClr val="tx2"/>
+                </a:solidFill>
+                <a:latin typeface="Roboto" panose="020B0604020202020204" charset="0"/>
+                <a:ea typeface="Roboto" panose="020B0604020202020204" charset="0"/>
+              </a:rPr>
+              <a:t>function </a:t>
+            </a:r>
+            <a:r>
+              <a:rPr lang="en-US" altLang="en-US" sz="1600" dirty="0" err="1">
+                <a:solidFill>
+                  <a:schemeClr val="tx2"/>
+                </a:solidFill>
+                <a:latin typeface="Roboto" panose="020B0604020202020204" charset="0"/>
+                <a:ea typeface="Roboto" panose="020B0604020202020204" charset="0"/>
+              </a:rPr>
+              <a:t>dump_props</a:t>
+            </a:r>
+            <a:r>
+              <a:rPr lang="en-US" altLang="en-US" sz="1600" dirty="0">
+                <a:solidFill>
+                  <a:schemeClr val="tx2"/>
+                </a:solidFill>
+                <a:latin typeface="Roboto" panose="020B0604020202020204" charset="0"/>
+                <a:ea typeface="Roboto" panose="020B0604020202020204" charset="0"/>
+              </a:rPr>
+              <a:t>(obj, </a:t>
+            </a:r>
+            <a:r>
+              <a:rPr lang="en-US" altLang="en-US" sz="1600" dirty="0" err="1">
+                <a:solidFill>
+                  <a:schemeClr val="tx2"/>
+                </a:solidFill>
+                <a:latin typeface="Roboto" panose="020B0604020202020204" charset="0"/>
+                <a:ea typeface="Roboto" panose="020B0604020202020204" charset="0"/>
+              </a:rPr>
+              <a:t>obj_name</a:t>
+            </a:r>
+            <a:r>
+              <a:rPr lang="en-US" altLang="en-US" sz="1600" dirty="0">
+                <a:solidFill>
+                  <a:schemeClr val="tx2"/>
+                </a:solidFill>
+                <a:latin typeface="Roboto" panose="020B0604020202020204" charset="0"/>
+                <a:ea typeface="Roboto" panose="020B0604020202020204" charset="0"/>
+              </a:rPr>
+              <a:t>) {</a:t>
+            </a:r>
+          </a:p>
+          <a:p>
+            <a:r>
+              <a:rPr lang="en-US" altLang="en-US" sz="1600" dirty="0">
+                <a:solidFill>
+                  <a:schemeClr val="tx2"/>
+                </a:solidFill>
+                <a:latin typeface="Roboto" panose="020B0604020202020204" charset="0"/>
+                <a:ea typeface="Roboto" panose="020B0604020202020204" charset="0"/>
+              </a:rPr>
+              <a:t>        var result = ""; </a:t>
+            </a:r>
+          </a:p>
+          <a:p>
+            <a:r>
+              <a:rPr lang="en-US" altLang="en-US" sz="1600" dirty="0">
+                <a:solidFill>
+                  <a:schemeClr val="tx2"/>
+                </a:solidFill>
+                <a:latin typeface="Roboto" panose="020B0604020202020204" charset="0"/>
+                <a:ea typeface="Roboto" panose="020B0604020202020204" charset="0"/>
+              </a:rPr>
+              <a:t>        for (var </a:t>
+            </a:r>
+            <a:r>
+              <a:rPr lang="en-US" altLang="en-US" sz="1600" dirty="0" err="1">
+                <a:solidFill>
+                  <a:schemeClr val="tx2"/>
+                </a:solidFill>
+                <a:latin typeface="Roboto" panose="020B0604020202020204" charset="0"/>
+                <a:ea typeface="Roboto" panose="020B0604020202020204" charset="0"/>
+              </a:rPr>
+              <a:t>i</a:t>
+            </a:r>
+            <a:r>
+              <a:rPr lang="en-US" altLang="en-US" sz="1600" dirty="0">
+                <a:solidFill>
+                  <a:schemeClr val="tx2"/>
+                </a:solidFill>
+                <a:latin typeface="Roboto" panose="020B0604020202020204" charset="0"/>
+                <a:ea typeface="Roboto" panose="020B0604020202020204" charset="0"/>
+              </a:rPr>
+              <a:t> in obj) { </a:t>
+            </a:r>
+          </a:p>
+          <a:p>
+            <a:r>
+              <a:rPr lang="en-US" altLang="en-US" sz="1600" dirty="0">
+                <a:solidFill>
+                  <a:schemeClr val="tx2"/>
+                </a:solidFill>
+                <a:latin typeface="Roboto" panose="020B0604020202020204" charset="0"/>
+                <a:ea typeface="Roboto" panose="020B0604020202020204" charset="0"/>
+              </a:rPr>
+              <a:t>                result += </a:t>
+            </a:r>
+            <a:r>
+              <a:rPr lang="en-US" altLang="en-US" sz="1600" dirty="0" err="1">
+                <a:solidFill>
+                  <a:schemeClr val="tx2"/>
+                </a:solidFill>
+                <a:latin typeface="Roboto" panose="020B0604020202020204" charset="0"/>
+                <a:ea typeface="Roboto" panose="020B0604020202020204" charset="0"/>
+              </a:rPr>
+              <a:t>obj_name</a:t>
+            </a:r>
+            <a:r>
+              <a:rPr lang="en-US" altLang="en-US" sz="1600" dirty="0">
+                <a:solidFill>
+                  <a:schemeClr val="tx2"/>
+                </a:solidFill>
+                <a:latin typeface="Roboto" panose="020B0604020202020204" charset="0"/>
+                <a:ea typeface="Roboto" panose="020B0604020202020204" charset="0"/>
+              </a:rPr>
+              <a:t> + "." + </a:t>
+            </a:r>
+            <a:r>
+              <a:rPr lang="en-US" altLang="en-US" sz="1600" dirty="0" err="1">
+                <a:solidFill>
+                  <a:schemeClr val="tx2"/>
+                </a:solidFill>
+                <a:latin typeface="Roboto" panose="020B0604020202020204" charset="0"/>
+                <a:ea typeface="Roboto" panose="020B0604020202020204" charset="0"/>
+              </a:rPr>
+              <a:t>i</a:t>
+            </a:r>
+            <a:r>
+              <a:rPr lang="en-US" altLang="en-US" sz="1600" dirty="0">
+                <a:solidFill>
+                  <a:schemeClr val="tx2"/>
+                </a:solidFill>
+                <a:latin typeface="Roboto" panose="020B0604020202020204" charset="0"/>
+                <a:ea typeface="Roboto" panose="020B0604020202020204" charset="0"/>
+              </a:rPr>
+              <a:t> + " = " + obj[</a:t>
+            </a:r>
+            <a:r>
+              <a:rPr lang="en-US" altLang="en-US" sz="1600" dirty="0" err="1">
+                <a:solidFill>
+                  <a:schemeClr val="tx2"/>
+                </a:solidFill>
+                <a:latin typeface="Roboto" panose="020B0604020202020204" charset="0"/>
+                <a:ea typeface="Roboto" panose="020B0604020202020204" charset="0"/>
+              </a:rPr>
+              <a:t>i</a:t>
+            </a:r>
+            <a:r>
+              <a:rPr lang="en-US" altLang="en-US" sz="1600" dirty="0">
+                <a:solidFill>
+                  <a:schemeClr val="tx2"/>
+                </a:solidFill>
+                <a:latin typeface="Roboto" panose="020B0604020202020204" charset="0"/>
+                <a:ea typeface="Roboto" panose="020B0604020202020204" charset="0"/>
+              </a:rPr>
+              <a:t>] + "&lt;</a:t>
+            </a:r>
+            <a:r>
+              <a:rPr lang="en-US" altLang="en-US" sz="1600" dirty="0" err="1">
+                <a:solidFill>
+                  <a:schemeClr val="tx2"/>
+                </a:solidFill>
+                <a:latin typeface="Roboto" panose="020B0604020202020204" charset="0"/>
+                <a:ea typeface="Roboto" panose="020B0604020202020204" charset="0"/>
+              </a:rPr>
+              <a:t>br</a:t>
+            </a:r>
+            <a:r>
+              <a:rPr lang="en-US" altLang="en-US" sz="1600" dirty="0">
+                <a:solidFill>
+                  <a:schemeClr val="tx2"/>
+                </a:solidFill>
+                <a:latin typeface="Roboto" panose="020B0604020202020204" charset="0"/>
+                <a:ea typeface="Roboto" panose="020B0604020202020204" charset="0"/>
+              </a:rPr>
+              <a:t>&gt;";</a:t>
+            </a:r>
+          </a:p>
+          <a:p>
+            <a:r>
+              <a:rPr lang="en-US" altLang="en-US" sz="1600" dirty="0">
+                <a:solidFill>
+                  <a:schemeClr val="tx2"/>
+                </a:solidFill>
+                <a:latin typeface="Roboto" panose="020B0604020202020204" charset="0"/>
+                <a:ea typeface="Roboto" panose="020B0604020202020204" charset="0"/>
+              </a:rPr>
+              <a:t>        } </a:t>
+            </a:r>
+          </a:p>
+          <a:p>
+            <a:r>
+              <a:rPr lang="en-US" altLang="en-US" sz="1600" dirty="0">
+                <a:solidFill>
+                  <a:schemeClr val="tx2"/>
+                </a:solidFill>
+                <a:latin typeface="Roboto" panose="020B0604020202020204" charset="0"/>
+                <a:ea typeface="Roboto" panose="020B0604020202020204" charset="0"/>
+              </a:rPr>
+              <a:t>        result += "&lt;</a:t>
+            </a:r>
+            <a:r>
+              <a:rPr lang="en-US" altLang="en-US" sz="1600" dirty="0" err="1">
+                <a:solidFill>
+                  <a:schemeClr val="tx2"/>
+                </a:solidFill>
+                <a:latin typeface="Roboto" panose="020B0604020202020204" charset="0"/>
+                <a:ea typeface="Roboto" panose="020B0604020202020204" charset="0"/>
+              </a:rPr>
+              <a:t>hr</a:t>
+            </a:r>
+            <a:r>
+              <a:rPr lang="en-US" altLang="en-US" sz="1600" dirty="0">
+                <a:solidFill>
+                  <a:schemeClr val="tx2"/>
+                </a:solidFill>
+                <a:latin typeface="Roboto" panose="020B0604020202020204" charset="0"/>
+                <a:ea typeface="Roboto" panose="020B0604020202020204" charset="0"/>
+              </a:rPr>
+              <a:t>&gt;"; </a:t>
+            </a:r>
+          </a:p>
+          <a:p>
+            <a:r>
+              <a:rPr lang="en-US" altLang="en-US" sz="1600" dirty="0">
+                <a:solidFill>
+                  <a:schemeClr val="tx2"/>
+                </a:solidFill>
+                <a:latin typeface="Roboto" panose="020B0604020202020204" charset="0"/>
+                <a:ea typeface="Roboto" panose="020B0604020202020204" charset="0"/>
+              </a:rPr>
+              <a:t>        return result; </a:t>
+            </a:r>
+          </a:p>
+          <a:p>
+            <a:r>
+              <a:rPr lang="en-US" altLang="en-US" sz="1600" dirty="0">
+                <a:solidFill>
+                  <a:schemeClr val="tx2"/>
+                </a:solidFill>
+                <a:latin typeface="Roboto" panose="020B0604020202020204" charset="0"/>
+                <a:ea typeface="Roboto" panose="020B0604020202020204" charset="0"/>
+              </a:rPr>
+              <a:t>} </a:t>
+            </a:r>
+          </a:p>
+          <a:p>
+            <a:endParaRPr lang="en-US" altLang="en-US" sz="1800" dirty="0">
+              <a:solidFill>
+                <a:schemeClr val="tx2"/>
+              </a:solidFill>
+              <a:latin typeface="Roboto" panose="020B0604020202020204" charset="0"/>
+              <a:ea typeface="Roboto" panose="020B0604020202020204" charset="0"/>
+            </a:endParaRPr>
+          </a:p>
+          <a:p>
+            <a:endParaRPr lang="en-US" altLang="en-US" sz="1800" dirty="0">
+              <a:solidFill>
+                <a:schemeClr val="tx2"/>
+              </a:solidFill>
+              <a:latin typeface="Roboto" panose="020B0604020202020204" charset="0"/>
+              <a:ea typeface="Roboto" panose="020B0604020202020204" charset="0"/>
+            </a:endParaRPr>
+          </a:p>
+          <a:p>
+            <a:endParaRPr lang="en-US" altLang="en-US" sz="1800" dirty="0">
+              <a:solidFill>
+                <a:schemeClr val="tx2"/>
+              </a:solidFill>
+              <a:latin typeface="Roboto" panose="020B0604020202020204" charset="0"/>
+              <a:ea typeface="Roboto" panose="020B0604020202020204" charset="0"/>
+            </a:endParaRPr>
+          </a:p>
+          <a:p>
+            <a:endParaRPr lang="en-US" dirty="0"/>
+          </a:p>
+        </p:txBody>
+      </p:sp>
+    </p:spTree>
+    <p:extLst>
+      <p:ext uri="{BB962C8B-B14F-4D97-AF65-F5344CB8AC3E}">
+        <p14:creationId xmlns:p14="http://schemas.microsoft.com/office/powerpoint/2010/main" val="3903925706"/>
+      </p:ext>
+    </p:extLst>
+  </p:cSld>
+  <p:clrMapOvr>
+    <a:masterClrMapping/>
+  </p:clrMapOvr>
+</p:sld>
+</file>
+
+<file path=ppt/slides/slide17.xml><?xml version="1.0" encoding="utf-8"?>
+<p:sld xmlns:a="http://schemas.openxmlformats.org/drawingml/2006/main" xmlns:r="http://schemas.openxmlformats.org/officeDocument/2006/relationships" xmlns:p="http://schemas.openxmlformats.org/presentationml/2006/main">
+  <p:cSld>
+    <p:spTree>
+      <p:nvGrpSpPr>
+        <p:cNvPr id="1" name=""/>
+        <p:cNvGrpSpPr/>
+        <p:nvPr/>
+      </p:nvGrpSpPr>
+      <p:grpSpPr>
+        <a:xfrm>
+          <a:off x="0" y="0"/>
+          <a:ext cx="0" cy="0"/>
+          <a:chOff x="0" y="0"/>
+          <a:chExt cx="0" cy="0"/>
+        </a:xfrm>
+      </p:grpSpPr>
+      <p:sp>
+        <p:nvSpPr>
+          <p:cNvPr id="2" name="Title 1">
+            <a:extLst>
+              <a:ext uri="{FF2B5EF4-FFF2-40B4-BE49-F238E27FC236}">
+                <a16:creationId xmlns:a16="http://schemas.microsoft.com/office/drawing/2014/main" id="{F78FF827-39C5-4603-B016-F70D466DC2F2}"/>
+              </a:ext>
+            </a:extLst>
+          </p:cNvPr>
+          <p:cNvSpPr>
+            <a:spLocks noGrp="1"/>
+          </p:cNvSpPr>
+          <p:nvPr>
+            <p:ph type="title"/>
+          </p:nvPr>
+        </p:nvSpPr>
+        <p:spPr/>
+        <p:txBody>
+          <a:bodyPr/>
+          <a:lstStyle/>
+          <a:p>
+            <a:r>
+              <a:rPr lang="en-US" dirty="0"/>
+              <a:t>for each…in Statement</a:t>
+            </a:r>
+          </a:p>
+        </p:txBody>
+      </p:sp>
+      <p:sp>
+        <p:nvSpPr>
+          <p:cNvPr id="5" name="TextBox 4">
+            <a:extLst>
+              <a:ext uri="{FF2B5EF4-FFF2-40B4-BE49-F238E27FC236}">
+                <a16:creationId xmlns:a16="http://schemas.microsoft.com/office/drawing/2014/main" id="{70E2F0E8-FE73-4E92-BE82-7B892DA6158C}"/>
+              </a:ext>
+            </a:extLst>
+          </p:cNvPr>
+          <p:cNvSpPr txBox="1"/>
+          <p:nvPr/>
+        </p:nvSpPr>
+        <p:spPr>
+          <a:xfrm>
+            <a:off x="471900" y="1847850"/>
+            <a:ext cx="8453025" cy="3077766"/>
+          </a:xfrm>
+          <a:prstGeom prst="rect">
+            <a:avLst/>
+          </a:prstGeom>
+          <a:noFill/>
+        </p:spPr>
+        <p:txBody>
+          <a:bodyPr wrap="square" rtlCol="0">
+            <a:spAutoFit/>
+          </a:bodyPr>
+          <a:lstStyle/>
+          <a:p>
+            <a:r>
+              <a:rPr lang="en-US" altLang="en-US" sz="1800" dirty="0">
+                <a:solidFill>
+                  <a:schemeClr val="tx2"/>
+                </a:solidFill>
+                <a:latin typeface="Roboto" panose="020B0604020202020204" charset="0"/>
+                <a:ea typeface="Roboto" panose="020B0604020202020204" charset="0"/>
+              </a:rPr>
+              <a:t>var sum = 0;</a:t>
+            </a:r>
+          </a:p>
+          <a:p>
+            <a:r>
+              <a:rPr lang="en-US" altLang="en-US" sz="1800" dirty="0">
+                <a:solidFill>
+                  <a:schemeClr val="tx2"/>
+                </a:solidFill>
+                <a:latin typeface="Roboto" panose="020B0604020202020204" charset="0"/>
+                <a:ea typeface="Roboto" panose="020B0604020202020204" charset="0"/>
+              </a:rPr>
+              <a:t>var obj = {</a:t>
+            </a:r>
+          </a:p>
+          <a:p>
+            <a:r>
+              <a:rPr lang="en-US" altLang="en-US" sz="1800" dirty="0">
+                <a:solidFill>
+                  <a:schemeClr val="tx2"/>
+                </a:solidFill>
+                <a:latin typeface="Roboto" panose="020B0604020202020204" charset="0"/>
+                <a:ea typeface="Roboto" panose="020B0604020202020204" charset="0"/>
+              </a:rPr>
+              <a:t>	prop1: 5, </a:t>
+            </a:r>
+          </a:p>
+          <a:p>
+            <a:r>
+              <a:rPr lang="en-US" altLang="en-US" sz="1800" dirty="0">
+                <a:solidFill>
+                  <a:schemeClr val="tx2"/>
+                </a:solidFill>
+                <a:latin typeface="Roboto" panose="020B0604020202020204" charset="0"/>
+                <a:ea typeface="Roboto" panose="020B0604020202020204" charset="0"/>
+              </a:rPr>
+              <a:t>	prop2: 13, </a:t>
+            </a:r>
+          </a:p>
+          <a:p>
+            <a:r>
+              <a:rPr lang="en-US" altLang="en-US" sz="1800" dirty="0">
+                <a:solidFill>
+                  <a:schemeClr val="tx2"/>
+                </a:solidFill>
+                <a:latin typeface="Roboto" panose="020B0604020202020204" charset="0"/>
+                <a:ea typeface="Roboto" panose="020B0604020202020204" charset="0"/>
+              </a:rPr>
+              <a:t>	prop3: 8</a:t>
+            </a:r>
+          </a:p>
+          <a:p>
+            <a:r>
+              <a:rPr lang="en-US" altLang="en-US" sz="1800" dirty="0">
+                <a:solidFill>
+                  <a:schemeClr val="tx2"/>
+                </a:solidFill>
+                <a:latin typeface="Roboto" panose="020B0604020202020204" charset="0"/>
+                <a:ea typeface="Roboto" panose="020B0604020202020204" charset="0"/>
+              </a:rPr>
+              <a:t>};</a:t>
+            </a:r>
+          </a:p>
+          <a:p>
+            <a:r>
+              <a:rPr lang="en-US" altLang="en-US" sz="1800" dirty="0">
+                <a:solidFill>
+                  <a:schemeClr val="tx2"/>
+                </a:solidFill>
+                <a:latin typeface="Roboto" panose="020B0604020202020204" charset="0"/>
+                <a:ea typeface="Roboto" panose="020B0604020202020204" charset="0"/>
+              </a:rPr>
+              <a:t> for each (var item in obj) {</a:t>
+            </a:r>
+          </a:p>
+          <a:p>
+            <a:r>
+              <a:rPr lang="en-US" altLang="en-US" sz="1800" dirty="0">
+                <a:solidFill>
+                  <a:schemeClr val="tx2"/>
+                </a:solidFill>
+                <a:latin typeface="Roboto" panose="020B0604020202020204" charset="0"/>
+                <a:ea typeface="Roboto" panose="020B0604020202020204" charset="0"/>
+              </a:rPr>
+              <a:t> 	sum += item;</a:t>
+            </a:r>
+          </a:p>
+          <a:p>
+            <a:r>
+              <a:rPr lang="en-US" altLang="en-US" sz="1800" dirty="0">
+                <a:solidFill>
+                  <a:schemeClr val="tx2"/>
+                </a:solidFill>
+                <a:latin typeface="Roboto" panose="020B0604020202020204" charset="0"/>
+                <a:ea typeface="Roboto" panose="020B0604020202020204" charset="0"/>
+              </a:rPr>
+              <a:t> } </a:t>
+            </a:r>
+          </a:p>
+          <a:p>
+            <a:r>
+              <a:rPr lang="en-US" altLang="en-US" sz="1800" dirty="0">
+                <a:solidFill>
+                  <a:schemeClr val="tx2"/>
+                </a:solidFill>
+                <a:latin typeface="Roboto" panose="020B0604020202020204" charset="0"/>
+                <a:ea typeface="Roboto" panose="020B0604020202020204" charset="0"/>
+              </a:rPr>
+              <a:t>print(sum); </a:t>
+            </a:r>
+            <a:r>
+              <a:rPr lang="en-US" altLang="en-US" sz="1800" dirty="0">
+                <a:solidFill>
+                  <a:schemeClr val="tx1"/>
+                </a:solidFill>
+                <a:latin typeface="Roboto" panose="020B0604020202020204" charset="0"/>
+                <a:ea typeface="Roboto" panose="020B0604020202020204" charset="0"/>
+              </a:rPr>
+              <a:t>// prints "26", which is 5+13+8 </a:t>
+            </a:r>
+          </a:p>
+          <a:p>
+            <a:endParaRPr lang="en-US" dirty="0"/>
+          </a:p>
+        </p:txBody>
+      </p:sp>
+    </p:spTree>
+    <p:extLst>
+      <p:ext uri="{BB962C8B-B14F-4D97-AF65-F5344CB8AC3E}">
+        <p14:creationId xmlns:p14="http://schemas.microsoft.com/office/powerpoint/2010/main" val="2321243745"/>
+      </p:ext>
+    </p:extLst>
+  </p:cSld>
+  <p:clrMapOvr>
+    <a:masterClrMapping/>
+  </p:clrMapOvr>
+</p:sld>
+</file>
+
+<file path=ppt/slides/slide18.xml><?xml version="1.0" encoding="utf-8"?>
+<p:sld xmlns:a="http://schemas.openxmlformats.org/drawingml/2006/main" xmlns:r="http://schemas.openxmlformats.org/officeDocument/2006/relationships" xmlns:p="http://schemas.openxmlformats.org/presentationml/2006/main">
+  <p:cSld>
+    <p:spTree>
+      <p:nvGrpSpPr>
+        <p:cNvPr id="1" name=""/>
+        <p:cNvGrpSpPr/>
+        <p:nvPr/>
+      </p:nvGrpSpPr>
+      <p:grpSpPr>
+        <a:xfrm>
+          <a:off x="0" y="0"/>
+          <a:ext cx="0" cy="0"/>
+          <a:chOff x="0" y="0"/>
+          <a:chExt cx="0" cy="0"/>
+        </a:xfrm>
+      </p:grpSpPr>
+      <p:sp>
+        <p:nvSpPr>
+          <p:cNvPr id="2" name="Title 1">
+            <a:extLst>
+              <a:ext uri="{FF2B5EF4-FFF2-40B4-BE49-F238E27FC236}">
+                <a16:creationId xmlns:a16="http://schemas.microsoft.com/office/drawing/2014/main" id="{D25ADD56-61B9-48D9-B547-7605D8646627}"/>
+              </a:ext>
+            </a:extLst>
+          </p:cNvPr>
+          <p:cNvSpPr>
+            <a:spLocks noGrp="1"/>
+          </p:cNvSpPr>
+          <p:nvPr>
+            <p:ph type="title"/>
+          </p:nvPr>
+        </p:nvSpPr>
+        <p:spPr/>
+        <p:txBody>
+          <a:bodyPr/>
+          <a:lstStyle/>
+          <a:p>
+            <a:r>
+              <a:rPr lang="en-US" dirty="0"/>
+              <a:t>Comments</a:t>
+            </a:r>
+          </a:p>
+        </p:txBody>
+      </p:sp>
+      <p:sp>
+        <p:nvSpPr>
+          <p:cNvPr id="5" name="TextBox 4">
+            <a:extLst>
+              <a:ext uri="{FF2B5EF4-FFF2-40B4-BE49-F238E27FC236}">
+                <a16:creationId xmlns:a16="http://schemas.microsoft.com/office/drawing/2014/main" id="{8CC5991E-722A-4A20-96FA-E6AE3099B551}"/>
+              </a:ext>
+            </a:extLst>
+          </p:cNvPr>
+          <p:cNvSpPr txBox="1"/>
+          <p:nvPr/>
+        </p:nvSpPr>
+        <p:spPr>
+          <a:xfrm>
+            <a:off x="471900" y="2124075"/>
+            <a:ext cx="8310150" cy="1754326"/>
+          </a:xfrm>
+          <a:prstGeom prst="rect">
+            <a:avLst/>
+          </a:prstGeom>
+          <a:noFill/>
+        </p:spPr>
+        <p:txBody>
+          <a:bodyPr wrap="square" rtlCol="0">
+            <a:spAutoFit/>
+          </a:bodyPr>
+          <a:lstStyle/>
+          <a:p>
+            <a:pPr lvl="0" eaLnBrk="0" fontAlgn="base" hangingPunct="0">
+              <a:spcBef>
+                <a:spcPct val="0"/>
+              </a:spcBef>
+              <a:spcAft>
+                <a:spcPct val="0"/>
+              </a:spcAft>
+              <a:buClrTx/>
+            </a:pPr>
+            <a:endParaRPr lang="en-US" altLang="en-US" sz="1800" dirty="0">
+              <a:solidFill>
+                <a:schemeClr val="tx2"/>
+              </a:solidFill>
+              <a:latin typeface="Roboto" panose="020B0604020202020204" charset="0"/>
+              <a:ea typeface="Roboto" panose="020B0604020202020204" charset="0"/>
+            </a:endParaRPr>
+          </a:p>
+          <a:p>
+            <a:pPr lvl="0" eaLnBrk="0" fontAlgn="base" hangingPunct="0">
+              <a:spcBef>
+                <a:spcPct val="0"/>
+              </a:spcBef>
+              <a:spcAft>
+                <a:spcPct val="0"/>
+              </a:spcAft>
+              <a:buClrTx/>
+            </a:pPr>
+            <a:r>
+              <a:rPr lang="en-US" altLang="en-US" sz="1800" dirty="0">
+                <a:solidFill>
+                  <a:schemeClr val="tx2"/>
+                </a:solidFill>
+                <a:latin typeface="Roboto" panose="020B0604020202020204" charset="0"/>
+                <a:ea typeface="Roboto" panose="020B0604020202020204" charset="0"/>
+              </a:rPr>
+              <a:t>// This is a single-line comment. </a:t>
+            </a:r>
+          </a:p>
+          <a:p>
+            <a:pPr lvl="0" eaLnBrk="0" fontAlgn="base" hangingPunct="0">
+              <a:spcBef>
+                <a:spcPct val="0"/>
+              </a:spcBef>
+              <a:spcAft>
+                <a:spcPct val="0"/>
+              </a:spcAft>
+              <a:buClrTx/>
+            </a:pPr>
+            <a:endParaRPr lang="en-US" altLang="en-US" sz="1800" dirty="0">
+              <a:solidFill>
+                <a:schemeClr val="tx2"/>
+              </a:solidFill>
+              <a:latin typeface="Roboto" panose="020B0604020202020204" charset="0"/>
+              <a:ea typeface="Roboto" panose="020B0604020202020204" charset="0"/>
+            </a:endParaRPr>
+          </a:p>
+          <a:p>
+            <a:pPr lvl="0" eaLnBrk="0" fontAlgn="base" hangingPunct="0">
+              <a:spcBef>
+                <a:spcPct val="0"/>
+              </a:spcBef>
+              <a:spcAft>
+                <a:spcPct val="0"/>
+              </a:spcAft>
+              <a:buClrTx/>
+            </a:pPr>
+            <a:endParaRPr lang="en-US" altLang="en-US" sz="1800" dirty="0">
+              <a:solidFill>
+                <a:schemeClr val="tx2"/>
+              </a:solidFill>
+              <a:latin typeface="Roboto" panose="020B0604020202020204" charset="0"/>
+              <a:ea typeface="Roboto" panose="020B0604020202020204" charset="0"/>
+            </a:endParaRPr>
+          </a:p>
+          <a:p>
+            <a:pPr lvl="0" eaLnBrk="0" fontAlgn="base" hangingPunct="0">
+              <a:spcBef>
+                <a:spcPct val="0"/>
+              </a:spcBef>
+              <a:spcAft>
+                <a:spcPct val="0"/>
+              </a:spcAft>
+              <a:buClrTx/>
+            </a:pPr>
+            <a:r>
+              <a:rPr lang="en-US" altLang="en-US" sz="1800" dirty="0">
+                <a:solidFill>
+                  <a:schemeClr val="tx2"/>
+                </a:solidFill>
+                <a:latin typeface="Roboto" panose="020B0604020202020204" charset="0"/>
+                <a:ea typeface="Roboto" panose="020B0604020202020204" charset="0"/>
+              </a:rPr>
+              <a:t>/*  This is a multiple-line comment. It can be of any length, and you can put whatever you want here.  */ </a:t>
+            </a:r>
+          </a:p>
+        </p:txBody>
+      </p:sp>
+    </p:spTree>
+    <p:extLst>
+      <p:ext uri="{BB962C8B-B14F-4D97-AF65-F5344CB8AC3E}">
+        <p14:creationId xmlns:p14="http://schemas.microsoft.com/office/powerpoint/2010/main" val="1855201412"/>
+      </p:ext>
+    </p:extLst>
+  </p:cSld>
+  <p:clrMapOvr>
+    <a:masterClrMapping/>
+  </p:clrMapOvr>
+</p:sld>
+</file>
+
+<file path=ppt/slides/slide19.xml><?xml version="1.0" encoding="utf-8"?>
+<p:sld xmlns:a="http://schemas.openxmlformats.org/drawingml/2006/main" xmlns:r="http://schemas.openxmlformats.org/officeDocument/2006/relationships" xmlns:p="http://schemas.openxmlformats.org/presentationml/2006/main">
+  <p:cSld>
+    <p:spTree>
+      <p:nvGrpSpPr>
+        <p:cNvPr id="1" name=""/>
+        <p:cNvGrpSpPr/>
+        <p:nvPr/>
+      </p:nvGrpSpPr>
+      <p:grpSpPr>
+        <a:xfrm>
+          <a:off x="0" y="0"/>
+          <a:ext cx="0" cy="0"/>
+          <a:chOff x="0" y="0"/>
+          <a:chExt cx="0" cy="0"/>
+        </a:xfrm>
+      </p:grpSpPr>
+      <p:sp>
+        <p:nvSpPr>
+          <p:cNvPr id="2" name="Title 1">
+            <a:extLst>
+              <a:ext uri="{FF2B5EF4-FFF2-40B4-BE49-F238E27FC236}">
                 <a16:creationId xmlns:a16="http://schemas.microsoft.com/office/drawing/2014/main" id="{FE986348-2E6B-4B83-90C9-7B2144299D98}"/>
               </a:ext>
             </a:extLst>
@@ -6495,173 +9247,6 @@
         <p14:creationId xmlns:p14="http://schemas.microsoft.com/office/powerpoint/2010/main" val="1579018120"/>
       </p:ext>
     </p:extLst>
-  </p:cSld>
-  <p:clrMapOvr>
-    <a:masterClrMapping/>
-  </p:clrMapOvr>
-</p:sld>
-</file>
-
-<file path=ppt/slides/slide11.xml><?xml version="1.0" encoding="utf-8"?>
-<p:sld xmlns:a="http://schemas.openxmlformats.org/drawingml/2006/main" xmlns:r="http://schemas.openxmlformats.org/officeDocument/2006/relationships" xmlns:p="http://schemas.openxmlformats.org/presentationml/2006/main">
-  <p:cSld>
-    <p:spTree>
-      <p:nvGrpSpPr>
-        <p:cNvPr id="1" name="Shape 174"/>
-        <p:cNvGrpSpPr/>
-        <p:nvPr/>
-      </p:nvGrpSpPr>
-      <p:grpSpPr>
-        <a:xfrm>
-          <a:off x="0" y="0"/>
-          <a:ext cx="0" cy="0"/>
-          <a:chOff x="0" y="0"/>
-          <a:chExt cx="0" cy="0"/>
-        </a:xfrm>
-      </p:grpSpPr>
-      <p:sp>
-        <p:nvSpPr>
-          <p:cNvPr id="175" name="Google Shape;175;p31"/>
-          <p:cNvSpPr txBox="1">
-            <a:spLocks noGrp="1"/>
-          </p:cNvSpPr>
-          <p:nvPr>
-            <p:ph type="title"/>
-          </p:nvPr>
-        </p:nvSpPr>
-        <p:spPr>
-          <a:xfrm>
-            <a:off x="471900" y="738725"/>
-            <a:ext cx="8222100" cy="767700"/>
-          </a:xfrm>
-          <a:prstGeom prst="rect">
-            <a:avLst/>
-          </a:prstGeom>
-        </p:spPr>
-        <p:txBody>
-          <a:bodyPr spcFirstLastPara="1" wrap="square" lIns="91425" tIns="91425" rIns="91425" bIns="91425" anchor="b" anchorCtr="0">
-            <a:noAutofit/>
-          </a:bodyPr>
-          <a:lstStyle/>
-          <a:p>
-            <a:pPr marL="0" lvl="0" indent="0" algn="l" rtl="0">
-              <a:spcBef>
-                <a:spcPts val="0"/>
-              </a:spcBef>
-              <a:spcAft>
-                <a:spcPts val="0"/>
-              </a:spcAft>
-              <a:buNone/>
-            </a:pPr>
-            <a:r>
-              <a:rPr lang="en-US" dirty="0"/>
-              <a:t>Thank you today</a:t>
-            </a:r>
-            <a:endParaRPr dirty="0"/>
-          </a:p>
-        </p:txBody>
-      </p:sp>
-      <p:sp>
-        <p:nvSpPr>
-          <p:cNvPr id="176" name="Google Shape;176;p31"/>
-          <p:cNvSpPr txBox="1">
-            <a:spLocks noGrp="1"/>
-          </p:cNvSpPr>
-          <p:nvPr>
-            <p:ph type="body" idx="1"/>
-          </p:nvPr>
-        </p:nvSpPr>
-        <p:spPr>
-          <a:xfrm>
-            <a:off x="471900" y="1919075"/>
-            <a:ext cx="8222100" cy="2710200"/>
-          </a:xfrm>
-          <a:prstGeom prst="rect">
-            <a:avLst/>
-          </a:prstGeom>
-        </p:spPr>
-        <p:txBody>
-          <a:bodyPr spcFirstLastPara="1" wrap="square" lIns="91425" tIns="91425" rIns="91425" bIns="91425" anchor="t" anchorCtr="0">
-            <a:noAutofit/>
-          </a:bodyPr>
-          <a:lstStyle/>
-          <a:p>
-            <a:pPr marL="0" lvl="0" indent="0" algn="l" rtl="0">
-              <a:spcBef>
-                <a:spcPts val="0"/>
-              </a:spcBef>
-              <a:spcAft>
-                <a:spcPts val="0"/>
-              </a:spcAft>
-              <a:buNone/>
-            </a:pPr>
-            <a:endParaRPr dirty="0"/>
-          </a:p>
-          <a:p>
-            <a:pPr marL="0" lvl="0" indent="0" algn="l" rtl="0">
-              <a:spcBef>
-                <a:spcPts val="1600"/>
-              </a:spcBef>
-              <a:spcAft>
-                <a:spcPts val="0"/>
-              </a:spcAft>
-              <a:buNone/>
-            </a:pPr>
-            <a:r>
-              <a:rPr lang="en" dirty="0"/>
-              <a:t> </a:t>
-            </a:r>
-            <a:endParaRPr dirty="0"/>
-          </a:p>
-          <a:p>
-            <a:pPr marL="0" lvl="0" indent="0" algn="l" rtl="0">
-              <a:spcBef>
-                <a:spcPts val="1600"/>
-              </a:spcBef>
-              <a:spcAft>
-                <a:spcPts val="1600"/>
-              </a:spcAft>
-              <a:buNone/>
-            </a:pPr>
-            <a:r>
-              <a:rPr lang="en" dirty="0"/>
-              <a:t> </a:t>
-            </a:r>
-            <a:endParaRPr dirty="0"/>
-          </a:p>
-        </p:txBody>
-      </p:sp>
-      <p:pic>
-        <p:nvPicPr>
-          <p:cNvPr id="3" name="Picture 2">
-            <a:extLst>
-              <a:ext uri="{FF2B5EF4-FFF2-40B4-BE49-F238E27FC236}">
-                <a16:creationId xmlns:a16="http://schemas.microsoft.com/office/drawing/2014/main" id="{D5740987-B884-4A8E-B052-CECE13E45610}"/>
-              </a:ext>
-            </a:extLst>
-          </p:cNvPr>
-          <p:cNvPicPr>
-            <a:picLocks noChangeAspect="1"/>
-          </p:cNvPicPr>
-          <p:nvPr/>
-        </p:nvPicPr>
-        <p:blipFill>
-          <a:blip r:embed="rId3"/>
-          <a:stretch>
-            <a:fillRect/>
-          </a:stretch>
-        </p:blipFill>
-        <p:spPr>
-          <a:xfrm>
-            <a:off x="3143250" y="2303027"/>
-            <a:ext cx="2857500" cy="2152650"/>
-          </a:xfrm>
-          <a:prstGeom prst="rect">
-            <a:avLst/>
-          </a:prstGeom>
-        </p:spPr>
-      </p:pic>
-    </p:spTree>
   </p:cSld>
   <p:clrMapOvr>
     <a:masterClrMapping/>
@@ -6794,6 +9379,1529 @@
         <p14:creationId xmlns:p14="http://schemas.microsoft.com/office/powerpoint/2010/main" val="2355437649"/>
       </p:ext>
     </p:extLst>
+  </p:cSld>
+  <p:clrMapOvr>
+    <a:masterClrMapping/>
+  </p:clrMapOvr>
+</p:sld>
+</file>
+
+<file path=ppt/slides/slide20.xml><?xml version="1.0" encoding="utf-8"?>
+<p:sld xmlns:a="http://schemas.openxmlformats.org/drawingml/2006/main" xmlns:r="http://schemas.openxmlformats.org/officeDocument/2006/relationships" xmlns:p="http://schemas.openxmlformats.org/presentationml/2006/main">
+  <p:cSld>
+    <p:spTree>
+      <p:nvGrpSpPr>
+        <p:cNvPr id="1" name=""/>
+        <p:cNvGrpSpPr/>
+        <p:nvPr/>
+      </p:nvGrpSpPr>
+      <p:grpSpPr>
+        <a:xfrm>
+          <a:off x="0" y="0"/>
+          <a:ext cx="0" cy="0"/>
+          <a:chOff x="0" y="0"/>
+          <a:chExt cx="0" cy="0"/>
+        </a:xfrm>
+      </p:grpSpPr>
+      <p:sp>
+        <p:nvSpPr>
+          <p:cNvPr id="2" name="Title 1">
+            <a:extLst>
+              <a:ext uri="{FF2B5EF4-FFF2-40B4-BE49-F238E27FC236}">
+                <a16:creationId xmlns:a16="http://schemas.microsoft.com/office/drawing/2014/main" id="{16755565-5BBF-4B87-923E-8B3C43CB026F}"/>
+              </a:ext>
+            </a:extLst>
+          </p:cNvPr>
+          <p:cNvSpPr>
+            <a:spLocks noGrp="1"/>
+          </p:cNvSpPr>
+          <p:nvPr>
+            <p:ph type="title"/>
+          </p:nvPr>
+        </p:nvSpPr>
+        <p:spPr/>
+        <p:txBody>
+          <a:bodyPr/>
+          <a:lstStyle/>
+          <a:p>
+            <a:r>
+              <a:rPr lang="en-US" dirty="0"/>
+              <a:t>throw Statement</a:t>
+            </a:r>
+          </a:p>
+        </p:txBody>
+      </p:sp>
+      <p:sp>
+        <p:nvSpPr>
+          <p:cNvPr id="5" name="TextBox 4">
+            <a:extLst>
+              <a:ext uri="{FF2B5EF4-FFF2-40B4-BE49-F238E27FC236}">
+                <a16:creationId xmlns:a16="http://schemas.microsoft.com/office/drawing/2014/main" id="{2248BEE7-D0C5-4356-B58B-8A5C38A48EF7}"/>
+              </a:ext>
+            </a:extLst>
+          </p:cNvPr>
+          <p:cNvSpPr txBox="1"/>
+          <p:nvPr/>
+        </p:nvSpPr>
+        <p:spPr>
+          <a:xfrm>
+            <a:off x="471900" y="2047875"/>
+            <a:ext cx="8405400" cy="2523768"/>
+          </a:xfrm>
+          <a:prstGeom prst="rect">
+            <a:avLst/>
+          </a:prstGeom>
+          <a:noFill/>
+        </p:spPr>
+        <p:txBody>
+          <a:bodyPr wrap="square" rtlCol="0">
+            <a:spAutoFit/>
+          </a:bodyPr>
+          <a:lstStyle/>
+          <a:p>
+            <a:r>
+              <a:rPr lang="en-US" altLang="en-US" sz="1800" dirty="0">
+                <a:solidFill>
+                  <a:schemeClr val="tx2"/>
+                </a:solidFill>
+                <a:latin typeface="Roboto" panose="020B0604020202020204" charset="0"/>
+                <a:ea typeface="Roboto" panose="020B0604020202020204" charset="0"/>
+              </a:rPr>
+              <a:t>throw "Error2"; </a:t>
+            </a:r>
+          </a:p>
+          <a:p>
+            <a:r>
+              <a:rPr lang="en-US" altLang="en-US" sz="1800" dirty="0">
+                <a:solidFill>
+                  <a:schemeClr val="tx2"/>
+                </a:solidFill>
+                <a:latin typeface="Roboto" panose="020B0604020202020204" charset="0"/>
+                <a:ea typeface="Roboto" panose="020B0604020202020204" charset="0"/>
+              </a:rPr>
+              <a:t>throw 42; </a:t>
+            </a:r>
+          </a:p>
+          <a:p>
+            <a:r>
+              <a:rPr lang="en-US" altLang="en-US" sz="1800" dirty="0">
+                <a:solidFill>
+                  <a:schemeClr val="tx2"/>
+                </a:solidFill>
+                <a:latin typeface="Roboto" panose="020B0604020202020204" charset="0"/>
+                <a:ea typeface="Roboto" panose="020B0604020202020204" charset="0"/>
+              </a:rPr>
+              <a:t>throw true; </a:t>
+            </a:r>
+          </a:p>
+          <a:p>
+            <a:r>
+              <a:rPr lang="en-US" altLang="en-US" sz="1800" dirty="0">
+                <a:solidFill>
+                  <a:schemeClr val="tx2"/>
+                </a:solidFill>
+                <a:latin typeface="Roboto" panose="020B0604020202020204" charset="0"/>
+                <a:ea typeface="Roboto" panose="020B0604020202020204" charset="0"/>
+              </a:rPr>
+              <a:t>throw {</a:t>
+            </a:r>
+          </a:p>
+          <a:p>
+            <a:r>
+              <a:rPr lang="en-US" altLang="en-US" sz="1800" dirty="0">
+                <a:solidFill>
+                  <a:schemeClr val="tx2"/>
+                </a:solidFill>
+                <a:latin typeface="Roboto" panose="020B0604020202020204" charset="0"/>
+                <a:ea typeface="Roboto" panose="020B0604020202020204" charset="0"/>
+              </a:rPr>
+              <a:t>	</a:t>
+            </a:r>
+            <a:r>
+              <a:rPr lang="en-US" altLang="en-US" sz="1800" dirty="0" err="1">
+                <a:solidFill>
+                  <a:schemeClr val="tx2"/>
+                </a:solidFill>
+                <a:latin typeface="Roboto" panose="020B0604020202020204" charset="0"/>
+                <a:ea typeface="Roboto" panose="020B0604020202020204" charset="0"/>
+              </a:rPr>
+              <a:t>toString</a:t>
+            </a:r>
+            <a:r>
+              <a:rPr lang="en-US" altLang="en-US" sz="1800" dirty="0">
+                <a:solidFill>
+                  <a:schemeClr val="tx2"/>
+                </a:solidFill>
+                <a:latin typeface="Roboto" panose="020B0604020202020204" charset="0"/>
+                <a:ea typeface="Roboto" panose="020B0604020202020204" charset="0"/>
+              </a:rPr>
+              <a:t>: function() { </a:t>
+            </a:r>
+          </a:p>
+          <a:p>
+            <a:r>
+              <a:rPr lang="en-US" altLang="en-US" sz="1800" dirty="0">
+                <a:solidFill>
+                  <a:schemeClr val="tx2"/>
+                </a:solidFill>
+                <a:latin typeface="Roboto" panose="020B0604020202020204" charset="0"/>
+                <a:ea typeface="Roboto" panose="020B0604020202020204" charset="0"/>
+              </a:rPr>
+              <a:t>	return "I'm an object!"; </a:t>
+            </a:r>
+          </a:p>
+          <a:p>
+            <a:r>
+              <a:rPr lang="en-US" altLang="en-US" sz="1800" dirty="0">
+                <a:solidFill>
+                  <a:schemeClr val="tx2"/>
+                </a:solidFill>
+                <a:latin typeface="Roboto" panose="020B0604020202020204" charset="0"/>
+                <a:ea typeface="Roboto" panose="020B0604020202020204" charset="0"/>
+              </a:rPr>
+              <a:t>  	} </a:t>
+            </a:r>
+          </a:p>
+          <a:p>
+            <a:r>
+              <a:rPr lang="en-US" altLang="en-US" sz="1800" dirty="0">
+                <a:solidFill>
+                  <a:schemeClr val="tx2"/>
+                </a:solidFill>
+                <a:latin typeface="Roboto" panose="020B0604020202020204" charset="0"/>
+                <a:ea typeface="Roboto" panose="020B0604020202020204" charset="0"/>
+              </a:rPr>
+              <a:t>}; </a:t>
+            </a:r>
+          </a:p>
+          <a:p>
+            <a:endParaRPr lang="en-US" dirty="0"/>
+          </a:p>
+        </p:txBody>
+      </p:sp>
+    </p:spTree>
+    <p:extLst>
+      <p:ext uri="{BB962C8B-B14F-4D97-AF65-F5344CB8AC3E}">
+        <p14:creationId xmlns:p14="http://schemas.microsoft.com/office/powerpoint/2010/main" val="742259342"/>
+      </p:ext>
+    </p:extLst>
+  </p:cSld>
+  <p:clrMapOvr>
+    <a:masterClrMapping/>
+  </p:clrMapOvr>
+</p:sld>
+</file>
+
+<file path=ppt/slides/slide21.xml><?xml version="1.0" encoding="utf-8"?>
+<p:sld xmlns:a="http://schemas.openxmlformats.org/drawingml/2006/main" xmlns:r="http://schemas.openxmlformats.org/officeDocument/2006/relationships" xmlns:p="http://schemas.openxmlformats.org/presentationml/2006/main">
+  <p:cSld>
+    <p:spTree>
+      <p:nvGrpSpPr>
+        <p:cNvPr id="1" name=""/>
+        <p:cNvGrpSpPr/>
+        <p:nvPr/>
+      </p:nvGrpSpPr>
+      <p:grpSpPr>
+        <a:xfrm>
+          <a:off x="0" y="0"/>
+          <a:ext cx="0" cy="0"/>
+          <a:chOff x="0" y="0"/>
+          <a:chExt cx="0" cy="0"/>
+        </a:xfrm>
+      </p:grpSpPr>
+      <p:sp>
+        <p:nvSpPr>
+          <p:cNvPr id="2" name="Title 1">
+            <a:extLst>
+              <a:ext uri="{FF2B5EF4-FFF2-40B4-BE49-F238E27FC236}">
+                <a16:creationId xmlns:a16="http://schemas.microsoft.com/office/drawing/2014/main" id="{3B74BAE1-C9A8-4099-B317-602B2C2B5C73}"/>
+              </a:ext>
+            </a:extLst>
+          </p:cNvPr>
+          <p:cNvSpPr>
+            <a:spLocks noGrp="1"/>
+          </p:cNvSpPr>
+          <p:nvPr>
+            <p:ph type="title"/>
+          </p:nvPr>
+        </p:nvSpPr>
+        <p:spPr/>
+        <p:txBody>
+          <a:bodyPr/>
+          <a:lstStyle/>
+          <a:p>
+            <a:r>
+              <a:rPr lang="en-US" b="1" dirty="0"/>
+              <a:t>The catch Block</a:t>
+            </a:r>
+            <a:endParaRPr lang="en-US" dirty="0"/>
+          </a:p>
+        </p:txBody>
+      </p:sp>
+      <p:sp>
+        <p:nvSpPr>
+          <p:cNvPr id="5" name="TextBox 4">
+            <a:extLst>
+              <a:ext uri="{FF2B5EF4-FFF2-40B4-BE49-F238E27FC236}">
+                <a16:creationId xmlns:a16="http://schemas.microsoft.com/office/drawing/2014/main" id="{A717585C-8DD3-4C67-B214-D6F9720131C6}"/>
+              </a:ext>
+            </a:extLst>
+          </p:cNvPr>
+          <p:cNvSpPr txBox="1"/>
+          <p:nvPr/>
+        </p:nvSpPr>
+        <p:spPr>
+          <a:xfrm>
+            <a:off x="471900" y="2110085"/>
+            <a:ext cx="7972425" cy="923330"/>
+          </a:xfrm>
+          <a:prstGeom prst="rect">
+            <a:avLst/>
+          </a:prstGeom>
+          <a:noFill/>
+        </p:spPr>
+        <p:txBody>
+          <a:bodyPr wrap="square" rtlCol="0">
+            <a:spAutoFit/>
+          </a:bodyPr>
+          <a:lstStyle/>
+          <a:p>
+            <a:pPr lvl="0" eaLnBrk="0" fontAlgn="base" hangingPunct="0">
+              <a:spcBef>
+                <a:spcPct val="0"/>
+              </a:spcBef>
+              <a:spcAft>
+                <a:spcPct val="0"/>
+              </a:spcAft>
+              <a:buClrTx/>
+            </a:pPr>
+            <a:r>
+              <a:rPr lang="en-US" altLang="en-US" sz="1800" dirty="0">
+                <a:solidFill>
+                  <a:schemeClr val="tx2"/>
+                </a:solidFill>
+                <a:latin typeface="Roboto" panose="020B0604020202020204" charset="0"/>
+                <a:ea typeface="Roboto" panose="020B0604020202020204" charset="0"/>
+              </a:rPr>
+              <a:t>catch (</a:t>
+            </a:r>
+            <a:r>
+              <a:rPr lang="en-US" altLang="en-US" sz="1800" dirty="0" err="1">
+                <a:solidFill>
+                  <a:schemeClr val="tx2"/>
+                </a:solidFill>
+                <a:latin typeface="Roboto" panose="020B0604020202020204" charset="0"/>
+                <a:ea typeface="Roboto" panose="020B0604020202020204" charset="0"/>
+              </a:rPr>
+              <a:t>catchID</a:t>
+            </a:r>
+            <a:r>
+              <a:rPr lang="en-US" altLang="en-US" sz="1800" dirty="0">
+                <a:solidFill>
+                  <a:schemeClr val="tx2"/>
+                </a:solidFill>
+                <a:latin typeface="Roboto" panose="020B0604020202020204" charset="0"/>
+                <a:ea typeface="Roboto" panose="020B0604020202020204" charset="0"/>
+              </a:rPr>
+              <a:t>) {</a:t>
+            </a:r>
+          </a:p>
+          <a:p>
+            <a:pPr lvl="0" eaLnBrk="0" fontAlgn="base" hangingPunct="0">
+              <a:spcBef>
+                <a:spcPct val="0"/>
+              </a:spcBef>
+              <a:spcAft>
+                <a:spcPct val="0"/>
+              </a:spcAft>
+              <a:buClrTx/>
+            </a:pPr>
+            <a:r>
+              <a:rPr lang="en-US" altLang="en-US" sz="1800" dirty="0">
+                <a:solidFill>
+                  <a:schemeClr val="tx2"/>
+                </a:solidFill>
+                <a:latin typeface="Roboto" panose="020B0604020202020204" charset="0"/>
+                <a:ea typeface="Roboto" panose="020B0604020202020204" charset="0"/>
+              </a:rPr>
+              <a:t> 	statements</a:t>
+            </a:r>
+          </a:p>
+          <a:p>
+            <a:pPr lvl="0" eaLnBrk="0" fontAlgn="base" hangingPunct="0">
+              <a:spcBef>
+                <a:spcPct val="0"/>
+              </a:spcBef>
+              <a:spcAft>
+                <a:spcPct val="0"/>
+              </a:spcAft>
+              <a:buClrTx/>
+            </a:pPr>
+            <a:r>
+              <a:rPr lang="en-US" altLang="en-US" sz="1800" dirty="0">
+                <a:solidFill>
+                  <a:schemeClr val="tx2"/>
+                </a:solidFill>
+                <a:latin typeface="Roboto" panose="020B0604020202020204" charset="0"/>
+                <a:ea typeface="Roboto" panose="020B0604020202020204" charset="0"/>
+              </a:rPr>
+              <a:t> } </a:t>
+            </a:r>
+          </a:p>
+        </p:txBody>
+      </p:sp>
+    </p:spTree>
+    <p:extLst>
+      <p:ext uri="{BB962C8B-B14F-4D97-AF65-F5344CB8AC3E}">
+        <p14:creationId xmlns:p14="http://schemas.microsoft.com/office/powerpoint/2010/main" val="4292196806"/>
+      </p:ext>
+    </p:extLst>
+  </p:cSld>
+  <p:clrMapOvr>
+    <a:masterClrMapping/>
+  </p:clrMapOvr>
+</p:sld>
+</file>
+
+<file path=ppt/slides/slide22.xml><?xml version="1.0" encoding="utf-8"?>
+<p:sld xmlns:a="http://schemas.openxmlformats.org/drawingml/2006/main" xmlns:r="http://schemas.openxmlformats.org/officeDocument/2006/relationships" xmlns:p="http://schemas.openxmlformats.org/presentationml/2006/main">
+  <p:cSld>
+    <p:spTree>
+      <p:nvGrpSpPr>
+        <p:cNvPr id="1" name=""/>
+        <p:cNvGrpSpPr/>
+        <p:nvPr/>
+      </p:nvGrpSpPr>
+      <p:grpSpPr>
+        <a:xfrm>
+          <a:off x="0" y="0"/>
+          <a:ext cx="0" cy="0"/>
+          <a:chOff x="0" y="0"/>
+          <a:chExt cx="0" cy="0"/>
+        </a:xfrm>
+      </p:grpSpPr>
+      <p:sp>
+        <p:nvSpPr>
+          <p:cNvPr id="2" name="Title 1">
+            <a:extLst>
+              <a:ext uri="{FF2B5EF4-FFF2-40B4-BE49-F238E27FC236}">
+                <a16:creationId xmlns:a16="http://schemas.microsoft.com/office/drawing/2014/main" id="{193118AF-546A-449D-8FE9-0378366E27CE}"/>
+              </a:ext>
+            </a:extLst>
+          </p:cNvPr>
+          <p:cNvSpPr>
+            <a:spLocks noGrp="1"/>
+          </p:cNvSpPr>
+          <p:nvPr>
+            <p:ph type="title"/>
+          </p:nvPr>
+        </p:nvSpPr>
+        <p:spPr/>
+        <p:txBody>
+          <a:bodyPr/>
+          <a:lstStyle/>
+          <a:p>
+            <a:r>
+              <a:rPr lang="en-US" dirty="0"/>
+              <a:t>try…catch Statement</a:t>
+            </a:r>
+          </a:p>
+        </p:txBody>
+      </p:sp>
+      <p:sp>
+        <p:nvSpPr>
+          <p:cNvPr id="5" name="TextBox 4">
+            <a:extLst>
+              <a:ext uri="{FF2B5EF4-FFF2-40B4-BE49-F238E27FC236}">
+                <a16:creationId xmlns:a16="http://schemas.microsoft.com/office/drawing/2014/main" id="{E318CF15-6B2C-4091-A8A2-9A73392FB8F5}"/>
+              </a:ext>
+            </a:extLst>
+          </p:cNvPr>
+          <p:cNvSpPr txBox="1"/>
+          <p:nvPr/>
+        </p:nvSpPr>
+        <p:spPr>
+          <a:xfrm>
+            <a:off x="471900" y="2190750"/>
+            <a:ext cx="8072025" cy="1969770"/>
+          </a:xfrm>
+          <a:prstGeom prst="rect">
+            <a:avLst/>
+          </a:prstGeom>
+          <a:noFill/>
+        </p:spPr>
+        <p:txBody>
+          <a:bodyPr wrap="square" rtlCol="0">
+            <a:spAutoFit/>
+          </a:bodyPr>
+          <a:lstStyle/>
+          <a:p>
+            <a:r>
+              <a:rPr lang="en-US" altLang="en-US" sz="1800" dirty="0">
+                <a:solidFill>
+                  <a:schemeClr val="tx2"/>
+                </a:solidFill>
+                <a:latin typeface="Roboto" panose="020B0604020202020204" charset="0"/>
+                <a:ea typeface="Roboto" panose="020B0604020202020204" charset="0"/>
+              </a:rPr>
+              <a:t>try { </a:t>
+            </a:r>
+          </a:p>
+          <a:p>
+            <a:r>
+              <a:rPr lang="en-US" altLang="en-US" sz="1800" dirty="0">
+                <a:solidFill>
+                  <a:schemeClr val="tx2"/>
+                </a:solidFill>
+                <a:latin typeface="Roboto" panose="020B0604020202020204" charset="0"/>
+                <a:ea typeface="Roboto" panose="020B0604020202020204" charset="0"/>
+              </a:rPr>
+              <a:t>	</a:t>
+            </a:r>
+            <a:r>
+              <a:rPr lang="en-US" altLang="en-US" sz="1800" dirty="0" err="1">
+                <a:solidFill>
+                  <a:schemeClr val="tx2"/>
+                </a:solidFill>
+                <a:latin typeface="Roboto" panose="020B0604020202020204" charset="0"/>
+                <a:ea typeface="Roboto" panose="020B0604020202020204" charset="0"/>
+              </a:rPr>
+              <a:t>monthName</a:t>
+            </a:r>
+            <a:r>
+              <a:rPr lang="en-US" altLang="en-US" sz="1800" dirty="0">
+                <a:solidFill>
+                  <a:schemeClr val="tx2"/>
+                </a:solidFill>
+                <a:latin typeface="Roboto" panose="020B0604020202020204" charset="0"/>
+                <a:ea typeface="Roboto" panose="020B0604020202020204" charset="0"/>
+              </a:rPr>
+              <a:t>=</a:t>
+            </a:r>
+            <a:r>
+              <a:rPr lang="en-US" altLang="en-US" sz="1800" dirty="0" err="1">
+                <a:solidFill>
+                  <a:schemeClr val="tx2"/>
+                </a:solidFill>
+                <a:latin typeface="Roboto" panose="020B0604020202020204" charset="0"/>
+                <a:ea typeface="Roboto" panose="020B0604020202020204" charset="0"/>
+              </a:rPr>
+              <a:t>getMonthName</a:t>
+            </a:r>
+            <a:r>
+              <a:rPr lang="en-US" altLang="en-US" sz="1800" dirty="0">
+                <a:solidFill>
+                  <a:schemeClr val="tx2"/>
+                </a:solidFill>
+                <a:latin typeface="Roboto" panose="020B0604020202020204" charset="0"/>
+                <a:ea typeface="Roboto" panose="020B0604020202020204" charset="0"/>
+              </a:rPr>
+              <a:t>(</a:t>
+            </a:r>
+            <a:r>
+              <a:rPr lang="en-US" altLang="en-US" sz="1800" dirty="0" err="1">
+                <a:solidFill>
+                  <a:schemeClr val="tx2"/>
+                </a:solidFill>
+                <a:latin typeface="Roboto" panose="020B0604020202020204" charset="0"/>
+                <a:ea typeface="Roboto" panose="020B0604020202020204" charset="0"/>
+              </a:rPr>
+              <a:t>myMonth</a:t>
+            </a:r>
+            <a:r>
+              <a:rPr lang="en-US" altLang="en-US" sz="1800" dirty="0">
+                <a:solidFill>
+                  <a:schemeClr val="tx2"/>
+                </a:solidFill>
+                <a:latin typeface="Roboto" panose="020B0604020202020204" charset="0"/>
+                <a:ea typeface="Roboto" panose="020B0604020202020204" charset="0"/>
+              </a:rPr>
+              <a:t>)</a:t>
+            </a:r>
+          </a:p>
+          <a:p>
+            <a:r>
+              <a:rPr lang="en-US" altLang="en-US" sz="1800" dirty="0">
+                <a:solidFill>
+                  <a:schemeClr val="tx2"/>
+                </a:solidFill>
+                <a:latin typeface="Roboto" panose="020B0604020202020204" charset="0"/>
+                <a:ea typeface="Roboto" panose="020B0604020202020204" charset="0"/>
+              </a:rPr>
+              <a:t> } catch (e) {</a:t>
+            </a:r>
+          </a:p>
+          <a:p>
+            <a:r>
+              <a:rPr lang="en-US" altLang="en-US" sz="1800" dirty="0">
+                <a:solidFill>
+                  <a:schemeClr val="tx2"/>
+                </a:solidFill>
+                <a:latin typeface="Roboto" panose="020B0604020202020204" charset="0"/>
+                <a:ea typeface="Roboto" panose="020B0604020202020204" charset="0"/>
+              </a:rPr>
+              <a:t> 	</a:t>
+            </a:r>
+            <a:r>
+              <a:rPr lang="en-US" altLang="en-US" sz="1800" dirty="0" err="1">
+                <a:solidFill>
+                  <a:schemeClr val="tx2"/>
+                </a:solidFill>
+                <a:latin typeface="Roboto" panose="020B0604020202020204" charset="0"/>
+                <a:ea typeface="Roboto" panose="020B0604020202020204" charset="0"/>
+              </a:rPr>
+              <a:t>monthName</a:t>
+            </a:r>
+            <a:r>
+              <a:rPr lang="en-US" altLang="en-US" sz="1800" dirty="0">
+                <a:solidFill>
+                  <a:schemeClr val="tx2"/>
+                </a:solidFill>
+                <a:latin typeface="Roboto" panose="020B0604020202020204" charset="0"/>
+                <a:ea typeface="Roboto" panose="020B0604020202020204" charset="0"/>
+              </a:rPr>
+              <a:t>="unknown" </a:t>
+            </a:r>
+            <a:r>
+              <a:rPr lang="en-US" altLang="en-US" sz="1800" dirty="0" err="1">
+                <a:solidFill>
+                  <a:schemeClr val="tx2"/>
+                </a:solidFill>
+                <a:latin typeface="Roboto" panose="020B0604020202020204" charset="0"/>
+                <a:ea typeface="Roboto" panose="020B0604020202020204" charset="0"/>
+              </a:rPr>
+              <a:t>logMyErrors</a:t>
+            </a:r>
+            <a:r>
+              <a:rPr lang="en-US" altLang="en-US" sz="1800" dirty="0">
+                <a:solidFill>
+                  <a:schemeClr val="tx2"/>
+                </a:solidFill>
+                <a:latin typeface="Roboto" panose="020B0604020202020204" charset="0"/>
+                <a:ea typeface="Roboto" panose="020B0604020202020204" charset="0"/>
+              </a:rPr>
+              <a:t>(e) </a:t>
+            </a:r>
+            <a:r>
+              <a:rPr lang="en-US" altLang="en-US" sz="1800" dirty="0">
+                <a:solidFill>
+                  <a:schemeClr val="tx1"/>
+                </a:solidFill>
+                <a:latin typeface="Roboto" panose="020B0604020202020204" charset="0"/>
+                <a:ea typeface="Roboto" panose="020B0604020202020204" charset="0"/>
+              </a:rPr>
+              <a:t>// pass exception object to </a:t>
+            </a:r>
+            <a:r>
+              <a:rPr lang="en-US" altLang="en-US" sz="1800" dirty="0">
+                <a:solidFill>
+                  <a:schemeClr val="tx2"/>
+                </a:solidFill>
+                <a:latin typeface="Roboto" panose="020B0604020202020204" charset="0"/>
+                <a:ea typeface="Roboto" panose="020B0604020202020204" charset="0"/>
+              </a:rPr>
+              <a:t>	error handler </a:t>
+            </a:r>
+          </a:p>
+          <a:p>
+            <a:r>
+              <a:rPr lang="en-US" altLang="en-US" sz="1800" dirty="0">
+                <a:solidFill>
+                  <a:schemeClr val="tx2"/>
+                </a:solidFill>
+                <a:latin typeface="Roboto" panose="020B0604020202020204" charset="0"/>
+                <a:ea typeface="Roboto" panose="020B0604020202020204" charset="0"/>
+              </a:rPr>
+              <a:t>} </a:t>
+            </a:r>
+          </a:p>
+          <a:p>
+            <a:endParaRPr lang="en-US" dirty="0"/>
+          </a:p>
+        </p:txBody>
+      </p:sp>
+    </p:spTree>
+    <p:extLst>
+      <p:ext uri="{BB962C8B-B14F-4D97-AF65-F5344CB8AC3E}">
+        <p14:creationId xmlns:p14="http://schemas.microsoft.com/office/powerpoint/2010/main" val="3771808042"/>
+      </p:ext>
+    </p:extLst>
+  </p:cSld>
+  <p:clrMapOvr>
+    <a:masterClrMapping/>
+  </p:clrMapOvr>
+</p:sld>
+</file>
+
+<file path=ppt/slides/slide23.xml><?xml version="1.0" encoding="utf-8"?>
+<p:sld xmlns:a="http://schemas.openxmlformats.org/drawingml/2006/main" xmlns:r="http://schemas.openxmlformats.org/officeDocument/2006/relationships" xmlns:p="http://schemas.openxmlformats.org/presentationml/2006/main">
+  <p:cSld>
+    <p:spTree>
+      <p:nvGrpSpPr>
+        <p:cNvPr id="1" name=""/>
+        <p:cNvGrpSpPr/>
+        <p:nvPr/>
+      </p:nvGrpSpPr>
+      <p:grpSpPr>
+        <a:xfrm>
+          <a:off x="0" y="0"/>
+          <a:ext cx="0" cy="0"/>
+          <a:chOff x="0" y="0"/>
+          <a:chExt cx="0" cy="0"/>
+        </a:xfrm>
+      </p:grpSpPr>
+      <p:sp>
+        <p:nvSpPr>
+          <p:cNvPr id="2" name="Title 1">
+            <a:extLst>
+              <a:ext uri="{FF2B5EF4-FFF2-40B4-BE49-F238E27FC236}">
+                <a16:creationId xmlns:a16="http://schemas.microsoft.com/office/drawing/2014/main" id="{47B88B71-3593-447F-B9FD-F450A94543FA}"/>
+              </a:ext>
+            </a:extLst>
+          </p:cNvPr>
+          <p:cNvSpPr>
+            <a:spLocks noGrp="1"/>
+          </p:cNvSpPr>
+          <p:nvPr>
+            <p:ph type="title"/>
+          </p:nvPr>
+        </p:nvSpPr>
+        <p:spPr/>
+        <p:txBody>
+          <a:bodyPr/>
+          <a:lstStyle/>
+          <a:p>
+            <a:r>
+              <a:rPr lang="en-US" b="1" dirty="0"/>
+              <a:t>The finally Block</a:t>
+            </a:r>
+            <a:endParaRPr lang="en-US" dirty="0"/>
+          </a:p>
+        </p:txBody>
+      </p:sp>
+      <p:sp>
+        <p:nvSpPr>
+          <p:cNvPr id="5" name="TextBox 4">
+            <a:extLst>
+              <a:ext uri="{FF2B5EF4-FFF2-40B4-BE49-F238E27FC236}">
+                <a16:creationId xmlns:a16="http://schemas.microsoft.com/office/drawing/2014/main" id="{83FEF944-2D41-4FBB-9CE8-C9D913B62970}"/>
+              </a:ext>
+            </a:extLst>
+          </p:cNvPr>
+          <p:cNvSpPr txBox="1"/>
+          <p:nvPr/>
+        </p:nvSpPr>
+        <p:spPr>
+          <a:xfrm>
+            <a:off x="361950" y="2000250"/>
+            <a:ext cx="8448675" cy="2585323"/>
+          </a:xfrm>
+          <a:prstGeom prst="rect">
+            <a:avLst/>
+          </a:prstGeom>
+          <a:noFill/>
+        </p:spPr>
+        <p:txBody>
+          <a:bodyPr wrap="square" rtlCol="0">
+            <a:spAutoFit/>
+          </a:bodyPr>
+          <a:lstStyle/>
+          <a:p>
+            <a:pPr lvl="0" eaLnBrk="0" fontAlgn="base" hangingPunct="0">
+              <a:spcBef>
+                <a:spcPct val="0"/>
+              </a:spcBef>
+              <a:spcAft>
+                <a:spcPct val="0"/>
+              </a:spcAft>
+              <a:buClrTx/>
+            </a:pPr>
+            <a:r>
+              <a:rPr lang="en-US" altLang="en-US" sz="1800" dirty="0" err="1">
+                <a:solidFill>
+                  <a:schemeClr val="tx2"/>
+                </a:solidFill>
+                <a:latin typeface="Roboto" panose="020B0604020202020204" charset="0"/>
+                <a:ea typeface="Roboto" panose="020B0604020202020204" charset="0"/>
+              </a:rPr>
+              <a:t>openMyFile</a:t>
+            </a:r>
+            <a:r>
+              <a:rPr lang="en-US" altLang="en-US" sz="1800" dirty="0">
+                <a:solidFill>
+                  <a:schemeClr val="tx2"/>
+                </a:solidFill>
+                <a:latin typeface="Roboto" panose="020B0604020202020204" charset="0"/>
+                <a:ea typeface="Roboto" panose="020B0604020202020204" charset="0"/>
+              </a:rPr>
+              <a:t>();</a:t>
+            </a:r>
+          </a:p>
+          <a:p>
+            <a:pPr lvl="0" eaLnBrk="0" fontAlgn="base" hangingPunct="0">
+              <a:spcBef>
+                <a:spcPct val="0"/>
+              </a:spcBef>
+              <a:spcAft>
+                <a:spcPct val="0"/>
+              </a:spcAft>
+              <a:buClrTx/>
+            </a:pPr>
+            <a:endParaRPr lang="en-US" altLang="en-US" sz="1800" dirty="0">
+              <a:solidFill>
+                <a:schemeClr val="tx2"/>
+              </a:solidFill>
+              <a:latin typeface="Roboto" panose="020B0604020202020204" charset="0"/>
+              <a:ea typeface="Roboto" panose="020B0604020202020204" charset="0"/>
+            </a:endParaRPr>
+          </a:p>
+          <a:p>
+            <a:pPr lvl="0" eaLnBrk="0" fontAlgn="base" hangingPunct="0">
+              <a:spcBef>
+                <a:spcPct val="0"/>
+              </a:spcBef>
+              <a:spcAft>
+                <a:spcPct val="0"/>
+              </a:spcAft>
+              <a:buClrTx/>
+            </a:pPr>
+            <a:r>
+              <a:rPr lang="en-US" altLang="en-US" sz="1800" dirty="0">
+                <a:solidFill>
+                  <a:schemeClr val="tx2"/>
+                </a:solidFill>
+                <a:latin typeface="Roboto" panose="020B0604020202020204" charset="0"/>
+                <a:ea typeface="Roboto" panose="020B0604020202020204" charset="0"/>
+              </a:rPr>
+              <a:t>try { </a:t>
+            </a:r>
+          </a:p>
+          <a:p>
+            <a:pPr lvl="0" eaLnBrk="0" fontAlgn="base" hangingPunct="0">
+              <a:spcBef>
+                <a:spcPct val="0"/>
+              </a:spcBef>
+              <a:spcAft>
+                <a:spcPct val="0"/>
+              </a:spcAft>
+              <a:buClrTx/>
+            </a:pPr>
+            <a:r>
+              <a:rPr lang="en-US" altLang="en-US" sz="1800" dirty="0">
+                <a:solidFill>
+                  <a:schemeClr val="tx2"/>
+                </a:solidFill>
+                <a:latin typeface="Roboto" panose="020B0604020202020204" charset="0"/>
+                <a:ea typeface="Roboto" panose="020B0604020202020204" charset="0"/>
+              </a:rPr>
+              <a:t>	</a:t>
+            </a:r>
+            <a:r>
+              <a:rPr lang="en-US" altLang="en-US" sz="1800" dirty="0" err="1">
+                <a:solidFill>
+                  <a:schemeClr val="tx2"/>
+                </a:solidFill>
+                <a:latin typeface="Roboto" panose="020B0604020202020204" charset="0"/>
+                <a:ea typeface="Roboto" panose="020B0604020202020204" charset="0"/>
+              </a:rPr>
+              <a:t>writeMyFile</a:t>
+            </a:r>
+            <a:r>
+              <a:rPr lang="en-US" altLang="en-US" sz="1800" dirty="0">
+                <a:solidFill>
+                  <a:schemeClr val="tx2"/>
+                </a:solidFill>
+                <a:latin typeface="Roboto" panose="020B0604020202020204" charset="0"/>
+                <a:ea typeface="Roboto" panose="020B0604020202020204" charset="0"/>
+              </a:rPr>
+              <a:t>(</a:t>
+            </a:r>
+            <a:r>
+              <a:rPr lang="en-US" altLang="en-US" sz="1800" dirty="0" err="1">
+                <a:solidFill>
+                  <a:schemeClr val="tx2"/>
+                </a:solidFill>
+                <a:latin typeface="Roboto" panose="020B0604020202020204" charset="0"/>
+                <a:ea typeface="Roboto" panose="020B0604020202020204" charset="0"/>
+              </a:rPr>
+              <a:t>theData</a:t>
+            </a:r>
+            <a:r>
+              <a:rPr lang="en-US" altLang="en-US" sz="1800" dirty="0">
+                <a:solidFill>
+                  <a:schemeClr val="tx2"/>
+                </a:solidFill>
+                <a:latin typeface="Roboto" panose="020B0604020202020204" charset="0"/>
+                <a:ea typeface="Roboto" panose="020B0604020202020204" charset="0"/>
+              </a:rPr>
+              <a:t>); </a:t>
+            </a:r>
+            <a:r>
+              <a:rPr lang="en-US" altLang="en-US" sz="1800" dirty="0">
+                <a:solidFill>
+                  <a:schemeClr val="tx1"/>
+                </a:solidFill>
+                <a:latin typeface="Roboto" panose="020B0604020202020204" charset="0"/>
+                <a:ea typeface="Roboto" panose="020B0604020202020204" charset="0"/>
+              </a:rPr>
+              <a:t>//This may throw a error </a:t>
+            </a:r>
+          </a:p>
+          <a:p>
+            <a:pPr lvl="0" eaLnBrk="0" fontAlgn="base" hangingPunct="0">
+              <a:spcBef>
+                <a:spcPct val="0"/>
+              </a:spcBef>
+              <a:spcAft>
+                <a:spcPct val="0"/>
+              </a:spcAft>
+              <a:buClrTx/>
+            </a:pPr>
+            <a:r>
+              <a:rPr lang="en-US" altLang="en-US" sz="1800" dirty="0">
+                <a:solidFill>
+                  <a:schemeClr val="tx2"/>
+                </a:solidFill>
+                <a:latin typeface="Roboto" panose="020B0604020202020204" charset="0"/>
+                <a:ea typeface="Roboto" panose="020B0604020202020204" charset="0"/>
+              </a:rPr>
+              <a:t>}catch(e){ </a:t>
+            </a:r>
+          </a:p>
+          <a:p>
+            <a:pPr lvl="0" eaLnBrk="0" fontAlgn="base" hangingPunct="0">
+              <a:spcBef>
+                <a:spcPct val="0"/>
+              </a:spcBef>
+              <a:spcAft>
+                <a:spcPct val="0"/>
+              </a:spcAft>
+              <a:buClrTx/>
+            </a:pPr>
+            <a:r>
+              <a:rPr lang="en-US" altLang="en-US" sz="1800" dirty="0">
+                <a:solidFill>
+                  <a:schemeClr val="tx2"/>
+                </a:solidFill>
+                <a:latin typeface="Roboto" panose="020B0604020202020204" charset="0"/>
+                <a:ea typeface="Roboto" panose="020B0604020202020204" charset="0"/>
+              </a:rPr>
+              <a:t>	</a:t>
+            </a:r>
+            <a:r>
+              <a:rPr lang="en-US" altLang="en-US" sz="1800" dirty="0" err="1">
+                <a:solidFill>
+                  <a:schemeClr val="tx2"/>
+                </a:solidFill>
+                <a:latin typeface="Roboto" panose="020B0604020202020204" charset="0"/>
+                <a:ea typeface="Roboto" panose="020B0604020202020204" charset="0"/>
+              </a:rPr>
+              <a:t>handleError</a:t>
+            </a:r>
+            <a:r>
+              <a:rPr lang="en-US" altLang="en-US" sz="1800" dirty="0">
+                <a:solidFill>
+                  <a:schemeClr val="tx2"/>
+                </a:solidFill>
+                <a:latin typeface="Roboto" panose="020B0604020202020204" charset="0"/>
+                <a:ea typeface="Roboto" panose="020B0604020202020204" charset="0"/>
+              </a:rPr>
+              <a:t>(e); </a:t>
+            </a:r>
+            <a:r>
+              <a:rPr lang="en-US" altLang="en-US" sz="1800" dirty="0">
+                <a:solidFill>
+                  <a:schemeClr val="tx1"/>
+                </a:solidFill>
+                <a:latin typeface="Roboto" panose="020B0604020202020204" charset="0"/>
+                <a:ea typeface="Roboto" panose="020B0604020202020204" charset="0"/>
+              </a:rPr>
+              <a:t>// If we got a error we handle it</a:t>
+            </a:r>
+          </a:p>
+          <a:p>
+            <a:pPr lvl="0" eaLnBrk="0" fontAlgn="base" hangingPunct="0">
+              <a:spcBef>
+                <a:spcPct val="0"/>
+              </a:spcBef>
+              <a:spcAft>
+                <a:spcPct val="0"/>
+              </a:spcAft>
+              <a:buClrTx/>
+            </a:pPr>
+            <a:r>
+              <a:rPr lang="en-US" altLang="en-US" sz="1800" dirty="0">
+                <a:solidFill>
+                  <a:schemeClr val="tx2"/>
+                </a:solidFill>
+                <a:latin typeface="Roboto" panose="020B0604020202020204" charset="0"/>
+                <a:ea typeface="Roboto" panose="020B0604020202020204" charset="0"/>
+              </a:rPr>
+              <a:t> }finally { </a:t>
+            </a:r>
+          </a:p>
+          <a:p>
+            <a:pPr lvl="0" eaLnBrk="0" fontAlgn="base" hangingPunct="0">
+              <a:spcBef>
+                <a:spcPct val="0"/>
+              </a:spcBef>
+              <a:spcAft>
+                <a:spcPct val="0"/>
+              </a:spcAft>
+              <a:buClrTx/>
+            </a:pPr>
+            <a:r>
+              <a:rPr lang="en-US" altLang="en-US" sz="1800" dirty="0">
+                <a:solidFill>
+                  <a:schemeClr val="tx2"/>
+                </a:solidFill>
+                <a:latin typeface="Roboto" panose="020B0604020202020204" charset="0"/>
+                <a:ea typeface="Roboto" panose="020B0604020202020204" charset="0"/>
+              </a:rPr>
+              <a:t>	</a:t>
+            </a:r>
+            <a:r>
+              <a:rPr lang="en-US" altLang="en-US" sz="1800" dirty="0" err="1">
+                <a:solidFill>
+                  <a:schemeClr val="tx2"/>
+                </a:solidFill>
+                <a:latin typeface="Roboto" panose="020B0604020202020204" charset="0"/>
+                <a:ea typeface="Roboto" panose="020B0604020202020204" charset="0"/>
+              </a:rPr>
+              <a:t>closeMyFile</a:t>
+            </a:r>
+            <a:r>
+              <a:rPr lang="en-US" altLang="en-US" sz="1800" dirty="0">
+                <a:solidFill>
+                  <a:schemeClr val="tx2"/>
+                </a:solidFill>
+                <a:latin typeface="Roboto" panose="020B0604020202020204" charset="0"/>
+                <a:ea typeface="Roboto" panose="020B0604020202020204" charset="0"/>
+              </a:rPr>
+              <a:t>(); </a:t>
+            </a:r>
+            <a:r>
+              <a:rPr lang="en-US" altLang="en-US" sz="1800" dirty="0">
+                <a:solidFill>
+                  <a:schemeClr val="tx1"/>
+                </a:solidFill>
+                <a:latin typeface="Roboto" panose="020B0604020202020204" charset="0"/>
+                <a:ea typeface="Roboto" panose="020B0604020202020204" charset="0"/>
+              </a:rPr>
+              <a:t>// always close the resource </a:t>
+            </a:r>
+          </a:p>
+          <a:p>
+            <a:pPr lvl="0" eaLnBrk="0" fontAlgn="base" hangingPunct="0">
+              <a:spcBef>
+                <a:spcPct val="0"/>
+              </a:spcBef>
+              <a:spcAft>
+                <a:spcPct val="0"/>
+              </a:spcAft>
+              <a:buClrTx/>
+            </a:pPr>
+            <a:r>
+              <a:rPr lang="en-US" altLang="en-US" sz="1800" dirty="0">
+                <a:solidFill>
+                  <a:schemeClr val="tx2"/>
+                </a:solidFill>
+                <a:latin typeface="Roboto" panose="020B0604020202020204" charset="0"/>
+                <a:ea typeface="Roboto" panose="020B0604020202020204" charset="0"/>
+              </a:rPr>
+              <a:t>} </a:t>
+            </a:r>
+          </a:p>
+        </p:txBody>
+      </p:sp>
+    </p:spTree>
+    <p:extLst>
+      <p:ext uri="{BB962C8B-B14F-4D97-AF65-F5344CB8AC3E}">
+        <p14:creationId xmlns:p14="http://schemas.microsoft.com/office/powerpoint/2010/main" val="3775756269"/>
+      </p:ext>
+    </p:extLst>
+  </p:cSld>
+  <p:clrMapOvr>
+    <a:masterClrMapping/>
+  </p:clrMapOvr>
+</p:sld>
+</file>
+
+<file path=ppt/slides/slide24.xml><?xml version="1.0" encoding="utf-8"?>
+<p:sld xmlns:a="http://schemas.openxmlformats.org/drawingml/2006/main" xmlns:r="http://schemas.openxmlformats.org/officeDocument/2006/relationships" xmlns:p="http://schemas.openxmlformats.org/presentationml/2006/main">
+  <p:cSld>
+    <p:spTree>
+      <p:nvGrpSpPr>
+        <p:cNvPr id="1" name=""/>
+        <p:cNvGrpSpPr/>
+        <p:nvPr/>
+      </p:nvGrpSpPr>
+      <p:grpSpPr>
+        <a:xfrm>
+          <a:off x="0" y="0"/>
+          <a:ext cx="0" cy="0"/>
+          <a:chOff x="0" y="0"/>
+          <a:chExt cx="0" cy="0"/>
+        </a:xfrm>
+      </p:grpSpPr>
+      <p:sp>
+        <p:nvSpPr>
+          <p:cNvPr id="2" name="Title 1">
+            <a:extLst>
+              <a:ext uri="{FF2B5EF4-FFF2-40B4-BE49-F238E27FC236}">
+                <a16:creationId xmlns:a16="http://schemas.microsoft.com/office/drawing/2014/main" id="{D50E6864-A4C0-4422-B5EF-B7815B90B607}"/>
+              </a:ext>
+            </a:extLst>
+          </p:cNvPr>
+          <p:cNvSpPr>
+            <a:spLocks noGrp="1"/>
+          </p:cNvSpPr>
+          <p:nvPr>
+            <p:ph type="title"/>
+          </p:nvPr>
+        </p:nvSpPr>
+        <p:spPr/>
+        <p:txBody>
+          <a:bodyPr/>
+          <a:lstStyle/>
+          <a:p>
+            <a:r>
+              <a:rPr lang="en-US" b="1" dirty="0"/>
+              <a:t>Nesting try…catch Statements</a:t>
+            </a:r>
+            <a:endParaRPr lang="en-US" dirty="0"/>
+          </a:p>
+        </p:txBody>
+      </p:sp>
+      <p:sp>
+        <p:nvSpPr>
+          <p:cNvPr id="5" name="TextBox 4">
+            <a:extLst>
+              <a:ext uri="{FF2B5EF4-FFF2-40B4-BE49-F238E27FC236}">
+                <a16:creationId xmlns:a16="http://schemas.microsoft.com/office/drawing/2014/main" id="{CEB2B4A8-C800-43B3-9AA0-9993758A2623}"/>
+              </a:ext>
+            </a:extLst>
+          </p:cNvPr>
+          <p:cNvSpPr txBox="1"/>
+          <p:nvPr/>
+        </p:nvSpPr>
+        <p:spPr>
+          <a:xfrm>
+            <a:off x="471899" y="1781175"/>
+            <a:ext cx="8559225" cy="3447098"/>
+          </a:xfrm>
+          <a:prstGeom prst="rect">
+            <a:avLst/>
+          </a:prstGeom>
+          <a:noFill/>
+        </p:spPr>
+        <p:txBody>
+          <a:bodyPr wrap="square" rtlCol="0">
+            <a:spAutoFit/>
+          </a:bodyPr>
+          <a:lstStyle/>
+          <a:p>
+            <a:r>
+              <a:rPr lang="en-US" altLang="en-US" sz="1700" dirty="0">
+                <a:solidFill>
+                  <a:schemeClr val="tx2"/>
+                </a:solidFill>
+                <a:latin typeface="Roboto" panose="020B0604020202020204" charset="0"/>
+                <a:ea typeface="Roboto" panose="020B0604020202020204" charset="0"/>
+              </a:rPr>
+              <a:t>function </a:t>
+            </a:r>
+            <a:r>
+              <a:rPr lang="en-US" altLang="en-US" sz="1700" dirty="0" err="1">
+                <a:solidFill>
+                  <a:schemeClr val="tx2"/>
+                </a:solidFill>
+                <a:latin typeface="Roboto" panose="020B0604020202020204" charset="0"/>
+                <a:ea typeface="Roboto" panose="020B0604020202020204" charset="0"/>
+              </a:rPr>
+              <a:t>doSomethingErrorProne</a:t>
+            </a:r>
+            <a:r>
+              <a:rPr lang="en-US" altLang="en-US" sz="1700" dirty="0">
+                <a:solidFill>
+                  <a:schemeClr val="tx2"/>
+                </a:solidFill>
+                <a:latin typeface="Roboto" panose="020B0604020202020204" charset="0"/>
+                <a:ea typeface="Roboto" panose="020B0604020202020204" charset="0"/>
+              </a:rPr>
+              <a:t> () {</a:t>
+            </a:r>
+          </a:p>
+          <a:p>
+            <a:r>
+              <a:rPr lang="en-US" altLang="en-US" sz="1700" dirty="0">
+                <a:solidFill>
+                  <a:schemeClr val="tx2"/>
+                </a:solidFill>
+                <a:latin typeface="Roboto" panose="020B0604020202020204" charset="0"/>
+                <a:ea typeface="Roboto" panose="020B0604020202020204" charset="0"/>
+              </a:rPr>
+              <a:t> 	if (</a:t>
+            </a:r>
+            <a:r>
+              <a:rPr lang="en-US" altLang="en-US" sz="1700" dirty="0" err="1">
+                <a:solidFill>
+                  <a:schemeClr val="tx2"/>
+                </a:solidFill>
+                <a:latin typeface="Roboto" panose="020B0604020202020204" charset="0"/>
+                <a:ea typeface="Roboto" panose="020B0604020202020204" charset="0"/>
+              </a:rPr>
+              <a:t>ourCodeMakesAMistake</a:t>
+            </a:r>
+            <a:r>
+              <a:rPr lang="en-US" altLang="en-US" sz="1700" dirty="0">
+                <a:solidFill>
+                  <a:schemeClr val="tx2"/>
+                </a:solidFill>
+                <a:latin typeface="Roboto" panose="020B0604020202020204" charset="0"/>
+                <a:ea typeface="Roboto" panose="020B0604020202020204" charset="0"/>
+              </a:rPr>
+              <a:t>()) {</a:t>
+            </a:r>
+          </a:p>
+          <a:p>
+            <a:r>
+              <a:rPr lang="en-US" altLang="en-US" sz="1700" dirty="0">
+                <a:solidFill>
+                  <a:schemeClr val="tx2"/>
+                </a:solidFill>
+                <a:latin typeface="Roboto" panose="020B0604020202020204" charset="0"/>
+                <a:ea typeface="Roboto" panose="020B0604020202020204" charset="0"/>
+              </a:rPr>
+              <a:t> 		throw (new Error('The message')); </a:t>
+            </a:r>
+          </a:p>
+          <a:p>
+            <a:r>
+              <a:rPr lang="en-US" altLang="en-US" sz="1700" dirty="0">
+                <a:solidFill>
+                  <a:schemeClr val="tx2"/>
+                </a:solidFill>
+                <a:latin typeface="Roboto" panose="020B0604020202020204" charset="0"/>
+                <a:ea typeface="Roboto" panose="020B0604020202020204" charset="0"/>
+              </a:rPr>
+              <a:t>	} else { </a:t>
+            </a:r>
+          </a:p>
+          <a:p>
+            <a:r>
+              <a:rPr lang="en-US" altLang="en-US" sz="1700" dirty="0">
+                <a:solidFill>
+                  <a:schemeClr val="tx2"/>
+                </a:solidFill>
+                <a:latin typeface="Roboto" panose="020B0604020202020204" charset="0"/>
+                <a:ea typeface="Roboto" panose="020B0604020202020204" charset="0"/>
+              </a:rPr>
+              <a:t>		</a:t>
+            </a:r>
+            <a:r>
+              <a:rPr lang="en-US" altLang="en-US" sz="1700" dirty="0" err="1">
+                <a:solidFill>
+                  <a:schemeClr val="tx2"/>
+                </a:solidFill>
+                <a:latin typeface="Roboto" panose="020B0604020202020204" charset="0"/>
+                <a:ea typeface="Roboto" panose="020B0604020202020204" charset="0"/>
+              </a:rPr>
+              <a:t>doSomethingToGetAJavascriptError</a:t>
+            </a:r>
+            <a:r>
+              <a:rPr lang="en-US" altLang="en-US" sz="1700" dirty="0">
+                <a:solidFill>
+                  <a:schemeClr val="tx2"/>
+                </a:solidFill>
+                <a:latin typeface="Roboto" panose="020B0604020202020204" charset="0"/>
+                <a:ea typeface="Roboto" panose="020B0604020202020204" charset="0"/>
+              </a:rPr>
+              <a:t>(); </a:t>
+            </a:r>
+          </a:p>
+          <a:p>
+            <a:r>
+              <a:rPr lang="en-US" altLang="en-US" sz="1700" dirty="0">
+                <a:solidFill>
+                  <a:schemeClr val="tx2"/>
+                </a:solidFill>
+                <a:latin typeface="Roboto" panose="020B0604020202020204" charset="0"/>
+                <a:ea typeface="Roboto" panose="020B0604020202020204" charset="0"/>
+              </a:rPr>
+              <a:t>	}</a:t>
+            </a:r>
+          </a:p>
+          <a:p>
+            <a:r>
+              <a:rPr lang="en-US" altLang="en-US" sz="1700" dirty="0">
+                <a:solidFill>
+                  <a:schemeClr val="tx2"/>
+                </a:solidFill>
+                <a:latin typeface="Roboto" panose="020B0604020202020204" charset="0"/>
+                <a:ea typeface="Roboto" panose="020B0604020202020204" charset="0"/>
+              </a:rPr>
+              <a:t> } .... </a:t>
+            </a:r>
+          </a:p>
+          <a:p>
+            <a:r>
+              <a:rPr lang="en-US" altLang="en-US" sz="1700" dirty="0">
+                <a:solidFill>
+                  <a:schemeClr val="tx2"/>
+                </a:solidFill>
+                <a:latin typeface="Roboto" panose="020B0604020202020204" charset="0"/>
+                <a:ea typeface="Roboto" panose="020B0604020202020204" charset="0"/>
+              </a:rPr>
+              <a:t>try { </a:t>
+            </a:r>
+          </a:p>
+          <a:p>
+            <a:r>
+              <a:rPr lang="en-US" altLang="en-US" sz="1700" dirty="0">
+                <a:solidFill>
+                  <a:schemeClr val="tx2"/>
+                </a:solidFill>
+                <a:latin typeface="Roboto" panose="020B0604020202020204" charset="0"/>
+                <a:ea typeface="Roboto" panose="020B0604020202020204" charset="0"/>
+              </a:rPr>
+              <a:t>	</a:t>
+            </a:r>
+            <a:r>
+              <a:rPr lang="en-US" altLang="en-US" sz="1700" dirty="0" err="1">
+                <a:solidFill>
+                  <a:schemeClr val="tx2"/>
+                </a:solidFill>
+                <a:latin typeface="Roboto" panose="020B0604020202020204" charset="0"/>
+                <a:ea typeface="Roboto" panose="020B0604020202020204" charset="0"/>
+              </a:rPr>
+              <a:t>doSomethingErrorProne</a:t>
+            </a:r>
+            <a:r>
+              <a:rPr lang="en-US" altLang="en-US" sz="1700" dirty="0">
+                <a:solidFill>
+                  <a:schemeClr val="tx2"/>
+                </a:solidFill>
+                <a:latin typeface="Roboto" panose="020B0604020202020204" charset="0"/>
+                <a:ea typeface="Roboto" panose="020B0604020202020204" charset="0"/>
+              </a:rPr>
+              <a:t>();</a:t>
+            </a:r>
+          </a:p>
+          <a:p>
+            <a:r>
+              <a:rPr lang="en-US" altLang="en-US" sz="1700" dirty="0">
+                <a:solidFill>
+                  <a:schemeClr val="tx2"/>
+                </a:solidFill>
+                <a:latin typeface="Roboto" panose="020B0604020202020204" charset="0"/>
+                <a:ea typeface="Roboto" panose="020B0604020202020204" charset="0"/>
+              </a:rPr>
+              <a:t> } catch (e) { </a:t>
+            </a:r>
+          </a:p>
+          <a:p>
+            <a:r>
+              <a:rPr lang="en-US" altLang="en-US" sz="1700" dirty="0">
+                <a:solidFill>
+                  <a:schemeClr val="tx2"/>
+                </a:solidFill>
+                <a:latin typeface="Roboto" panose="020B0604020202020204" charset="0"/>
+                <a:ea typeface="Roboto" panose="020B0604020202020204" charset="0"/>
+              </a:rPr>
+              <a:t>	alert(e.name);   </a:t>
+            </a:r>
+          </a:p>
+          <a:p>
+            <a:r>
+              <a:rPr lang="en-US" altLang="en-US" sz="1700" dirty="0">
+                <a:solidFill>
+                  <a:schemeClr val="tx2"/>
+                </a:solidFill>
+                <a:latin typeface="Roboto" panose="020B0604020202020204" charset="0"/>
+                <a:ea typeface="Roboto" panose="020B0604020202020204" charset="0"/>
+              </a:rPr>
+              <a:t> } </a:t>
+            </a:r>
+          </a:p>
+          <a:p>
+            <a:endParaRPr lang="en-US" dirty="0"/>
+          </a:p>
+        </p:txBody>
+      </p:sp>
+    </p:spTree>
+    <p:extLst>
+      <p:ext uri="{BB962C8B-B14F-4D97-AF65-F5344CB8AC3E}">
+        <p14:creationId xmlns:p14="http://schemas.microsoft.com/office/powerpoint/2010/main" val="3552791388"/>
+      </p:ext>
+    </p:extLst>
+  </p:cSld>
+  <p:clrMapOvr>
+    <a:masterClrMapping/>
+  </p:clrMapOvr>
+</p:sld>
+</file>
+
+<file path=ppt/slides/slide25.xml><?xml version="1.0" encoding="utf-8"?>
+<p:sld xmlns:a="http://schemas.openxmlformats.org/drawingml/2006/main" xmlns:r="http://schemas.openxmlformats.org/officeDocument/2006/relationships" xmlns:p="http://schemas.openxmlformats.org/presentationml/2006/main">
+  <p:cSld>
+    <p:spTree>
+      <p:nvGrpSpPr>
+        <p:cNvPr id="1" name="Shape 174"/>
+        <p:cNvGrpSpPr/>
+        <p:nvPr/>
+      </p:nvGrpSpPr>
+      <p:grpSpPr>
+        <a:xfrm>
+          <a:off x="0" y="0"/>
+          <a:ext cx="0" cy="0"/>
+          <a:chOff x="0" y="0"/>
+          <a:chExt cx="0" cy="0"/>
+        </a:xfrm>
+      </p:grpSpPr>
+      <p:sp>
+        <p:nvSpPr>
+          <p:cNvPr id="175" name="Google Shape;175;p31"/>
+          <p:cNvSpPr txBox="1">
+            <a:spLocks noGrp="1"/>
+          </p:cNvSpPr>
+          <p:nvPr>
+            <p:ph type="title"/>
+          </p:nvPr>
+        </p:nvSpPr>
+        <p:spPr>
+          <a:xfrm>
+            <a:off x="471900" y="738725"/>
+            <a:ext cx="8222100" cy="767700"/>
+          </a:xfrm>
+          <a:prstGeom prst="rect">
+            <a:avLst/>
+          </a:prstGeom>
+        </p:spPr>
+        <p:txBody>
+          <a:bodyPr spcFirstLastPara="1" wrap="square" lIns="91425" tIns="91425" rIns="91425" bIns="91425" anchor="b" anchorCtr="0">
+            <a:noAutofit/>
+          </a:bodyPr>
+          <a:lstStyle/>
+          <a:p>
+            <a:pPr marL="0" lvl="0" indent="0" algn="l" rtl="0">
+              <a:spcBef>
+                <a:spcPts val="0"/>
+              </a:spcBef>
+              <a:spcAft>
+                <a:spcPts val="0"/>
+              </a:spcAft>
+              <a:buNone/>
+            </a:pPr>
+            <a:r>
+              <a:rPr lang="en-US" dirty="0"/>
+              <a:t>Thank you today</a:t>
+            </a:r>
+            <a:endParaRPr dirty="0"/>
+          </a:p>
+        </p:txBody>
+      </p:sp>
+      <p:sp>
+        <p:nvSpPr>
+          <p:cNvPr id="176" name="Google Shape;176;p31"/>
+          <p:cNvSpPr txBox="1">
+            <a:spLocks noGrp="1"/>
+          </p:cNvSpPr>
+          <p:nvPr>
+            <p:ph type="body" idx="1"/>
+          </p:nvPr>
+        </p:nvSpPr>
+        <p:spPr>
+          <a:xfrm>
+            <a:off x="471900" y="1919075"/>
+            <a:ext cx="8222100" cy="2710200"/>
+          </a:xfrm>
+          <a:prstGeom prst="rect">
+            <a:avLst/>
+          </a:prstGeom>
+        </p:spPr>
+        <p:txBody>
+          <a:bodyPr spcFirstLastPara="1" wrap="square" lIns="91425" tIns="91425" rIns="91425" bIns="91425" anchor="t" anchorCtr="0">
+            <a:noAutofit/>
+          </a:bodyPr>
+          <a:lstStyle/>
+          <a:p>
+            <a:pPr marL="0" lvl="0" indent="0" algn="l" rtl="0">
+              <a:spcBef>
+                <a:spcPts val="0"/>
+              </a:spcBef>
+              <a:spcAft>
+                <a:spcPts val="0"/>
+              </a:spcAft>
+              <a:buNone/>
+            </a:pPr>
+            <a:endParaRPr dirty="0"/>
+          </a:p>
+          <a:p>
+            <a:pPr marL="0" lvl="0" indent="0" algn="l" rtl="0">
+              <a:spcBef>
+                <a:spcPts val="1600"/>
+              </a:spcBef>
+              <a:spcAft>
+                <a:spcPts val="0"/>
+              </a:spcAft>
+              <a:buNone/>
+            </a:pPr>
+            <a:r>
+              <a:rPr lang="en" dirty="0"/>
+              <a:t> </a:t>
+            </a:r>
+            <a:endParaRPr dirty="0"/>
+          </a:p>
+          <a:p>
+            <a:pPr marL="0" lvl="0" indent="0" algn="l" rtl="0">
+              <a:spcBef>
+                <a:spcPts val="1600"/>
+              </a:spcBef>
+              <a:spcAft>
+                <a:spcPts val="1600"/>
+              </a:spcAft>
+              <a:buNone/>
+            </a:pPr>
+            <a:r>
+              <a:rPr lang="en" dirty="0"/>
+              <a:t> </a:t>
+            </a:r>
+            <a:endParaRPr dirty="0"/>
+          </a:p>
+        </p:txBody>
+      </p:sp>
+      <p:pic>
+        <p:nvPicPr>
+          <p:cNvPr id="3" name="Picture 2">
+            <a:extLst>
+              <a:ext uri="{FF2B5EF4-FFF2-40B4-BE49-F238E27FC236}">
+                <a16:creationId xmlns:a16="http://schemas.microsoft.com/office/drawing/2014/main" id="{D5740987-B884-4A8E-B052-CECE13E45610}"/>
+              </a:ext>
+            </a:extLst>
+          </p:cNvPr>
+          <p:cNvPicPr>
+            <a:picLocks noChangeAspect="1"/>
+          </p:cNvPicPr>
+          <p:nvPr/>
+        </p:nvPicPr>
+        <p:blipFill>
+          <a:blip r:embed="rId3"/>
+          <a:stretch>
+            <a:fillRect/>
+          </a:stretch>
+        </p:blipFill>
+        <p:spPr>
+          <a:xfrm>
+            <a:off x="3143250" y="2303027"/>
+            <a:ext cx="2857500" cy="2152650"/>
+          </a:xfrm>
+          <a:prstGeom prst="rect">
+            <a:avLst/>
+          </a:prstGeom>
+        </p:spPr>
+      </p:pic>
+    </p:spTree>
   </p:cSld>
   <p:clrMapOvr>
     <a:masterClrMapping/>
@@ -8124,7 +12232,7 @@
           <p:cNvPr id="2" name="Title 1">
             <a:extLst>
               <a:ext uri="{FF2B5EF4-FFF2-40B4-BE49-F238E27FC236}">
-                <a16:creationId xmlns:a16="http://schemas.microsoft.com/office/drawing/2014/main" id="{E0008E5A-74FF-4CC9-940F-699FF20EF1D9}"/>
+                <a16:creationId xmlns:a16="http://schemas.microsoft.com/office/drawing/2014/main" id="{ACE00107-B6A1-499D-90A8-6F408272F132}"/>
               </a:ext>
             </a:extLst>
           </p:cNvPr>
@@ -8141,19 +12249,18 @@
           <a:lstStyle/>
           <a:p>
             <a:r>
-              <a:rPr lang="en-US" b="1" dirty="0"/>
-              <a:t>Object Manipulation Statements</a:t>
-            </a:r>
-            <a:endParaRPr lang="en-US" dirty="0"/>
+              <a:rPr lang="en-US" dirty="0"/>
+              <a:t>For Statement</a:t>
+            </a:r>
           </a:p>
         </p:txBody>
       </p:sp>
       <p:sp>
         <p:nvSpPr>
-          <p:cNvPr id="3" name="Text Placeholder 2">
+          <p:cNvPr id="7" name="Text Placeholder 6">
             <a:extLst>
               <a:ext uri="{FF2B5EF4-FFF2-40B4-BE49-F238E27FC236}">
-                <a16:creationId xmlns:a16="http://schemas.microsoft.com/office/drawing/2014/main" id="{B8CBF1D8-DD90-4681-B980-E30564F28628}"/>
+                <a16:creationId xmlns:a16="http://schemas.microsoft.com/office/drawing/2014/main" id="{E33E2FF1-8787-4DCA-8F7A-14446DC62786}"/>
               </a:ext>
             </a:extLst>
           </p:cNvPr>
@@ -8166,42 +12273,405 @@
         </p:nvSpPr>
         <p:spPr>
           <a:xfrm>
-            <a:off x="460950" y="1855280"/>
-            <a:ext cx="8222100" cy="2710200"/>
+            <a:off x="471900" y="1919074"/>
+            <a:ext cx="8222100" cy="3224425"/>
           </a:xfrm>
         </p:spPr>
         <p:txBody>
           <a:bodyPr/>
           <a:lstStyle/>
           <a:p>
-            <a:pPr marL="114300" indent="0">
+            <a:pPr marL="0" lvl="0" indent="0" eaLnBrk="0" fontAlgn="base" hangingPunct="0">
+              <a:lnSpc>
+                <a:spcPct val="100000"/>
+              </a:lnSpc>
+              <a:spcBef>
+                <a:spcPct val="0"/>
+              </a:spcBef>
+              <a:spcAft>
+                <a:spcPct val="0"/>
+              </a:spcAft>
+              <a:buClrTx/>
+              <a:buSzTx/>
               <a:buNone/>
             </a:pPr>
             <a:r>
               <a:rPr lang="en-US" altLang="en-US" dirty="0">
                 <a:solidFill>
-                  <a:schemeClr val="bg1">
-                    <a:lumMod val="50000"/>
-                  </a:schemeClr>
-                </a:solidFill>
-                <a:latin typeface="Roboto" panose="020B0604020202020204" charset="0"/>
-                <a:ea typeface="Roboto" panose="020B0604020202020204" charset="0"/>
-              </a:rPr>
-              <a:t>JavaScript uses the for...in, for each...in, and with statements to manipulate objects.</a:t>
-            </a:r>
-          </a:p>
-          <a:p>
-            <a:pPr marL="114300" indent="0">
+                  <a:schemeClr val="tx2"/>
+                </a:solidFill>
+                <a:latin typeface="Roboto" panose="020B0604020202020204" charset="0"/>
+                <a:ea typeface="Roboto" panose="020B0604020202020204" charset="0"/>
+              </a:rPr>
+              <a:t>for ([</a:t>
+            </a:r>
+            <a:r>
+              <a:rPr lang="en-US" altLang="en-US" dirty="0" err="1">
+                <a:solidFill>
+                  <a:schemeClr val="tx2"/>
+                </a:solidFill>
+                <a:latin typeface="Roboto" panose="020B0604020202020204" charset="0"/>
+                <a:ea typeface="Roboto" panose="020B0604020202020204" charset="0"/>
+              </a:rPr>
+              <a:t>initialExpression</a:t>
+            </a:r>
+            <a:r>
+              <a:rPr lang="en-US" altLang="en-US" dirty="0">
+                <a:solidFill>
+                  <a:schemeClr val="tx2"/>
+                </a:solidFill>
+                <a:latin typeface="Roboto" panose="020B0604020202020204" charset="0"/>
+                <a:ea typeface="Roboto" panose="020B0604020202020204" charset="0"/>
+              </a:rPr>
+              <a:t>]; [condition]; [</a:t>
+            </a:r>
+            <a:r>
+              <a:rPr lang="en-US" altLang="en-US" dirty="0" err="1">
+                <a:solidFill>
+                  <a:schemeClr val="tx2"/>
+                </a:solidFill>
+                <a:latin typeface="Roboto" panose="020B0604020202020204" charset="0"/>
+                <a:ea typeface="Roboto" panose="020B0604020202020204" charset="0"/>
+              </a:rPr>
+              <a:t>incrementExpression</a:t>
+            </a:r>
+            <a:r>
+              <a:rPr lang="en-US" altLang="en-US" dirty="0">
+                <a:solidFill>
+                  <a:schemeClr val="tx2"/>
+                </a:solidFill>
+                <a:latin typeface="Roboto" panose="020B0604020202020204" charset="0"/>
+                <a:ea typeface="Roboto" panose="020B0604020202020204" charset="0"/>
+              </a:rPr>
+              <a:t>]){</a:t>
+            </a:r>
+          </a:p>
+          <a:p>
+            <a:pPr marL="0" lvl="0" indent="0" eaLnBrk="0" fontAlgn="base" hangingPunct="0">
+              <a:lnSpc>
+                <a:spcPct val="100000"/>
+              </a:lnSpc>
+              <a:spcBef>
+                <a:spcPct val="0"/>
+              </a:spcBef>
+              <a:spcAft>
+                <a:spcPct val="0"/>
+              </a:spcAft>
+              <a:buClrTx/>
+              <a:buSzTx/>
+              <a:buNone/>
+            </a:pPr>
+            <a:r>
+              <a:rPr lang="en-US" altLang="en-US" dirty="0">
+                <a:solidFill>
+                  <a:schemeClr val="tx2"/>
+                </a:solidFill>
+                <a:latin typeface="Roboto" panose="020B0604020202020204" charset="0"/>
+                <a:ea typeface="Roboto" panose="020B0604020202020204" charset="0"/>
+              </a:rPr>
+              <a:t> 	statement </a:t>
+            </a:r>
+          </a:p>
+          <a:p>
+            <a:pPr marL="0" lvl="0" indent="0" eaLnBrk="0" fontAlgn="base" hangingPunct="0">
+              <a:lnSpc>
+                <a:spcPct val="100000"/>
+              </a:lnSpc>
+              <a:spcBef>
+                <a:spcPct val="0"/>
+              </a:spcBef>
+              <a:spcAft>
+                <a:spcPct val="0"/>
+              </a:spcAft>
+              <a:buClrTx/>
+              <a:buSzTx/>
+              <a:buNone/>
+            </a:pPr>
+            <a:r>
+              <a:rPr lang="en-US" altLang="en-US" dirty="0">
+                <a:solidFill>
+                  <a:schemeClr val="tx2"/>
+                </a:solidFill>
+                <a:latin typeface="Roboto" panose="020B0604020202020204" charset="0"/>
+                <a:ea typeface="Roboto" panose="020B0604020202020204" charset="0"/>
+              </a:rPr>
+              <a:t>}</a:t>
+            </a:r>
+          </a:p>
+          <a:p>
+            <a:pPr marL="0" lvl="0" indent="0" eaLnBrk="0" fontAlgn="base" hangingPunct="0">
+              <a:lnSpc>
+                <a:spcPct val="100000"/>
+              </a:lnSpc>
+              <a:spcBef>
+                <a:spcPct val="0"/>
+              </a:spcBef>
+              <a:spcAft>
+                <a:spcPct val="0"/>
+              </a:spcAft>
+              <a:buClrTx/>
+              <a:buSzTx/>
               <a:buNone/>
             </a:pPr>
             <a:endParaRPr lang="en-US" altLang="en-US" dirty="0">
               <a:solidFill>
-                <a:schemeClr val="bg1">
-                  <a:lumMod val="50000"/>
-                </a:schemeClr>
+                <a:schemeClr val="tx2"/>
               </a:solidFill>
               <a:latin typeface="Roboto" panose="020B0604020202020204" charset="0"/>
               <a:ea typeface="Roboto" panose="020B0604020202020204" charset="0"/>
+            </a:endParaRPr>
+          </a:p>
+          <a:p>
+            <a:pPr marL="0" lvl="0" indent="0" eaLnBrk="0" fontAlgn="base" hangingPunct="0">
+              <a:lnSpc>
+                <a:spcPct val="100000"/>
+              </a:lnSpc>
+              <a:spcBef>
+                <a:spcPct val="0"/>
+              </a:spcBef>
+              <a:spcAft>
+                <a:spcPct val="0"/>
+              </a:spcAft>
+              <a:buClrTx/>
+              <a:buSzTx/>
+              <a:buNone/>
+            </a:pPr>
+            <a:r>
+              <a:rPr lang="en-US" altLang="en-US" b="1" dirty="0">
+                <a:solidFill>
+                  <a:schemeClr val="bg2"/>
+                </a:solidFill>
+                <a:latin typeface="Roboto" panose="020B0604020202020204" charset="0"/>
+                <a:ea typeface="Roboto" panose="020B0604020202020204" charset="0"/>
+              </a:rPr>
+              <a:t>Example,</a:t>
+            </a:r>
+          </a:p>
+          <a:p>
+            <a:pPr marL="0" lvl="0" indent="0" eaLnBrk="0" fontAlgn="base" hangingPunct="0">
+              <a:lnSpc>
+                <a:spcPct val="100000"/>
+              </a:lnSpc>
+              <a:spcBef>
+                <a:spcPct val="0"/>
+              </a:spcBef>
+              <a:spcAft>
+                <a:spcPct val="0"/>
+              </a:spcAft>
+              <a:buClrTx/>
+              <a:buSzTx/>
+              <a:buNone/>
+            </a:pPr>
+            <a:endParaRPr lang="en-US" altLang="en-US" dirty="0">
+              <a:solidFill>
+                <a:schemeClr val="tx2"/>
+              </a:solidFill>
+              <a:latin typeface="Roboto" panose="020B0604020202020204" charset="0"/>
+              <a:ea typeface="Roboto" panose="020B0604020202020204" charset="0"/>
+            </a:endParaRPr>
+          </a:p>
+          <a:p>
+            <a:pPr marL="0" indent="0" eaLnBrk="0" fontAlgn="base" hangingPunct="0">
+              <a:lnSpc>
+                <a:spcPct val="100000"/>
+              </a:lnSpc>
+              <a:spcBef>
+                <a:spcPct val="0"/>
+              </a:spcBef>
+              <a:spcAft>
+                <a:spcPct val="0"/>
+              </a:spcAft>
+              <a:buClrTx/>
+              <a:buSzTx/>
+              <a:buNone/>
+            </a:pPr>
+            <a:r>
+              <a:rPr lang="en-US" altLang="en-US" dirty="0">
+                <a:solidFill>
+                  <a:schemeClr val="tx2"/>
+                </a:solidFill>
+                <a:latin typeface="Consolas" panose="020B0609020204030204" pitchFamily="49" charset="0"/>
+              </a:rPr>
+              <a:t>for (var </a:t>
+            </a:r>
+            <a:r>
+              <a:rPr lang="en-US" altLang="en-US" dirty="0" err="1">
+                <a:solidFill>
+                  <a:schemeClr val="tx2"/>
+                </a:solidFill>
+                <a:latin typeface="Consolas" panose="020B0609020204030204" pitchFamily="49" charset="0"/>
+              </a:rPr>
+              <a:t>i</a:t>
+            </a:r>
+            <a:r>
+              <a:rPr lang="en-US" altLang="en-US" dirty="0">
+                <a:solidFill>
+                  <a:schemeClr val="tx2"/>
+                </a:solidFill>
+                <a:latin typeface="Consolas" panose="020B0609020204030204" pitchFamily="49" charset="0"/>
+              </a:rPr>
+              <a:t> = 0; </a:t>
+            </a:r>
+            <a:r>
+              <a:rPr lang="en-US" altLang="en-US" dirty="0" err="1">
+                <a:solidFill>
+                  <a:schemeClr val="tx2"/>
+                </a:solidFill>
+                <a:latin typeface="Consolas" panose="020B0609020204030204" pitchFamily="49" charset="0"/>
+              </a:rPr>
+              <a:t>i</a:t>
+            </a:r>
+            <a:r>
+              <a:rPr lang="en-US" altLang="en-US" dirty="0">
+                <a:solidFill>
+                  <a:schemeClr val="tx2"/>
+                </a:solidFill>
+                <a:latin typeface="Consolas" panose="020B0609020204030204" pitchFamily="49" charset="0"/>
+              </a:rPr>
+              <a:t> &lt; </a:t>
+            </a:r>
+            <a:r>
+              <a:rPr lang="en-US" altLang="en-US" dirty="0" err="1">
+                <a:solidFill>
+                  <a:schemeClr val="tx2"/>
+                </a:solidFill>
+                <a:latin typeface="Consolas" panose="020B0609020204030204" pitchFamily="49" charset="0"/>
+              </a:rPr>
+              <a:t>selectObject.options.length</a:t>
+            </a:r>
+            <a:r>
+              <a:rPr lang="en-US" altLang="en-US" dirty="0">
+                <a:solidFill>
+                  <a:schemeClr val="tx2"/>
+                </a:solidFill>
+                <a:latin typeface="Consolas" panose="020B0609020204030204" pitchFamily="49" charset="0"/>
+              </a:rPr>
+              <a:t>; </a:t>
+            </a:r>
+            <a:r>
+              <a:rPr lang="en-US" altLang="en-US" dirty="0" err="1">
+                <a:solidFill>
+                  <a:schemeClr val="tx2"/>
+                </a:solidFill>
+                <a:latin typeface="Consolas" panose="020B0609020204030204" pitchFamily="49" charset="0"/>
+              </a:rPr>
+              <a:t>i</a:t>
+            </a:r>
+            <a:r>
+              <a:rPr lang="en-US" altLang="en-US" dirty="0">
+                <a:solidFill>
+                  <a:schemeClr val="tx2"/>
+                </a:solidFill>
+                <a:latin typeface="Consolas" panose="020B0609020204030204" pitchFamily="49" charset="0"/>
+              </a:rPr>
+              <a:t>++)</a:t>
+            </a:r>
+          </a:p>
+          <a:p>
+            <a:pPr marL="0" indent="0" eaLnBrk="0" fontAlgn="base" hangingPunct="0">
+              <a:lnSpc>
+                <a:spcPct val="100000"/>
+              </a:lnSpc>
+              <a:spcBef>
+                <a:spcPct val="0"/>
+              </a:spcBef>
+              <a:spcAft>
+                <a:spcPct val="0"/>
+              </a:spcAft>
+              <a:buClrTx/>
+              <a:buSzTx/>
+              <a:buNone/>
+            </a:pPr>
+            <a:r>
+              <a:rPr lang="en-US" altLang="en-US" dirty="0">
+                <a:solidFill>
+                  <a:schemeClr val="tx2"/>
+                </a:solidFill>
+                <a:latin typeface="Consolas" panose="020B0609020204030204" pitchFamily="49" charset="0"/>
+              </a:rPr>
+              <a:t> {</a:t>
+            </a:r>
+          </a:p>
+          <a:p>
+            <a:pPr marL="0" indent="0" eaLnBrk="0" fontAlgn="base" hangingPunct="0">
+              <a:lnSpc>
+                <a:spcPct val="100000"/>
+              </a:lnSpc>
+              <a:spcBef>
+                <a:spcPct val="0"/>
+              </a:spcBef>
+              <a:spcAft>
+                <a:spcPct val="0"/>
+              </a:spcAft>
+              <a:buClrTx/>
+              <a:buSzTx/>
+              <a:buNone/>
+            </a:pPr>
+            <a:r>
+              <a:rPr lang="en-US" altLang="en-US" dirty="0">
+                <a:solidFill>
+                  <a:schemeClr val="tx2"/>
+                </a:solidFill>
+                <a:latin typeface="Consolas" panose="020B0609020204030204" pitchFamily="49" charset="0"/>
+              </a:rPr>
+              <a:t> 	consol.log(</a:t>
+            </a:r>
+            <a:r>
+              <a:rPr lang="en-US" altLang="en-US" dirty="0" err="1">
+                <a:solidFill>
+                  <a:schemeClr val="tx2"/>
+                </a:solidFill>
+                <a:latin typeface="Consolas" panose="020B0609020204030204" pitchFamily="49" charset="0"/>
+              </a:rPr>
+              <a:t>i</a:t>
+            </a:r>
+            <a:r>
+              <a:rPr lang="en-US" altLang="en-US" dirty="0">
+                <a:solidFill>
+                  <a:schemeClr val="tx2"/>
+                </a:solidFill>
+                <a:latin typeface="Consolas" panose="020B0609020204030204" pitchFamily="49" charset="0"/>
+              </a:rPr>
+              <a:t>);</a:t>
+            </a:r>
+          </a:p>
+          <a:p>
+            <a:pPr marL="0" indent="0" eaLnBrk="0" fontAlgn="base" hangingPunct="0">
+              <a:lnSpc>
+                <a:spcPct val="100000"/>
+              </a:lnSpc>
+              <a:spcBef>
+                <a:spcPct val="0"/>
+              </a:spcBef>
+              <a:spcAft>
+                <a:spcPct val="0"/>
+              </a:spcAft>
+              <a:buClrTx/>
+              <a:buSzTx/>
+              <a:buNone/>
+            </a:pPr>
+            <a:r>
+              <a:rPr lang="en-US" altLang="en-US" dirty="0">
+                <a:solidFill>
+                  <a:schemeClr val="tx2"/>
+                </a:solidFill>
+                <a:latin typeface="Consolas" panose="020B0609020204030204" pitchFamily="49" charset="0"/>
+              </a:rPr>
+              <a:t> }</a:t>
+            </a:r>
+            <a:r>
+              <a:rPr lang="en-US" altLang="en-US" sz="1400" dirty="0">
+                <a:solidFill>
+                  <a:schemeClr val="tx2"/>
+                </a:solidFill>
+              </a:rPr>
+              <a:t> </a:t>
+            </a:r>
+            <a:endParaRPr lang="en-US" altLang="en-US" sz="4000" dirty="0">
+              <a:solidFill>
+                <a:schemeClr val="tx2"/>
+              </a:solidFill>
+              <a:latin typeface="Arial" panose="020B0604020202020204" pitchFamily="34" charset="0"/>
             </a:endParaRPr>
           </a:p>
           <a:p>
@@ -8215,7 +12685,7 @@
     </p:spTree>
     <p:extLst>
       <p:ext uri="{BB962C8B-B14F-4D97-AF65-F5344CB8AC3E}">
-        <p14:creationId xmlns:p14="http://schemas.microsoft.com/office/powerpoint/2010/main" val="1162783113"/>
+        <p14:creationId xmlns:p14="http://schemas.microsoft.com/office/powerpoint/2010/main" val="1995994981"/>
       </p:ext>
     </p:extLst>
   </p:cSld>

</xml_diff>